<commit_message>
Review lecture 24 (NP-complete reductions)
</commit_message>
<xml_diff>
--- a/Lectures/Lecture 24_NP-Complete Reductions.pptx
+++ b/Lectures/Lecture 24_NP-Complete Reductions.pptx
@@ -273,7 +273,7 @@
           <a:p>
             <a:fld id="{40A064AD-7059-6948-BAB0-E62C6B3257D3}" type="datetimeFigureOut">
               <a:rPr lang="en-US" smtClean="0"/>
-              <a:t>4/23/24</a:t>
+              <a:t>4/27/24</a:t>
             </a:fld>
             <a:endParaRPr lang="en-US"/>
           </a:p>
@@ -438,7 +438,7 @@
           <a:p>
             <a:fld id="{07F74A3F-3C2C-9340-BD65-4AF8BE3CE1AC}" type="datetimeFigureOut">
               <a:rPr lang="en-US" smtClean="0"/>
-              <a:t>4/23/24</a:t>
+              <a:t>4/27/24</a:t>
             </a:fld>
             <a:endParaRPr lang="en-US"/>
           </a:p>
@@ -1078,7 +1078,7 @@
           <a:p>
             <a:fld id="{D728701E-CAF4-4159-9B3E-41C86DFFA30D}" type="datetimeFigureOut">
               <a:rPr lang="en-US" smtClean="0"/>
-              <a:t>4/23/24</a:t>
+              <a:t>4/27/24</a:t>
             </a:fld>
             <a:endParaRPr lang="en-US"/>
           </a:p>
@@ -1273,7 +1273,7 @@
           <a:p>
             <a:fld id="{D728701E-CAF4-4159-9B3E-41C86DFFA30D}" type="datetimeFigureOut">
               <a:rPr lang="en-US" smtClean="0"/>
-              <a:t>4/23/24</a:t>
+              <a:t>4/27/24</a:t>
             </a:fld>
             <a:endParaRPr lang="en-US"/>
           </a:p>
@@ -1457,7 +1457,7 @@
           <a:p>
             <a:fld id="{D728701E-CAF4-4159-9B3E-41C86DFFA30D}" type="datetimeFigureOut">
               <a:rPr lang="en-US" smtClean="0"/>
-              <a:t>4/23/24</a:t>
+              <a:t>4/27/24</a:t>
             </a:fld>
             <a:endParaRPr lang="en-US"/>
           </a:p>
@@ -1719,7 +1719,7 @@
           <a:p>
             <a:fld id="{D728701E-CAF4-4159-9B3E-41C86DFFA30D}" type="datetimeFigureOut">
               <a:rPr lang="en-US" smtClean="0"/>
-              <a:t>4/23/24</a:t>
+              <a:t>4/27/24</a:t>
             </a:fld>
             <a:endParaRPr lang="en-US"/>
           </a:p>
@@ -2134,7 +2134,7 @@
           <a:p>
             <a:fld id="{D728701E-CAF4-4159-9B3E-41C86DFFA30D}" type="datetimeFigureOut">
               <a:rPr lang="en-US" smtClean="0"/>
-              <a:t>4/23/24</a:t>
+              <a:t>4/27/24</a:t>
             </a:fld>
             <a:endParaRPr lang="en-US"/>
           </a:p>
@@ -2375,7 +2375,7 @@
           <a:p>
             <a:fld id="{D728701E-CAF4-4159-9B3E-41C86DFFA30D}" type="datetimeFigureOut">
               <a:rPr lang="en-US" smtClean="0"/>
-              <a:t>4/23/24</a:t>
+              <a:t>4/27/24</a:t>
             </a:fld>
             <a:endParaRPr lang="en-US"/>
           </a:p>
@@ -2610,7 +2610,7 @@
           <a:p>
             <a:fld id="{D728701E-CAF4-4159-9B3E-41C86DFFA30D}" type="datetimeFigureOut">
               <a:rPr lang="en-US" smtClean="0"/>
-              <a:t>4/23/24</a:t>
+              <a:t>4/27/24</a:t>
             </a:fld>
             <a:endParaRPr lang="en-US"/>
           </a:p>
@@ -2804,7 +2804,7 @@
           <a:p>
             <a:fld id="{D728701E-CAF4-4159-9B3E-41C86DFFA30D}" type="datetimeFigureOut">
               <a:rPr lang="en-US" smtClean="0"/>
-              <a:t>4/23/24</a:t>
+              <a:t>4/27/24</a:t>
             </a:fld>
             <a:endParaRPr lang="en-US"/>
           </a:p>
@@ -2902,7 +2902,7 @@
           <a:p>
             <a:fld id="{D728701E-CAF4-4159-9B3E-41C86DFFA30D}" type="datetimeFigureOut">
               <a:rPr lang="en-US" smtClean="0"/>
-              <a:t>4/23/24</a:t>
+              <a:t>4/27/24</a:t>
             </a:fld>
             <a:endParaRPr lang="en-US"/>
           </a:p>
@@ -3037,7 +3037,7 @@
           <a:p>
             <a:fld id="{D728701E-CAF4-4159-9B3E-41C86DFFA30D}" type="datetimeFigureOut">
               <a:rPr lang="en-US" smtClean="0"/>
-              <a:t>4/23/24</a:t>
+              <a:t>4/27/24</a:t>
             </a:fld>
             <a:endParaRPr lang="en-US"/>
           </a:p>
@@ -3559,7 +3559,7 @@
           <a:p>
             <a:fld id="{D728701E-CAF4-4159-9B3E-41C86DFFA30D}" type="datetimeFigureOut">
               <a:rPr lang="en-US" smtClean="0"/>
-              <a:t>4/23/24</a:t>
+              <a:t>4/27/24</a:t>
             </a:fld>
             <a:endParaRPr lang="en-US"/>
           </a:p>
@@ -3818,7 +3818,7 @@
           <a:p>
             <a:fld id="{D728701E-CAF4-4159-9B3E-41C86DFFA30D}" type="datetimeFigureOut">
               <a:rPr lang="en-US" smtClean="0"/>
-              <a:t>4/23/24</a:t>
+              <a:t>4/27/24</a:t>
             </a:fld>
             <a:endParaRPr lang="en-US"/>
           </a:p>
@@ -4670,15 +4670,7 @@
             </a:pPr>
             <a:r>
               <a:rPr lang="en-US" sz="2400" dirty="0"/>
-              <a:t>A </a:t>
-            </a:r>
-            <a:r>
-              <a:rPr lang="en-US" sz="2400" dirty="0" err="1"/>
-              <a:t>boolean</a:t>
-            </a:r>
-            <a:r>
-              <a:rPr lang="en-US" sz="2400" dirty="0"/>
-              <a:t> formula is in </a:t>
+              <a:t>A Boolean formula is in </a:t>
             </a:r>
             <a:r>
               <a:rPr lang="en-US" sz="2400" i="1" dirty="0"/>
@@ -4941,15 +4933,7 @@
             </a:pPr>
             <a:r>
               <a:rPr lang="en-US" sz="2800" dirty="0"/>
-              <a:t>Given a </a:t>
-            </a:r>
-            <a:r>
-              <a:rPr lang="en-US" sz="2800" dirty="0" err="1"/>
-              <a:t>boolean</a:t>
-            </a:r>
-            <a:r>
-              <a:rPr lang="en-US" sz="2800" dirty="0"/>
-              <a:t> formula of </a:t>
+              <a:t>Given a Boolean formula of </a:t>
             </a:r>
             <a:r>
               <a:rPr lang="en-US" sz="2800" i="1" dirty="0"/>
@@ -4957,15 +4941,7 @@
             </a:r>
             <a:r>
               <a:rPr lang="en-US" sz="2800" dirty="0"/>
-              <a:t> </a:t>
-            </a:r>
-            <a:r>
-              <a:rPr lang="en-US" sz="2800" dirty="0" err="1"/>
-              <a:t>boolean</a:t>
-            </a:r>
-            <a:r>
-              <a:rPr lang="en-US" sz="2800" dirty="0"/>
-              <a:t> variables joined by </a:t>
+              <a:t> Boolean variables joined by </a:t>
             </a:r>
             <a:r>
               <a:rPr lang="en-US" sz="2800" i="1" dirty="0"/>
@@ -4973,19 +4949,14 @@
             </a:r>
             <a:r>
               <a:rPr lang="en-US" sz="2800" dirty="0"/>
-              <a:t> connectives (AND, OR or NOT) is there a setting of the variables such that the </a:t>
-            </a:r>
-            <a:r>
-              <a:rPr lang="en-US" sz="2800" dirty="0" err="1"/>
-              <a:t>boolean</a:t>
-            </a:r>
+              <a:t> connectives (AND, OR or NOT) is there a setting of the variables such that the Boolean formula evaluate to true?</a:t>
+            </a:r>
+          </a:p>
+          <a:p>
             <a:r>
               <a:rPr lang="en-US" sz="2800" dirty="0"/>
-              <a:t> formula evaluate to true?</a:t>
-            </a:r>
-          </a:p>
-          <a:p>
-            <a:endParaRPr lang="en-US" sz="2800" dirty="0"/>
+              <a:t> </a:t>
+            </a:r>
           </a:p>
         </p:txBody>
       </p:sp>
@@ -5538,15 +5509,7 @@
             </a:pPr>
             <a:r>
               <a:rPr lang="en-US" sz="2400" dirty="0"/>
-              <a:t>Given a </a:t>
-            </a:r>
-            <a:r>
-              <a:rPr lang="en-US" sz="2400" dirty="0" err="1"/>
-              <a:t>boolean</a:t>
-            </a:r>
-            <a:r>
-              <a:rPr lang="en-US" sz="2400" dirty="0"/>
-              <a:t> formula of </a:t>
+              <a:t>Given a Boolean formula of </a:t>
             </a:r>
             <a:r>
               <a:rPr lang="en-US" sz="2400" i="1" dirty="0"/>
@@ -5554,15 +5517,7 @@
             </a:r>
             <a:r>
               <a:rPr lang="en-US" sz="2400" dirty="0"/>
-              <a:t> </a:t>
-            </a:r>
-            <a:r>
-              <a:rPr lang="en-US" sz="2400" dirty="0" err="1"/>
-              <a:t>boolean</a:t>
-            </a:r>
-            <a:r>
-              <a:rPr lang="en-US" sz="2400" dirty="0"/>
-              <a:t> variables joined by </a:t>
+              <a:t> Boolean variables joined by </a:t>
             </a:r>
             <a:r>
               <a:rPr lang="en-US" sz="2400" i="1" dirty="0"/>
@@ -5570,15 +5525,7 @@
             </a:r>
             <a:r>
               <a:rPr lang="en-US" sz="2400" dirty="0"/>
-              <a:t> connectives (AND, OR or NOT) is there a setting of the variables such that the </a:t>
-            </a:r>
-            <a:r>
-              <a:rPr lang="en-US" sz="2400" dirty="0" err="1"/>
-              <a:t>boolean</a:t>
-            </a:r>
-            <a:r>
-              <a:rPr lang="en-US" sz="2400" dirty="0"/>
-              <a:t> formula evaluate to true?</a:t>
+              <a:t> connectives (AND, OR or NOT) is there a setting of the variables such that the Boolean formula evaluate to true?</a:t>
             </a:r>
           </a:p>
           <a:p>
@@ -5595,10 +5542,16 @@
           <p:cNvGraphicFramePr>
             <a:graphicFrameLocks noChangeAspect="1"/>
           </p:cNvGraphicFramePr>
-          <p:nvPr/>
+          <p:nvPr>
+            <p:extLst>
+              <p:ext uri="{D42A27DB-BD31-4B8C-83A1-F6EECF244321}">
+                <p14:modId xmlns:p14="http://schemas.microsoft.com/office/powerpoint/2010/main" val="4063579298"/>
+              </p:ext>
+            </p:extLst>
+          </p:nvPr>
         </p:nvGraphicFramePr>
         <p:xfrm>
-          <a:off x="1476360" y="2881496"/>
+          <a:off x="2068543" y="2859783"/>
           <a:ext cx="4290933" cy="404166"/>
         </p:xfrm>
         <a:graphic>
@@ -5626,7 +5579,7 @@
                     </p:blipFill>
                     <p:spPr>
                       <a:xfrm>
-                        <a:off x="1476360" y="2881496"/>
+                        <a:off x="2068543" y="2859783"/>
                         <a:ext cx="4290933" cy="404166"/>
                       </a:xfrm>
                       <a:prstGeom prst="rect">
@@ -5945,7 +5898,7 @@
           <a:p>
             <a:r>
               <a:rPr lang="en-US" sz="2400" dirty="0"/>
-              <a:t>Verifier: A solution consists of an assignment of the variables</a:t>
+              <a:t>Verifier: A solution consists of an assignment of the variables.</a:t>
             </a:r>
           </a:p>
           <a:p>
@@ -7136,7 +7089,7 @@
             </a:pPr>
             <a:r>
               <a:rPr lang="en-US" sz="2000" dirty="0"/>
-              <a:t>Because 3-SAT problems are a subset of SAT problems, then the SAT problem will also have a solution</a:t>
+              <a:t>Because 3-SAT problems are a subset of SAT problems, then the SAT problem will also have a solution.</a:t>
             </a:r>
           </a:p>
           <a:p>
@@ -7163,7 +7116,7 @@
             </a:br>
             <a:r>
               <a:rPr lang="en-US" sz="2000" dirty="0"/>
-              <a:t>3-SAT problem</a:t>
+              <a:t>3-SAT problem.</a:t>
             </a:r>
           </a:p>
           <a:p>
@@ -7173,7 +7126,7 @@
             </a:pPr>
             <a:r>
               <a:rPr lang="en-US" sz="2000" dirty="0"/>
-              <a:t>Therefore the variable assignment found by our SAT-solver will also be a solution to the original 3-SAT problem</a:t>
+              <a:t>Therefore, the variable assignment found by our SAT-solver will also be a solution to the original 3-SAT problem.</a:t>
             </a:r>
           </a:p>
         </p:txBody>
@@ -7514,7 +7467,7 @@
             </a:r>
             <a:r>
               <a:rPr lang="en-US" sz="2800" dirty="0"/>
-              <a:t> in an undirected graph G = (V, E) is a subset V’ ⊆ V of vertices that are fully connected, i.e. every vertex in V’ is connected to every other vertex in V’</a:t>
+              <a:t> in an undirected graph G = (V, E) is a subset V’ ⊆ V of vertices that are fully connected, i.e., every vertex in V’ is connected to every other vertex in V’</a:t>
             </a:r>
           </a:p>
           <a:p>
@@ -8802,15 +8755,7 @@
             </a:pPr>
             <a:r>
               <a:rPr lang="en-US" sz="2400" dirty="0"/>
-              <a:t>there exists an edge (</a:t>
-            </a:r>
-            <a:r>
-              <a:rPr lang="en-US" sz="2400" dirty="0" err="1"/>
-              <a:t>u,v</a:t>
-            </a:r>
-            <a:r>
-              <a:rPr lang="en-US" sz="2400" dirty="0"/>
-              <a:t>) ∈ E</a:t>
+              <a:t>there exists an edge (u, v) ∈ E</a:t>
             </a:r>
           </a:p>
         </p:txBody>
@@ -9493,7 +9438,7 @@
           <a:effectLst/>
           <a:extLst>
             <a:ext uri="{AF507438-7753-43e0-B8FC-AC1667EBCBE1}">
-              <a14:hiddenEffects xmlns:a14="http://schemas.microsoft.com/office/drawing/2010/main" xmlns="">
+              <a14:hiddenEffects xmlns="" xmlns:a14="http://schemas.microsoft.com/office/drawing/2010/main">
                 <a:effectLst>
                   <a:outerShdw blurRad="63500" dist="38099" dir="2700000" algn="ctr" rotWithShape="0">
                     <a:schemeClr val="bg2">
@@ -9547,12 +9492,12 @@
           <a:effectLst/>
           <a:extLst>
             <a:ext uri="{909E8E84-426E-40dd-AFC4-6F175D3DCCD1}">
-              <a14:hiddenFill xmlns:a14="http://schemas.microsoft.com/office/drawing/2010/main" xmlns="">
+              <a14:hiddenFill xmlns="" xmlns:a14="http://schemas.microsoft.com/office/drawing/2010/main">
                 <a:noFill/>
               </a14:hiddenFill>
             </a:ext>
             <a:ext uri="{AF507438-7753-43e0-B8FC-AC1667EBCBE1}">
-              <a14:hiddenEffects xmlns:a14="http://schemas.microsoft.com/office/drawing/2010/main" xmlns="">
+              <a14:hiddenEffects xmlns="" xmlns:a14="http://schemas.microsoft.com/office/drawing/2010/main">
                 <a:effectLst>
                   <a:outerShdw blurRad="63500" dist="38099" dir="2700000" algn="ctr" rotWithShape="0">
                     <a:schemeClr val="bg2">
@@ -9595,14 +9540,14 @@
           <a:effectLst/>
           <a:extLst>
             <a:ext uri="{909E8E84-426E-40dd-AFC4-6F175D3DCCD1}">
-              <a14:hiddenFill xmlns:a14="http://schemas.microsoft.com/office/drawing/2010/main" xmlns="">
+              <a14:hiddenFill xmlns="" xmlns:a14="http://schemas.microsoft.com/office/drawing/2010/main">
                 <a:solidFill>
                   <a:schemeClr val="accent1"/>
                 </a:solidFill>
               </a14:hiddenFill>
             </a:ext>
             <a:ext uri="{91240B29-F687-4f45-9708-019B960494DF}">
-              <a14:hiddenLine xmlns:a14="http://schemas.microsoft.com/office/drawing/2010/main" xmlns="" w="9525">
+              <a14:hiddenLine xmlns="" xmlns:a14="http://schemas.microsoft.com/office/drawing/2010/main" w="9525">
                 <a:solidFill>
                   <a:schemeClr val="tx1"/>
                 </a:solidFill>
@@ -9612,7 +9557,7 @@
               </a14:hiddenLine>
             </a:ext>
             <a:ext uri="{AF507438-7753-43e0-B8FC-AC1667EBCBE1}">
-              <a14:hiddenEffects xmlns:a14="http://schemas.microsoft.com/office/drawing/2010/main" xmlns="">
+              <a14:hiddenEffects xmlns="" xmlns:a14="http://schemas.microsoft.com/office/drawing/2010/main">
                 <a:effectLst>
                   <a:outerShdw blurRad="63500" dist="38099" dir="2700000" algn="ctr" rotWithShape="0">
                     <a:schemeClr val="bg2">
@@ -9662,14 +9607,14 @@
           <a:effectLst/>
           <a:extLst>
             <a:ext uri="{909E8E84-426E-40dd-AFC4-6F175D3DCCD1}">
-              <a14:hiddenFill xmlns:a14="http://schemas.microsoft.com/office/drawing/2010/main" xmlns="">
+              <a14:hiddenFill xmlns="" xmlns:a14="http://schemas.microsoft.com/office/drawing/2010/main">
                 <a:solidFill>
                   <a:schemeClr val="accent1"/>
                 </a:solidFill>
               </a14:hiddenFill>
             </a:ext>
             <a:ext uri="{91240B29-F687-4f45-9708-019B960494DF}">
-              <a14:hiddenLine xmlns:a14="http://schemas.microsoft.com/office/drawing/2010/main" xmlns="" w="9525">
+              <a14:hiddenLine xmlns="" xmlns:a14="http://schemas.microsoft.com/office/drawing/2010/main" w="9525">
                 <a:solidFill>
                   <a:schemeClr val="tx1"/>
                 </a:solidFill>
@@ -9679,7 +9624,7 @@
               </a14:hiddenLine>
             </a:ext>
             <a:ext uri="{AF507438-7753-43e0-B8FC-AC1667EBCBE1}">
-              <a14:hiddenEffects xmlns:a14="http://schemas.microsoft.com/office/drawing/2010/main" xmlns="">
+              <a14:hiddenEffects xmlns="" xmlns:a14="http://schemas.microsoft.com/office/drawing/2010/main">
                 <a:effectLst>
                   <a:outerShdw blurRad="63500" dist="38099" dir="2700000" algn="ctr" rotWithShape="0">
                     <a:schemeClr val="bg2">
@@ -9734,12 +9679,12 @@
           <a:effectLst/>
           <a:extLst>
             <a:ext uri="{909E8E84-426E-40dd-AFC4-6F175D3DCCD1}">
-              <a14:hiddenFill xmlns:a14="http://schemas.microsoft.com/office/drawing/2010/main" xmlns="">
+              <a14:hiddenFill xmlns="" xmlns:a14="http://schemas.microsoft.com/office/drawing/2010/main">
                 <a:noFill/>
               </a14:hiddenFill>
             </a:ext>
             <a:ext uri="{AF507438-7753-43e0-B8FC-AC1667EBCBE1}">
-              <a14:hiddenEffects xmlns:a14="http://schemas.microsoft.com/office/drawing/2010/main" xmlns="">
+              <a14:hiddenEffects xmlns="" xmlns:a14="http://schemas.microsoft.com/office/drawing/2010/main">
                 <a:effectLst>
                   <a:outerShdw blurRad="63500" dist="38099" dir="2700000" algn="ctr" rotWithShape="0">
                     <a:schemeClr val="bg2">
@@ -9782,14 +9727,14 @@
           <a:effectLst/>
           <a:extLst>
             <a:ext uri="{909E8E84-426E-40dd-AFC4-6F175D3DCCD1}">
-              <a14:hiddenFill xmlns:a14="http://schemas.microsoft.com/office/drawing/2010/main" xmlns="">
+              <a14:hiddenFill xmlns="" xmlns:a14="http://schemas.microsoft.com/office/drawing/2010/main">
                 <a:solidFill>
                   <a:schemeClr val="accent1"/>
                 </a:solidFill>
               </a14:hiddenFill>
             </a:ext>
             <a:ext uri="{91240B29-F687-4f45-9708-019B960494DF}">
-              <a14:hiddenLine xmlns:a14="http://schemas.microsoft.com/office/drawing/2010/main" xmlns="" w="9525">
+              <a14:hiddenLine xmlns="" xmlns:a14="http://schemas.microsoft.com/office/drawing/2010/main" w="9525">
                 <a:solidFill>
                   <a:schemeClr val="tx1"/>
                 </a:solidFill>
@@ -9799,7 +9744,7 @@
               </a14:hiddenLine>
             </a:ext>
             <a:ext uri="{AF507438-7753-43e0-B8FC-AC1667EBCBE1}">
-              <a14:hiddenEffects xmlns:a14="http://schemas.microsoft.com/office/drawing/2010/main" xmlns="">
+              <a14:hiddenEffects xmlns="" xmlns:a14="http://schemas.microsoft.com/office/drawing/2010/main">
                 <a:effectLst>
                   <a:outerShdw blurRad="63500" dist="38099" dir="2700000" algn="ctr" rotWithShape="0">
                     <a:schemeClr val="bg2">
@@ -9817,21 +9762,24 @@
           </a:bodyPr>
           <a:lstStyle/>
           <a:p>
+            <a:pPr algn="just"/>
             <a:r>
               <a:rPr lang="en-US" dirty="0"/>
               <a:t>CLIQUE problem</a:t>
             </a:r>
           </a:p>
           <a:p>
+            <a:pPr algn="just"/>
             <a:r>
               <a:rPr lang="en-US" dirty="0"/>
               <a:t>(Does G have </a:t>
             </a:r>
           </a:p>
           <a:p>
+            <a:pPr algn="just"/>
             <a:r>
               <a:rPr lang="en-US" dirty="0"/>
-              <a:t>clique of size k)</a:t>
+              <a:t>clique of size k?)</a:t>
             </a:r>
           </a:p>
         </p:txBody>
@@ -9859,14 +9807,14 @@
           <a:effectLst/>
           <a:extLst>
             <a:ext uri="{909E8E84-426E-40dd-AFC4-6F175D3DCCD1}">
-              <a14:hiddenFill xmlns:a14="http://schemas.microsoft.com/office/drawing/2010/main" xmlns="">
+              <a14:hiddenFill xmlns="" xmlns:a14="http://schemas.microsoft.com/office/drawing/2010/main">
                 <a:solidFill>
                   <a:schemeClr val="accent1"/>
                 </a:solidFill>
               </a14:hiddenFill>
             </a:ext>
             <a:ext uri="{91240B29-F687-4f45-9708-019B960494DF}">
-              <a14:hiddenLine xmlns:a14="http://schemas.microsoft.com/office/drawing/2010/main" xmlns="" w="9525">
+              <a14:hiddenLine xmlns="" xmlns:a14="http://schemas.microsoft.com/office/drawing/2010/main" w="9525">
                 <a:solidFill>
                   <a:schemeClr val="tx1"/>
                 </a:solidFill>
@@ -9876,7 +9824,7 @@
               </a14:hiddenLine>
             </a:ext>
             <a:ext uri="{AF507438-7753-43e0-B8FC-AC1667EBCBE1}">
-              <a14:hiddenEffects xmlns:a14="http://schemas.microsoft.com/office/drawing/2010/main" xmlns="">
+              <a14:hiddenEffects xmlns="" xmlns:a14="http://schemas.microsoft.com/office/drawing/2010/main">
                 <a:effectLst>
                   <a:outerShdw blurRad="63500" dist="38099" dir="2700000" algn="ctr" rotWithShape="0">
                     <a:schemeClr val="bg2">
@@ -9894,21 +9842,24 @@
           </a:bodyPr>
           <a:lstStyle/>
           <a:p>
+            <a:pPr algn="just"/>
             <a:r>
               <a:rPr lang="en-US" dirty="0"/>
               <a:t>HALF-CLIQUE problem</a:t>
             </a:r>
           </a:p>
           <a:p>
+            <a:pPr algn="just"/>
             <a:r>
               <a:rPr lang="en-US" dirty="0"/>
               <a:t>(Does G have a clique</a:t>
             </a:r>
           </a:p>
           <a:p>
+            <a:pPr algn="just"/>
             <a:r>
               <a:rPr lang="en-US" dirty="0"/>
-              <a:t>exactly have the size)</a:t>
+              <a:t>exactly have the size?)</a:t>
             </a:r>
           </a:p>
         </p:txBody>
@@ -10074,12 +10025,12 @@
           <a:effectLst/>
           <a:extLst>
             <a:ext uri="{909E8E84-426E-40dd-AFC4-6F175D3DCCD1}">
-              <a14:hiddenFill xmlns:a14="http://schemas.microsoft.com/office/drawing/2010/main" xmlns="">
+              <a14:hiddenFill xmlns="" xmlns:a14="http://schemas.microsoft.com/office/drawing/2010/main">
                 <a:noFill/>
               </a14:hiddenFill>
             </a:ext>
             <a:ext uri="{AF507438-7753-43e0-B8FC-AC1667EBCBE1}">
-              <a14:hiddenEffects xmlns:a14="http://schemas.microsoft.com/office/drawing/2010/main" xmlns="">
+              <a14:hiddenEffects xmlns="" xmlns:a14="http://schemas.microsoft.com/office/drawing/2010/main">
                 <a:effectLst>
                   <a:outerShdw blurRad="63500" dist="38099" dir="2700000" algn="ctr" rotWithShape="0">
                     <a:schemeClr val="bg2">
@@ -10128,12 +10079,12 @@
           <a:effectLst/>
           <a:extLst>
             <a:ext uri="{909E8E84-426E-40dd-AFC4-6F175D3DCCD1}">
-              <a14:hiddenFill xmlns:a14="http://schemas.microsoft.com/office/drawing/2010/main" xmlns="">
+              <a14:hiddenFill xmlns="" xmlns:a14="http://schemas.microsoft.com/office/drawing/2010/main">
                 <a:noFill/>
               </a14:hiddenFill>
             </a:ext>
             <a:ext uri="{AF507438-7753-43e0-B8FC-AC1667EBCBE1}">
-              <a14:hiddenEffects xmlns:a14="http://schemas.microsoft.com/office/drawing/2010/main" xmlns="">
+              <a14:hiddenEffects xmlns="" xmlns:a14="http://schemas.microsoft.com/office/drawing/2010/main">
                 <a:effectLst>
                   <a:outerShdw blurRad="63500" dist="38099" dir="2700000" algn="ctr" rotWithShape="0">
                     <a:schemeClr val="bg2">
@@ -10235,7 +10186,7 @@
           <a:effectLst/>
           <a:extLst>
             <a:ext uri="{AF507438-7753-43e0-B8FC-AC1667EBCBE1}">
-              <a14:hiddenEffects xmlns:a14="http://schemas.microsoft.com/office/drawing/2010/main" xmlns="">
+              <a14:hiddenEffects xmlns="" xmlns:a14="http://schemas.microsoft.com/office/drawing/2010/main">
                 <a:effectLst>
                   <a:outerShdw blurRad="63500" dist="38099" dir="2700000" algn="ctr" rotWithShape="0">
                     <a:schemeClr val="bg2">
@@ -10289,12 +10240,12 @@
           <a:effectLst/>
           <a:extLst>
             <a:ext uri="{909E8E84-426E-40dd-AFC4-6F175D3DCCD1}">
-              <a14:hiddenFill xmlns:a14="http://schemas.microsoft.com/office/drawing/2010/main" xmlns="">
+              <a14:hiddenFill xmlns="" xmlns:a14="http://schemas.microsoft.com/office/drawing/2010/main">
                 <a:noFill/>
               </a14:hiddenFill>
             </a:ext>
             <a:ext uri="{AF507438-7753-43e0-B8FC-AC1667EBCBE1}">
-              <a14:hiddenEffects xmlns:a14="http://schemas.microsoft.com/office/drawing/2010/main" xmlns="">
+              <a14:hiddenEffects xmlns="" xmlns:a14="http://schemas.microsoft.com/office/drawing/2010/main">
                 <a:effectLst>
                   <a:outerShdw blurRad="63500" dist="38099" dir="2700000" algn="ctr" rotWithShape="0">
                     <a:schemeClr val="bg2">
@@ -10337,14 +10288,14 @@
           <a:effectLst/>
           <a:extLst>
             <a:ext uri="{909E8E84-426E-40dd-AFC4-6F175D3DCCD1}">
-              <a14:hiddenFill xmlns:a14="http://schemas.microsoft.com/office/drawing/2010/main" xmlns="">
+              <a14:hiddenFill xmlns="" xmlns:a14="http://schemas.microsoft.com/office/drawing/2010/main">
                 <a:solidFill>
                   <a:schemeClr val="accent1"/>
                 </a:solidFill>
               </a14:hiddenFill>
             </a:ext>
             <a:ext uri="{91240B29-F687-4f45-9708-019B960494DF}">
-              <a14:hiddenLine xmlns:a14="http://schemas.microsoft.com/office/drawing/2010/main" xmlns="" w="9525">
+              <a14:hiddenLine xmlns="" xmlns:a14="http://schemas.microsoft.com/office/drawing/2010/main" w="9525">
                 <a:solidFill>
                   <a:schemeClr val="tx1"/>
                 </a:solidFill>
@@ -10354,7 +10305,7 @@
               </a14:hiddenLine>
             </a:ext>
             <a:ext uri="{AF507438-7753-43e0-B8FC-AC1667EBCBE1}">
-              <a14:hiddenEffects xmlns:a14="http://schemas.microsoft.com/office/drawing/2010/main" xmlns="">
+              <a14:hiddenEffects xmlns="" xmlns:a14="http://schemas.microsoft.com/office/drawing/2010/main">
                 <a:effectLst>
                   <a:outerShdw blurRad="63500" dist="38099" dir="2700000" algn="ctr" rotWithShape="0">
                     <a:schemeClr val="bg2">
@@ -10404,14 +10355,14 @@
           <a:effectLst/>
           <a:extLst>
             <a:ext uri="{909E8E84-426E-40dd-AFC4-6F175D3DCCD1}">
-              <a14:hiddenFill xmlns:a14="http://schemas.microsoft.com/office/drawing/2010/main" xmlns="">
+              <a14:hiddenFill xmlns="" xmlns:a14="http://schemas.microsoft.com/office/drawing/2010/main">
                 <a:solidFill>
                   <a:schemeClr val="accent1"/>
                 </a:solidFill>
               </a14:hiddenFill>
             </a:ext>
             <a:ext uri="{91240B29-F687-4f45-9708-019B960494DF}">
-              <a14:hiddenLine xmlns:a14="http://schemas.microsoft.com/office/drawing/2010/main" xmlns="" w="9525">
+              <a14:hiddenLine xmlns="" xmlns:a14="http://schemas.microsoft.com/office/drawing/2010/main" w="9525">
                 <a:solidFill>
                   <a:schemeClr val="tx1"/>
                 </a:solidFill>
@@ -10421,7 +10372,7 @@
               </a14:hiddenLine>
             </a:ext>
             <a:ext uri="{AF507438-7753-43e0-B8FC-AC1667EBCBE1}">
-              <a14:hiddenEffects xmlns:a14="http://schemas.microsoft.com/office/drawing/2010/main" xmlns="">
+              <a14:hiddenEffects xmlns="" xmlns:a14="http://schemas.microsoft.com/office/drawing/2010/main">
                 <a:effectLst>
                   <a:outerShdw blurRad="63500" dist="38099" dir="2700000" algn="ctr" rotWithShape="0">
                     <a:schemeClr val="bg2">
@@ -10476,12 +10427,12 @@
           <a:effectLst/>
           <a:extLst>
             <a:ext uri="{909E8E84-426E-40dd-AFC4-6F175D3DCCD1}">
-              <a14:hiddenFill xmlns:a14="http://schemas.microsoft.com/office/drawing/2010/main" xmlns="">
+              <a14:hiddenFill xmlns="" xmlns:a14="http://schemas.microsoft.com/office/drawing/2010/main">
                 <a:noFill/>
               </a14:hiddenFill>
             </a:ext>
             <a:ext uri="{AF507438-7753-43e0-B8FC-AC1667EBCBE1}">
-              <a14:hiddenEffects xmlns:a14="http://schemas.microsoft.com/office/drawing/2010/main" xmlns="">
+              <a14:hiddenEffects xmlns="" xmlns:a14="http://schemas.microsoft.com/office/drawing/2010/main">
                 <a:effectLst>
                   <a:outerShdw blurRad="63500" dist="38099" dir="2700000" algn="ctr" rotWithShape="0">
                     <a:schemeClr val="bg2">
@@ -10524,14 +10475,14 @@
           <a:effectLst/>
           <a:extLst>
             <a:ext uri="{909E8E84-426E-40dd-AFC4-6F175D3DCCD1}">
-              <a14:hiddenFill xmlns:a14="http://schemas.microsoft.com/office/drawing/2010/main" xmlns="">
+              <a14:hiddenFill xmlns="" xmlns:a14="http://schemas.microsoft.com/office/drawing/2010/main">
                 <a:solidFill>
                   <a:schemeClr val="accent1"/>
                 </a:solidFill>
               </a14:hiddenFill>
             </a:ext>
             <a:ext uri="{91240B29-F687-4f45-9708-019B960494DF}">
-              <a14:hiddenLine xmlns:a14="http://schemas.microsoft.com/office/drawing/2010/main" xmlns="" w="9525">
+              <a14:hiddenLine xmlns="" xmlns:a14="http://schemas.microsoft.com/office/drawing/2010/main" w="9525">
                 <a:solidFill>
                   <a:schemeClr val="tx1"/>
                 </a:solidFill>
@@ -10541,7 +10492,7 @@
               </a14:hiddenLine>
             </a:ext>
             <a:ext uri="{AF507438-7753-43e0-B8FC-AC1667EBCBE1}">
-              <a14:hiddenEffects xmlns:a14="http://schemas.microsoft.com/office/drawing/2010/main" xmlns="">
+              <a14:hiddenEffects xmlns="" xmlns:a14="http://schemas.microsoft.com/office/drawing/2010/main">
                 <a:effectLst>
                   <a:outerShdw blurRad="63500" dist="38099" dir="2700000" algn="ctr" rotWithShape="0">
                     <a:schemeClr val="bg2">
@@ -10601,14 +10552,14 @@
           <a:effectLst/>
           <a:extLst>
             <a:ext uri="{909E8E84-426E-40dd-AFC4-6F175D3DCCD1}">
-              <a14:hiddenFill xmlns:a14="http://schemas.microsoft.com/office/drawing/2010/main" xmlns="">
+              <a14:hiddenFill xmlns="" xmlns:a14="http://schemas.microsoft.com/office/drawing/2010/main">
                 <a:solidFill>
                   <a:schemeClr val="accent1"/>
                 </a:solidFill>
               </a14:hiddenFill>
             </a:ext>
             <a:ext uri="{91240B29-F687-4f45-9708-019B960494DF}">
-              <a14:hiddenLine xmlns:a14="http://schemas.microsoft.com/office/drawing/2010/main" xmlns="" w="9525">
+              <a14:hiddenLine xmlns="" xmlns:a14="http://schemas.microsoft.com/office/drawing/2010/main" w="9525">
                 <a:solidFill>
                   <a:schemeClr val="tx1"/>
                 </a:solidFill>
@@ -10618,7 +10569,7 @@
               </a14:hiddenLine>
             </a:ext>
             <a:ext uri="{AF507438-7753-43e0-B8FC-AC1667EBCBE1}">
-              <a14:hiddenEffects xmlns:a14="http://schemas.microsoft.com/office/drawing/2010/main" xmlns="">
+              <a14:hiddenEffects xmlns="" xmlns:a14="http://schemas.microsoft.com/office/drawing/2010/main">
                 <a:effectLst>
                   <a:outerShdw blurRad="63500" dist="38099" dir="2700000" algn="ctr" rotWithShape="0">
                     <a:schemeClr val="bg2">
@@ -10835,7 +10786,7 @@
           <a:p>
             <a:r>
               <a:rPr lang="en-US" sz="2400" dirty="0"/>
-              <a:t>Given an instance of CLIQUE, turn it into an instance of HALF-CLIQUE</a:t>
+              <a:t>Given an instance of CLIQUE, turn it into an instance of HALF-CLIQUE.</a:t>
             </a:r>
           </a:p>
         </p:txBody>
@@ -10894,7 +10845,7 @@
         <p:spPr>
           <a:xfrm>
             <a:off x="1734707" y="2903668"/>
-            <a:ext cx="4292311" cy="461665"/>
+            <a:ext cx="4359848" cy="461665"/>
           </a:xfrm>
           <a:prstGeom prst="rect">
             <a:avLst/>
@@ -10913,7 +10864,7 @@
                   <a:srgbClr val="0000FF"/>
                 </a:solidFill>
               </a:rPr>
-              <a:t>It’s already a half-clique problem</a:t>
+              <a:t>It’s already a half-clique problem.</a:t>
             </a:r>
           </a:p>
         </p:txBody>
@@ -11148,7 +11099,7 @@
           <a:p>
             <a:r>
               <a:rPr lang="en-US" sz="2400" dirty="0"/>
-              <a:t>Given an instance of CLIQUE, turn it into an instance of HALF-CLIQUE</a:t>
+              <a:t>Given an instance of CLIQUE, turn it into an instance of HALF-CLIQUE.</a:t>
             </a:r>
           </a:p>
         </p:txBody>
@@ -11999,12 +11950,12 @@
           <a:effectLst/>
           <a:extLst>
             <a:ext uri="{909E8E84-426E-40dd-AFC4-6F175D3DCCD1}">
-              <a14:hiddenFill xmlns:a14="http://schemas.microsoft.com/office/drawing/2010/main" xmlns="">
+              <a14:hiddenFill xmlns="" xmlns:a14="http://schemas.microsoft.com/office/drawing/2010/main">
                 <a:noFill/>
               </a14:hiddenFill>
             </a:ext>
             <a:ext uri="{AF507438-7753-43e0-B8FC-AC1667EBCBE1}">
-              <a14:hiddenEffects xmlns:a14="http://schemas.microsoft.com/office/drawing/2010/main" xmlns="">
+              <a14:hiddenEffects xmlns="" xmlns:a14="http://schemas.microsoft.com/office/drawing/2010/main">
                 <a:effectLst>
                   <a:outerShdw blurRad="63500" dist="38099" dir="2700000" algn="ctr" rotWithShape="0">
                     <a:schemeClr val="bg2">
@@ -12137,12 +12088,12 @@
           <a:effectLst/>
           <a:extLst>
             <a:ext uri="{909E8E84-426E-40dd-AFC4-6F175D3DCCD1}">
-              <a14:hiddenFill xmlns:a14="http://schemas.microsoft.com/office/drawing/2010/main" xmlns="">
+              <a14:hiddenFill xmlns="" xmlns:a14="http://schemas.microsoft.com/office/drawing/2010/main">
                 <a:noFill/>
               </a14:hiddenFill>
             </a:ext>
             <a:ext uri="{AF507438-7753-43e0-B8FC-AC1667EBCBE1}">
-              <a14:hiddenEffects xmlns:a14="http://schemas.microsoft.com/office/drawing/2010/main" xmlns="">
+              <a14:hiddenEffects xmlns="" xmlns:a14="http://schemas.microsoft.com/office/drawing/2010/main">
                 <a:effectLst>
                   <a:outerShdw blurRad="63500" dist="38099" dir="2700000" algn="ctr" rotWithShape="0">
                     <a:schemeClr val="bg2">
@@ -12227,7 +12178,7 @@
         <p:spPr>
           <a:xfrm>
             <a:off x="612648" y="1600200"/>
-            <a:ext cx="8153400" cy="4456216"/>
+            <a:ext cx="8153400" cy="3058886"/>
           </a:xfrm>
         </p:spPr>
         <p:txBody>
@@ -12239,15 +12190,7 @@
             </a:pPr>
             <a:r>
               <a:rPr lang="en-US" dirty="0"/>
-              <a:t>Given a graph G that has a CLIQUE of size k, show that f(</a:t>
-            </a:r>
-            <a:r>
-              <a:rPr lang="en-US" dirty="0" err="1"/>
-              <a:t>G,k</a:t>
-            </a:r>
-            <a:r>
-              <a:rPr lang="en-US" dirty="0"/>
-              <a:t>) has a solution to HALF-CLIQUE</a:t>
+              <a:t>Given a graph G that has a CLIQUE of size k, show that f(G, k) has a solution to HALF-CLIQUE.</a:t>
             </a:r>
           </a:p>
           <a:p>
@@ -12273,15 +12216,7 @@
             <a:pPr lvl="1"/>
             <a:r>
               <a:rPr lang="en-US" dirty="0"/>
-              <a:t>f(</a:t>
-            </a:r>
-            <a:r>
-              <a:rPr lang="en-US" dirty="0" err="1"/>
-              <a:t>G,k</a:t>
-            </a:r>
-            <a:r>
-              <a:rPr lang="en-US" dirty="0"/>
-              <a:t>) has a clique that is half the size</a:t>
+              <a:t>f(G, k) has a clique that is half the size</a:t>
             </a:r>
           </a:p>
         </p:txBody>
@@ -12522,15 +12457,7 @@
             </a:pPr>
             <a:r>
               <a:rPr lang="en-US" dirty="0"/>
-              <a:t>Given a graph G that has a CLIQUE of size k, show that f(</a:t>
-            </a:r>
-            <a:r>
-              <a:rPr lang="en-US" dirty="0" err="1"/>
-              <a:t>G,k</a:t>
-            </a:r>
-            <a:r>
-              <a:rPr lang="en-US" dirty="0"/>
-              <a:t>) has a solution to HALF-CLIQUE</a:t>
+              <a:t>Given a graph G that has a CLIQUE of size k, show that f(G, k) has a solution to HALF-CLIQUE.</a:t>
             </a:r>
           </a:p>
           <a:p>
@@ -12859,7 +12786,12 @@
             <p:ph sz="quarter" idx="1"/>
           </p:nvPr>
         </p:nvSpPr>
-        <p:spPr/>
+        <p:spPr>
+          <a:xfrm>
+            <a:off x="612648" y="1600200"/>
+            <a:ext cx="8153400" cy="2719251"/>
+          </a:xfrm>
+        </p:spPr>
         <p:txBody>
           <a:bodyPr/>
           <a:lstStyle/>
@@ -12869,7 +12801,7 @@
             </a:pPr>
             <a:r>
               <a:rPr lang="en-US" dirty="0"/>
-              <a:t>P = problems with a polynomial runtime solution</a:t>
+              <a:t>P = problems with a polynomial runtime solution.</a:t>
             </a:r>
           </a:p>
           <a:p>
@@ -12884,7 +12816,7 @@
             </a:pPr>
             <a:r>
               <a:rPr lang="en-US" dirty="0"/>
-              <a:t>Also, called “tractable” problems</a:t>
+              <a:t>Also, called “tractable” problems.</a:t>
             </a:r>
           </a:p>
           <a:p>
@@ -12899,7 +12831,7 @@
             </a:pPr>
             <a:r>
               <a:rPr lang="en-US" dirty="0"/>
-              <a:t>(Basically, all of the problems in this class)</a:t>
+              <a:t>(Basically, all the problems in this class).</a:t>
             </a:r>
           </a:p>
         </p:txBody>
@@ -12981,15 +12913,7 @@
             </a:pPr>
             <a:r>
               <a:rPr lang="en-US" dirty="0"/>
-              <a:t>Given a graph G that has a CLIQUE of size k, show that f(</a:t>
-            </a:r>
-            <a:r>
-              <a:rPr lang="en-US" dirty="0" err="1"/>
-              <a:t>G,k</a:t>
-            </a:r>
-            <a:r>
-              <a:rPr lang="en-US" dirty="0"/>
-              <a:t>) has a solution to HALF-CLIQUE</a:t>
+              <a:t>Given a graph G that has a CLIQUE of size k, show that f(G, k) has a solution to HALF-CLIQUE</a:t>
             </a:r>
           </a:p>
           <a:p>
@@ -13461,7 +13385,12 @@
             <p:ph sz="quarter" idx="1"/>
           </p:nvPr>
         </p:nvSpPr>
-        <p:spPr/>
+        <p:spPr>
+          <a:xfrm>
+            <a:off x="612648" y="1600200"/>
+            <a:ext cx="8153400" cy="2248989"/>
+          </a:xfrm>
+        </p:spPr>
         <p:txBody>
           <a:bodyPr/>
           <a:lstStyle/>
@@ -13486,7 +13415,7 @@
             </a:pPr>
             <a:r>
               <a:rPr lang="en-US" dirty="0"/>
-              <a:t>I’ve provided a concrete example of the Half-Clique proof on the course webpage</a:t>
+              <a:t>I’ve provided a concrete example of the Half-Clique proof on the course webpage.</a:t>
             </a:r>
           </a:p>
         </p:txBody>
@@ -13750,14 +13679,14 @@
           <a:effectLst/>
           <a:extLst>
             <a:ext uri="{909E8E84-426E-40dd-AFC4-6F175D3DCCD1}">
-              <a14:hiddenFill xmlns:a14="http://schemas.microsoft.com/office/drawing/2010/main" xmlns="">
+              <a14:hiddenFill xmlns="" xmlns:a14="http://schemas.microsoft.com/office/drawing/2010/main">
                 <a:solidFill>
                   <a:schemeClr val="accent1"/>
                 </a:solidFill>
               </a14:hiddenFill>
             </a:ext>
             <a:ext uri="{91240B29-F687-4f45-9708-019B960494DF}">
-              <a14:hiddenLine xmlns:a14="http://schemas.microsoft.com/office/drawing/2010/main" xmlns="" w="9525">
+              <a14:hiddenLine xmlns="" xmlns:a14="http://schemas.microsoft.com/office/drawing/2010/main" w="9525">
                 <a:solidFill>
                   <a:schemeClr val="tx1"/>
                 </a:solidFill>
@@ -13767,7 +13696,7 @@
               </a14:hiddenLine>
             </a:ext>
             <a:ext uri="{AF507438-7753-43e0-B8FC-AC1667EBCBE1}">
-              <a14:hiddenEffects xmlns:a14="http://schemas.microsoft.com/office/drawing/2010/main" xmlns="">
+              <a14:hiddenEffects xmlns="" xmlns:a14="http://schemas.microsoft.com/office/drawing/2010/main">
                 <a:effectLst>
                   <a:outerShdw blurRad="63500" dist="38099" dir="2700000" algn="ctr" rotWithShape="0">
                     <a:schemeClr val="bg2">
@@ -14941,8 +14870,8 @@
         </p:nvSpPr>
         <p:spPr>
           <a:xfrm>
-            <a:off x="612648" y="1600200"/>
-            <a:ext cx="8153400" cy="1915929"/>
+            <a:off x="612648" y="1600201"/>
+            <a:ext cx="8153400" cy="1738358"/>
           </a:xfrm>
         </p:spPr>
         <p:txBody>
@@ -14995,14 +14924,14 @@
           <a:effectLst/>
           <a:extLst>
             <a:ext uri="{909E8E84-426E-40dd-AFC4-6F175D3DCCD1}">
-              <a14:hiddenFill xmlns:a14="http://schemas.microsoft.com/office/drawing/2010/main" xmlns="">
+              <a14:hiddenFill xmlns="" xmlns:a14="http://schemas.microsoft.com/office/drawing/2010/main">
                 <a:solidFill>
                   <a:schemeClr val="accent1"/>
                 </a:solidFill>
               </a14:hiddenFill>
             </a:ext>
             <a:ext uri="{91240B29-F687-4f45-9708-019B960494DF}">
-              <a14:hiddenLine xmlns:a14="http://schemas.microsoft.com/office/drawing/2010/main" xmlns="" w="9525">
+              <a14:hiddenLine xmlns="" xmlns:a14="http://schemas.microsoft.com/office/drawing/2010/main" w="9525">
                 <a:solidFill>
                   <a:schemeClr val="tx1"/>
                 </a:solidFill>
@@ -15012,7 +14941,7 @@
               </a14:hiddenLine>
             </a:ext>
             <a:ext uri="{AF507438-7753-43e0-B8FC-AC1667EBCBE1}">
-              <a14:hiddenEffects xmlns:a14="http://schemas.microsoft.com/office/drawing/2010/main" xmlns="">
+              <a14:hiddenEffects xmlns="" xmlns:a14="http://schemas.microsoft.com/office/drawing/2010/main">
                 <a:effectLst>
                   <a:outerShdw blurRad="63500" dist="38099" dir="2700000" algn="ctr" rotWithShape="0">
                     <a:schemeClr val="bg2">
@@ -15594,8 +15523,8 @@
               <a:buNone/>
             </a:pPr>
             <a:r>
-              <a:rPr lang="en-US" sz="2400"/>
-              <a:t>Both are selecting vertices</a:t>
+              <a:rPr lang="en-US" sz="2400" dirty="0"/>
+              <a:t>Both are selecting vertices.</a:t>
             </a:r>
           </a:p>
           <a:p>
@@ -15603,7 +15532,7 @@
               <a:buFont typeface="Wingdings"/>
               <a:buNone/>
             </a:pPr>
-            <a:endParaRPr lang="en-US" sz="2400"/>
+            <a:endParaRPr lang="en-US" sz="2400" dirty="0"/>
           </a:p>
           <a:p>
             <a:pPr marL="0" indent="0">
@@ -15611,8 +15540,8 @@
               <a:buNone/>
             </a:pPr>
             <a:r>
-              <a:rPr lang="en-US" sz="2400"/>
-              <a:t>Independent set wants vertices where NONE are connected</a:t>
+              <a:rPr lang="en-US" sz="2400" dirty="0"/>
+              <a:t>Independent set wants vertices where NONE are connected.</a:t>
             </a:r>
           </a:p>
           <a:p>
@@ -15620,7 +15549,7 @@
               <a:buFont typeface="Wingdings"/>
               <a:buNone/>
             </a:pPr>
-            <a:endParaRPr lang="en-US" sz="2400"/>
+            <a:endParaRPr lang="en-US" sz="2400" dirty="0"/>
           </a:p>
           <a:p>
             <a:pPr marL="0" indent="0">
@@ -15628,8 +15557,8 @@
               <a:buNone/>
             </a:pPr>
             <a:r>
-              <a:rPr lang="en-US" sz="2400"/>
-              <a:t>Clique wants vertices where ALL are connected</a:t>
+              <a:rPr lang="en-US" sz="2400" dirty="0"/>
+              <a:t>Clique wants vertices where ALL are connected.</a:t>
             </a:r>
           </a:p>
           <a:p>
@@ -15653,7 +15582,7 @@
         </p:nvSpPr>
         <p:spPr>
           <a:xfrm>
-            <a:off x="1133666" y="5762859"/>
+            <a:off x="689529" y="5762859"/>
             <a:ext cx="7391734" cy="461665"/>
           </a:xfrm>
           <a:prstGeom prst="rect">
@@ -15747,7 +15676,7 @@
         </p:spPr>
         <p:txBody>
           <a:bodyPr>
-            <a:normAutofit fontScale="92500" lnSpcReduction="10000"/>
+            <a:normAutofit fontScale="92500"/>
           </a:bodyPr>
           <a:lstStyle/>
           <a:p>
@@ -15756,7 +15685,7 @@
             </a:pPr>
             <a:r>
               <a:rPr lang="en-US" sz="2800" dirty="0"/>
-              <a:t>Given a graph G = (V, E), the complement of that graph G’ = (V, E) is the a graph constructed by remove all edges E and including all edges not in E</a:t>
+              <a:t>Given a graph G = (V, E), the complement of that graph G’ = (V, E) is the graph constructed by remove all edges E and including all edges not in E.</a:t>
             </a:r>
           </a:p>
           <a:p>
@@ -15771,7 +15700,7 @@
             </a:pPr>
             <a:r>
               <a:rPr lang="en-US" sz="2800" dirty="0"/>
-              <a:t>For example, for adjacency matrix this is flipping all of the bits</a:t>
+              <a:t>For example, for adjacency matrix this is flipping all the bits.</a:t>
             </a:r>
           </a:p>
         </p:txBody>
@@ -15784,7 +15713,7 @@
         </p:nvSpPr>
         <p:spPr>
           <a:xfrm>
-            <a:off x="612648" y="4670280"/>
+            <a:off x="2130307" y="4600612"/>
             <a:ext cx="5118082" cy="954107"/>
           </a:xfrm>
           <a:prstGeom prst="rect">
@@ -15881,7 +15810,7 @@
         <p:spPr>
           <a:xfrm>
             <a:off x="433294" y="1600199"/>
-            <a:ext cx="8486588" cy="5049117"/>
+            <a:ext cx="8486588" cy="3790407"/>
           </a:xfrm>
         </p:spPr>
         <p:txBody>
@@ -15927,7 +15856,7 @@
             </a:r>
             <a:r>
               <a:rPr lang="en-US" dirty="0"/>
-              <a:t>in polynomial time</a:t>
+              <a:t>in polynomial time.</a:t>
             </a:r>
           </a:p>
           <a:p>
@@ -15939,20 +15868,8 @@
             </a:pPr>
             <a:r>
               <a:rPr lang="en-US" dirty="0"/>
-              <a:t>A problem can be verified in polynomial time if you can check that a given solution is correct in polynomial time</a:t>
-            </a:r>
-          </a:p>
-          <a:p>
-            <a:pPr marL="0" indent="0">
-              <a:buNone/>
-            </a:pPr>
-            <a:endParaRPr lang="en-US" dirty="0"/>
-          </a:p>
-          <a:p>
-            <a:pPr marL="0" indent="0">
-              <a:buNone/>
-            </a:pPr>
-            <a:endParaRPr lang="en-US" dirty="0"/>
+              <a:t>A problem can be verified in polynomial time if you can check that a given solution is correct in polynomial time.</a:t>
+            </a:r>
           </a:p>
           <a:p>
             <a:pPr marL="0" indent="0">
@@ -16083,7 +16000,7 @@
                                         <p:tgtEl>
                                           <p:spTgt spid="3">
                                             <p:txEl>
-                                              <p:pRg st="6" end="6"/>
+                                              <p:pRg st="4" end="4"/>
                                             </p:txEl>
                                           </p:spTgt>
                                         </p:tgtEl>
@@ -16411,12 +16328,12 @@
           <a:effectLst/>
           <a:extLst>
             <a:ext uri="{909E8E84-426E-40dd-AFC4-6F175D3DCCD1}">
-              <a14:hiddenFill xmlns:a14="http://schemas.microsoft.com/office/drawing/2010/main" xmlns="">
+              <a14:hiddenFill xmlns="" xmlns:a14="http://schemas.microsoft.com/office/drawing/2010/main">
                 <a:noFill/>
               </a14:hiddenFill>
             </a:ext>
             <a:ext uri="{AF507438-7753-43e0-B8FC-AC1667EBCBE1}">
-              <a14:hiddenEffects xmlns:a14="http://schemas.microsoft.com/office/drawing/2010/main" xmlns="">
+              <a14:hiddenEffects xmlns="" xmlns:a14="http://schemas.microsoft.com/office/drawing/2010/main">
                 <a:effectLst>
                   <a:outerShdw blurRad="63500" dist="38099" dir="2700000" algn="ctr" rotWithShape="0">
                     <a:schemeClr val="bg2">
@@ -16549,12 +16466,12 @@
           <a:effectLst/>
           <a:extLst>
             <a:ext uri="{909E8E84-426E-40dd-AFC4-6F175D3DCCD1}">
-              <a14:hiddenFill xmlns:a14="http://schemas.microsoft.com/office/drawing/2010/main" xmlns="">
+              <a14:hiddenFill xmlns="" xmlns:a14="http://schemas.microsoft.com/office/drawing/2010/main">
                 <a:noFill/>
               </a14:hiddenFill>
             </a:ext>
             <a:ext uri="{AF507438-7753-43e0-B8FC-AC1667EBCBE1}">
-              <a14:hiddenEffects xmlns:a14="http://schemas.microsoft.com/office/drawing/2010/main" xmlns="">
+              <a14:hiddenEffects xmlns="" xmlns:a14="http://schemas.microsoft.com/office/drawing/2010/main">
                 <a:effectLst>
                   <a:outerShdw blurRad="63500" dist="38099" dir="2700000" algn="ctr" rotWithShape="0">
                     <a:schemeClr val="bg2">
@@ -16636,7 +16553,12 @@
             <p:ph sz="quarter" idx="1"/>
           </p:nvPr>
         </p:nvSpPr>
-        <p:spPr/>
+        <p:spPr>
+          <a:xfrm>
+            <a:off x="612648" y="1600200"/>
+            <a:ext cx="8153400" cy="2876006"/>
+          </a:xfrm>
+        </p:spPr>
         <p:txBody>
           <a:bodyPr/>
           <a:lstStyle/>
@@ -16646,21 +16568,21 @@
             </a:pPr>
             <a:r>
               <a:rPr lang="en-US" dirty="0"/>
-              <a:t>Given a graph G that has an independent set of size k, show that f(G) has a clique of size k</a:t>
+              <a:t>Given a graph G that has an independent set of size k, show that f(G) has a clique of size k.</a:t>
             </a:r>
           </a:p>
           <a:p>
             <a:pPr lvl="1"/>
             <a:r>
               <a:rPr lang="en-US" dirty="0"/>
-              <a:t>By definition, the independent set has no edges between any vertices</a:t>
+              <a:t>By definition, the independent set has no edges between any vertices.</a:t>
             </a:r>
           </a:p>
           <a:p>
             <a:pPr lvl="1"/>
             <a:r>
               <a:rPr lang="en-US" dirty="0"/>
-              <a:t>These will all be edges in f(G) and therefore they will form a clique of size k</a:t>
+              <a:t>These will all be edges in f(G) and therefore they will form a clique of size k.</a:t>
             </a:r>
           </a:p>
           <a:p>
@@ -16841,7 +16763,12 @@
             <p:ph sz="quarter" idx="1"/>
           </p:nvPr>
         </p:nvSpPr>
-        <p:spPr/>
+        <p:spPr>
+          <a:xfrm>
+            <a:off x="612648" y="1600200"/>
+            <a:ext cx="8153400" cy="2902131"/>
+          </a:xfrm>
+        </p:spPr>
         <p:txBody>
           <a:bodyPr/>
           <a:lstStyle/>
@@ -16858,14 +16785,14 @@
             <a:pPr lvl="1"/>
             <a:r>
               <a:rPr lang="en-US" dirty="0"/>
-              <a:t>By definition, the clique will have an edge between every vertex</a:t>
+              <a:t>By definition, the clique will have an edge between every vertex.</a:t>
             </a:r>
           </a:p>
           <a:p>
             <a:pPr lvl="1"/>
             <a:r>
               <a:rPr lang="en-US" dirty="0"/>
-              <a:t>None of these vertices will therefore be connected in G, so we have an independent set</a:t>
+              <a:t>None of these vertices will therefore be connected in G, so we have an independent set.</a:t>
             </a:r>
           </a:p>
           <a:p>
@@ -17102,14 +17029,14 @@
           <a:effectLst/>
           <a:extLst>
             <a:ext uri="{909E8E84-426E-40dd-AFC4-6F175D3DCCD1}">
-              <a14:hiddenFill xmlns:a14="http://schemas.microsoft.com/office/drawing/2010/main" xmlns="">
+              <a14:hiddenFill xmlns="" xmlns:a14="http://schemas.microsoft.com/office/drawing/2010/main">
                 <a:solidFill>
                   <a:schemeClr val="accent1"/>
                 </a:solidFill>
               </a14:hiddenFill>
             </a:ext>
             <a:ext uri="{91240B29-F687-4f45-9708-019B960494DF}">
-              <a14:hiddenLine xmlns:a14="http://schemas.microsoft.com/office/drawing/2010/main" xmlns="" w="9525">
+              <a14:hiddenLine xmlns="" xmlns:a14="http://schemas.microsoft.com/office/drawing/2010/main" w="9525">
                 <a:solidFill>
                   <a:schemeClr val="tx1"/>
                 </a:solidFill>
@@ -17119,7 +17046,7 @@
               </a14:hiddenLine>
             </a:ext>
             <a:ext uri="{AF507438-7753-43e0-B8FC-AC1667EBCBE1}">
-              <a14:hiddenEffects xmlns:a14="http://schemas.microsoft.com/office/drawing/2010/main" xmlns="">
+              <a14:hiddenEffects xmlns="" xmlns:a14="http://schemas.microsoft.com/office/drawing/2010/main">
                 <a:effectLst>
                   <a:outerShdw blurRad="63500" dist="38099" dir="2700000" algn="ctr" rotWithShape="0">
                     <a:schemeClr val="bg2">
@@ -17508,14 +17435,14 @@
           <a:effectLst/>
           <a:extLst>
             <a:ext uri="{909E8E84-426E-40dd-AFC4-6F175D3DCCD1}">
-              <a14:hiddenFill xmlns:a14="http://schemas.microsoft.com/office/drawing/2010/main" xmlns="">
+              <a14:hiddenFill xmlns="" xmlns:a14="http://schemas.microsoft.com/office/drawing/2010/main">
                 <a:solidFill>
                   <a:schemeClr val="accent1"/>
                 </a:solidFill>
               </a14:hiddenFill>
             </a:ext>
             <a:ext uri="{91240B29-F687-4f45-9708-019B960494DF}">
-              <a14:hiddenLine xmlns:a14="http://schemas.microsoft.com/office/drawing/2010/main" xmlns="" w="9525">
+              <a14:hiddenLine xmlns="" xmlns:a14="http://schemas.microsoft.com/office/drawing/2010/main" w="9525">
                 <a:solidFill>
                   <a:schemeClr val="tx1"/>
                 </a:solidFill>
@@ -17525,7 +17452,7 @@
               </a14:hiddenLine>
             </a:ext>
             <a:ext uri="{AF507438-7753-43e0-B8FC-AC1667EBCBE1}">
-              <a14:hiddenEffects xmlns:a14="http://schemas.microsoft.com/office/drawing/2010/main" xmlns="">
+              <a14:hiddenEffects xmlns="" xmlns:a14="http://schemas.microsoft.com/office/drawing/2010/main">
                 <a:effectLst>
                   <a:outerShdw blurRad="63500" dist="38099" dir="2700000" algn="ctr" rotWithShape="0">
                     <a:schemeClr val="bg2">
@@ -17896,15 +17823,7 @@
             </a:pPr>
             <a:r>
               <a:rPr lang="en-US" dirty="0"/>
-              <a:t>For the </a:t>
-            </a:r>
-            <a:r>
-              <a:rPr lang="en-US" dirty="0" err="1"/>
-              <a:t>boolean</a:t>
-            </a:r>
-            <a:r>
-              <a:rPr lang="en-US" dirty="0"/>
-              <a:t> formula in 3-SAT to be satisfied, at least one of the literals in each clause must be true</a:t>
+              <a:t>For the Boolean formula in 3-SAT to be satisfied, at least one of the literals in each clause must be true</a:t>
             </a:r>
           </a:p>
           <a:p>
@@ -17940,7 +17859,7 @@
             </p:nvSpPr>
             <p:spPr>
               <a:xfrm>
-                <a:off x="1979526" y="2481943"/>
+                <a:off x="2377200" y="2490652"/>
                 <a:ext cx="4389600" cy="369332"/>
               </a:xfrm>
               <a:prstGeom prst="rect">
@@ -17954,6 +17873,7 @@
               </a:bodyPr>
               <a:lstStyle/>
               <a:p>
+                <a:pPr/>
                 <a14:m>
                   <m:oMathPara xmlns:m="http://schemas.openxmlformats.org/officeDocument/2006/math">
                     <m:oMathParaPr>
@@ -18115,7 +18035,7 @@
             </p:nvSpPr>
             <p:spPr>
               <a:xfrm>
-                <a:off x="1979526" y="2481943"/>
+                <a:off x="2377200" y="2490652"/>
                 <a:ext cx="4389600" cy="369332"/>
               </a:xfrm>
               <a:prstGeom prst="rect">
@@ -18124,7 +18044,7 @@
               <a:blipFill>
                 <a:blip r:embed="rId3"/>
                 <a:stretch>
-                  <a:fillRect b="-16667"/>
+                  <a:fillRect b="-13333"/>
                 </a:stretch>
               </a:blipFill>
             </p:spPr>
@@ -18305,7 +18225,7 @@
             <a:effectLst/>
             <a:extLst>
               <a:ext uri="{AF507438-7753-43e0-B8FC-AC1667EBCBE1}">
-                <a14:hiddenEffects xmlns:a14="http://schemas.microsoft.com/office/drawing/2010/main" xmlns="">
+                <a14:hiddenEffects xmlns="" xmlns:a14="http://schemas.microsoft.com/office/drawing/2010/main">
                   <a:effectLst>
                     <a:outerShdw blurRad="63500" dist="38099" dir="2700000" algn="ctr" rotWithShape="0">
                       <a:schemeClr val="bg2">
@@ -18351,14 +18271,14 @@
             <a:effectLst/>
             <a:extLst>
               <a:ext uri="{909E8E84-426E-40dd-AFC4-6F175D3DCCD1}">
-                <a14:hiddenFill xmlns:a14="http://schemas.microsoft.com/office/drawing/2010/main" xmlns="">
+                <a14:hiddenFill xmlns="" xmlns:a14="http://schemas.microsoft.com/office/drawing/2010/main">
                   <a:solidFill>
                     <a:schemeClr val="accent1"/>
                   </a:solidFill>
                 </a14:hiddenFill>
               </a:ext>
               <a:ext uri="{91240B29-F687-4f45-9708-019B960494DF}">
-                <a14:hiddenLine xmlns:a14="http://schemas.microsoft.com/office/drawing/2010/main" xmlns="" w="9525">
+                <a14:hiddenLine xmlns="" xmlns:a14="http://schemas.microsoft.com/office/drawing/2010/main" w="9525">
                   <a:solidFill>
                     <a:schemeClr val="tx1"/>
                   </a:solidFill>
@@ -18368,7 +18288,7 @@
                 </a14:hiddenLine>
               </a:ext>
               <a:ext uri="{AF507438-7753-43e0-B8FC-AC1667EBCBE1}">
-                <a14:hiddenEffects xmlns:a14="http://schemas.microsoft.com/office/drawing/2010/main" xmlns="">
+                <a14:hiddenEffects xmlns="" xmlns:a14="http://schemas.microsoft.com/office/drawing/2010/main">
                   <a:effectLst>
                     <a:outerShdw blurRad="63500" dist="38099" dir="2700000" algn="ctr" rotWithShape="0">
                       <a:schemeClr val="bg2">
@@ -18446,7 +18366,7 @@
             <a:effectLst/>
             <a:extLst>
               <a:ext uri="{AF507438-7753-43e0-B8FC-AC1667EBCBE1}">
-                <a14:hiddenEffects xmlns:a14="http://schemas.microsoft.com/office/drawing/2010/main" xmlns="">
+                <a14:hiddenEffects xmlns="" xmlns:a14="http://schemas.microsoft.com/office/drawing/2010/main">
                   <a:effectLst>
                     <a:outerShdw blurRad="63500" dist="38099" dir="2700000" algn="ctr" rotWithShape="0">
                       <a:schemeClr val="bg2">
@@ -18492,14 +18412,14 @@
             <a:effectLst/>
             <a:extLst>
               <a:ext uri="{909E8E84-426E-40dd-AFC4-6F175D3DCCD1}">
-                <a14:hiddenFill xmlns:a14="http://schemas.microsoft.com/office/drawing/2010/main" xmlns="">
+                <a14:hiddenFill xmlns="" xmlns:a14="http://schemas.microsoft.com/office/drawing/2010/main">
                   <a:solidFill>
                     <a:schemeClr val="accent1"/>
                   </a:solidFill>
                 </a14:hiddenFill>
               </a:ext>
               <a:ext uri="{91240B29-F687-4f45-9708-019B960494DF}">
-                <a14:hiddenLine xmlns:a14="http://schemas.microsoft.com/office/drawing/2010/main" xmlns="" w="9525">
+                <a14:hiddenLine xmlns="" xmlns:a14="http://schemas.microsoft.com/office/drawing/2010/main" w="9525">
                   <a:solidFill>
                     <a:schemeClr val="tx1"/>
                   </a:solidFill>
@@ -18509,7 +18429,7 @@
                 </a14:hiddenLine>
               </a:ext>
               <a:ext uri="{AF507438-7753-43e0-B8FC-AC1667EBCBE1}">
-                <a14:hiddenEffects xmlns:a14="http://schemas.microsoft.com/office/drawing/2010/main" xmlns="">
+                <a14:hiddenEffects xmlns="" xmlns:a14="http://schemas.microsoft.com/office/drawing/2010/main">
                   <a:effectLst>
                     <a:outerShdw blurRad="63500" dist="38099" dir="2700000" algn="ctr" rotWithShape="0">
                       <a:schemeClr val="bg2">
@@ -18587,7 +18507,7 @@
             <a:effectLst/>
             <a:extLst>
               <a:ext uri="{AF507438-7753-43e0-B8FC-AC1667EBCBE1}">
-                <a14:hiddenEffects xmlns:a14="http://schemas.microsoft.com/office/drawing/2010/main" xmlns="">
+                <a14:hiddenEffects xmlns="" xmlns:a14="http://schemas.microsoft.com/office/drawing/2010/main">
                   <a:effectLst>
                     <a:outerShdw blurRad="63500" dist="38099" dir="2700000" algn="ctr" rotWithShape="0">
                       <a:schemeClr val="bg2">
@@ -18633,14 +18553,14 @@
             <a:effectLst/>
             <a:extLst>
               <a:ext uri="{909E8E84-426E-40dd-AFC4-6F175D3DCCD1}">
-                <a14:hiddenFill xmlns:a14="http://schemas.microsoft.com/office/drawing/2010/main" xmlns="">
+                <a14:hiddenFill xmlns="" xmlns:a14="http://schemas.microsoft.com/office/drawing/2010/main">
                   <a:solidFill>
                     <a:schemeClr val="accent1"/>
                   </a:solidFill>
                 </a14:hiddenFill>
               </a:ext>
               <a:ext uri="{91240B29-F687-4f45-9708-019B960494DF}">
-                <a14:hiddenLine xmlns:a14="http://schemas.microsoft.com/office/drawing/2010/main" xmlns="" w="9525">
+                <a14:hiddenLine xmlns="" xmlns:a14="http://schemas.microsoft.com/office/drawing/2010/main" w="9525">
                   <a:solidFill>
                     <a:schemeClr val="tx1"/>
                   </a:solidFill>
@@ -18650,7 +18570,7 @@
                 </a14:hiddenLine>
               </a:ext>
               <a:ext uri="{AF507438-7753-43e0-B8FC-AC1667EBCBE1}">
-                <a14:hiddenEffects xmlns:a14="http://schemas.microsoft.com/office/drawing/2010/main" xmlns="">
+                <a14:hiddenEffects xmlns="" xmlns:a14="http://schemas.microsoft.com/office/drawing/2010/main">
                   <a:effectLst>
                     <a:outerShdw blurRad="63500" dist="38099" dir="2700000" algn="ctr" rotWithShape="0">
                       <a:schemeClr val="bg2">
@@ -19014,7 +18934,7 @@
             <a:effectLst/>
             <a:extLst>
               <a:ext uri="{AF507438-7753-43e0-B8FC-AC1667EBCBE1}">
-                <a14:hiddenEffects xmlns:a14="http://schemas.microsoft.com/office/drawing/2010/main" xmlns="">
+                <a14:hiddenEffects xmlns="" xmlns:a14="http://schemas.microsoft.com/office/drawing/2010/main">
                   <a:effectLst>
                     <a:outerShdw blurRad="63500" dist="38099" dir="2700000" algn="ctr" rotWithShape="0">
                       <a:schemeClr val="bg2">
@@ -19060,14 +18980,14 @@
             <a:effectLst/>
             <a:extLst>
               <a:ext uri="{909E8E84-426E-40dd-AFC4-6F175D3DCCD1}">
-                <a14:hiddenFill xmlns:a14="http://schemas.microsoft.com/office/drawing/2010/main" xmlns="">
+                <a14:hiddenFill xmlns="" xmlns:a14="http://schemas.microsoft.com/office/drawing/2010/main">
                   <a:solidFill>
                     <a:schemeClr val="accent1"/>
                   </a:solidFill>
                 </a14:hiddenFill>
               </a:ext>
               <a:ext uri="{91240B29-F687-4f45-9708-019B960494DF}">
-                <a14:hiddenLine xmlns:a14="http://schemas.microsoft.com/office/drawing/2010/main" xmlns="" w="9525">
+                <a14:hiddenLine xmlns="" xmlns:a14="http://schemas.microsoft.com/office/drawing/2010/main" w="9525">
                   <a:solidFill>
                     <a:schemeClr val="tx1"/>
                   </a:solidFill>
@@ -19077,7 +18997,7 @@
                 </a14:hiddenLine>
               </a:ext>
               <a:ext uri="{AF507438-7753-43e0-B8FC-AC1667EBCBE1}">
-                <a14:hiddenEffects xmlns:a14="http://schemas.microsoft.com/office/drawing/2010/main" xmlns="">
+                <a14:hiddenEffects xmlns="" xmlns:a14="http://schemas.microsoft.com/office/drawing/2010/main">
                   <a:effectLst>
                     <a:outerShdw blurRad="63500" dist="38099" dir="2700000" algn="ctr" rotWithShape="0">
                       <a:schemeClr val="bg2">
@@ -19155,7 +19075,7 @@
             <a:effectLst/>
             <a:extLst>
               <a:ext uri="{AF507438-7753-43e0-B8FC-AC1667EBCBE1}">
-                <a14:hiddenEffects xmlns:a14="http://schemas.microsoft.com/office/drawing/2010/main" xmlns="">
+                <a14:hiddenEffects xmlns="" xmlns:a14="http://schemas.microsoft.com/office/drawing/2010/main">
                   <a:effectLst>
                     <a:outerShdw blurRad="63500" dist="38099" dir="2700000" algn="ctr" rotWithShape="0">
                       <a:schemeClr val="bg2">
@@ -19201,14 +19121,14 @@
             <a:effectLst/>
             <a:extLst>
               <a:ext uri="{909E8E84-426E-40dd-AFC4-6F175D3DCCD1}">
-                <a14:hiddenFill xmlns:a14="http://schemas.microsoft.com/office/drawing/2010/main" xmlns="">
+                <a14:hiddenFill xmlns="" xmlns:a14="http://schemas.microsoft.com/office/drawing/2010/main">
                   <a:solidFill>
                     <a:schemeClr val="accent1"/>
                   </a:solidFill>
                 </a14:hiddenFill>
               </a:ext>
               <a:ext uri="{91240B29-F687-4f45-9708-019B960494DF}">
-                <a14:hiddenLine xmlns:a14="http://schemas.microsoft.com/office/drawing/2010/main" xmlns="" w="9525">
+                <a14:hiddenLine xmlns="" xmlns:a14="http://schemas.microsoft.com/office/drawing/2010/main" w="9525">
                   <a:solidFill>
                     <a:schemeClr val="tx1"/>
                   </a:solidFill>
@@ -19218,7 +19138,7 @@
                 </a14:hiddenLine>
               </a:ext>
               <a:ext uri="{AF507438-7753-43e0-B8FC-AC1667EBCBE1}">
-                <a14:hiddenEffects xmlns:a14="http://schemas.microsoft.com/office/drawing/2010/main" xmlns="">
+                <a14:hiddenEffects xmlns="" xmlns:a14="http://schemas.microsoft.com/office/drawing/2010/main">
                   <a:effectLst>
                     <a:outerShdw blurRad="63500" dist="38099" dir="2700000" algn="ctr" rotWithShape="0">
                       <a:schemeClr val="bg2">
@@ -19296,7 +19216,7 @@
             <a:effectLst/>
             <a:extLst>
               <a:ext uri="{AF507438-7753-43e0-B8FC-AC1667EBCBE1}">
-                <a14:hiddenEffects xmlns:a14="http://schemas.microsoft.com/office/drawing/2010/main" xmlns="">
+                <a14:hiddenEffects xmlns="" xmlns:a14="http://schemas.microsoft.com/office/drawing/2010/main">
                   <a:effectLst>
                     <a:outerShdw blurRad="63500" dist="38099" dir="2700000" algn="ctr" rotWithShape="0">
                       <a:schemeClr val="bg2">
@@ -19342,14 +19262,14 @@
             <a:effectLst/>
             <a:extLst>
               <a:ext uri="{909E8E84-426E-40dd-AFC4-6F175D3DCCD1}">
-                <a14:hiddenFill xmlns:a14="http://schemas.microsoft.com/office/drawing/2010/main" xmlns="">
+                <a14:hiddenFill xmlns="" xmlns:a14="http://schemas.microsoft.com/office/drawing/2010/main">
                   <a:solidFill>
                     <a:schemeClr val="accent1"/>
                   </a:solidFill>
                 </a14:hiddenFill>
               </a:ext>
               <a:ext uri="{91240B29-F687-4f45-9708-019B960494DF}">
-                <a14:hiddenLine xmlns:a14="http://schemas.microsoft.com/office/drawing/2010/main" xmlns="" w="9525">
+                <a14:hiddenLine xmlns="" xmlns:a14="http://schemas.microsoft.com/office/drawing/2010/main" w="9525">
                   <a:solidFill>
                     <a:schemeClr val="tx1"/>
                   </a:solidFill>
@@ -19359,7 +19279,7 @@
                 </a14:hiddenLine>
               </a:ext>
               <a:ext uri="{AF507438-7753-43e0-B8FC-AC1667EBCBE1}">
-                <a14:hiddenEffects xmlns:a14="http://schemas.microsoft.com/office/drawing/2010/main" xmlns="">
+                <a14:hiddenEffects xmlns="" xmlns:a14="http://schemas.microsoft.com/office/drawing/2010/main">
                   <a:effectLst>
                     <a:outerShdw blurRad="63500" dist="38099" dir="2700000" algn="ctr" rotWithShape="0">
                       <a:schemeClr val="bg2">
@@ -19558,7 +19478,7 @@
             <a:effectLst/>
             <a:extLst>
               <a:ext uri="{AF507438-7753-43e0-B8FC-AC1667EBCBE1}">
-                <a14:hiddenEffects xmlns:a14="http://schemas.microsoft.com/office/drawing/2010/main" xmlns="">
+                <a14:hiddenEffects xmlns="" xmlns:a14="http://schemas.microsoft.com/office/drawing/2010/main">
                   <a:effectLst>
                     <a:outerShdw blurRad="63500" dist="38099" dir="2700000" algn="ctr" rotWithShape="0">
                       <a:schemeClr val="bg2">
@@ -19604,14 +19524,14 @@
             <a:effectLst/>
             <a:extLst>
               <a:ext uri="{909E8E84-426E-40dd-AFC4-6F175D3DCCD1}">
-                <a14:hiddenFill xmlns:a14="http://schemas.microsoft.com/office/drawing/2010/main" xmlns="">
+                <a14:hiddenFill xmlns="" xmlns:a14="http://schemas.microsoft.com/office/drawing/2010/main">
                   <a:solidFill>
                     <a:schemeClr val="accent1"/>
                   </a:solidFill>
                 </a14:hiddenFill>
               </a:ext>
               <a:ext uri="{91240B29-F687-4f45-9708-019B960494DF}">
-                <a14:hiddenLine xmlns:a14="http://schemas.microsoft.com/office/drawing/2010/main" xmlns="" w="9525">
+                <a14:hiddenLine xmlns="" xmlns:a14="http://schemas.microsoft.com/office/drawing/2010/main" w="9525">
                   <a:solidFill>
                     <a:schemeClr val="tx1"/>
                   </a:solidFill>
@@ -19621,7 +19541,7 @@
                 </a14:hiddenLine>
               </a:ext>
               <a:ext uri="{AF507438-7753-43e0-B8FC-AC1667EBCBE1}">
-                <a14:hiddenEffects xmlns:a14="http://schemas.microsoft.com/office/drawing/2010/main" xmlns="">
+                <a14:hiddenEffects xmlns="" xmlns:a14="http://schemas.microsoft.com/office/drawing/2010/main">
                   <a:effectLst>
                     <a:outerShdw blurRad="63500" dist="38099" dir="2700000" algn="ctr" rotWithShape="0">
                       <a:schemeClr val="bg2">
@@ -19699,7 +19619,7 @@
             <a:effectLst/>
             <a:extLst>
               <a:ext uri="{AF507438-7753-43e0-B8FC-AC1667EBCBE1}">
-                <a14:hiddenEffects xmlns:a14="http://schemas.microsoft.com/office/drawing/2010/main" xmlns="">
+                <a14:hiddenEffects xmlns="" xmlns:a14="http://schemas.microsoft.com/office/drawing/2010/main">
                   <a:effectLst>
                     <a:outerShdw blurRad="63500" dist="38099" dir="2700000" algn="ctr" rotWithShape="0">
                       <a:schemeClr val="bg2">
@@ -19745,14 +19665,14 @@
             <a:effectLst/>
             <a:extLst>
               <a:ext uri="{909E8E84-426E-40dd-AFC4-6F175D3DCCD1}">
-                <a14:hiddenFill xmlns:a14="http://schemas.microsoft.com/office/drawing/2010/main" xmlns="">
+                <a14:hiddenFill xmlns="" xmlns:a14="http://schemas.microsoft.com/office/drawing/2010/main">
                   <a:solidFill>
                     <a:schemeClr val="accent1"/>
                   </a:solidFill>
                 </a14:hiddenFill>
               </a:ext>
               <a:ext uri="{91240B29-F687-4f45-9708-019B960494DF}">
-                <a14:hiddenLine xmlns:a14="http://schemas.microsoft.com/office/drawing/2010/main" xmlns="" w="9525">
+                <a14:hiddenLine xmlns="" xmlns:a14="http://schemas.microsoft.com/office/drawing/2010/main" w="9525">
                   <a:solidFill>
                     <a:schemeClr val="tx1"/>
                   </a:solidFill>
@@ -19762,7 +19682,7 @@
                 </a14:hiddenLine>
               </a:ext>
               <a:ext uri="{AF507438-7753-43e0-B8FC-AC1667EBCBE1}">
-                <a14:hiddenEffects xmlns:a14="http://schemas.microsoft.com/office/drawing/2010/main" xmlns="">
+                <a14:hiddenEffects xmlns="" xmlns:a14="http://schemas.microsoft.com/office/drawing/2010/main">
                   <a:effectLst>
                     <a:outerShdw blurRad="63500" dist="38099" dir="2700000" algn="ctr" rotWithShape="0">
                       <a:schemeClr val="bg2">
@@ -19840,7 +19760,7 @@
             <a:effectLst/>
             <a:extLst>
               <a:ext uri="{AF507438-7753-43e0-B8FC-AC1667EBCBE1}">
-                <a14:hiddenEffects xmlns:a14="http://schemas.microsoft.com/office/drawing/2010/main" xmlns="">
+                <a14:hiddenEffects xmlns="" xmlns:a14="http://schemas.microsoft.com/office/drawing/2010/main">
                   <a:effectLst>
                     <a:outerShdw blurRad="63500" dist="38099" dir="2700000" algn="ctr" rotWithShape="0">
                       <a:schemeClr val="bg2">
@@ -19886,14 +19806,14 @@
             <a:effectLst/>
             <a:extLst>
               <a:ext uri="{909E8E84-426E-40dd-AFC4-6F175D3DCCD1}">
-                <a14:hiddenFill xmlns:a14="http://schemas.microsoft.com/office/drawing/2010/main" xmlns="">
+                <a14:hiddenFill xmlns="" xmlns:a14="http://schemas.microsoft.com/office/drawing/2010/main">
                   <a:solidFill>
                     <a:schemeClr val="accent1"/>
                   </a:solidFill>
                 </a14:hiddenFill>
               </a:ext>
               <a:ext uri="{91240B29-F687-4f45-9708-019B960494DF}">
-                <a14:hiddenLine xmlns:a14="http://schemas.microsoft.com/office/drawing/2010/main" xmlns="" w="9525">
+                <a14:hiddenLine xmlns="" xmlns:a14="http://schemas.microsoft.com/office/drawing/2010/main" w="9525">
                   <a:solidFill>
                     <a:schemeClr val="tx1"/>
                   </a:solidFill>
@@ -19903,7 +19823,7 @@
                 </a14:hiddenLine>
               </a:ext>
               <a:ext uri="{AF507438-7753-43e0-B8FC-AC1667EBCBE1}">
-                <a14:hiddenEffects xmlns:a14="http://schemas.microsoft.com/office/drawing/2010/main" xmlns="">
+                <a14:hiddenEffects xmlns="" xmlns:a14="http://schemas.microsoft.com/office/drawing/2010/main">
                   <a:effectLst>
                     <a:outerShdw blurRad="63500" dist="38099" dir="2700000" algn="ctr" rotWithShape="0">
                       <a:schemeClr val="bg2">
@@ -20126,31 +20046,6 @@
           <a:chExt cx="0" cy="0"/>
         </a:xfrm>
       </p:grpSpPr>
-      <p:sp>
-        <p:nvSpPr>
-          <p:cNvPr id="2" name="Title 1">
-            <a:extLst>
-              <a:ext uri="{FF2B5EF4-FFF2-40B4-BE49-F238E27FC236}">
-                <a16:creationId xmlns:a16="http://schemas.microsoft.com/office/drawing/2014/main" id="{6463704F-AEAB-326B-ABDF-D059EE73E03C}"/>
-              </a:ext>
-            </a:extLst>
-          </p:cNvPr>
-          <p:cNvSpPr>
-            <a:spLocks noGrp="1"/>
-          </p:cNvSpPr>
-          <p:nvPr>
-            <p:ph type="title"/>
-          </p:nvPr>
-        </p:nvSpPr>
-        <p:spPr/>
-        <p:txBody>
-          <a:bodyPr/>
-          <a:lstStyle/>
-          <a:p>
-            <a:endParaRPr lang="en-US"/>
-          </a:p>
-        </p:txBody>
-      </p:sp>
       <p:graphicFrame>
         <p:nvGraphicFramePr>
           <p:cNvPr id="4" name="Object 3">
@@ -20278,7 +20173,7 @@
             <a:effectLst/>
             <a:extLst>
               <a:ext uri="{AF507438-7753-43e0-B8FC-AC1667EBCBE1}">
-                <a14:hiddenEffects xmlns:a14="http://schemas.microsoft.com/office/drawing/2010/main" xmlns="">
+                <a14:hiddenEffects xmlns="" xmlns:a14="http://schemas.microsoft.com/office/drawing/2010/main">
                   <a:effectLst>
                     <a:outerShdw blurRad="63500" dist="38099" dir="2700000" algn="ctr" rotWithShape="0">
                       <a:schemeClr val="bg2">
@@ -20330,14 +20225,14 @@
             <a:effectLst/>
             <a:extLst>
               <a:ext uri="{909E8E84-426E-40dd-AFC4-6F175D3DCCD1}">
-                <a14:hiddenFill xmlns:a14="http://schemas.microsoft.com/office/drawing/2010/main" xmlns="">
+                <a14:hiddenFill xmlns="" xmlns:a14="http://schemas.microsoft.com/office/drawing/2010/main">
                   <a:solidFill>
                     <a:schemeClr val="accent1"/>
                   </a:solidFill>
                 </a14:hiddenFill>
               </a:ext>
               <a:ext uri="{91240B29-F687-4f45-9708-019B960494DF}">
-                <a14:hiddenLine xmlns:a14="http://schemas.microsoft.com/office/drawing/2010/main" xmlns="" w="9525">
+                <a14:hiddenLine xmlns="" xmlns:a14="http://schemas.microsoft.com/office/drawing/2010/main" w="9525">
                   <a:solidFill>
                     <a:schemeClr val="tx1"/>
                   </a:solidFill>
@@ -20347,7 +20242,7 @@
                 </a14:hiddenLine>
               </a:ext>
               <a:ext uri="{AF507438-7753-43e0-B8FC-AC1667EBCBE1}">
-                <a14:hiddenEffects xmlns:a14="http://schemas.microsoft.com/office/drawing/2010/main" xmlns="">
+                <a14:hiddenEffects xmlns="" xmlns:a14="http://schemas.microsoft.com/office/drawing/2010/main">
                   <a:effectLst>
                     <a:outerShdw blurRad="63500" dist="38099" dir="2700000" algn="ctr" rotWithShape="0">
                       <a:schemeClr val="bg2">
@@ -20437,7 +20332,7 @@
             <a:effectLst/>
             <a:extLst>
               <a:ext uri="{AF507438-7753-43e0-B8FC-AC1667EBCBE1}">
-                <a14:hiddenEffects xmlns:a14="http://schemas.microsoft.com/office/drawing/2010/main" xmlns="">
+                <a14:hiddenEffects xmlns="" xmlns:a14="http://schemas.microsoft.com/office/drawing/2010/main">
                   <a:effectLst>
                     <a:outerShdw blurRad="63500" dist="38099" dir="2700000" algn="ctr" rotWithShape="0">
                       <a:schemeClr val="bg2">
@@ -20489,14 +20384,14 @@
             <a:effectLst/>
             <a:extLst>
               <a:ext uri="{909E8E84-426E-40dd-AFC4-6F175D3DCCD1}">
-                <a14:hiddenFill xmlns:a14="http://schemas.microsoft.com/office/drawing/2010/main" xmlns="">
+                <a14:hiddenFill xmlns="" xmlns:a14="http://schemas.microsoft.com/office/drawing/2010/main">
                   <a:solidFill>
                     <a:schemeClr val="accent1"/>
                   </a:solidFill>
                 </a14:hiddenFill>
               </a:ext>
               <a:ext uri="{91240B29-F687-4f45-9708-019B960494DF}">
-                <a14:hiddenLine xmlns:a14="http://schemas.microsoft.com/office/drawing/2010/main" xmlns="" w="9525">
+                <a14:hiddenLine xmlns="" xmlns:a14="http://schemas.microsoft.com/office/drawing/2010/main" w="9525">
                   <a:solidFill>
                     <a:schemeClr val="tx1"/>
                   </a:solidFill>
@@ -20506,7 +20401,7 @@
                 </a14:hiddenLine>
               </a:ext>
               <a:ext uri="{AF507438-7753-43e0-B8FC-AC1667EBCBE1}">
-                <a14:hiddenEffects xmlns:a14="http://schemas.microsoft.com/office/drawing/2010/main" xmlns="">
+                <a14:hiddenEffects xmlns="" xmlns:a14="http://schemas.microsoft.com/office/drawing/2010/main">
                   <a:effectLst>
                     <a:outerShdw blurRad="63500" dist="38099" dir="2700000" algn="ctr" rotWithShape="0">
                       <a:schemeClr val="bg2">
@@ -20596,7 +20491,7 @@
             <a:effectLst/>
             <a:extLst>
               <a:ext uri="{AF507438-7753-43e0-B8FC-AC1667EBCBE1}">
-                <a14:hiddenEffects xmlns:a14="http://schemas.microsoft.com/office/drawing/2010/main" xmlns="">
+                <a14:hiddenEffects xmlns="" xmlns:a14="http://schemas.microsoft.com/office/drawing/2010/main">
                   <a:effectLst>
                     <a:outerShdw blurRad="63500" dist="38099" dir="2700000" algn="ctr" rotWithShape="0">
                       <a:schemeClr val="bg2">
@@ -20648,14 +20543,14 @@
             <a:effectLst/>
             <a:extLst>
               <a:ext uri="{909E8E84-426E-40dd-AFC4-6F175D3DCCD1}">
-                <a14:hiddenFill xmlns:a14="http://schemas.microsoft.com/office/drawing/2010/main" xmlns="">
+                <a14:hiddenFill xmlns="" xmlns:a14="http://schemas.microsoft.com/office/drawing/2010/main">
                   <a:solidFill>
                     <a:schemeClr val="accent1"/>
                   </a:solidFill>
                 </a14:hiddenFill>
               </a:ext>
               <a:ext uri="{91240B29-F687-4f45-9708-019B960494DF}">
-                <a14:hiddenLine xmlns:a14="http://schemas.microsoft.com/office/drawing/2010/main" xmlns="" w="9525">
+                <a14:hiddenLine xmlns="" xmlns:a14="http://schemas.microsoft.com/office/drawing/2010/main" w="9525">
                   <a:solidFill>
                     <a:schemeClr val="tx1"/>
                   </a:solidFill>
@@ -20665,7 +20560,7 @@
                 </a14:hiddenLine>
               </a:ext>
               <a:ext uri="{AF507438-7753-43e0-B8FC-AC1667EBCBE1}">
-                <a14:hiddenEffects xmlns:a14="http://schemas.microsoft.com/office/drawing/2010/main" xmlns="">
+                <a14:hiddenEffects xmlns="" xmlns:a14="http://schemas.microsoft.com/office/drawing/2010/main">
                   <a:effectLst>
                     <a:outerShdw blurRad="63500" dist="38099" dir="2700000" algn="ctr" rotWithShape="0">
                       <a:schemeClr val="bg2">
@@ -20894,7 +20789,7 @@
             <a:effectLst/>
             <a:extLst>
               <a:ext uri="{AF507438-7753-43e0-B8FC-AC1667EBCBE1}">
-                <a14:hiddenEffects xmlns:a14="http://schemas.microsoft.com/office/drawing/2010/main" xmlns="">
+                <a14:hiddenEffects xmlns="" xmlns:a14="http://schemas.microsoft.com/office/drawing/2010/main">
                   <a:effectLst>
                     <a:outerShdw blurRad="63500" dist="38099" dir="2700000" algn="ctr" rotWithShape="0">
                       <a:schemeClr val="bg2">
@@ -20946,14 +20841,14 @@
             <a:effectLst/>
             <a:extLst>
               <a:ext uri="{909E8E84-426E-40dd-AFC4-6F175D3DCCD1}">
-                <a14:hiddenFill xmlns:a14="http://schemas.microsoft.com/office/drawing/2010/main" xmlns="">
+                <a14:hiddenFill xmlns="" xmlns:a14="http://schemas.microsoft.com/office/drawing/2010/main">
                   <a:solidFill>
                     <a:schemeClr val="accent1"/>
                   </a:solidFill>
                 </a14:hiddenFill>
               </a:ext>
               <a:ext uri="{91240B29-F687-4f45-9708-019B960494DF}">
-                <a14:hiddenLine xmlns:a14="http://schemas.microsoft.com/office/drawing/2010/main" xmlns="" w="9525">
+                <a14:hiddenLine xmlns="" xmlns:a14="http://schemas.microsoft.com/office/drawing/2010/main" w="9525">
                   <a:solidFill>
                     <a:schemeClr val="tx1"/>
                   </a:solidFill>
@@ -20963,7 +20858,7 @@
                 </a14:hiddenLine>
               </a:ext>
               <a:ext uri="{AF507438-7753-43e0-B8FC-AC1667EBCBE1}">
-                <a14:hiddenEffects xmlns:a14="http://schemas.microsoft.com/office/drawing/2010/main" xmlns="">
+                <a14:hiddenEffects xmlns="" xmlns:a14="http://schemas.microsoft.com/office/drawing/2010/main">
                   <a:effectLst>
                     <a:outerShdw blurRad="63500" dist="38099" dir="2700000" algn="ctr" rotWithShape="0">
                       <a:schemeClr val="bg2">
@@ -21053,7 +20948,7 @@
             <a:effectLst/>
             <a:extLst>
               <a:ext uri="{AF507438-7753-43e0-B8FC-AC1667EBCBE1}">
-                <a14:hiddenEffects xmlns:a14="http://schemas.microsoft.com/office/drawing/2010/main" xmlns="">
+                <a14:hiddenEffects xmlns="" xmlns:a14="http://schemas.microsoft.com/office/drawing/2010/main">
                   <a:effectLst>
                     <a:outerShdw blurRad="63500" dist="38099" dir="2700000" algn="ctr" rotWithShape="0">
                       <a:schemeClr val="bg2">
@@ -21105,14 +21000,14 @@
             <a:effectLst/>
             <a:extLst>
               <a:ext uri="{909E8E84-426E-40dd-AFC4-6F175D3DCCD1}">
-                <a14:hiddenFill xmlns:a14="http://schemas.microsoft.com/office/drawing/2010/main" xmlns="">
+                <a14:hiddenFill xmlns="" xmlns:a14="http://schemas.microsoft.com/office/drawing/2010/main">
                   <a:solidFill>
                     <a:schemeClr val="accent1"/>
                   </a:solidFill>
                 </a14:hiddenFill>
               </a:ext>
               <a:ext uri="{91240B29-F687-4f45-9708-019B960494DF}">
-                <a14:hiddenLine xmlns:a14="http://schemas.microsoft.com/office/drawing/2010/main" xmlns="" w="9525">
+                <a14:hiddenLine xmlns="" xmlns:a14="http://schemas.microsoft.com/office/drawing/2010/main" w="9525">
                   <a:solidFill>
                     <a:schemeClr val="tx1"/>
                   </a:solidFill>
@@ -21122,7 +21017,7 @@
                 </a14:hiddenLine>
               </a:ext>
               <a:ext uri="{AF507438-7753-43e0-B8FC-AC1667EBCBE1}">
-                <a14:hiddenEffects xmlns:a14="http://schemas.microsoft.com/office/drawing/2010/main" xmlns="">
+                <a14:hiddenEffects xmlns="" xmlns:a14="http://schemas.microsoft.com/office/drawing/2010/main">
                   <a:effectLst>
                     <a:outerShdw blurRad="63500" dist="38099" dir="2700000" algn="ctr" rotWithShape="0">
                       <a:schemeClr val="bg2">
@@ -21212,7 +21107,7 @@
             <a:effectLst/>
             <a:extLst>
               <a:ext uri="{AF507438-7753-43e0-B8FC-AC1667EBCBE1}">
-                <a14:hiddenEffects xmlns:a14="http://schemas.microsoft.com/office/drawing/2010/main" xmlns="">
+                <a14:hiddenEffects xmlns="" xmlns:a14="http://schemas.microsoft.com/office/drawing/2010/main">
                   <a:effectLst>
                     <a:outerShdw blurRad="63500" dist="38099" dir="2700000" algn="ctr" rotWithShape="0">
                       <a:schemeClr val="bg2">
@@ -21264,14 +21159,14 @@
             <a:effectLst/>
             <a:extLst>
               <a:ext uri="{909E8E84-426E-40dd-AFC4-6F175D3DCCD1}">
-                <a14:hiddenFill xmlns:a14="http://schemas.microsoft.com/office/drawing/2010/main" xmlns="">
+                <a14:hiddenFill xmlns="" xmlns:a14="http://schemas.microsoft.com/office/drawing/2010/main">
                   <a:solidFill>
                     <a:schemeClr val="accent1"/>
                   </a:solidFill>
                 </a14:hiddenFill>
               </a:ext>
               <a:ext uri="{91240B29-F687-4f45-9708-019B960494DF}">
-                <a14:hiddenLine xmlns:a14="http://schemas.microsoft.com/office/drawing/2010/main" xmlns="" w="9525">
+                <a14:hiddenLine xmlns="" xmlns:a14="http://schemas.microsoft.com/office/drawing/2010/main" w="9525">
                   <a:solidFill>
                     <a:schemeClr val="tx1"/>
                   </a:solidFill>
@@ -21281,7 +21176,7 @@
                 </a14:hiddenLine>
               </a:ext>
               <a:ext uri="{AF507438-7753-43e0-B8FC-AC1667EBCBE1}">
-                <a14:hiddenEffects xmlns:a14="http://schemas.microsoft.com/office/drawing/2010/main" xmlns="">
+                <a14:hiddenEffects xmlns="" xmlns:a14="http://schemas.microsoft.com/office/drawing/2010/main">
                   <a:effectLst>
                     <a:outerShdw blurRad="63500" dist="38099" dir="2700000" algn="ctr" rotWithShape="0">
                       <a:schemeClr val="bg2">
@@ -21556,7 +21451,7 @@
             <a:effectLst/>
             <a:extLst>
               <a:ext uri="{AF507438-7753-43e0-B8FC-AC1667EBCBE1}">
-                <a14:hiddenEffects xmlns:a14="http://schemas.microsoft.com/office/drawing/2010/main" xmlns="">
+                <a14:hiddenEffects xmlns="" xmlns:a14="http://schemas.microsoft.com/office/drawing/2010/main">
                   <a:effectLst>
                     <a:outerShdw blurRad="63500" dist="38099" dir="2700000" algn="ctr" rotWithShape="0">
                       <a:schemeClr val="bg2">
@@ -21608,14 +21503,14 @@
             <a:effectLst/>
             <a:extLst>
               <a:ext uri="{909E8E84-426E-40dd-AFC4-6F175D3DCCD1}">
-                <a14:hiddenFill xmlns:a14="http://schemas.microsoft.com/office/drawing/2010/main" xmlns="">
+                <a14:hiddenFill xmlns="" xmlns:a14="http://schemas.microsoft.com/office/drawing/2010/main">
                   <a:solidFill>
                     <a:schemeClr val="accent1"/>
                   </a:solidFill>
                 </a14:hiddenFill>
               </a:ext>
               <a:ext uri="{91240B29-F687-4f45-9708-019B960494DF}">
-                <a14:hiddenLine xmlns:a14="http://schemas.microsoft.com/office/drawing/2010/main" xmlns="" w="9525">
+                <a14:hiddenLine xmlns="" xmlns:a14="http://schemas.microsoft.com/office/drawing/2010/main" w="9525">
                   <a:solidFill>
                     <a:schemeClr val="tx1"/>
                   </a:solidFill>
@@ -21625,7 +21520,7 @@
                 </a14:hiddenLine>
               </a:ext>
               <a:ext uri="{AF507438-7753-43e0-B8FC-AC1667EBCBE1}">
-                <a14:hiddenEffects xmlns:a14="http://schemas.microsoft.com/office/drawing/2010/main" xmlns="">
+                <a14:hiddenEffects xmlns="" xmlns:a14="http://schemas.microsoft.com/office/drawing/2010/main">
                   <a:effectLst>
                     <a:outerShdw blurRad="63500" dist="38099" dir="2700000" algn="ctr" rotWithShape="0">
                       <a:schemeClr val="bg2">
@@ -21715,7 +21610,7 @@
             <a:effectLst/>
             <a:extLst>
               <a:ext uri="{AF507438-7753-43e0-B8FC-AC1667EBCBE1}">
-                <a14:hiddenEffects xmlns:a14="http://schemas.microsoft.com/office/drawing/2010/main" xmlns="">
+                <a14:hiddenEffects xmlns="" xmlns:a14="http://schemas.microsoft.com/office/drawing/2010/main">
                   <a:effectLst>
                     <a:outerShdw blurRad="63500" dist="38099" dir="2700000" algn="ctr" rotWithShape="0">
                       <a:schemeClr val="bg2">
@@ -21767,14 +21662,14 @@
             <a:effectLst/>
             <a:extLst>
               <a:ext uri="{909E8E84-426E-40dd-AFC4-6F175D3DCCD1}">
-                <a14:hiddenFill xmlns:a14="http://schemas.microsoft.com/office/drawing/2010/main" xmlns="">
+                <a14:hiddenFill xmlns="" xmlns:a14="http://schemas.microsoft.com/office/drawing/2010/main">
                   <a:solidFill>
                     <a:schemeClr val="accent1"/>
                   </a:solidFill>
                 </a14:hiddenFill>
               </a:ext>
               <a:ext uri="{91240B29-F687-4f45-9708-019B960494DF}">
-                <a14:hiddenLine xmlns:a14="http://schemas.microsoft.com/office/drawing/2010/main" xmlns="" w="9525">
+                <a14:hiddenLine xmlns="" xmlns:a14="http://schemas.microsoft.com/office/drawing/2010/main" w="9525">
                   <a:solidFill>
                     <a:schemeClr val="tx1"/>
                   </a:solidFill>
@@ -21784,7 +21679,7 @@
                 </a14:hiddenLine>
               </a:ext>
               <a:ext uri="{AF507438-7753-43e0-B8FC-AC1667EBCBE1}">
-                <a14:hiddenEffects xmlns:a14="http://schemas.microsoft.com/office/drawing/2010/main" xmlns="">
+                <a14:hiddenEffects xmlns="" xmlns:a14="http://schemas.microsoft.com/office/drawing/2010/main">
                   <a:effectLst>
                     <a:outerShdw blurRad="63500" dist="38099" dir="2700000" algn="ctr" rotWithShape="0">
                       <a:schemeClr val="bg2">
@@ -21874,7 +21769,7 @@
             <a:effectLst/>
             <a:extLst>
               <a:ext uri="{AF507438-7753-43e0-B8FC-AC1667EBCBE1}">
-                <a14:hiddenEffects xmlns:a14="http://schemas.microsoft.com/office/drawing/2010/main" xmlns="">
+                <a14:hiddenEffects xmlns="" xmlns:a14="http://schemas.microsoft.com/office/drawing/2010/main">
                   <a:effectLst>
                     <a:outerShdw blurRad="63500" dist="38099" dir="2700000" algn="ctr" rotWithShape="0">
                       <a:schemeClr val="bg2">
@@ -21926,14 +21821,14 @@
             <a:effectLst/>
             <a:extLst>
               <a:ext uri="{909E8E84-426E-40dd-AFC4-6F175D3DCCD1}">
-                <a14:hiddenFill xmlns:a14="http://schemas.microsoft.com/office/drawing/2010/main" xmlns="">
+                <a14:hiddenFill xmlns="" xmlns:a14="http://schemas.microsoft.com/office/drawing/2010/main">
                   <a:solidFill>
                     <a:schemeClr val="accent1"/>
                   </a:solidFill>
                 </a14:hiddenFill>
               </a:ext>
               <a:ext uri="{91240B29-F687-4f45-9708-019B960494DF}">
-                <a14:hiddenLine xmlns:a14="http://schemas.microsoft.com/office/drawing/2010/main" xmlns="" w="9525">
+                <a14:hiddenLine xmlns="" xmlns:a14="http://schemas.microsoft.com/office/drawing/2010/main" w="9525">
                   <a:solidFill>
                     <a:schemeClr val="tx1"/>
                   </a:solidFill>
@@ -21943,7 +21838,7 @@
                 </a14:hiddenLine>
               </a:ext>
               <a:ext uri="{AF507438-7753-43e0-B8FC-AC1667EBCBE1}">
-                <a14:hiddenEffects xmlns:a14="http://schemas.microsoft.com/office/drawing/2010/main" xmlns="">
+                <a14:hiddenEffects xmlns="" xmlns:a14="http://schemas.microsoft.com/office/drawing/2010/main">
                   <a:effectLst>
                     <a:outerShdw blurRad="63500" dist="38099" dir="2700000" algn="ctr" rotWithShape="0">
                       <a:schemeClr val="bg2">
@@ -22615,7 +22510,7 @@
           <a:p>
             <a:r>
               <a:rPr lang="en-US" sz="2800" dirty="0"/>
-              <a:t>Big-O allowed us to group algorithms by run-time</a:t>
+              <a:t>Big-O allowed us to group algorithms by run-time.</a:t>
             </a:r>
           </a:p>
           <a:p>
@@ -22624,7 +22519,7 @@
           <a:p>
             <a:r>
               <a:rPr lang="en-US" sz="2800" dirty="0"/>
-              <a:t>Today, we’re talking about sets of problems grouped by how easy they are to solve</a:t>
+              <a:t>Today, we’re talking about sets of problems grouped by how easy they are to solve.</a:t>
             </a:r>
           </a:p>
         </p:txBody>
@@ -22643,7 +22538,7 @@
         </p:nvSpPr>
         <p:spPr>
           <a:xfrm>
-            <a:off x="1103586" y="5339255"/>
+            <a:off x="1101677" y="5104124"/>
             <a:ext cx="5610190" cy="369332"/>
           </a:xfrm>
           <a:prstGeom prst="rect">
@@ -22955,7 +22850,7 @@
             <a:effectLst/>
             <a:extLst>
               <a:ext uri="{AF507438-7753-43e0-B8FC-AC1667EBCBE1}">
-                <a14:hiddenEffects xmlns:a14="http://schemas.microsoft.com/office/drawing/2010/main" xmlns="">
+                <a14:hiddenEffects xmlns="" xmlns:a14="http://schemas.microsoft.com/office/drawing/2010/main">
                   <a:effectLst>
                     <a:outerShdw blurRad="63500" dist="38099" dir="2700000" algn="ctr" rotWithShape="0">
                       <a:schemeClr val="bg2">
@@ -23007,14 +22902,14 @@
             <a:effectLst/>
             <a:extLst>
               <a:ext uri="{909E8E84-426E-40dd-AFC4-6F175D3DCCD1}">
-                <a14:hiddenFill xmlns:a14="http://schemas.microsoft.com/office/drawing/2010/main" xmlns="">
+                <a14:hiddenFill xmlns="" xmlns:a14="http://schemas.microsoft.com/office/drawing/2010/main">
                   <a:solidFill>
                     <a:schemeClr val="accent1"/>
                   </a:solidFill>
                 </a14:hiddenFill>
               </a:ext>
               <a:ext uri="{91240B29-F687-4f45-9708-019B960494DF}">
-                <a14:hiddenLine xmlns:a14="http://schemas.microsoft.com/office/drawing/2010/main" xmlns="" w="9525">
+                <a14:hiddenLine xmlns="" xmlns:a14="http://schemas.microsoft.com/office/drawing/2010/main" w="9525">
                   <a:solidFill>
                     <a:schemeClr val="tx1"/>
                   </a:solidFill>
@@ -23024,7 +22919,7 @@
                 </a14:hiddenLine>
               </a:ext>
               <a:ext uri="{AF507438-7753-43e0-B8FC-AC1667EBCBE1}">
-                <a14:hiddenEffects xmlns:a14="http://schemas.microsoft.com/office/drawing/2010/main" xmlns="">
+                <a14:hiddenEffects xmlns="" xmlns:a14="http://schemas.microsoft.com/office/drawing/2010/main">
                   <a:effectLst>
                     <a:outerShdw blurRad="63500" dist="38099" dir="2700000" algn="ctr" rotWithShape="0">
                       <a:schemeClr val="bg2">
@@ -23114,7 +23009,7 @@
             <a:effectLst/>
             <a:extLst>
               <a:ext uri="{AF507438-7753-43e0-B8FC-AC1667EBCBE1}">
-                <a14:hiddenEffects xmlns:a14="http://schemas.microsoft.com/office/drawing/2010/main" xmlns="">
+                <a14:hiddenEffects xmlns="" xmlns:a14="http://schemas.microsoft.com/office/drawing/2010/main">
                   <a:effectLst>
                     <a:outerShdw blurRad="63500" dist="38099" dir="2700000" algn="ctr" rotWithShape="0">
                       <a:schemeClr val="bg2">
@@ -23166,14 +23061,14 @@
             <a:effectLst/>
             <a:extLst>
               <a:ext uri="{909E8E84-426E-40dd-AFC4-6F175D3DCCD1}">
-                <a14:hiddenFill xmlns:a14="http://schemas.microsoft.com/office/drawing/2010/main" xmlns="">
+                <a14:hiddenFill xmlns="" xmlns:a14="http://schemas.microsoft.com/office/drawing/2010/main">
                   <a:solidFill>
                     <a:schemeClr val="accent1"/>
                   </a:solidFill>
                 </a14:hiddenFill>
               </a:ext>
               <a:ext uri="{91240B29-F687-4f45-9708-019B960494DF}">
-                <a14:hiddenLine xmlns:a14="http://schemas.microsoft.com/office/drawing/2010/main" xmlns="" w="9525">
+                <a14:hiddenLine xmlns="" xmlns:a14="http://schemas.microsoft.com/office/drawing/2010/main" w="9525">
                   <a:solidFill>
                     <a:schemeClr val="tx1"/>
                   </a:solidFill>
@@ -23183,7 +23078,7 @@
                 </a14:hiddenLine>
               </a:ext>
               <a:ext uri="{AF507438-7753-43e0-B8FC-AC1667EBCBE1}">
-                <a14:hiddenEffects xmlns:a14="http://schemas.microsoft.com/office/drawing/2010/main" xmlns="">
+                <a14:hiddenEffects xmlns="" xmlns:a14="http://schemas.microsoft.com/office/drawing/2010/main">
                   <a:effectLst>
                     <a:outerShdw blurRad="63500" dist="38099" dir="2700000" algn="ctr" rotWithShape="0">
                       <a:schemeClr val="bg2">
@@ -23273,7 +23168,7 @@
             <a:effectLst/>
             <a:extLst>
               <a:ext uri="{AF507438-7753-43e0-B8FC-AC1667EBCBE1}">
-                <a14:hiddenEffects xmlns:a14="http://schemas.microsoft.com/office/drawing/2010/main" xmlns="">
+                <a14:hiddenEffects xmlns="" xmlns:a14="http://schemas.microsoft.com/office/drawing/2010/main">
                   <a:effectLst>
                     <a:outerShdw blurRad="63500" dist="38099" dir="2700000" algn="ctr" rotWithShape="0">
                       <a:schemeClr val="bg2">
@@ -23325,14 +23220,14 @@
             <a:effectLst/>
             <a:extLst>
               <a:ext uri="{909E8E84-426E-40dd-AFC4-6F175D3DCCD1}">
-                <a14:hiddenFill xmlns:a14="http://schemas.microsoft.com/office/drawing/2010/main" xmlns="">
+                <a14:hiddenFill xmlns="" xmlns:a14="http://schemas.microsoft.com/office/drawing/2010/main">
                   <a:solidFill>
                     <a:schemeClr val="accent1"/>
                   </a:solidFill>
                 </a14:hiddenFill>
               </a:ext>
               <a:ext uri="{91240B29-F687-4f45-9708-019B960494DF}">
-                <a14:hiddenLine xmlns:a14="http://schemas.microsoft.com/office/drawing/2010/main" xmlns="" w="9525">
+                <a14:hiddenLine xmlns="" xmlns:a14="http://schemas.microsoft.com/office/drawing/2010/main" w="9525">
                   <a:solidFill>
                     <a:schemeClr val="tx1"/>
                   </a:solidFill>
@@ -23342,7 +23237,7 @@
                 </a14:hiddenLine>
               </a:ext>
               <a:ext uri="{AF507438-7753-43e0-B8FC-AC1667EBCBE1}">
-                <a14:hiddenEffects xmlns:a14="http://schemas.microsoft.com/office/drawing/2010/main" xmlns="">
+                <a14:hiddenEffects xmlns="" xmlns:a14="http://schemas.microsoft.com/office/drawing/2010/main">
                   <a:effectLst>
                     <a:outerShdw blurRad="63500" dist="38099" dir="2700000" algn="ctr" rotWithShape="0">
                       <a:schemeClr val="bg2">
@@ -23571,7 +23466,7 @@
             <a:effectLst/>
             <a:extLst>
               <a:ext uri="{AF507438-7753-43e0-B8FC-AC1667EBCBE1}">
-                <a14:hiddenEffects xmlns:a14="http://schemas.microsoft.com/office/drawing/2010/main" xmlns="">
+                <a14:hiddenEffects xmlns="" xmlns:a14="http://schemas.microsoft.com/office/drawing/2010/main">
                   <a:effectLst>
                     <a:outerShdw blurRad="63500" dist="38099" dir="2700000" algn="ctr" rotWithShape="0">
                       <a:schemeClr val="bg2">
@@ -23623,14 +23518,14 @@
             <a:effectLst/>
             <a:extLst>
               <a:ext uri="{909E8E84-426E-40dd-AFC4-6F175D3DCCD1}">
-                <a14:hiddenFill xmlns:a14="http://schemas.microsoft.com/office/drawing/2010/main" xmlns="">
+                <a14:hiddenFill xmlns="" xmlns:a14="http://schemas.microsoft.com/office/drawing/2010/main">
                   <a:solidFill>
                     <a:schemeClr val="accent1"/>
                   </a:solidFill>
                 </a14:hiddenFill>
               </a:ext>
               <a:ext uri="{91240B29-F687-4f45-9708-019B960494DF}">
-                <a14:hiddenLine xmlns:a14="http://schemas.microsoft.com/office/drawing/2010/main" xmlns="" w="9525">
+                <a14:hiddenLine xmlns="" xmlns:a14="http://schemas.microsoft.com/office/drawing/2010/main" w="9525">
                   <a:solidFill>
                     <a:schemeClr val="tx1"/>
                   </a:solidFill>
@@ -23640,7 +23535,7 @@
                 </a14:hiddenLine>
               </a:ext>
               <a:ext uri="{AF507438-7753-43e0-B8FC-AC1667EBCBE1}">
-                <a14:hiddenEffects xmlns:a14="http://schemas.microsoft.com/office/drawing/2010/main" xmlns="">
+                <a14:hiddenEffects xmlns="" xmlns:a14="http://schemas.microsoft.com/office/drawing/2010/main">
                   <a:effectLst>
                     <a:outerShdw blurRad="63500" dist="38099" dir="2700000" algn="ctr" rotWithShape="0">
                       <a:schemeClr val="bg2">
@@ -23730,7 +23625,7 @@
             <a:effectLst/>
             <a:extLst>
               <a:ext uri="{AF507438-7753-43e0-B8FC-AC1667EBCBE1}">
-                <a14:hiddenEffects xmlns:a14="http://schemas.microsoft.com/office/drawing/2010/main" xmlns="">
+                <a14:hiddenEffects xmlns="" xmlns:a14="http://schemas.microsoft.com/office/drawing/2010/main">
                   <a:effectLst>
                     <a:outerShdw blurRad="63500" dist="38099" dir="2700000" algn="ctr" rotWithShape="0">
                       <a:schemeClr val="bg2">
@@ -23782,14 +23677,14 @@
             <a:effectLst/>
             <a:extLst>
               <a:ext uri="{909E8E84-426E-40dd-AFC4-6F175D3DCCD1}">
-                <a14:hiddenFill xmlns:a14="http://schemas.microsoft.com/office/drawing/2010/main" xmlns="">
+                <a14:hiddenFill xmlns="" xmlns:a14="http://schemas.microsoft.com/office/drawing/2010/main">
                   <a:solidFill>
                     <a:schemeClr val="accent1"/>
                   </a:solidFill>
                 </a14:hiddenFill>
               </a:ext>
               <a:ext uri="{91240B29-F687-4f45-9708-019B960494DF}">
-                <a14:hiddenLine xmlns:a14="http://schemas.microsoft.com/office/drawing/2010/main" xmlns="" w="9525">
+                <a14:hiddenLine xmlns="" xmlns:a14="http://schemas.microsoft.com/office/drawing/2010/main" w="9525">
                   <a:solidFill>
                     <a:schemeClr val="tx1"/>
                   </a:solidFill>
@@ -23799,7 +23694,7 @@
                 </a14:hiddenLine>
               </a:ext>
               <a:ext uri="{AF507438-7753-43e0-B8FC-AC1667EBCBE1}">
-                <a14:hiddenEffects xmlns:a14="http://schemas.microsoft.com/office/drawing/2010/main" xmlns="">
+                <a14:hiddenEffects xmlns="" xmlns:a14="http://schemas.microsoft.com/office/drawing/2010/main">
                   <a:effectLst>
                     <a:outerShdw blurRad="63500" dist="38099" dir="2700000" algn="ctr" rotWithShape="0">
                       <a:schemeClr val="bg2">
@@ -23889,7 +23784,7 @@
             <a:effectLst/>
             <a:extLst>
               <a:ext uri="{AF507438-7753-43e0-B8FC-AC1667EBCBE1}">
-                <a14:hiddenEffects xmlns:a14="http://schemas.microsoft.com/office/drawing/2010/main" xmlns="">
+                <a14:hiddenEffects xmlns="" xmlns:a14="http://schemas.microsoft.com/office/drawing/2010/main">
                   <a:effectLst>
                     <a:outerShdw blurRad="63500" dist="38099" dir="2700000" algn="ctr" rotWithShape="0">
                       <a:schemeClr val="bg2">
@@ -23941,14 +23836,14 @@
             <a:effectLst/>
             <a:extLst>
               <a:ext uri="{909E8E84-426E-40dd-AFC4-6F175D3DCCD1}">
-                <a14:hiddenFill xmlns:a14="http://schemas.microsoft.com/office/drawing/2010/main" xmlns="">
+                <a14:hiddenFill xmlns="" xmlns:a14="http://schemas.microsoft.com/office/drawing/2010/main">
                   <a:solidFill>
                     <a:schemeClr val="accent1"/>
                   </a:solidFill>
                 </a14:hiddenFill>
               </a:ext>
               <a:ext uri="{91240B29-F687-4f45-9708-019B960494DF}">
-                <a14:hiddenLine xmlns:a14="http://schemas.microsoft.com/office/drawing/2010/main" xmlns="" w="9525">
+                <a14:hiddenLine xmlns="" xmlns:a14="http://schemas.microsoft.com/office/drawing/2010/main" w="9525">
                   <a:solidFill>
                     <a:schemeClr val="tx1"/>
                   </a:solidFill>
@@ -23958,7 +23853,7 @@
                 </a14:hiddenLine>
               </a:ext>
               <a:ext uri="{AF507438-7753-43e0-B8FC-AC1667EBCBE1}">
-                <a14:hiddenEffects xmlns:a14="http://schemas.microsoft.com/office/drawing/2010/main" xmlns="">
+                <a14:hiddenEffects xmlns="" xmlns:a14="http://schemas.microsoft.com/office/drawing/2010/main">
                   <a:effectLst>
                     <a:outerShdw blurRad="63500" dist="38099" dir="2700000" algn="ctr" rotWithShape="0">
                       <a:schemeClr val="bg2">
@@ -24233,7 +24128,7 @@
             <a:effectLst/>
             <a:extLst>
               <a:ext uri="{AF507438-7753-43e0-B8FC-AC1667EBCBE1}">
-                <a14:hiddenEffects xmlns:a14="http://schemas.microsoft.com/office/drawing/2010/main" xmlns="">
+                <a14:hiddenEffects xmlns="" xmlns:a14="http://schemas.microsoft.com/office/drawing/2010/main">
                   <a:effectLst>
                     <a:outerShdw blurRad="63500" dist="38099" dir="2700000" algn="ctr" rotWithShape="0">
                       <a:schemeClr val="bg2">
@@ -24285,14 +24180,14 @@
             <a:effectLst/>
             <a:extLst>
               <a:ext uri="{909E8E84-426E-40dd-AFC4-6F175D3DCCD1}">
-                <a14:hiddenFill xmlns:a14="http://schemas.microsoft.com/office/drawing/2010/main" xmlns="">
+                <a14:hiddenFill xmlns="" xmlns:a14="http://schemas.microsoft.com/office/drawing/2010/main">
                   <a:solidFill>
                     <a:schemeClr val="accent1"/>
                   </a:solidFill>
                 </a14:hiddenFill>
               </a:ext>
               <a:ext uri="{91240B29-F687-4f45-9708-019B960494DF}">
-                <a14:hiddenLine xmlns:a14="http://schemas.microsoft.com/office/drawing/2010/main" xmlns="" w="9525">
+                <a14:hiddenLine xmlns="" xmlns:a14="http://schemas.microsoft.com/office/drawing/2010/main" w="9525">
                   <a:solidFill>
                     <a:schemeClr val="tx1"/>
                   </a:solidFill>
@@ -24302,7 +24197,7 @@
                 </a14:hiddenLine>
               </a:ext>
               <a:ext uri="{AF507438-7753-43e0-B8FC-AC1667EBCBE1}">
-                <a14:hiddenEffects xmlns:a14="http://schemas.microsoft.com/office/drawing/2010/main" xmlns="">
+                <a14:hiddenEffects xmlns="" xmlns:a14="http://schemas.microsoft.com/office/drawing/2010/main">
                   <a:effectLst>
                     <a:outerShdw blurRad="63500" dist="38099" dir="2700000" algn="ctr" rotWithShape="0">
                       <a:schemeClr val="bg2">
@@ -24392,7 +24287,7 @@
             <a:effectLst/>
             <a:extLst>
               <a:ext uri="{AF507438-7753-43e0-B8FC-AC1667EBCBE1}">
-                <a14:hiddenEffects xmlns:a14="http://schemas.microsoft.com/office/drawing/2010/main" xmlns="">
+                <a14:hiddenEffects xmlns="" xmlns:a14="http://schemas.microsoft.com/office/drawing/2010/main">
                   <a:effectLst>
                     <a:outerShdw blurRad="63500" dist="38099" dir="2700000" algn="ctr" rotWithShape="0">
                       <a:schemeClr val="bg2">
@@ -24444,14 +24339,14 @@
             <a:effectLst/>
             <a:extLst>
               <a:ext uri="{909E8E84-426E-40dd-AFC4-6F175D3DCCD1}">
-                <a14:hiddenFill xmlns:a14="http://schemas.microsoft.com/office/drawing/2010/main" xmlns="">
+                <a14:hiddenFill xmlns="" xmlns:a14="http://schemas.microsoft.com/office/drawing/2010/main">
                   <a:solidFill>
                     <a:schemeClr val="accent1"/>
                   </a:solidFill>
                 </a14:hiddenFill>
               </a:ext>
               <a:ext uri="{91240B29-F687-4f45-9708-019B960494DF}">
-                <a14:hiddenLine xmlns:a14="http://schemas.microsoft.com/office/drawing/2010/main" xmlns="" w="9525">
+                <a14:hiddenLine xmlns="" xmlns:a14="http://schemas.microsoft.com/office/drawing/2010/main" w="9525">
                   <a:solidFill>
                     <a:schemeClr val="tx1"/>
                   </a:solidFill>
@@ -24461,7 +24356,7 @@
                 </a14:hiddenLine>
               </a:ext>
               <a:ext uri="{AF507438-7753-43e0-B8FC-AC1667EBCBE1}">
-                <a14:hiddenEffects xmlns:a14="http://schemas.microsoft.com/office/drawing/2010/main" xmlns="">
+                <a14:hiddenEffects xmlns="" xmlns:a14="http://schemas.microsoft.com/office/drawing/2010/main">
                   <a:effectLst>
                     <a:outerShdw blurRad="63500" dist="38099" dir="2700000" algn="ctr" rotWithShape="0">
                       <a:schemeClr val="bg2">
@@ -24551,7 +24446,7 @@
             <a:effectLst/>
             <a:extLst>
               <a:ext uri="{AF507438-7753-43e0-B8FC-AC1667EBCBE1}">
-                <a14:hiddenEffects xmlns:a14="http://schemas.microsoft.com/office/drawing/2010/main" xmlns="">
+                <a14:hiddenEffects xmlns="" xmlns:a14="http://schemas.microsoft.com/office/drawing/2010/main">
                   <a:effectLst>
                     <a:outerShdw blurRad="63500" dist="38099" dir="2700000" algn="ctr" rotWithShape="0">
                       <a:schemeClr val="bg2">
@@ -24603,14 +24498,14 @@
             <a:effectLst/>
             <a:extLst>
               <a:ext uri="{909E8E84-426E-40dd-AFC4-6F175D3DCCD1}">
-                <a14:hiddenFill xmlns:a14="http://schemas.microsoft.com/office/drawing/2010/main" xmlns="">
+                <a14:hiddenFill xmlns="" xmlns:a14="http://schemas.microsoft.com/office/drawing/2010/main">
                   <a:solidFill>
                     <a:schemeClr val="accent1"/>
                   </a:solidFill>
                 </a14:hiddenFill>
               </a:ext>
               <a:ext uri="{91240B29-F687-4f45-9708-019B960494DF}">
-                <a14:hiddenLine xmlns:a14="http://schemas.microsoft.com/office/drawing/2010/main" xmlns="" w="9525">
+                <a14:hiddenLine xmlns="" xmlns:a14="http://schemas.microsoft.com/office/drawing/2010/main" w="9525">
                   <a:solidFill>
                     <a:schemeClr val="tx1"/>
                   </a:solidFill>
@@ -24620,7 +24515,7 @@
                 </a14:hiddenLine>
               </a:ext>
               <a:ext uri="{AF507438-7753-43e0-B8FC-AC1667EBCBE1}">
-                <a14:hiddenEffects xmlns:a14="http://schemas.microsoft.com/office/drawing/2010/main" xmlns="">
+                <a14:hiddenEffects xmlns="" xmlns:a14="http://schemas.microsoft.com/office/drawing/2010/main">
                   <a:effectLst>
                     <a:outerShdw blurRad="63500" dist="38099" dir="2700000" algn="ctr" rotWithShape="0">
                       <a:schemeClr val="bg2">
@@ -25248,7 +25143,7 @@
             <a:effectLst/>
             <a:extLst>
               <a:ext uri="{AF507438-7753-43e0-B8FC-AC1667EBCBE1}">
-                <a14:hiddenEffects xmlns:a14="http://schemas.microsoft.com/office/drawing/2010/main" xmlns="">
+                <a14:hiddenEffects xmlns="" xmlns:a14="http://schemas.microsoft.com/office/drawing/2010/main">
                   <a:effectLst>
                     <a:outerShdw blurRad="63500" dist="38099" dir="2700000" algn="ctr" rotWithShape="0">
                       <a:schemeClr val="bg2">
@@ -25300,14 +25195,14 @@
             <a:effectLst/>
             <a:extLst>
               <a:ext uri="{909E8E84-426E-40dd-AFC4-6F175D3DCCD1}">
-                <a14:hiddenFill xmlns:a14="http://schemas.microsoft.com/office/drawing/2010/main" xmlns="">
+                <a14:hiddenFill xmlns="" xmlns:a14="http://schemas.microsoft.com/office/drawing/2010/main">
                   <a:solidFill>
                     <a:schemeClr val="accent1"/>
                   </a:solidFill>
                 </a14:hiddenFill>
               </a:ext>
               <a:ext uri="{91240B29-F687-4f45-9708-019B960494DF}">
-                <a14:hiddenLine xmlns:a14="http://schemas.microsoft.com/office/drawing/2010/main" xmlns="" w="9525">
+                <a14:hiddenLine xmlns="" xmlns:a14="http://schemas.microsoft.com/office/drawing/2010/main" w="9525">
                   <a:solidFill>
                     <a:schemeClr val="tx1"/>
                   </a:solidFill>
@@ -25317,7 +25212,7 @@
                 </a14:hiddenLine>
               </a:ext>
               <a:ext uri="{AF507438-7753-43e0-B8FC-AC1667EBCBE1}">
-                <a14:hiddenEffects xmlns:a14="http://schemas.microsoft.com/office/drawing/2010/main" xmlns="">
+                <a14:hiddenEffects xmlns="" xmlns:a14="http://schemas.microsoft.com/office/drawing/2010/main">
                   <a:effectLst>
                     <a:outerShdw blurRad="63500" dist="38099" dir="2700000" algn="ctr" rotWithShape="0">
                       <a:schemeClr val="bg2">
@@ -25407,7 +25302,7 @@
             <a:effectLst/>
             <a:extLst>
               <a:ext uri="{AF507438-7753-43e0-B8FC-AC1667EBCBE1}">
-                <a14:hiddenEffects xmlns:a14="http://schemas.microsoft.com/office/drawing/2010/main" xmlns="">
+                <a14:hiddenEffects xmlns="" xmlns:a14="http://schemas.microsoft.com/office/drawing/2010/main">
                   <a:effectLst>
                     <a:outerShdw blurRad="63500" dist="38099" dir="2700000" algn="ctr" rotWithShape="0">
                       <a:schemeClr val="bg2">
@@ -25459,14 +25354,14 @@
             <a:effectLst/>
             <a:extLst>
               <a:ext uri="{909E8E84-426E-40dd-AFC4-6F175D3DCCD1}">
-                <a14:hiddenFill xmlns:a14="http://schemas.microsoft.com/office/drawing/2010/main" xmlns="">
+                <a14:hiddenFill xmlns="" xmlns:a14="http://schemas.microsoft.com/office/drawing/2010/main">
                   <a:solidFill>
                     <a:schemeClr val="accent1"/>
                   </a:solidFill>
                 </a14:hiddenFill>
               </a:ext>
               <a:ext uri="{91240B29-F687-4f45-9708-019B960494DF}">
-                <a14:hiddenLine xmlns:a14="http://schemas.microsoft.com/office/drawing/2010/main" xmlns="" w="9525">
+                <a14:hiddenLine xmlns="" xmlns:a14="http://schemas.microsoft.com/office/drawing/2010/main" w="9525">
                   <a:solidFill>
                     <a:schemeClr val="tx1"/>
                   </a:solidFill>
@@ -25476,7 +25371,7 @@
                 </a14:hiddenLine>
               </a:ext>
               <a:ext uri="{AF507438-7753-43e0-B8FC-AC1667EBCBE1}">
-                <a14:hiddenEffects xmlns:a14="http://schemas.microsoft.com/office/drawing/2010/main" xmlns="">
+                <a14:hiddenEffects xmlns="" xmlns:a14="http://schemas.microsoft.com/office/drawing/2010/main">
                   <a:effectLst>
                     <a:outerShdw blurRad="63500" dist="38099" dir="2700000" algn="ctr" rotWithShape="0">
                       <a:schemeClr val="bg2">
@@ -25566,7 +25461,7 @@
             <a:effectLst/>
             <a:extLst>
               <a:ext uri="{AF507438-7753-43e0-B8FC-AC1667EBCBE1}">
-                <a14:hiddenEffects xmlns:a14="http://schemas.microsoft.com/office/drawing/2010/main" xmlns="">
+                <a14:hiddenEffects xmlns="" xmlns:a14="http://schemas.microsoft.com/office/drawing/2010/main">
                   <a:effectLst>
                     <a:outerShdw blurRad="63500" dist="38099" dir="2700000" algn="ctr" rotWithShape="0">
                       <a:schemeClr val="bg2">
@@ -25618,14 +25513,14 @@
             <a:effectLst/>
             <a:extLst>
               <a:ext uri="{909E8E84-426E-40dd-AFC4-6F175D3DCCD1}">
-                <a14:hiddenFill xmlns:a14="http://schemas.microsoft.com/office/drawing/2010/main" xmlns="">
+                <a14:hiddenFill xmlns="" xmlns:a14="http://schemas.microsoft.com/office/drawing/2010/main">
                   <a:solidFill>
                     <a:schemeClr val="accent1"/>
                   </a:solidFill>
                 </a14:hiddenFill>
               </a:ext>
               <a:ext uri="{91240B29-F687-4f45-9708-019B960494DF}">
-                <a14:hiddenLine xmlns:a14="http://schemas.microsoft.com/office/drawing/2010/main" xmlns="" w="9525">
+                <a14:hiddenLine xmlns="" xmlns:a14="http://schemas.microsoft.com/office/drawing/2010/main" w="9525">
                   <a:solidFill>
                     <a:schemeClr val="tx1"/>
                   </a:solidFill>
@@ -25635,7 +25530,7 @@
                 </a14:hiddenLine>
               </a:ext>
               <a:ext uri="{AF507438-7753-43e0-B8FC-AC1667EBCBE1}">
-                <a14:hiddenEffects xmlns:a14="http://schemas.microsoft.com/office/drawing/2010/main" xmlns="">
+                <a14:hiddenEffects xmlns="" xmlns:a14="http://schemas.microsoft.com/office/drawing/2010/main">
                   <a:effectLst>
                     <a:outerShdw blurRad="63500" dist="38099" dir="2700000" algn="ctr" rotWithShape="0">
                       <a:schemeClr val="bg2">
@@ -25864,7 +25759,7 @@
             <a:effectLst/>
             <a:extLst>
               <a:ext uri="{AF507438-7753-43e0-B8FC-AC1667EBCBE1}">
-                <a14:hiddenEffects xmlns:a14="http://schemas.microsoft.com/office/drawing/2010/main" xmlns="">
+                <a14:hiddenEffects xmlns="" xmlns:a14="http://schemas.microsoft.com/office/drawing/2010/main">
                   <a:effectLst>
                     <a:outerShdw blurRad="63500" dist="38099" dir="2700000" algn="ctr" rotWithShape="0">
                       <a:schemeClr val="bg2">
@@ -25916,14 +25811,14 @@
             <a:effectLst/>
             <a:extLst>
               <a:ext uri="{909E8E84-426E-40dd-AFC4-6F175D3DCCD1}">
-                <a14:hiddenFill xmlns:a14="http://schemas.microsoft.com/office/drawing/2010/main" xmlns="">
+                <a14:hiddenFill xmlns="" xmlns:a14="http://schemas.microsoft.com/office/drawing/2010/main">
                   <a:solidFill>
                     <a:schemeClr val="accent1"/>
                   </a:solidFill>
                 </a14:hiddenFill>
               </a:ext>
               <a:ext uri="{91240B29-F687-4f45-9708-019B960494DF}">
-                <a14:hiddenLine xmlns:a14="http://schemas.microsoft.com/office/drawing/2010/main" xmlns="" w="9525">
+                <a14:hiddenLine xmlns="" xmlns:a14="http://schemas.microsoft.com/office/drawing/2010/main" w="9525">
                   <a:solidFill>
                     <a:schemeClr val="tx1"/>
                   </a:solidFill>
@@ -25933,7 +25828,7 @@
                 </a14:hiddenLine>
               </a:ext>
               <a:ext uri="{AF507438-7753-43e0-B8FC-AC1667EBCBE1}">
-                <a14:hiddenEffects xmlns:a14="http://schemas.microsoft.com/office/drawing/2010/main" xmlns="">
+                <a14:hiddenEffects xmlns="" xmlns:a14="http://schemas.microsoft.com/office/drawing/2010/main">
                   <a:effectLst>
                     <a:outerShdw blurRad="63500" dist="38099" dir="2700000" algn="ctr" rotWithShape="0">
                       <a:schemeClr val="bg2">
@@ -26023,7 +25918,7 @@
             <a:effectLst/>
             <a:extLst>
               <a:ext uri="{AF507438-7753-43e0-B8FC-AC1667EBCBE1}">
-                <a14:hiddenEffects xmlns:a14="http://schemas.microsoft.com/office/drawing/2010/main" xmlns="">
+                <a14:hiddenEffects xmlns="" xmlns:a14="http://schemas.microsoft.com/office/drawing/2010/main">
                   <a:effectLst>
                     <a:outerShdw blurRad="63500" dist="38099" dir="2700000" algn="ctr" rotWithShape="0">
                       <a:schemeClr val="bg2">
@@ -26075,14 +25970,14 @@
             <a:effectLst/>
             <a:extLst>
               <a:ext uri="{909E8E84-426E-40dd-AFC4-6F175D3DCCD1}">
-                <a14:hiddenFill xmlns:a14="http://schemas.microsoft.com/office/drawing/2010/main" xmlns="">
+                <a14:hiddenFill xmlns="" xmlns:a14="http://schemas.microsoft.com/office/drawing/2010/main">
                   <a:solidFill>
                     <a:schemeClr val="accent1"/>
                   </a:solidFill>
                 </a14:hiddenFill>
               </a:ext>
               <a:ext uri="{91240B29-F687-4f45-9708-019B960494DF}">
-                <a14:hiddenLine xmlns:a14="http://schemas.microsoft.com/office/drawing/2010/main" xmlns="" w="9525">
+                <a14:hiddenLine xmlns="" xmlns:a14="http://schemas.microsoft.com/office/drawing/2010/main" w="9525">
                   <a:solidFill>
                     <a:schemeClr val="tx1"/>
                   </a:solidFill>
@@ -26092,7 +25987,7 @@
                 </a14:hiddenLine>
               </a:ext>
               <a:ext uri="{AF507438-7753-43e0-B8FC-AC1667EBCBE1}">
-                <a14:hiddenEffects xmlns:a14="http://schemas.microsoft.com/office/drawing/2010/main" xmlns="">
+                <a14:hiddenEffects xmlns="" xmlns:a14="http://schemas.microsoft.com/office/drawing/2010/main">
                   <a:effectLst>
                     <a:outerShdw blurRad="63500" dist="38099" dir="2700000" algn="ctr" rotWithShape="0">
                       <a:schemeClr val="bg2">
@@ -26182,7 +26077,7 @@
             <a:effectLst/>
             <a:extLst>
               <a:ext uri="{AF507438-7753-43e0-B8FC-AC1667EBCBE1}">
-                <a14:hiddenEffects xmlns:a14="http://schemas.microsoft.com/office/drawing/2010/main" xmlns="">
+                <a14:hiddenEffects xmlns="" xmlns:a14="http://schemas.microsoft.com/office/drawing/2010/main">
                   <a:effectLst>
                     <a:outerShdw blurRad="63500" dist="38099" dir="2700000" algn="ctr" rotWithShape="0">
                       <a:schemeClr val="bg2">
@@ -26234,14 +26129,14 @@
             <a:effectLst/>
             <a:extLst>
               <a:ext uri="{909E8E84-426E-40dd-AFC4-6F175D3DCCD1}">
-                <a14:hiddenFill xmlns:a14="http://schemas.microsoft.com/office/drawing/2010/main" xmlns="">
+                <a14:hiddenFill xmlns="" xmlns:a14="http://schemas.microsoft.com/office/drawing/2010/main">
                   <a:solidFill>
                     <a:schemeClr val="accent1"/>
                   </a:solidFill>
                 </a14:hiddenFill>
               </a:ext>
               <a:ext uri="{91240B29-F687-4f45-9708-019B960494DF}">
-                <a14:hiddenLine xmlns:a14="http://schemas.microsoft.com/office/drawing/2010/main" xmlns="" w="9525">
+                <a14:hiddenLine xmlns="" xmlns:a14="http://schemas.microsoft.com/office/drawing/2010/main" w="9525">
                   <a:solidFill>
                     <a:schemeClr val="tx1"/>
                   </a:solidFill>
@@ -26251,7 +26146,7 @@
                 </a14:hiddenLine>
               </a:ext>
               <a:ext uri="{AF507438-7753-43e0-B8FC-AC1667EBCBE1}">
-                <a14:hiddenEffects xmlns:a14="http://schemas.microsoft.com/office/drawing/2010/main" xmlns="">
+                <a14:hiddenEffects xmlns="" xmlns:a14="http://schemas.microsoft.com/office/drawing/2010/main">
                   <a:effectLst>
                     <a:outerShdw blurRad="63500" dist="38099" dir="2700000" algn="ctr" rotWithShape="0">
                       <a:schemeClr val="bg2">
@@ -26526,7 +26421,7 @@
             <a:effectLst/>
             <a:extLst>
               <a:ext uri="{AF507438-7753-43e0-B8FC-AC1667EBCBE1}">
-                <a14:hiddenEffects xmlns:a14="http://schemas.microsoft.com/office/drawing/2010/main" xmlns="">
+                <a14:hiddenEffects xmlns="" xmlns:a14="http://schemas.microsoft.com/office/drawing/2010/main">
                   <a:effectLst>
                     <a:outerShdw blurRad="63500" dist="38099" dir="2700000" algn="ctr" rotWithShape="0">
                       <a:schemeClr val="bg2">
@@ -26578,14 +26473,14 @@
             <a:effectLst/>
             <a:extLst>
               <a:ext uri="{909E8E84-426E-40dd-AFC4-6F175D3DCCD1}">
-                <a14:hiddenFill xmlns:a14="http://schemas.microsoft.com/office/drawing/2010/main" xmlns="">
+                <a14:hiddenFill xmlns="" xmlns:a14="http://schemas.microsoft.com/office/drawing/2010/main">
                   <a:solidFill>
                     <a:schemeClr val="accent1"/>
                   </a:solidFill>
                 </a14:hiddenFill>
               </a:ext>
               <a:ext uri="{91240B29-F687-4f45-9708-019B960494DF}">
-                <a14:hiddenLine xmlns:a14="http://schemas.microsoft.com/office/drawing/2010/main" xmlns="" w="9525">
+                <a14:hiddenLine xmlns="" xmlns:a14="http://schemas.microsoft.com/office/drawing/2010/main" w="9525">
                   <a:solidFill>
                     <a:schemeClr val="tx1"/>
                   </a:solidFill>
@@ -26595,7 +26490,7 @@
                 </a14:hiddenLine>
               </a:ext>
               <a:ext uri="{AF507438-7753-43e0-B8FC-AC1667EBCBE1}">
-                <a14:hiddenEffects xmlns:a14="http://schemas.microsoft.com/office/drawing/2010/main" xmlns="">
+                <a14:hiddenEffects xmlns="" xmlns:a14="http://schemas.microsoft.com/office/drawing/2010/main">
                   <a:effectLst>
                     <a:outerShdw blurRad="63500" dist="38099" dir="2700000" algn="ctr" rotWithShape="0">
                       <a:schemeClr val="bg2">
@@ -26685,7 +26580,7 @@
             <a:effectLst/>
             <a:extLst>
               <a:ext uri="{AF507438-7753-43e0-B8FC-AC1667EBCBE1}">
-                <a14:hiddenEffects xmlns:a14="http://schemas.microsoft.com/office/drawing/2010/main" xmlns="">
+                <a14:hiddenEffects xmlns="" xmlns:a14="http://schemas.microsoft.com/office/drawing/2010/main">
                   <a:effectLst>
                     <a:outerShdw blurRad="63500" dist="38099" dir="2700000" algn="ctr" rotWithShape="0">
                       <a:schemeClr val="bg2">
@@ -26737,14 +26632,14 @@
             <a:effectLst/>
             <a:extLst>
               <a:ext uri="{909E8E84-426E-40dd-AFC4-6F175D3DCCD1}">
-                <a14:hiddenFill xmlns:a14="http://schemas.microsoft.com/office/drawing/2010/main" xmlns="">
+                <a14:hiddenFill xmlns="" xmlns:a14="http://schemas.microsoft.com/office/drawing/2010/main">
                   <a:solidFill>
                     <a:schemeClr val="accent1"/>
                   </a:solidFill>
                 </a14:hiddenFill>
               </a:ext>
               <a:ext uri="{91240B29-F687-4f45-9708-019B960494DF}">
-                <a14:hiddenLine xmlns:a14="http://schemas.microsoft.com/office/drawing/2010/main" xmlns="" w="9525">
+                <a14:hiddenLine xmlns="" xmlns:a14="http://schemas.microsoft.com/office/drawing/2010/main" w="9525">
                   <a:solidFill>
                     <a:schemeClr val="tx1"/>
                   </a:solidFill>
@@ -26754,7 +26649,7 @@
                 </a14:hiddenLine>
               </a:ext>
               <a:ext uri="{AF507438-7753-43e0-B8FC-AC1667EBCBE1}">
-                <a14:hiddenEffects xmlns:a14="http://schemas.microsoft.com/office/drawing/2010/main" xmlns="">
+                <a14:hiddenEffects xmlns="" xmlns:a14="http://schemas.microsoft.com/office/drawing/2010/main">
                   <a:effectLst>
                     <a:outerShdw blurRad="63500" dist="38099" dir="2700000" algn="ctr" rotWithShape="0">
                       <a:schemeClr val="bg2">
@@ -26844,7 +26739,7 @@
             <a:effectLst/>
             <a:extLst>
               <a:ext uri="{AF507438-7753-43e0-B8FC-AC1667EBCBE1}">
-                <a14:hiddenEffects xmlns:a14="http://schemas.microsoft.com/office/drawing/2010/main" xmlns="">
+                <a14:hiddenEffects xmlns="" xmlns:a14="http://schemas.microsoft.com/office/drawing/2010/main">
                   <a:effectLst>
                     <a:outerShdw blurRad="63500" dist="38099" dir="2700000" algn="ctr" rotWithShape="0">
                       <a:schemeClr val="bg2">
@@ -26896,14 +26791,14 @@
             <a:effectLst/>
             <a:extLst>
               <a:ext uri="{909E8E84-426E-40dd-AFC4-6F175D3DCCD1}">
-                <a14:hiddenFill xmlns:a14="http://schemas.microsoft.com/office/drawing/2010/main" xmlns="">
+                <a14:hiddenFill xmlns="" xmlns:a14="http://schemas.microsoft.com/office/drawing/2010/main">
                   <a:solidFill>
                     <a:schemeClr val="accent1"/>
                   </a:solidFill>
                 </a14:hiddenFill>
               </a:ext>
               <a:ext uri="{91240B29-F687-4f45-9708-019B960494DF}">
-                <a14:hiddenLine xmlns:a14="http://schemas.microsoft.com/office/drawing/2010/main" xmlns="" w="9525">
+                <a14:hiddenLine xmlns="" xmlns:a14="http://schemas.microsoft.com/office/drawing/2010/main" w="9525">
                   <a:solidFill>
                     <a:schemeClr val="tx1"/>
                   </a:solidFill>
@@ -26913,7 +26808,7 @@
                 </a14:hiddenLine>
               </a:ext>
               <a:ext uri="{AF507438-7753-43e0-B8FC-AC1667EBCBE1}">
-                <a14:hiddenEffects xmlns:a14="http://schemas.microsoft.com/office/drawing/2010/main" xmlns="">
+                <a14:hiddenEffects xmlns="" xmlns:a14="http://schemas.microsoft.com/office/drawing/2010/main">
                   <a:effectLst>
                     <a:outerShdw blurRad="63500" dist="38099" dir="2700000" algn="ctr" rotWithShape="0">
                       <a:schemeClr val="bg2">
@@ -27694,7 +27589,7 @@
             <a:effectLst/>
             <a:extLst>
               <a:ext uri="{AF507438-7753-43e0-B8FC-AC1667EBCBE1}">
-                <a14:hiddenEffects xmlns:a14="http://schemas.microsoft.com/office/drawing/2010/main" xmlns="">
+                <a14:hiddenEffects xmlns="" xmlns:a14="http://schemas.microsoft.com/office/drawing/2010/main">
                   <a:effectLst>
                     <a:outerShdw blurRad="63500" dist="38099" dir="2700000" algn="ctr" rotWithShape="0">
                       <a:schemeClr val="bg2">
@@ -27746,14 +27641,14 @@
             <a:effectLst/>
             <a:extLst>
               <a:ext uri="{909E8E84-426E-40dd-AFC4-6F175D3DCCD1}">
-                <a14:hiddenFill xmlns:a14="http://schemas.microsoft.com/office/drawing/2010/main" xmlns="">
+                <a14:hiddenFill xmlns="" xmlns:a14="http://schemas.microsoft.com/office/drawing/2010/main">
                   <a:solidFill>
                     <a:schemeClr val="accent1"/>
                   </a:solidFill>
                 </a14:hiddenFill>
               </a:ext>
               <a:ext uri="{91240B29-F687-4f45-9708-019B960494DF}">
-                <a14:hiddenLine xmlns:a14="http://schemas.microsoft.com/office/drawing/2010/main" xmlns="" w="9525">
+                <a14:hiddenLine xmlns="" xmlns:a14="http://schemas.microsoft.com/office/drawing/2010/main" w="9525">
                   <a:solidFill>
                     <a:schemeClr val="tx1"/>
                   </a:solidFill>
@@ -27763,7 +27658,7 @@
                 </a14:hiddenLine>
               </a:ext>
               <a:ext uri="{AF507438-7753-43e0-B8FC-AC1667EBCBE1}">
-                <a14:hiddenEffects xmlns:a14="http://schemas.microsoft.com/office/drawing/2010/main" xmlns="">
+                <a14:hiddenEffects xmlns="" xmlns:a14="http://schemas.microsoft.com/office/drawing/2010/main">
                   <a:effectLst>
                     <a:outerShdw blurRad="63500" dist="38099" dir="2700000" algn="ctr" rotWithShape="0">
                       <a:schemeClr val="bg2">
@@ -27853,7 +27748,7 @@
             <a:effectLst/>
             <a:extLst>
               <a:ext uri="{AF507438-7753-43e0-B8FC-AC1667EBCBE1}">
-                <a14:hiddenEffects xmlns:a14="http://schemas.microsoft.com/office/drawing/2010/main" xmlns="">
+                <a14:hiddenEffects xmlns="" xmlns:a14="http://schemas.microsoft.com/office/drawing/2010/main">
                   <a:effectLst>
                     <a:outerShdw blurRad="63500" dist="38099" dir="2700000" algn="ctr" rotWithShape="0">
                       <a:schemeClr val="bg2">
@@ -27905,14 +27800,14 @@
             <a:effectLst/>
             <a:extLst>
               <a:ext uri="{909E8E84-426E-40dd-AFC4-6F175D3DCCD1}">
-                <a14:hiddenFill xmlns:a14="http://schemas.microsoft.com/office/drawing/2010/main" xmlns="">
+                <a14:hiddenFill xmlns="" xmlns:a14="http://schemas.microsoft.com/office/drawing/2010/main">
                   <a:solidFill>
                     <a:schemeClr val="accent1"/>
                   </a:solidFill>
                 </a14:hiddenFill>
               </a:ext>
               <a:ext uri="{91240B29-F687-4f45-9708-019B960494DF}">
-                <a14:hiddenLine xmlns:a14="http://schemas.microsoft.com/office/drawing/2010/main" xmlns="" w="9525">
+                <a14:hiddenLine xmlns="" xmlns:a14="http://schemas.microsoft.com/office/drawing/2010/main" w="9525">
                   <a:solidFill>
                     <a:schemeClr val="tx1"/>
                   </a:solidFill>
@@ -27922,7 +27817,7 @@
                 </a14:hiddenLine>
               </a:ext>
               <a:ext uri="{AF507438-7753-43e0-B8FC-AC1667EBCBE1}">
-                <a14:hiddenEffects xmlns:a14="http://schemas.microsoft.com/office/drawing/2010/main" xmlns="">
+                <a14:hiddenEffects xmlns="" xmlns:a14="http://schemas.microsoft.com/office/drawing/2010/main">
                   <a:effectLst>
                     <a:outerShdw blurRad="63500" dist="38099" dir="2700000" algn="ctr" rotWithShape="0">
                       <a:schemeClr val="bg2">
@@ -28012,7 +27907,7 @@
             <a:effectLst/>
             <a:extLst>
               <a:ext uri="{AF507438-7753-43e0-B8FC-AC1667EBCBE1}">
-                <a14:hiddenEffects xmlns:a14="http://schemas.microsoft.com/office/drawing/2010/main" xmlns="">
+                <a14:hiddenEffects xmlns="" xmlns:a14="http://schemas.microsoft.com/office/drawing/2010/main">
                   <a:effectLst>
                     <a:outerShdw blurRad="63500" dist="38099" dir="2700000" algn="ctr" rotWithShape="0">
                       <a:schemeClr val="bg2">
@@ -28064,14 +27959,14 @@
             <a:effectLst/>
             <a:extLst>
               <a:ext uri="{909E8E84-426E-40dd-AFC4-6F175D3DCCD1}">
-                <a14:hiddenFill xmlns:a14="http://schemas.microsoft.com/office/drawing/2010/main" xmlns="">
+                <a14:hiddenFill xmlns="" xmlns:a14="http://schemas.microsoft.com/office/drawing/2010/main">
                   <a:solidFill>
                     <a:schemeClr val="accent1"/>
                   </a:solidFill>
                 </a14:hiddenFill>
               </a:ext>
               <a:ext uri="{91240B29-F687-4f45-9708-019B960494DF}">
-                <a14:hiddenLine xmlns:a14="http://schemas.microsoft.com/office/drawing/2010/main" xmlns="" w="9525">
+                <a14:hiddenLine xmlns="" xmlns:a14="http://schemas.microsoft.com/office/drawing/2010/main" w="9525">
                   <a:solidFill>
                     <a:schemeClr val="tx1"/>
                   </a:solidFill>
@@ -28081,7 +27976,7 @@
                 </a14:hiddenLine>
               </a:ext>
               <a:ext uri="{AF507438-7753-43e0-B8FC-AC1667EBCBE1}">
-                <a14:hiddenEffects xmlns:a14="http://schemas.microsoft.com/office/drawing/2010/main" xmlns="">
+                <a14:hiddenEffects xmlns="" xmlns:a14="http://schemas.microsoft.com/office/drawing/2010/main">
                   <a:effectLst>
                     <a:outerShdw blurRad="63500" dist="38099" dir="2700000" algn="ctr" rotWithShape="0">
                       <a:schemeClr val="bg2">
@@ -28310,7 +28205,7 @@
             <a:effectLst/>
             <a:extLst>
               <a:ext uri="{AF507438-7753-43e0-B8FC-AC1667EBCBE1}">
-                <a14:hiddenEffects xmlns:a14="http://schemas.microsoft.com/office/drawing/2010/main" xmlns="">
+                <a14:hiddenEffects xmlns="" xmlns:a14="http://schemas.microsoft.com/office/drawing/2010/main">
                   <a:effectLst>
                     <a:outerShdw blurRad="63500" dist="38099" dir="2700000" algn="ctr" rotWithShape="0">
                       <a:schemeClr val="bg2">
@@ -28362,14 +28257,14 @@
             <a:effectLst/>
             <a:extLst>
               <a:ext uri="{909E8E84-426E-40dd-AFC4-6F175D3DCCD1}">
-                <a14:hiddenFill xmlns:a14="http://schemas.microsoft.com/office/drawing/2010/main" xmlns="">
+                <a14:hiddenFill xmlns="" xmlns:a14="http://schemas.microsoft.com/office/drawing/2010/main">
                   <a:solidFill>
                     <a:schemeClr val="accent1"/>
                   </a:solidFill>
                 </a14:hiddenFill>
               </a:ext>
               <a:ext uri="{91240B29-F687-4f45-9708-019B960494DF}">
-                <a14:hiddenLine xmlns:a14="http://schemas.microsoft.com/office/drawing/2010/main" xmlns="" w="9525">
+                <a14:hiddenLine xmlns="" xmlns:a14="http://schemas.microsoft.com/office/drawing/2010/main" w="9525">
                   <a:solidFill>
                     <a:schemeClr val="tx1"/>
                   </a:solidFill>
@@ -28379,7 +28274,7 @@
                 </a14:hiddenLine>
               </a:ext>
               <a:ext uri="{AF507438-7753-43e0-B8FC-AC1667EBCBE1}">
-                <a14:hiddenEffects xmlns:a14="http://schemas.microsoft.com/office/drawing/2010/main" xmlns="">
+                <a14:hiddenEffects xmlns="" xmlns:a14="http://schemas.microsoft.com/office/drawing/2010/main">
                   <a:effectLst>
                     <a:outerShdw blurRad="63500" dist="38099" dir="2700000" algn="ctr" rotWithShape="0">
                       <a:schemeClr val="bg2">
@@ -28469,7 +28364,7 @@
             <a:effectLst/>
             <a:extLst>
               <a:ext uri="{AF507438-7753-43e0-B8FC-AC1667EBCBE1}">
-                <a14:hiddenEffects xmlns:a14="http://schemas.microsoft.com/office/drawing/2010/main" xmlns="">
+                <a14:hiddenEffects xmlns="" xmlns:a14="http://schemas.microsoft.com/office/drawing/2010/main">
                   <a:effectLst>
                     <a:outerShdw blurRad="63500" dist="38099" dir="2700000" algn="ctr" rotWithShape="0">
                       <a:schemeClr val="bg2">
@@ -28521,14 +28416,14 @@
             <a:effectLst/>
             <a:extLst>
               <a:ext uri="{909E8E84-426E-40dd-AFC4-6F175D3DCCD1}">
-                <a14:hiddenFill xmlns:a14="http://schemas.microsoft.com/office/drawing/2010/main" xmlns="">
+                <a14:hiddenFill xmlns="" xmlns:a14="http://schemas.microsoft.com/office/drawing/2010/main">
                   <a:solidFill>
                     <a:schemeClr val="accent1"/>
                   </a:solidFill>
                 </a14:hiddenFill>
               </a:ext>
               <a:ext uri="{91240B29-F687-4f45-9708-019B960494DF}">
-                <a14:hiddenLine xmlns:a14="http://schemas.microsoft.com/office/drawing/2010/main" xmlns="" w="9525">
+                <a14:hiddenLine xmlns="" xmlns:a14="http://schemas.microsoft.com/office/drawing/2010/main" w="9525">
                   <a:solidFill>
                     <a:schemeClr val="tx1"/>
                   </a:solidFill>
@@ -28538,7 +28433,7 @@
                 </a14:hiddenLine>
               </a:ext>
               <a:ext uri="{AF507438-7753-43e0-B8FC-AC1667EBCBE1}">
-                <a14:hiddenEffects xmlns:a14="http://schemas.microsoft.com/office/drawing/2010/main" xmlns="">
+                <a14:hiddenEffects xmlns="" xmlns:a14="http://schemas.microsoft.com/office/drawing/2010/main">
                   <a:effectLst>
                     <a:outerShdw blurRad="63500" dist="38099" dir="2700000" algn="ctr" rotWithShape="0">
                       <a:schemeClr val="bg2">
@@ -28628,7 +28523,7 @@
             <a:effectLst/>
             <a:extLst>
               <a:ext uri="{AF507438-7753-43e0-B8FC-AC1667EBCBE1}">
-                <a14:hiddenEffects xmlns:a14="http://schemas.microsoft.com/office/drawing/2010/main" xmlns="">
+                <a14:hiddenEffects xmlns="" xmlns:a14="http://schemas.microsoft.com/office/drawing/2010/main">
                   <a:effectLst>
                     <a:outerShdw blurRad="63500" dist="38099" dir="2700000" algn="ctr" rotWithShape="0">
                       <a:schemeClr val="bg2">
@@ -28680,14 +28575,14 @@
             <a:effectLst/>
             <a:extLst>
               <a:ext uri="{909E8E84-426E-40dd-AFC4-6F175D3DCCD1}">
-                <a14:hiddenFill xmlns:a14="http://schemas.microsoft.com/office/drawing/2010/main" xmlns="">
+                <a14:hiddenFill xmlns="" xmlns:a14="http://schemas.microsoft.com/office/drawing/2010/main">
                   <a:solidFill>
                     <a:schemeClr val="accent1"/>
                   </a:solidFill>
                 </a14:hiddenFill>
               </a:ext>
               <a:ext uri="{91240B29-F687-4f45-9708-019B960494DF}">
-                <a14:hiddenLine xmlns:a14="http://schemas.microsoft.com/office/drawing/2010/main" xmlns="" w="9525">
+                <a14:hiddenLine xmlns="" xmlns:a14="http://schemas.microsoft.com/office/drawing/2010/main" w="9525">
                   <a:solidFill>
                     <a:schemeClr val="tx1"/>
                   </a:solidFill>
@@ -28697,7 +28592,7 @@
                 </a14:hiddenLine>
               </a:ext>
               <a:ext uri="{AF507438-7753-43e0-B8FC-AC1667EBCBE1}">
-                <a14:hiddenEffects xmlns:a14="http://schemas.microsoft.com/office/drawing/2010/main" xmlns="">
+                <a14:hiddenEffects xmlns="" xmlns:a14="http://schemas.microsoft.com/office/drawing/2010/main">
                   <a:effectLst>
                     <a:outerShdw blurRad="63500" dist="38099" dir="2700000" algn="ctr" rotWithShape="0">
                       <a:schemeClr val="bg2">
@@ -28972,7 +28867,7 @@
             <a:effectLst/>
             <a:extLst>
               <a:ext uri="{AF507438-7753-43e0-B8FC-AC1667EBCBE1}">
-                <a14:hiddenEffects xmlns:a14="http://schemas.microsoft.com/office/drawing/2010/main" xmlns="">
+                <a14:hiddenEffects xmlns="" xmlns:a14="http://schemas.microsoft.com/office/drawing/2010/main">
                   <a:effectLst>
                     <a:outerShdw blurRad="63500" dist="38099" dir="2700000" algn="ctr" rotWithShape="0">
                       <a:schemeClr val="bg2">
@@ -29024,14 +28919,14 @@
             <a:effectLst/>
             <a:extLst>
               <a:ext uri="{909E8E84-426E-40dd-AFC4-6F175D3DCCD1}">
-                <a14:hiddenFill xmlns:a14="http://schemas.microsoft.com/office/drawing/2010/main" xmlns="">
+                <a14:hiddenFill xmlns="" xmlns:a14="http://schemas.microsoft.com/office/drawing/2010/main">
                   <a:solidFill>
                     <a:schemeClr val="accent1"/>
                   </a:solidFill>
                 </a14:hiddenFill>
               </a:ext>
               <a:ext uri="{91240B29-F687-4f45-9708-019B960494DF}">
-                <a14:hiddenLine xmlns:a14="http://schemas.microsoft.com/office/drawing/2010/main" xmlns="" w="9525">
+                <a14:hiddenLine xmlns="" xmlns:a14="http://schemas.microsoft.com/office/drawing/2010/main" w="9525">
                   <a:solidFill>
                     <a:schemeClr val="tx1"/>
                   </a:solidFill>
@@ -29041,7 +28936,7 @@
                 </a14:hiddenLine>
               </a:ext>
               <a:ext uri="{AF507438-7753-43e0-B8FC-AC1667EBCBE1}">
-                <a14:hiddenEffects xmlns:a14="http://schemas.microsoft.com/office/drawing/2010/main" xmlns="">
+                <a14:hiddenEffects xmlns="" xmlns:a14="http://schemas.microsoft.com/office/drawing/2010/main">
                   <a:effectLst>
                     <a:outerShdw blurRad="63500" dist="38099" dir="2700000" algn="ctr" rotWithShape="0">
                       <a:schemeClr val="bg2">
@@ -29131,7 +29026,7 @@
             <a:effectLst/>
             <a:extLst>
               <a:ext uri="{AF507438-7753-43e0-B8FC-AC1667EBCBE1}">
-                <a14:hiddenEffects xmlns:a14="http://schemas.microsoft.com/office/drawing/2010/main" xmlns="">
+                <a14:hiddenEffects xmlns="" xmlns:a14="http://schemas.microsoft.com/office/drawing/2010/main">
                   <a:effectLst>
                     <a:outerShdw blurRad="63500" dist="38099" dir="2700000" algn="ctr" rotWithShape="0">
                       <a:schemeClr val="bg2">
@@ -29183,14 +29078,14 @@
             <a:effectLst/>
             <a:extLst>
               <a:ext uri="{909E8E84-426E-40dd-AFC4-6F175D3DCCD1}">
-                <a14:hiddenFill xmlns:a14="http://schemas.microsoft.com/office/drawing/2010/main" xmlns="">
+                <a14:hiddenFill xmlns="" xmlns:a14="http://schemas.microsoft.com/office/drawing/2010/main">
                   <a:solidFill>
                     <a:schemeClr val="accent1"/>
                   </a:solidFill>
                 </a14:hiddenFill>
               </a:ext>
               <a:ext uri="{91240B29-F687-4f45-9708-019B960494DF}">
-                <a14:hiddenLine xmlns:a14="http://schemas.microsoft.com/office/drawing/2010/main" xmlns="" w="9525">
+                <a14:hiddenLine xmlns="" xmlns:a14="http://schemas.microsoft.com/office/drawing/2010/main" w="9525">
                   <a:solidFill>
                     <a:schemeClr val="tx1"/>
                   </a:solidFill>
@@ -29200,7 +29095,7 @@
                 </a14:hiddenLine>
               </a:ext>
               <a:ext uri="{AF507438-7753-43e0-B8FC-AC1667EBCBE1}">
-                <a14:hiddenEffects xmlns:a14="http://schemas.microsoft.com/office/drawing/2010/main" xmlns="">
+                <a14:hiddenEffects xmlns="" xmlns:a14="http://schemas.microsoft.com/office/drawing/2010/main">
                   <a:effectLst>
                     <a:outerShdw blurRad="63500" dist="38099" dir="2700000" algn="ctr" rotWithShape="0">
                       <a:schemeClr val="bg2">
@@ -29290,7 +29185,7 @@
             <a:effectLst/>
             <a:extLst>
               <a:ext uri="{AF507438-7753-43e0-B8FC-AC1667EBCBE1}">
-                <a14:hiddenEffects xmlns:a14="http://schemas.microsoft.com/office/drawing/2010/main" xmlns="">
+                <a14:hiddenEffects xmlns="" xmlns:a14="http://schemas.microsoft.com/office/drawing/2010/main">
                   <a:effectLst>
                     <a:outerShdw blurRad="63500" dist="38099" dir="2700000" algn="ctr" rotWithShape="0">
                       <a:schemeClr val="bg2">
@@ -29342,14 +29237,14 @@
             <a:effectLst/>
             <a:extLst>
               <a:ext uri="{909E8E84-426E-40dd-AFC4-6F175D3DCCD1}">
-                <a14:hiddenFill xmlns:a14="http://schemas.microsoft.com/office/drawing/2010/main" xmlns="">
+                <a14:hiddenFill xmlns="" xmlns:a14="http://schemas.microsoft.com/office/drawing/2010/main">
                   <a:solidFill>
                     <a:schemeClr val="accent1"/>
                   </a:solidFill>
                 </a14:hiddenFill>
               </a:ext>
               <a:ext uri="{91240B29-F687-4f45-9708-019B960494DF}">
-                <a14:hiddenLine xmlns:a14="http://schemas.microsoft.com/office/drawing/2010/main" xmlns="" w="9525">
+                <a14:hiddenLine xmlns="" xmlns:a14="http://schemas.microsoft.com/office/drawing/2010/main" w="9525">
                   <a:solidFill>
                     <a:schemeClr val="tx1"/>
                   </a:solidFill>
@@ -29359,7 +29254,7 @@
                 </a14:hiddenLine>
               </a:ext>
               <a:ext uri="{AF507438-7753-43e0-B8FC-AC1667EBCBE1}">
-                <a14:hiddenEffects xmlns:a14="http://schemas.microsoft.com/office/drawing/2010/main" xmlns="">
+                <a14:hiddenEffects xmlns="" xmlns:a14="http://schemas.microsoft.com/office/drawing/2010/main">
                   <a:effectLst>
                     <a:outerShdw blurRad="63500" dist="38099" dir="2700000" algn="ctr" rotWithShape="0">
                       <a:schemeClr val="bg2">
@@ -30378,7 +30273,7 @@
             <a:effectLst/>
             <a:extLst>
               <a:ext uri="{AF507438-7753-43e0-B8FC-AC1667EBCBE1}">
-                <a14:hiddenEffects xmlns:a14="http://schemas.microsoft.com/office/drawing/2010/main" xmlns="">
+                <a14:hiddenEffects xmlns="" xmlns:a14="http://schemas.microsoft.com/office/drawing/2010/main">
                   <a:effectLst>
                     <a:outerShdw blurRad="63500" dist="38099" dir="2700000" algn="ctr" rotWithShape="0">
                       <a:schemeClr val="bg2">
@@ -30430,14 +30325,14 @@
             <a:effectLst/>
             <a:extLst>
               <a:ext uri="{909E8E84-426E-40dd-AFC4-6F175D3DCCD1}">
-                <a14:hiddenFill xmlns:a14="http://schemas.microsoft.com/office/drawing/2010/main" xmlns="">
+                <a14:hiddenFill xmlns="" xmlns:a14="http://schemas.microsoft.com/office/drawing/2010/main">
                   <a:solidFill>
                     <a:schemeClr val="accent1"/>
                   </a:solidFill>
                 </a14:hiddenFill>
               </a:ext>
               <a:ext uri="{91240B29-F687-4f45-9708-019B960494DF}">
-                <a14:hiddenLine xmlns:a14="http://schemas.microsoft.com/office/drawing/2010/main" xmlns="" w="9525">
+                <a14:hiddenLine xmlns="" xmlns:a14="http://schemas.microsoft.com/office/drawing/2010/main" w="9525">
                   <a:solidFill>
                     <a:schemeClr val="tx1"/>
                   </a:solidFill>
@@ -30447,7 +30342,7 @@
                 </a14:hiddenLine>
               </a:ext>
               <a:ext uri="{AF507438-7753-43e0-B8FC-AC1667EBCBE1}">
-                <a14:hiddenEffects xmlns:a14="http://schemas.microsoft.com/office/drawing/2010/main" xmlns="">
+                <a14:hiddenEffects xmlns="" xmlns:a14="http://schemas.microsoft.com/office/drawing/2010/main">
                   <a:effectLst>
                     <a:outerShdw blurRad="63500" dist="38099" dir="2700000" algn="ctr" rotWithShape="0">
                       <a:schemeClr val="bg2">
@@ -30537,7 +30432,7 @@
             <a:effectLst/>
             <a:extLst>
               <a:ext uri="{AF507438-7753-43e0-B8FC-AC1667EBCBE1}">
-                <a14:hiddenEffects xmlns:a14="http://schemas.microsoft.com/office/drawing/2010/main" xmlns="">
+                <a14:hiddenEffects xmlns="" xmlns:a14="http://schemas.microsoft.com/office/drawing/2010/main">
                   <a:effectLst>
                     <a:outerShdw blurRad="63500" dist="38099" dir="2700000" algn="ctr" rotWithShape="0">
                       <a:schemeClr val="bg2">
@@ -30589,14 +30484,14 @@
             <a:effectLst/>
             <a:extLst>
               <a:ext uri="{909E8E84-426E-40dd-AFC4-6F175D3DCCD1}">
-                <a14:hiddenFill xmlns:a14="http://schemas.microsoft.com/office/drawing/2010/main" xmlns="">
+                <a14:hiddenFill xmlns="" xmlns:a14="http://schemas.microsoft.com/office/drawing/2010/main">
                   <a:solidFill>
                     <a:schemeClr val="accent1"/>
                   </a:solidFill>
                 </a14:hiddenFill>
               </a:ext>
               <a:ext uri="{91240B29-F687-4f45-9708-019B960494DF}">
-                <a14:hiddenLine xmlns:a14="http://schemas.microsoft.com/office/drawing/2010/main" xmlns="" w="9525">
+                <a14:hiddenLine xmlns="" xmlns:a14="http://schemas.microsoft.com/office/drawing/2010/main" w="9525">
                   <a:solidFill>
                     <a:schemeClr val="tx1"/>
                   </a:solidFill>
@@ -30606,7 +30501,7 @@
                 </a14:hiddenLine>
               </a:ext>
               <a:ext uri="{AF507438-7753-43e0-B8FC-AC1667EBCBE1}">
-                <a14:hiddenEffects xmlns:a14="http://schemas.microsoft.com/office/drawing/2010/main" xmlns="">
+                <a14:hiddenEffects xmlns="" xmlns:a14="http://schemas.microsoft.com/office/drawing/2010/main">
                   <a:effectLst>
                     <a:outerShdw blurRad="63500" dist="38099" dir="2700000" algn="ctr" rotWithShape="0">
                       <a:schemeClr val="bg2">
@@ -30696,7 +30591,7 @@
             <a:effectLst/>
             <a:extLst>
               <a:ext uri="{AF507438-7753-43e0-B8FC-AC1667EBCBE1}">
-                <a14:hiddenEffects xmlns:a14="http://schemas.microsoft.com/office/drawing/2010/main" xmlns="">
+                <a14:hiddenEffects xmlns="" xmlns:a14="http://schemas.microsoft.com/office/drawing/2010/main">
                   <a:effectLst>
                     <a:outerShdw blurRad="63500" dist="38099" dir="2700000" algn="ctr" rotWithShape="0">
                       <a:schemeClr val="bg2">
@@ -30748,14 +30643,14 @@
             <a:effectLst/>
             <a:extLst>
               <a:ext uri="{909E8E84-426E-40dd-AFC4-6F175D3DCCD1}">
-                <a14:hiddenFill xmlns:a14="http://schemas.microsoft.com/office/drawing/2010/main" xmlns="">
+                <a14:hiddenFill xmlns="" xmlns:a14="http://schemas.microsoft.com/office/drawing/2010/main">
                   <a:solidFill>
                     <a:schemeClr val="accent1"/>
                   </a:solidFill>
                 </a14:hiddenFill>
               </a:ext>
               <a:ext uri="{91240B29-F687-4f45-9708-019B960494DF}">
-                <a14:hiddenLine xmlns:a14="http://schemas.microsoft.com/office/drawing/2010/main" xmlns="" w="9525">
+                <a14:hiddenLine xmlns="" xmlns:a14="http://schemas.microsoft.com/office/drawing/2010/main" w="9525">
                   <a:solidFill>
                     <a:schemeClr val="tx1"/>
                   </a:solidFill>
@@ -30765,7 +30660,7 @@
                 </a14:hiddenLine>
               </a:ext>
               <a:ext uri="{AF507438-7753-43e0-B8FC-AC1667EBCBE1}">
-                <a14:hiddenEffects xmlns:a14="http://schemas.microsoft.com/office/drawing/2010/main" xmlns="">
+                <a14:hiddenEffects xmlns="" xmlns:a14="http://schemas.microsoft.com/office/drawing/2010/main">
                   <a:effectLst>
                     <a:outerShdw blurRad="63500" dist="38099" dir="2700000" algn="ctr" rotWithShape="0">
                       <a:schemeClr val="bg2">
@@ -30994,7 +30889,7 @@
             <a:effectLst/>
             <a:extLst>
               <a:ext uri="{AF507438-7753-43e0-B8FC-AC1667EBCBE1}">
-                <a14:hiddenEffects xmlns:a14="http://schemas.microsoft.com/office/drawing/2010/main" xmlns="">
+                <a14:hiddenEffects xmlns="" xmlns:a14="http://schemas.microsoft.com/office/drawing/2010/main">
                   <a:effectLst>
                     <a:outerShdw blurRad="63500" dist="38099" dir="2700000" algn="ctr" rotWithShape="0">
                       <a:schemeClr val="bg2">
@@ -31046,14 +30941,14 @@
             <a:effectLst/>
             <a:extLst>
               <a:ext uri="{909E8E84-426E-40dd-AFC4-6F175D3DCCD1}">
-                <a14:hiddenFill xmlns:a14="http://schemas.microsoft.com/office/drawing/2010/main" xmlns="">
+                <a14:hiddenFill xmlns="" xmlns:a14="http://schemas.microsoft.com/office/drawing/2010/main">
                   <a:solidFill>
                     <a:schemeClr val="accent1"/>
                   </a:solidFill>
                 </a14:hiddenFill>
               </a:ext>
               <a:ext uri="{91240B29-F687-4f45-9708-019B960494DF}">
-                <a14:hiddenLine xmlns:a14="http://schemas.microsoft.com/office/drawing/2010/main" xmlns="" w="9525">
+                <a14:hiddenLine xmlns="" xmlns:a14="http://schemas.microsoft.com/office/drawing/2010/main" w="9525">
                   <a:solidFill>
                     <a:schemeClr val="tx1"/>
                   </a:solidFill>
@@ -31063,7 +30958,7 @@
                 </a14:hiddenLine>
               </a:ext>
               <a:ext uri="{AF507438-7753-43e0-B8FC-AC1667EBCBE1}">
-                <a14:hiddenEffects xmlns:a14="http://schemas.microsoft.com/office/drawing/2010/main" xmlns="">
+                <a14:hiddenEffects xmlns="" xmlns:a14="http://schemas.microsoft.com/office/drawing/2010/main">
                   <a:effectLst>
                     <a:outerShdw blurRad="63500" dist="38099" dir="2700000" algn="ctr" rotWithShape="0">
                       <a:schemeClr val="bg2">
@@ -31153,7 +31048,7 @@
             <a:effectLst/>
             <a:extLst>
               <a:ext uri="{AF507438-7753-43e0-B8FC-AC1667EBCBE1}">
-                <a14:hiddenEffects xmlns:a14="http://schemas.microsoft.com/office/drawing/2010/main" xmlns="">
+                <a14:hiddenEffects xmlns="" xmlns:a14="http://schemas.microsoft.com/office/drawing/2010/main">
                   <a:effectLst>
                     <a:outerShdw blurRad="63500" dist="38099" dir="2700000" algn="ctr" rotWithShape="0">
                       <a:schemeClr val="bg2">
@@ -31205,14 +31100,14 @@
             <a:effectLst/>
             <a:extLst>
               <a:ext uri="{909E8E84-426E-40dd-AFC4-6F175D3DCCD1}">
-                <a14:hiddenFill xmlns:a14="http://schemas.microsoft.com/office/drawing/2010/main" xmlns="">
+                <a14:hiddenFill xmlns="" xmlns:a14="http://schemas.microsoft.com/office/drawing/2010/main">
                   <a:solidFill>
                     <a:schemeClr val="accent1"/>
                   </a:solidFill>
                 </a14:hiddenFill>
               </a:ext>
               <a:ext uri="{91240B29-F687-4f45-9708-019B960494DF}">
-                <a14:hiddenLine xmlns:a14="http://schemas.microsoft.com/office/drawing/2010/main" xmlns="" w="9525">
+                <a14:hiddenLine xmlns="" xmlns:a14="http://schemas.microsoft.com/office/drawing/2010/main" w="9525">
                   <a:solidFill>
                     <a:schemeClr val="tx1"/>
                   </a:solidFill>
@@ -31222,7 +31117,7 @@
                 </a14:hiddenLine>
               </a:ext>
               <a:ext uri="{AF507438-7753-43e0-B8FC-AC1667EBCBE1}">
-                <a14:hiddenEffects xmlns:a14="http://schemas.microsoft.com/office/drawing/2010/main" xmlns="">
+                <a14:hiddenEffects xmlns="" xmlns:a14="http://schemas.microsoft.com/office/drawing/2010/main">
                   <a:effectLst>
                     <a:outerShdw blurRad="63500" dist="38099" dir="2700000" algn="ctr" rotWithShape="0">
                       <a:schemeClr val="bg2">
@@ -31312,7 +31207,7 @@
             <a:effectLst/>
             <a:extLst>
               <a:ext uri="{AF507438-7753-43e0-B8FC-AC1667EBCBE1}">
-                <a14:hiddenEffects xmlns:a14="http://schemas.microsoft.com/office/drawing/2010/main" xmlns="">
+                <a14:hiddenEffects xmlns="" xmlns:a14="http://schemas.microsoft.com/office/drawing/2010/main">
                   <a:effectLst>
                     <a:outerShdw blurRad="63500" dist="38099" dir="2700000" algn="ctr" rotWithShape="0">
                       <a:schemeClr val="bg2">
@@ -31364,14 +31259,14 @@
             <a:effectLst/>
             <a:extLst>
               <a:ext uri="{909E8E84-426E-40dd-AFC4-6F175D3DCCD1}">
-                <a14:hiddenFill xmlns:a14="http://schemas.microsoft.com/office/drawing/2010/main" xmlns="">
+                <a14:hiddenFill xmlns="" xmlns:a14="http://schemas.microsoft.com/office/drawing/2010/main">
                   <a:solidFill>
                     <a:schemeClr val="accent1"/>
                   </a:solidFill>
                 </a14:hiddenFill>
               </a:ext>
               <a:ext uri="{91240B29-F687-4f45-9708-019B960494DF}">
-                <a14:hiddenLine xmlns:a14="http://schemas.microsoft.com/office/drawing/2010/main" xmlns="" w="9525">
+                <a14:hiddenLine xmlns="" xmlns:a14="http://schemas.microsoft.com/office/drawing/2010/main" w="9525">
                   <a:solidFill>
                     <a:schemeClr val="tx1"/>
                   </a:solidFill>
@@ -31381,7 +31276,7 @@
                 </a14:hiddenLine>
               </a:ext>
               <a:ext uri="{AF507438-7753-43e0-B8FC-AC1667EBCBE1}">
-                <a14:hiddenEffects xmlns:a14="http://schemas.microsoft.com/office/drawing/2010/main" xmlns="">
+                <a14:hiddenEffects xmlns="" xmlns:a14="http://schemas.microsoft.com/office/drawing/2010/main">
                   <a:effectLst>
                     <a:outerShdw blurRad="63500" dist="38099" dir="2700000" algn="ctr" rotWithShape="0">
                       <a:schemeClr val="bg2">
@@ -31656,7 +31551,7 @@
             <a:effectLst/>
             <a:extLst>
               <a:ext uri="{AF507438-7753-43e0-B8FC-AC1667EBCBE1}">
-                <a14:hiddenEffects xmlns:a14="http://schemas.microsoft.com/office/drawing/2010/main" xmlns="">
+                <a14:hiddenEffects xmlns="" xmlns:a14="http://schemas.microsoft.com/office/drawing/2010/main">
                   <a:effectLst>
                     <a:outerShdw blurRad="63500" dist="38099" dir="2700000" algn="ctr" rotWithShape="0">
                       <a:schemeClr val="bg2">
@@ -31708,14 +31603,14 @@
             <a:effectLst/>
             <a:extLst>
               <a:ext uri="{909E8E84-426E-40dd-AFC4-6F175D3DCCD1}">
-                <a14:hiddenFill xmlns:a14="http://schemas.microsoft.com/office/drawing/2010/main" xmlns="">
+                <a14:hiddenFill xmlns="" xmlns:a14="http://schemas.microsoft.com/office/drawing/2010/main">
                   <a:solidFill>
                     <a:schemeClr val="accent1"/>
                   </a:solidFill>
                 </a14:hiddenFill>
               </a:ext>
               <a:ext uri="{91240B29-F687-4f45-9708-019B960494DF}">
-                <a14:hiddenLine xmlns:a14="http://schemas.microsoft.com/office/drawing/2010/main" xmlns="" w="9525">
+                <a14:hiddenLine xmlns="" xmlns:a14="http://schemas.microsoft.com/office/drawing/2010/main" w="9525">
                   <a:solidFill>
                     <a:schemeClr val="tx1"/>
                   </a:solidFill>
@@ -31725,7 +31620,7 @@
                 </a14:hiddenLine>
               </a:ext>
               <a:ext uri="{AF507438-7753-43e0-B8FC-AC1667EBCBE1}">
-                <a14:hiddenEffects xmlns:a14="http://schemas.microsoft.com/office/drawing/2010/main" xmlns="">
+                <a14:hiddenEffects xmlns="" xmlns:a14="http://schemas.microsoft.com/office/drawing/2010/main">
                   <a:effectLst>
                     <a:outerShdw blurRad="63500" dist="38099" dir="2700000" algn="ctr" rotWithShape="0">
                       <a:schemeClr val="bg2">
@@ -31815,7 +31710,7 @@
             <a:effectLst/>
             <a:extLst>
               <a:ext uri="{AF507438-7753-43e0-B8FC-AC1667EBCBE1}">
-                <a14:hiddenEffects xmlns:a14="http://schemas.microsoft.com/office/drawing/2010/main" xmlns="">
+                <a14:hiddenEffects xmlns="" xmlns:a14="http://schemas.microsoft.com/office/drawing/2010/main">
                   <a:effectLst>
                     <a:outerShdw blurRad="63500" dist="38099" dir="2700000" algn="ctr" rotWithShape="0">
                       <a:schemeClr val="bg2">
@@ -31867,14 +31762,14 @@
             <a:effectLst/>
             <a:extLst>
               <a:ext uri="{909E8E84-426E-40dd-AFC4-6F175D3DCCD1}">
-                <a14:hiddenFill xmlns:a14="http://schemas.microsoft.com/office/drawing/2010/main" xmlns="">
+                <a14:hiddenFill xmlns="" xmlns:a14="http://schemas.microsoft.com/office/drawing/2010/main">
                   <a:solidFill>
                     <a:schemeClr val="accent1"/>
                   </a:solidFill>
                 </a14:hiddenFill>
               </a:ext>
               <a:ext uri="{91240B29-F687-4f45-9708-019B960494DF}">
-                <a14:hiddenLine xmlns:a14="http://schemas.microsoft.com/office/drawing/2010/main" xmlns="" w="9525">
+                <a14:hiddenLine xmlns="" xmlns:a14="http://schemas.microsoft.com/office/drawing/2010/main" w="9525">
                   <a:solidFill>
                     <a:schemeClr val="tx1"/>
                   </a:solidFill>
@@ -31884,7 +31779,7 @@
                 </a14:hiddenLine>
               </a:ext>
               <a:ext uri="{AF507438-7753-43e0-B8FC-AC1667EBCBE1}">
-                <a14:hiddenEffects xmlns:a14="http://schemas.microsoft.com/office/drawing/2010/main" xmlns="">
+                <a14:hiddenEffects xmlns="" xmlns:a14="http://schemas.microsoft.com/office/drawing/2010/main">
                   <a:effectLst>
                     <a:outerShdw blurRad="63500" dist="38099" dir="2700000" algn="ctr" rotWithShape="0">
                       <a:schemeClr val="bg2">
@@ -31974,7 +31869,7 @@
             <a:effectLst/>
             <a:extLst>
               <a:ext uri="{AF507438-7753-43e0-B8FC-AC1667EBCBE1}">
-                <a14:hiddenEffects xmlns:a14="http://schemas.microsoft.com/office/drawing/2010/main" xmlns="">
+                <a14:hiddenEffects xmlns="" xmlns:a14="http://schemas.microsoft.com/office/drawing/2010/main">
                   <a:effectLst>
                     <a:outerShdw blurRad="63500" dist="38099" dir="2700000" algn="ctr" rotWithShape="0">
                       <a:schemeClr val="bg2">
@@ -32026,14 +31921,14 @@
             <a:effectLst/>
             <a:extLst>
               <a:ext uri="{909E8E84-426E-40dd-AFC4-6F175D3DCCD1}">
-                <a14:hiddenFill xmlns:a14="http://schemas.microsoft.com/office/drawing/2010/main" xmlns="">
+                <a14:hiddenFill xmlns="" xmlns:a14="http://schemas.microsoft.com/office/drawing/2010/main">
                   <a:solidFill>
                     <a:schemeClr val="accent1"/>
                   </a:solidFill>
                 </a14:hiddenFill>
               </a:ext>
               <a:ext uri="{91240B29-F687-4f45-9708-019B960494DF}">
-                <a14:hiddenLine xmlns:a14="http://schemas.microsoft.com/office/drawing/2010/main" xmlns="" w="9525">
+                <a14:hiddenLine xmlns="" xmlns:a14="http://schemas.microsoft.com/office/drawing/2010/main" w="9525">
                   <a:solidFill>
                     <a:schemeClr val="tx1"/>
                   </a:solidFill>
@@ -32043,7 +31938,7 @@
                 </a14:hiddenLine>
               </a:ext>
               <a:ext uri="{AF507438-7753-43e0-B8FC-AC1667EBCBE1}">
-                <a14:hiddenEffects xmlns:a14="http://schemas.microsoft.com/office/drawing/2010/main" xmlns="">
+                <a14:hiddenEffects xmlns="" xmlns:a14="http://schemas.microsoft.com/office/drawing/2010/main">
                   <a:effectLst>
                     <a:outerShdw blurRad="63500" dist="38099" dir="2700000" algn="ctr" rotWithShape="0">
                       <a:schemeClr val="bg2">
@@ -32550,7 +32445,7 @@
             <a:effectLst/>
             <a:extLst>
               <a:ext uri="{AF507438-7753-43e0-B8FC-AC1667EBCBE1}">
-                <a14:hiddenEffects xmlns:a14="http://schemas.microsoft.com/office/drawing/2010/main" xmlns="">
+                <a14:hiddenEffects xmlns="" xmlns:a14="http://schemas.microsoft.com/office/drawing/2010/main">
                   <a:effectLst>
                     <a:outerShdw blurRad="63500" dist="38099" dir="2700000" algn="ctr" rotWithShape="0">
                       <a:schemeClr val="bg2">
@@ -32602,14 +32497,14 @@
             <a:effectLst/>
             <a:extLst>
               <a:ext uri="{909E8E84-426E-40dd-AFC4-6F175D3DCCD1}">
-                <a14:hiddenFill xmlns:a14="http://schemas.microsoft.com/office/drawing/2010/main" xmlns="">
+                <a14:hiddenFill xmlns="" xmlns:a14="http://schemas.microsoft.com/office/drawing/2010/main">
                   <a:solidFill>
                     <a:schemeClr val="accent1"/>
                   </a:solidFill>
                 </a14:hiddenFill>
               </a:ext>
               <a:ext uri="{91240B29-F687-4f45-9708-019B960494DF}">
-                <a14:hiddenLine xmlns:a14="http://schemas.microsoft.com/office/drawing/2010/main" xmlns="" w="9525">
+                <a14:hiddenLine xmlns="" xmlns:a14="http://schemas.microsoft.com/office/drawing/2010/main" w="9525">
                   <a:solidFill>
                     <a:schemeClr val="tx1"/>
                   </a:solidFill>
@@ -32619,7 +32514,7 @@
                 </a14:hiddenLine>
               </a:ext>
               <a:ext uri="{AF507438-7753-43e0-B8FC-AC1667EBCBE1}">
-                <a14:hiddenEffects xmlns:a14="http://schemas.microsoft.com/office/drawing/2010/main" xmlns="">
+                <a14:hiddenEffects xmlns="" xmlns:a14="http://schemas.microsoft.com/office/drawing/2010/main">
                   <a:effectLst>
                     <a:outerShdw blurRad="63500" dist="38099" dir="2700000" algn="ctr" rotWithShape="0">
                       <a:schemeClr val="bg2">
@@ -33164,7 +33059,7 @@
         </p:nvSpPr>
         <p:spPr>
           <a:xfrm>
-            <a:off x="612648" y="1600200"/>
+            <a:off x="495300" y="1486988"/>
             <a:ext cx="8153400" cy="5257800"/>
           </a:xfrm>
         </p:spPr>
@@ -33186,15 +33081,7 @@
             <a:pPr lvl="1"/>
             <a:r>
               <a:rPr lang="en-US" sz="2400" dirty="0"/>
-              <a:t>Is there a </a:t>
-            </a:r>
-            <a:r>
-              <a:rPr lang="en-US" sz="2400" dirty="0" err="1"/>
-              <a:t>hamiltonian</a:t>
-            </a:r>
-            <a:r>
-              <a:rPr lang="en-US" sz="2400" dirty="0"/>
-              <a:t> cycle?</a:t>
+              <a:t>Is there a Hamiltonian cycle?</a:t>
             </a:r>
           </a:p>
           <a:p>
@@ -33208,7 +33095,7 @@
             <a:pPr lvl="1"/>
             <a:r>
               <a:rPr lang="en-US" sz="2400" dirty="0"/>
-              <a:t>Does the graph has an independent set of size k?</a:t>
+              <a:t>Does the graph have an independent set of size k?</a:t>
             </a:r>
           </a:p>
           <a:p>
@@ -33244,6 +33131,16 @@
               <a:rPr lang="en-US" sz="2400" dirty="0"/>
               <a:t>What is the shortest path that visits all the vertices exactly once?</a:t>
             </a:r>
+          </a:p>
+          <a:p>
+            <a:pPr marL="0" indent="0">
+              <a:buNone/>
+            </a:pPr>
+            <a:endParaRPr lang="en-US" sz="2800" dirty="0">
+              <a:solidFill>
+                <a:srgbClr val="FF0000"/>
+              </a:solidFill>
+            </a:endParaRPr>
           </a:p>
           <a:p>
             <a:pPr marL="0" indent="0">
@@ -33852,8 +33749,12 @@
               <a:buNone/>
             </a:pPr>
             <a:r>
+              <a:rPr lang="en-US" i="1" dirty="0"/>
+              <a:t>such that</a:t>
+            </a:r>
+            <a:r>
               <a:rPr lang="en-US" dirty="0"/>
-              <a:t>such that: a solution to </a:t>
+              <a:t>: a solution to </a:t>
             </a:r>
             <a:r>
               <a:rPr lang="en-US" i="1" dirty="0"/>
@@ -33872,7 +33773,7 @@
               <a:t> </a:t>
             </a:r>
             <a:r>
-              <a:rPr lang="en-US" dirty="0" err="1"/>
+              <a:rPr lang="en-US" b="1" dirty="0" err="1"/>
               <a:t>iff</a:t>
             </a:r>
             <a:r>
@@ -33925,7 +33826,7 @@
           <a:effectLst/>
           <a:extLst>
             <a:ext uri="{AF507438-7753-43e0-B8FC-AC1667EBCBE1}">
-              <a14:hiddenEffects xmlns:a14="http://schemas.microsoft.com/office/drawing/2010/main" xmlns="">
+              <a14:hiddenEffects xmlns="" xmlns:a14="http://schemas.microsoft.com/office/drawing/2010/main">
                 <a:effectLst>
                   <a:outerShdw blurRad="63500" dist="38099" dir="2700000" algn="ctr" rotWithShape="0">
                     <a:schemeClr val="bg2">
@@ -33979,12 +33880,12 @@
           <a:effectLst/>
           <a:extLst>
             <a:ext uri="{909E8E84-426E-40dd-AFC4-6F175D3DCCD1}">
-              <a14:hiddenFill xmlns:a14="http://schemas.microsoft.com/office/drawing/2010/main" xmlns="">
+              <a14:hiddenFill xmlns="" xmlns:a14="http://schemas.microsoft.com/office/drawing/2010/main">
                 <a:noFill/>
               </a14:hiddenFill>
             </a:ext>
             <a:ext uri="{AF507438-7753-43e0-B8FC-AC1667EBCBE1}">
-              <a14:hiddenEffects xmlns:a14="http://schemas.microsoft.com/office/drawing/2010/main" xmlns="">
+              <a14:hiddenEffects xmlns="" xmlns:a14="http://schemas.microsoft.com/office/drawing/2010/main">
                 <a:effectLst>
                   <a:outerShdw blurRad="63500" dist="38099" dir="2700000" algn="ctr" rotWithShape="0">
                     <a:schemeClr val="bg2">
@@ -34027,14 +33928,14 @@
           <a:effectLst/>
           <a:extLst>
             <a:ext uri="{909E8E84-426E-40dd-AFC4-6F175D3DCCD1}">
-              <a14:hiddenFill xmlns:a14="http://schemas.microsoft.com/office/drawing/2010/main" xmlns="">
+              <a14:hiddenFill xmlns="" xmlns:a14="http://schemas.microsoft.com/office/drawing/2010/main">
                 <a:solidFill>
                   <a:schemeClr val="accent1"/>
                 </a:solidFill>
               </a14:hiddenFill>
             </a:ext>
             <a:ext uri="{91240B29-F687-4f45-9708-019B960494DF}">
-              <a14:hiddenLine xmlns:a14="http://schemas.microsoft.com/office/drawing/2010/main" xmlns="" w="9525">
+              <a14:hiddenLine xmlns="" xmlns:a14="http://schemas.microsoft.com/office/drawing/2010/main" w="9525">
                 <a:solidFill>
                   <a:schemeClr val="tx1"/>
                 </a:solidFill>
@@ -34044,7 +33945,7 @@
               </a14:hiddenLine>
             </a:ext>
             <a:ext uri="{AF507438-7753-43e0-B8FC-AC1667EBCBE1}">
-              <a14:hiddenEffects xmlns:a14="http://schemas.microsoft.com/office/drawing/2010/main" xmlns="">
+              <a14:hiddenEffects xmlns="" xmlns:a14="http://schemas.microsoft.com/office/drawing/2010/main">
                 <a:effectLst>
                   <a:outerShdw blurRad="63500" dist="38099" dir="2700000" algn="ctr" rotWithShape="0">
                     <a:schemeClr val="bg2">
@@ -34094,14 +33995,14 @@
           <a:effectLst/>
           <a:extLst>
             <a:ext uri="{909E8E84-426E-40dd-AFC4-6F175D3DCCD1}">
-              <a14:hiddenFill xmlns:a14="http://schemas.microsoft.com/office/drawing/2010/main" xmlns="">
+              <a14:hiddenFill xmlns="" xmlns:a14="http://schemas.microsoft.com/office/drawing/2010/main">
                 <a:solidFill>
                   <a:schemeClr val="accent1"/>
                 </a:solidFill>
               </a14:hiddenFill>
             </a:ext>
             <a:ext uri="{91240B29-F687-4f45-9708-019B960494DF}">
-              <a14:hiddenLine xmlns:a14="http://schemas.microsoft.com/office/drawing/2010/main" xmlns="" w="9525">
+              <a14:hiddenLine xmlns="" xmlns:a14="http://schemas.microsoft.com/office/drawing/2010/main" w="9525">
                 <a:solidFill>
                   <a:schemeClr val="tx1"/>
                 </a:solidFill>
@@ -34111,7 +34012,7 @@
               </a14:hiddenLine>
             </a:ext>
             <a:ext uri="{AF507438-7753-43e0-B8FC-AC1667EBCBE1}">
-              <a14:hiddenEffects xmlns:a14="http://schemas.microsoft.com/office/drawing/2010/main" xmlns="">
+              <a14:hiddenEffects xmlns="" xmlns:a14="http://schemas.microsoft.com/office/drawing/2010/main">
                 <a:effectLst>
                   <a:outerShdw blurRad="63500" dist="38099" dir="2700000" algn="ctr" rotWithShape="0">
                     <a:schemeClr val="bg2">
@@ -34166,12 +34067,12 @@
           <a:effectLst/>
           <a:extLst>
             <a:ext uri="{909E8E84-426E-40dd-AFC4-6F175D3DCCD1}">
-              <a14:hiddenFill xmlns:a14="http://schemas.microsoft.com/office/drawing/2010/main" xmlns="">
+              <a14:hiddenFill xmlns="" xmlns:a14="http://schemas.microsoft.com/office/drawing/2010/main">
                 <a:noFill/>
               </a14:hiddenFill>
             </a:ext>
             <a:ext uri="{AF507438-7753-43e0-B8FC-AC1667EBCBE1}">
-              <a14:hiddenEffects xmlns:a14="http://schemas.microsoft.com/office/drawing/2010/main" xmlns="">
+              <a14:hiddenEffects xmlns="" xmlns:a14="http://schemas.microsoft.com/office/drawing/2010/main">
                 <a:effectLst>
                   <a:outerShdw blurRad="63500" dist="38099" dir="2700000" algn="ctr" rotWithShape="0">
                     <a:schemeClr val="bg2">
@@ -34214,14 +34115,14 @@
           <a:effectLst/>
           <a:extLst>
             <a:ext uri="{909E8E84-426E-40dd-AFC4-6F175D3DCCD1}">
-              <a14:hiddenFill xmlns:a14="http://schemas.microsoft.com/office/drawing/2010/main" xmlns="">
+              <a14:hiddenFill xmlns="" xmlns:a14="http://schemas.microsoft.com/office/drawing/2010/main">
                 <a:solidFill>
                   <a:schemeClr val="accent1"/>
                 </a:solidFill>
               </a14:hiddenFill>
             </a:ext>
             <a:ext uri="{91240B29-F687-4f45-9708-019B960494DF}">
-              <a14:hiddenLine xmlns:a14="http://schemas.microsoft.com/office/drawing/2010/main" xmlns="" w="9525">
+              <a14:hiddenLine xmlns="" xmlns:a14="http://schemas.microsoft.com/office/drawing/2010/main" w="9525">
                 <a:solidFill>
                   <a:schemeClr val="tx1"/>
                 </a:solidFill>
@@ -34231,7 +34132,7 @@
               </a14:hiddenLine>
             </a:ext>
             <a:ext uri="{AF507438-7753-43e0-B8FC-AC1667EBCBE1}">
-              <a14:hiddenEffects xmlns:a14="http://schemas.microsoft.com/office/drawing/2010/main" xmlns="">
+              <a14:hiddenEffects xmlns="" xmlns:a14="http://schemas.microsoft.com/office/drawing/2010/main">
                 <a:effectLst>
                   <a:outerShdw blurRad="63500" dist="38099" dir="2700000" algn="ctr" rotWithShape="0">
                     <a:schemeClr val="bg2">
@@ -34288,14 +34189,14 @@
           <a:effectLst/>
           <a:extLst>
             <a:ext uri="{909E8E84-426E-40dd-AFC4-6F175D3DCCD1}">
-              <a14:hiddenFill xmlns:a14="http://schemas.microsoft.com/office/drawing/2010/main" xmlns="">
+              <a14:hiddenFill xmlns="" xmlns:a14="http://schemas.microsoft.com/office/drawing/2010/main">
                 <a:solidFill>
                   <a:schemeClr val="accent1"/>
                 </a:solidFill>
               </a14:hiddenFill>
             </a:ext>
             <a:ext uri="{91240B29-F687-4f45-9708-019B960494DF}">
-              <a14:hiddenLine xmlns:a14="http://schemas.microsoft.com/office/drawing/2010/main" xmlns="" w="9525">
+              <a14:hiddenLine xmlns="" xmlns:a14="http://schemas.microsoft.com/office/drawing/2010/main" w="9525">
                 <a:solidFill>
                   <a:schemeClr val="tx1"/>
                 </a:solidFill>
@@ -34305,7 +34206,7 @@
               </a14:hiddenLine>
             </a:ext>
             <a:ext uri="{AF507438-7753-43e0-B8FC-AC1667EBCBE1}">
-              <a14:hiddenEffects xmlns:a14="http://schemas.microsoft.com/office/drawing/2010/main" xmlns="">
+              <a14:hiddenEffects xmlns="" xmlns:a14="http://schemas.microsoft.com/office/drawing/2010/main">
                 <a:effectLst>
                   <a:outerShdw blurRad="63500" dist="38099" dir="2700000" algn="ctr" rotWithShape="0">
                     <a:schemeClr val="bg2">
@@ -35072,7 +34973,7 @@
             <a:effectLst/>
             <a:extLst>
               <a:ext uri="{AF507438-7753-43e0-B8FC-AC1667EBCBE1}">
-                <a14:hiddenEffects xmlns:a14="http://schemas.microsoft.com/office/drawing/2010/main" xmlns="">
+                <a14:hiddenEffects xmlns="" xmlns:a14="http://schemas.microsoft.com/office/drawing/2010/main">
                   <a:effectLst>
                     <a:outerShdw blurRad="63500" dist="38099" dir="2700000" algn="ctr" rotWithShape="0">
                       <a:schemeClr val="bg2">
@@ -35131,7 +35032,7 @@
             <a:effectLst/>
             <a:extLst>
               <a:ext uri="{AF507438-7753-43e0-B8FC-AC1667EBCBE1}">
-                <a14:hiddenEffects xmlns:a14="http://schemas.microsoft.com/office/drawing/2010/main" xmlns="">
+                <a14:hiddenEffects xmlns="" xmlns:a14="http://schemas.microsoft.com/office/drawing/2010/main">
                   <a:effectLst>
                     <a:outerShdw blurRad="63500" dist="38099" dir="2700000" algn="ctr" rotWithShape="0">
                       <a:schemeClr val="bg2">
@@ -35187,7 +35088,7 @@
             <a:effectLst/>
             <a:extLst>
               <a:ext uri="{AF507438-7753-43e0-B8FC-AC1667EBCBE1}">
-                <a14:hiddenEffects xmlns:a14="http://schemas.microsoft.com/office/drawing/2010/main" xmlns="">
+                <a14:hiddenEffects xmlns="" xmlns:a14="http://schemas.microsoft.com/office/drawing/2010/main">
                   <a:effectLst>
                     <a:outerShdw blurRad="63500" dist="38099" dir="2700000" algn="ctr" rotWithShape="0">
                       <a:schemeClr val="bg2">
@@ -35243,12 +35144,12 @@
             <a:effectLst/>
             <a:extLst>
               <a:ext uri="{909E8E84-426E-40dd-AFC4-6F175D3DCCD1}">
-                <a14:hiddenFill xmlns:a14="http://schemas.microsoft.com/office/drawing/2010/main" xmlns="">
+                <a14:hiddenFill xmlns="" xmlns:a14="http://schemas.microsoft.com/office/drawing/2010/main">
                   <a:noFill/>
                 </a14:hiddenFill>
               </a:ext>
               <a:ext uri="{AF507438-7753-43e0-B8FC-AC1667EBCBE1}">
-                <a14:hiddenEffects xmlns:a14="http://schemas.microsoft.com/office/drawing/2010/main" xmlns="">
+                <a14:hiddenEffects xmlns="" xmlns:a14="http://schemas.microsoft.com/office/drawing/2010/main">
                   <a:effectLst>
                     <a:outerShdw blurRad="63500" dist="38099" dir="2700000" algn="ctr" rotWithShape="0">
                       <a:schemeClr val="bg2">
@@ -35291,14 +35192,14 @@
             <a:effectLst/>
             <a:extLst>
               <a:ext uri="{909E8E84-426E-40dd-AFC4-6F175D3DCCD1}">
-                <a14:hiddenFill xmlns:a14="http://schemas.microsoft.com/office/drawing/2010/main" xmlns="">
+                <a14:hiddenFill xmlns="" xmlns:a14="http://schemas.microsoft.com/office/drawing/2010/main">
                   <a:solidFill>
                     <a:schemeClr val="accent1"/>
                   </a:solidFill>
                 </a14:hiddenFill>
               </a:ext>
               <a:ext uri="{91240B29-F687-4f45-9708-019B960494DF}">
-                <a14:hiddenLine xmlns:a14="http://schemas.microsoft.com/office/drawing/2010/main" xmlns="" w="9525">
+                <a14:hiddenLine xmlns="" xmlns:a14="http://schemas.microsoft.com/office/drawing/2010/main" w="9525">
                   <a:solidFill>
                     <a:schemeClr val="tx1"/>
                   </a:solidFill>
@@ -35308,7 +35209,7 @@
                 </a14:hiddenLine>
               </a:ext>
               <a:ext uri="{AF507438-7753-43e0-B8FC-AC1667EBCBE1}">
-                <a14:hiddenEffects xmlns:a14="http://schemas.microsoft.com/office/drawing/2010/main" xmlns="">
+                <a14:hiddenEffects xmlns="" xmlns:a14="http://schemas.microsoft.com/office/drawing/2010/main">
                   <a:effectLst>
                     <a:outerShdw blurRad="63500" dist="38099" dir="2700000" algn="ctr" rotWithShape="0">
                       <a:schemeClr val="bg2">
@@ -35358,14 +35259,14 @@
             <a:effectLst/>
             <a:extLst>
               <a:ext uri="{909E8E84-426E-40dd-AFC4-6F175D3DCCD1}">
-                <a14:hiddenFill xmlns:a14="http://schemas.microsoft.com/office/drawing/2010/main" xmlns="">
+                <a14:hiddenFill xmlns="" xmlns:a14="http://schemas.microsoft.com/office/drawing/2010/main">
                   <a:solidFill>
                     <a:schemeClr val="accent1"/>
                   </a:solidFill>
                 </a14:hiddenFill>
               </a:ext>
               <a:ext uri="{91240B29-F687-4f45-9708-019B960494DF}">
-                <a14:hiddenLine xmlns:a14="http://schemas.microsoft.com/office/drawing/2010/main" xmlns="" w="9525">
+                <a14:hiddenLine xmlns="" xmlns:a14="http://schemas.microsoft.com/office/drawing/2010/main" w="9525">
                   <a:solidFill>
                     <a:schemeClr val="tx1"/>
                   </a:solidFill>
@@ -35375,7 +35276,7 @@
                 </a14:hiddenLine>
               </a:ext>
               <a:ext uri="{AF507438-7753-43e0-B8FC-AC1667EBCBE1}">
-                <a14:hiddenEffects xmlns:a14="http://schemas.microsoft.com/office/drawing/2010/main" xmlns="">
+                <a14:hiddenEffects xmlns="" xmlns:a14="http://schemas.microsoft.com/office/drawing/2010/main">
                   <a:effectLst>
                     <a:outerShdw blurRad="63500" dist="38099" dir="2700000" algn="ctr" rotWithShape="0">
                       <a:schemeClr val="bg2">
@@ -35430,12 +35331,12 @@
             <a:effectLst/>
             <a:extLst>
               <a:ext uri="{909E8E84-426E-40dd-AFC4-6F175D3DCCD1}">
-                <a14:hiddenFill xmlns:a14="http://schemas.microsoft.com/office/drawing/2010/main" xmlns="">
+                <a14:hiddenFill xmlns="" xmlns:a14="http://schemas.microsoft.com/office/drawing/2010/main">
                   <a:noFill/>
                 </a14:hiddenFill>
               </a:ext>
               <a:ext uri="{AF507438-7753-43e0-B8FC-AC1667EBCBE1}">
-                <a14:hiddenEffects xmlns:a14="http://schemas.microsoft.com/office/drawing/2010/main" xmlns="">
+                <a14:hiddenEffects xmlns="" xmlns:a14="http://schemas.microsoft.com/office/drawing/2010/main">
                   <a:effectLst>
                     <a:outerShdw blurRad="63500" dist="38099" dir="2700000" algn="ctr" rotWithShape="0">
                       <a:schemeClr val="bg2">
@@ -35483,12 +35384,12 @@
             <a:effectLst/>
             <a:extLst>
               <a:ext uri="{909E8E84-426E-40dd-AFC4-6F175D3DCCD1}">
-                <a14:hiddenFill xmlns:a14="http://schemas.microsoft.com/office/drawing/2010/main" xmlns="">
+                <a14:hiddenFill xmlns="" xmlns:a14="http://schemas.microsoft.com/office/drawing/2010/main">
                   <a:noFill/>
                 </a14:hiddenFill>
               </a:ext>
               <a:ext uri="{AF507438-7753-43e0-B8FC-AC1667EBCBE1}">
-                <a14:hiddenEffects xmlns:a14="http://schemas.microsoft.com/office/drawing/2010/main" xmlns="">
+                <a14:hiddenEffects xmlns="" xmlns:a14="http://schemas.microsoft.com/office/drawing/2010/main">
                   <a:effectLst>
                     <a:outerShdw blurRad="63500" dist="38099" dir="2700000" algn="ctr" rotWithShape="0">
                       <a:schemeClr val="bg2">
@@ -35536,12 +35437,12 @@
             <a:effectLst/>
             <a:extLst>
               <a:ext uri="{909E8E84-426E-40dd-AFC4-6F175D3DCCD1}">
-                <a14:hiddenFill xmlns:a14="http://schemas.microsoft.com/office/drawing/2010/main" xmlns="">
+                <a14:hiddenFill xmlns="" xmlns:a14="http://schemas.microsoft.com/office/drawing/2010/main">
                   <a:noFill/>
                 </a14:hiddenFill>
               </a:ext>
               <a:ext uri="{AF507438-7753-43e0-B8FC-AC1667EBCBE1}">
-                <a14:hiddenEffects xmlns:a14="http://schemas.microsoft.com/office/drawing/2010/main" xmlns="">
+                <a14:hiddenEffects xmlns="" xmlns:a14="http://schemas.microsoft.com/office/drawing/2010/main">
                   <a:effectLst>
                     <a:outerShdw blurRad="63500" dist="38099" dir="2700000" algn="ctr" rotWithShape="0">
                       <a:schemeClr val="bg2">
@@ -35589,12 +35490,12 @@
             <a:effectLst/>
             <a:extLst>
               <a:ext uri="{909E8E84-426E-40dd-AFC4-6F175D3DCCD1}">
-                <a14:hiddenFill xmlns:a14="http://schemas.microsoft.com/office/drawing/2010/main" xmlns="">
+                <a14:hiddenFill xmlns="" xmlns:a14="http://schemas.microsoft.com/office/drawing/2010/main">
                   <a:noFill/>
                 </a14:hiddenFill>
               </a:ext>
               <a:ext uri="{AF507438-7753-43e0-B8FC-AC1667EBCBE1}">
-                <a14:hiddenEffects xmlns:a14="http://schemas.microsoft.com/office/drawing/2010/main" xmlns="">
+                <a14:hiddenEffects xmlns="" xmlns:a14="http://schemas.microsoft.com/office/drawing/2010/main">
                   <a:effectLst>
                     <a:outerShdw blurRad="63500" dist="38099" dir="2700000" algn="ctr" rotWithShape="0">
                       <a:schemeClr val="bg2">
@@ -35642,12 +35543,12 @@
             <a:effectLst/>
             <a:extLst>
               <a:ext uri="{909E8E84-426E-40dd-AFC4-6F175D3DCCD1}">
-                <a14:hiddenFill xmlns:a14="http://schemas.microsoft.com/office/drawing/2010/main" xmlns="">
+                <a14:hiddenFill xmlns="" xmlns:a14="http://schemas.microsoft.com/office/drawing/2010/main">
                   <a:noFill/>
                 </a14:hiddenFill>
               </a:ext>
               <a:ext uri="{AF507438-7753-43e0-B8FC-AC1667EBCBE1}">
-                <a14:hiddenEffects xmlns:a14="http://schemas.microsoft.com/office/drawing/2010/main" xmlns="">
+                <a14:hiddenEffects xmlns="" xmlns:a14="http://schemas.microsoft.com/office/drawing/2010/main">
                   <a:effectLst>
                     <a:outerShdw blurRad="63500" dist="38099" dir="2700000" algn="ctr" rotWithShape="0">
                       <a:schemeClr val="bg2">
@@ -35690,14 +35591,14 @@
             <a:effectLst/>
             <a:extLst>
               <a:ext uri="{909E8E84-426E-40dd-AFC4-6F175D3DCCD1}">
-                <a14:hiddenFill xmlns:a14="http://schemas.microsoft.com/office/drawing/2010/main" xmlns="">
+                <a14:hiddenFill xmlns="" xmlns:a14="http://schemas.microsoft.com/office/drawing/2010/main">
                   <a:solidFill>
                     <a:schemeClr val="accent1"/>
                   </a:solidFill>
                 </a14:hiddenFill>
               </a:ext>
               <a:ext uri="{91240B29-F687-4f45-9708-019B960494DF}">
-                <a14:hiddenLine xmlns:a14="http://schemas.microsoft.com/office/drawing/2010/main" xmlns="" w="9525">
+                <a14:hiddenLine xmlns="" xmlns:a14="http://schemas.microsoft.com/office/drawing/2010/main" w="9525">
                   <a:solidFill>
                     <a:schemeClr val="tx1"/>
                   </a:solidFill>
@@ -35707,7 +35608,7 @@
                 </a14:hiddenLine>
               </a:ext>
               <a:ext uri="{AF507438-7753-43e0-B8FC-AC1667EBCBE1}">
-                <a14:hiddenEffects xmlns:a14="http://schemas.microsoft.com/office/drawing/2010/main" xmlns="">
+                <a14:hiddenEffects xmlns="" xmlns:a14="http://schemas.microsoft.com/office/drawing/2010/main">
                   <a:effectLst>
                     <a:outerShdw blurRad="63500" dist="38099" dir="2700000" algn="ctr" rotWithShape="0">
                       <a:schemeClr val="bg2">
@@ -35755,14 +35656,14 @@
             <a:effectLst/>
             <a:extLst>
               <a:ext uri="{909E8E84-426E-40dd-AFC4-6F175D3DCCD1}">
-                <a14:hiddenFill xmlns:a14="http://schemas.microsoft.com/office/drawing/2010/main" xmlns="">
+                <a14:hiddenFill xmlns="" xmlns:a14="http://schemas.microsoft.com/office/drawing/2010/main">
                   <a:solidFill>
                     <a:schemeClr val="accent1"/>
                   </a:solidFill>
                 </a14:hiddenFill>
               </a:ext>
               <a:ext uri="{91240B29-F687-4f45-9708-019B960494DF}">
-                <a14:hiddenLine xmlns:a14="http://schemas.microsoft.com/office/drawing/2010/main" xmlns="" w="9525">
+                <a14:hiddenLine xmlns="" xmlns:a14="http://schemas.microsoft.com/office/drawing/2010/main" w="9525">
                   <a:solidFill>
                     <a:schemeClr val="tx1"/>
                   </a:solidFill>
@@ -35772,7 +35673,7 @@
                 </a14:hiddenLine>
               </a:ext>
               <a:ext uri="{AF507438-7753-43e0-B8FC-AC1667EBCBE1}">
-                <a14:hiddenEffects xmlns:a14="http://schemas.microsoft.com/office/drawing/2010/main" xmlns="">
+                <a14:hiddenEffects xmlns="" xmlns:a14="http://schemas.microsoft.com/office/drawing/2010/main">
                   <a:effectLst>
                     <a:outerShdw blurRad="63500" dist="38099" dir="2700000" algn="ctr" rotWithShape="0">
                       <a:schemeClr val="bg2">
@@ -35820,14 +35721,14 @@
             <a:effectLst/>
             <a:extLst>
               <a:ext uri="{909E8E84-426E-40dd-AFC4-6F175D3DCCD1}">
-                <a14:hiddenFill xmlns:a14="http://schemas.microsoft.com/office/drawing/2010/main" xmlns="">
+                <a14:hiddenFill xmlns="" xmlns:a14="http://schemas.microsoft.com/office/drawing/2010/main">
                   <a:solidFill>
                     <a:schemeClr val="accent1"/>
                   </a:solidFill>
                 </a14:hiddenFill>
               </a:ext>
               <a:ext uri="{91240B29-F687-4f45-9708-019B960494DF}">
-                <a14:hiddenLine xmlns:a14="http://schemas.microsoft.com/office/drawing/2010/main" xmlns="" w="9525">
+                <a14:hiddenLine xmlns="" xmlns:a14="http://schemas.microsoft.com/office/drawing/2010/main" w="9525">
                   <a:solidFill>
                     <a:schemeClr val="tx1"/>
                   </a:solidFill>
@@ -35837,7 +35738,7 @@
                 </a14:hiddenLine>
               </a:ext>
               <a:ext uri="{AF507438-7753-43e0-B8FC-AC1667EBCBE1}">
-                <a14:hiddenEffects xmlns:a14="http://schemas.microsoft.com/office/drawing/2010/main" xmlns="">
+                <a14:hiddenEffects xmlns="" xmlns:a14="http://schemas.microsoft.com/office/drawing/2010/main">
                   <a:effectLst>
                     <a:outerShdw blurRad="63500" dist="38099" dir="2700000" algn="ctr" rotWithShape="0">
                       <a:schemeClr val="bg2">
@@ -35885,14 +35786,14 @@
             <a:effectLst/>
             <a:extLst>
               <a:ext uri="{909E8E84-426E-40dd-AFC4-6F175D3DCCD1}">
-                <a14:hiddenFill xmlns:a14="http://schemas.microsoft.com/office/drawing/2010/main" xmlns="">
+                <a14:hiddenFill xmlns="" xmlns:a14="http://schemas.microsoft.com/office/drawing/2010/main">
                   <a:solidFill>
                     <a:schemeClr val="accent1"/>
                   </a:solidFill>
                 </a14:hiddenFill>
               </a:ext>
               <a:ext uri="{91240B29-F687-4f45-9708-019B960494DF}">
-                <a14:hiddenLine xmlns:a14="http://schemas.microsoft.com/office/drawing/2010/main" xmlns="" w="9525">
+                <a14:hiddenLine xmlns="" xmlns:a14="http://schemas.microsoft.com/office/drawing/2010/main" w="9525">
                   <a:solidFill>
                     <a:schemeClr val="tx1"/>
                   </a:solidFill>
@@ -35902,7 +35803,7 @@
                 </a14:hiddenLine>
               </a:ext>
               <a:ext uri="{AF507438-7753-43e0-B8FC-AC1667EBCBE1}">
-                <a14:hiddenEffects xmlns:a14="http://schemas.microsoft.com/office/drawing/2010/main" xmlns="">
+                <a14:hiddenEffects xmlns="" xmlns:a14="http://schemas.microsoft.com/office/drawing/2010/main">
                   <a:effectLst>
                     <a:outerShdw blurRad="63500" dist="38099" dir="2700000" algn="ctr" rotWithShape="0">
                       <a:schemeClr val="bg2">
@@ -35950,14 +35851,14 @@
             <a:effectLst/>
             <a:extLst>
               <a:ext uri="{909E8E84-426E-40dd-AFC4-6F175D3DCCD1}">
-                <a14:hiddenFill xmlns:a14="http://schemas.microsoft.com/office/drawing/2010/main" xmlns="">
+                <a14:hiddenFill xmlns="" xmlns:a14="http://schemas.microsoft.com/office/drawing/2010/main">
                   <a:solidFill>
                     <a:schemeClr val="accent1"/>
                   </a:solidFill>
                 </a14:hiddenFill>
               </a:ext>
               <a:ext uri="{91240B29-F687-4f45-9708-019B960494DF}">
-                <a14:hiddenLine xmlns:a14="http://schemas.microsoft.com/office/drawing/2010/main" xmlns="" w="9525">
+                <a14:hiddenLine xmlns="" xmlns:a14="http://schemas.microsoft.com/office/drawing/2010/main" w="9525">
                   <a:solidFill>
                     <a:schemeClr val="tx1"/>
                   </a:solidFill>
@@ -35967,7 +35868,7 @@
                 </a14:hiddenLine>
               </a:ext>
               <a:ext uri="{AF507438-7753-43e0-B8FC-AC1667EBCBE1}">
-                <a14:hiddenEffects xmlns:a14="http://schemas.microsoft.com/office/drawing/2010/main" xmlns="">
+                <a14:hiddenEffects xmlns="" xmlns:a14="http://schemas.microsoft.com/office/drawing/2010/main">
                   <a:effectLst>
                     <a:outerShdw blurRad="63500" dist="38099" dir="2700000" algn="ctr" rotWithShape="0">
                       <a:schemeClr val="bg2">
@@ -36006,7 +35907,7 @@
         <p:spPr>
           <a:xfrm>
             <a:off x="514122" y="3540352"/>
-            <a:ext cx="8207987" cy="523220"/>
+            <a:ext cx="8494826" cy="523220"/>
           </a:xfrm>
           <a:prstGeom prst="rect">
             <a:avLst/>
@@ -36057,7 +35958,7 @@
                   <a:srgbClr val="0000FF"/>
                 </a:solidFill>
               </a:rPr>
-              <a:t> </a:t>
+              <a:t>.</a:t>
             </a:r>
           </a:p>
         </p:txBody>
@@ -36092,7 +35993,7 @@
           <a:effectLst/>
           <a:extLst>
             <a:ext uri="{AF507438-7753-43e0-B8FC-AC1667EBCBE1}">
-              <a14:hiddenEffects xmlns:a14="http://schemas.microsoft.com/office/drawing/2010/main" xmlns="">
+              <a14:hiddenEffects xmlns="" xmlns:a14="http://schemas.microsoft.com/office/drawing/2010/main">
                 <a:effectLst>
                   <a:outerShdw blurRad="63500" dist="38099" dir="2700000" algn="ctr" rotWithShape="0">
                     <a:schemeClr val="bg2">
@@ -36146,12 +36047,12 @@
           <a:effectLst/>
           <a:extLst>
             <a:ext uri="{909E8E84-426E-40dd-AFC4-6F175D3DCCD1}">
-              <a14:hiddenFill xmlns:a14="http://schemas.microsoft.com/office/drawing/2010/main" xmlns="">
+              <a14:hiddenFill xmlns="" xmlns:a14="http://schemas.microsoft.com/office/drawing/2010/main">
                 <a:noFill/>
               </a14:hiddenFill>
             </a:ext>
             <a:ext uri="{AF507438-7753-43e0-B8FC-AC1667EBCBE1}">
-              <a14:hiddenEffects xmlns:a14="http://schemas.microsoft.com/office/drawing/2010/main" xmlns="">
+              <a14:hiddenEffects xmlns="" xmlns:a14="http://schemas.microsoft.com/office/drawing/2010/main">
                 <a:effectLst>
                   <a:outerShdw blurRad="63500" dist="38099" dir="2700000" algn="ctr" rotWithShape="0">
                     <a:schemeClr val="bg2">
@@ -36194,14 +36095,14 @@
           <a:effectLst/>
           <a:extLst>
             <a:ext uri="{909E8E84-426E-40dd-AFC4-6F175D3DCCD1}">
-              <a14:hiddenFill xmlns:a14="http://schemas.microsoft.com/office/drawing/2010/main" xmlns="">
+              <a14:hiddenFill xmlns="" xmlns:a14="http://schemas.microsoft.com/office/drawing/2010/main">
                 <a:solidFill>
                   <a:schemeClr val="accent1"/>
                 </a:solidFill>
               </a14:hiddenFill>
             </a:ext>
             <a:ext uri="{91240B29-F687-4f45-9708-019B960494DF}">
-              <a14:hiddenLine xmlns:a14="http://schemas.microsoft.com/office/drawing/2010/main" xmlns="" w="9525">
+              <a14:hiddenLine xmlns="" xmlns:a14="http://schemas.microsoft.com/office/drawing/2010/main" w="9525">
                 <a:solidFill>
                   <a:schemeClr val="tx1"/>
                 </a:solidFill>
@@ -36211,7 +36112,7 @@
               </a14:hiddenLine>
             </a:ext>
             <a:ext uri="{AF507438-7753-43e0-B8FC-AC1667EBCBE1}">
-              <a14:hiddenEffects xmlns:a14="http://schemas.microsoft.com/office/drawing/2010/main" xmlns="">
+              <a14:hiddenEffects xmlns="" xmlns:a14="http://schemas.microsoft.com/office/drawing/2010/main">
                 <a:effectLst>
                   <a:outerShdw blurRad="63500" dist="38099" dir="2700000" algn="ctr" rotWithShape="0">
                     <a:schemeClr val="bg2">
@@ -36261,14 +36162,14 @@
           <a:effectLst/>
           <a:extLst>
             <a:ext uri="{909E8E84-426E-40dd-AFC4-6F175D3DCCD1}">
-              <a14:hiddenFill xmlns:a14="http://schemas.microsoft.com/office/drawing/2010/main" xmlns="">
+              <a14:hiddenFill xmlns="" xmlns:a14="http://schemas.microsoft.com/office/drawing/2010/main">
                 <a:solidFill>
                   <a:schemeClr val="accent1"/>
                 </a:solidFill>
               </a14:hiddenFill>
             </a:ext>
             <a:ext uri="{91240B29-F687-4f45-9708-019B960494DF}">
-              <a14:hiddenLine xmlns:a14="http://schemas.microsoft.com/office/drawing/2010/main" xmlns="" w="9525">
+              <a14:hiddenLine xmlns="" xmlns:a14="http://schemas.microsoft.com/office/drawing/2010/main" w="9525">
                 <a:solidFill>
                   <a:schemeClr val="tx1"/>
                 </a:solidFill>
@@ -36278,7 +36179,7 @@
               </a14:hiddenLine>
             </a:ext>
             <a:ext uri="{AF507438-7753-43e0-B8FC-AC1667EBCBE1}">
-              <a14:hiddenEffects xmlns:a14="http://schemas.microsoft.com/office/drawing/2010/main" xmlns="">
+              <a14:hiddenEffects xmlns="" xmlns:a14="http://schemas.microsoft.com/office/drawing/2010/main">
                 <a:effectLst>
                   <a:outerShdw blurRad="63500" dist="38099" dir="2700000" algn="ctr" rotWithShape="0">
                     <a:schemeClr val="bg2">
@@ -36333,12 +36234,12 @@
           <a:effectLst/>
           <a:extLst>
             <a:ext uri="{909E8E84-426E-40dd-AFC4-6F175D3DCCD1}">
-              <a14:hiddenFill xmlns:a14="http://schemas.microsoft.com/office/drawing/2010/main" xmlns="">
+              <a14:hiddenFill xmlns="" xmlns:a14="http://schemas.microsoft.com/office/drawing/2010/main">
                 <a:noFill/>
               </a14:hiddenFill>
             </a:ext>
             <a:ext uri="{AF507438-7753-43e0-B8FC-AC1667EBCBE1}">
-              <a14:hiddenEffects xmlns:a14="http://schemas.microsoft.com/office/drawing/2010/main" xmlns="">
+              <a14:hiddenEffects xmlns="" xmlns:a14="http://schemas.microsoft.com/office/drawing/2010/main">
                 <a:effectLst>
                   <a:outerShdw blurRad="63500" dist="38099" dir="2700000" algn="ctr" rotWithShape="0">
                     <a:schemeClr val="bg2">
@@ -36381,14 +36282,14 @@
           <a:effectLst/>
           <a:extLst>
             <a:ext uri="{909E8E84-426E-40dd-AFC4-6F175D3DCCD1}">
-              <a14:hiddenFill xmlns:a14="http://schemas.microsoft.com/office/drawing/2010/main" xmlns="">
+              <a14:hiddenFill xmlns="" xmlns:a14="http://schemas.microsoft.com/office/drawing/2010/main">
                 <a:solidFill>
                   <a:schemeClr val="accent1"/>
                 </a:solidFill>
               </a14:hiddenFill>
             </a:ext>
             <a:ext uri="{91240B29-F687-4f45-9708-019B960494DF}">
-              <a14:hiddenLine xmlns:a14="http://schemas.microsoft.com/office/drawing/2010/main" xmlns="" w="9525">
+              <a14:hiddenLine xmlns="" xmlns:a14="http://schemas.microsoft.com/office/drawing/2010/main" w="9525">
                 <a:solidFill>
                   <a:schemeClr val="tx1"/>
                 </a:solidFill>
@@ -36398,7 +36299,7 @@
               </a14:hiddenLine>
             </a:ext>
             <a:ext uri="{AF507438-7753-43e0-B8FC-AC1667EBCBE1}">
-              <a14:hiddenEffects xmlns:a14="http://schemas.microsoft.com/office/drawing/2010/main" xmlns="">
+              <a14:hiddenEffects xmlns="" xmlns:a14="http://schemas.microsoft.com/office/drawing/2010/main">
                 <a:effectLst>
                   <a:outerShdw blurRad="63500" dist="38099" dir="2700000" algn="ctr" rotWithShape="0">
                     <a:schemeClr val="bg2">
@@ -36455,14 +36356,14 @@
           <a:effectLst/>
           <a:extLst>
             <a:ext uri="{909E8E84-426E-40dd-AFC4-6F175D3DCCD1}">
-              <a14:hiddenFill xmlns:a14="http://schemas.microsoft.com/office/drawing/2010/main" xmlns="">
+              <a14:hiddenFill xmlns="" xmlns:a14="http://schemas.microsoft.com/office/drawing/2010/main">
                 <a:solidFill>
                   <a:schemeClr val="accent1"/>
                 </a:solidFill>
               </a14:hiddenFill>
             </a:ext>
             <a:ext uri="{91240B29-F687-4f45-9708-019B960494DF}">
-              <a14:hiddenLine xmlns:a14="http://schemas.microsoft.com/office/drawing/2010/main" xmlns="" w="9525">
+              <a14:hiddenLine xmlns="" xmlns:a14="http://schemas.microsoft.com/office/drawing/2010/main" w="9525">
                 <a:solidFill>
                   <a:schemeClr val="tx1"/>
                 </a:solidFill>
@@ -36472,7 +36373,7 @@
               </a14:hiddenLine>
             </a:ext>
             <a:ext uri="{AF507438-7753-43e0-B8FC-AC1667EBCBE1}">
-              <a14:hiddenEffects xmlns:a14="http://schemas.microsoft.com/office/drawing/2010/main" xmlns="">
+              <a14:hiddenEffects xmlns="" xmlns:a14="http://schemas.microsoft.com/office/drawing/2010/main">
                 <a:effectLst>
                   <a:outerShdw blurRad="63500" dist="38099" dir="2700000" algn="ctr" rotWithShape="0">
                     <a:schemeClr val="bg2">
@@ -36893,7 +36794,7 @@
             </a:pPr>
             <a:r>
               <a:rPr lang="en-US" dirty="0"/>
-              <a:t>Other ways of proving the IFF, but this is often the easiest</a:t>
+              <a:t>Other ways of proving the IFF, but this is often the easiest.</a:t>
             </a:r>
           </a:p>
         </p:txBody>
@@ -37011,12 +36912,12 @@
           <a:effectLst/>
           <a:extLst>
             <a:ext uri="{909E8E84-426E-40dd-AFC4-6F175D3DCCD1}">
-              <a14:hiddenFill xmlns:a14="http://schemas.microsoft.com/office/drawing/2010/main" xmlns="">
+              <a14:hiddenFill xmlns="" xmlns:a14="http://schemas.microsoft.com/office/drawing/2010/main">
                 <a:noFill/>
               </a14:hiddenFill>
             </a:ext>
             <a:ext uri="{AF507438-7753-43e0-B8FC-AC1667EBCBE1}">
-              <a14:hiddenEffects xmlns:a14="http://schemas.microsoft.com/office/drawing/2010/main" xmlns="">
+              <a14:hiddenEffects xmlns="" xmlns:a14="http://schemas.microsoft.com/office/drawing/2010/main">
                 <a:effectLst>
                   <a:outerShdw blurRad="63500" dist="38099" dir="2700000" algn="ctr" rotWithShape="0">
                     <a:schemeClr val="bg2">
@@ -37149,12 +37050,12 @@
           <a:effectLst/>
           <a:extLst>
             <a:ext uri="{909E8E84-426E-40dd-AFC4-6F175D3DCCD1}">
-              <a14:hiddenFill xmlns:a14="http://schemas.microsoft.com/office/drawing/2010/main" xmlns="">
+              <a14:hiddenFill xmlns="" xmlns:a14="http://schemas.microsoft.com/office/drawing/2010/main">
                 <a:noFill/>
               </a14:hiddenFill>
             </a:ext>
             <a:ext uri="{AF507438-7753-43e0-B8FC-AC1667EBCBE1}">
-              <a14:hiddenEffects xmlns:a14="http://schemas.microsoft.com/office/drawing/2010/main" xmlns="">
+              <a14:hiddenEffects xmlns="" xmlns:a14="http://schemas.microsoft.com/office/drawing/2010/main">
                 <a:effectLst>
                   <a:outerShdw blurRad="63500" dist="38099" dir="2700000" algn="ctr" rotWithShape="0">
                     <a:schemeClr val="bg2">

</xml_diff>

<commit_message>
Review lecture 24 on NP-Complete reductions
For the purposes of completing assignment 11
</commit_message>
<xml_diff>
--- a/Lectures/Lecture 24_NP-Complete Reductions.pptx
+++ b/Lectures/Lecture 24_NP-Complete Reductions.pptx
@@ -9438,7 +9438,7 @@
           <a:effectLst/>
           <a:extLst>
             <a:ext uri="{AF507438-7753-43e0-B8FC-AC1667EBCBE1}">
-              <a14:hiddenEffects xmlns:a14="http://schemas.microsoft.com/office/drawing/2010/main" xmlns="">
+              <a14:hiddenEffects xmlns="" xmlns:a14="http://schemas.microsoft.com/office/drawing/2010/main">
                 <a:effectLst>
                   <a:outerShdw blurRad="63500" dist="38099" dir="2700000" algn="ctr" rotWithShape="0">
                     <a:schemeClr val="bg2">
@@ -9492,12 +9492,12 @@
           <a:effectLst/>
           <a:extLst>
             <a:ext uri="{909E8E84-426E-40dd-AFC4-6F175D3DCCD1}">
-              <a14:hiddenFill xmlns:a14="http://schemas.microsoft.com/office/drawing/2010/main" xmlns="">
+              <a14:hiddenFill xmlns="" xmlns:a14="http://schemas.microsoft.com/office/drawing/2010/main">
                 <a:noFill/>
               </a14:hiddenFill>
             </a:ext>
             <a:ext uri="{AF507438-7753-43e0-B8FC-AC1667EBCBE1}">
-              <a14:hiddenEffects xmlns:a14="http://schemas.microsoft.com/office/drawing/2010/main" xmlns="">
+              <a14:hiddenEffects xmlns="" xmlns:a14="http://schemas.microsoft.com/office/drawing/2010/main">
                 <a:effectLst>
                   <a:outerShdw blurRad="63500" dist="38099" dir="2700000" algn="ctr" rotWithShape="0">
                     <a:schemeClr val="bg2">
@@ -9540,14 +9540,14 @@
           <a:effectLst/>
           <a:extLst>
             <a:ext uri="{909E8E84-426E-40dd-AFC4-6F175D3DCCD1}">
-              <a14:hiddenFill xmlns:a14="http://schemas.microsoft.com/office/drawing/2010/main" xmlns="">
+              <a14:hiddenFill xmlns="" xmlns:a14="http://schemas.microsoft.com/office/drawing/2010/main">
                 <a:solidFill>
                   <a:schemeClr val="accent1"/>
                 </a:solidFill>
               </a14:hiddenFill>
             </a:ext>
             <a:ext uri="{91240B29-F687-4f45-9708-019B960494DF}">
-              <a14:hiddenLine xmlns:a14="http://schemas.microsoft.com/office/drawing/2010/main" xmlns="" w="9525">
+              <a14:hiddenLine xmlns="" xmlns:a14="http://schemas.microsoft.com/office/drawing/2010/main" w="9525">
                 <a:solidFill>
                   <a:schemeClr val="tx1"/>
                 </a:solidFill>
@@ -9557,7 +9557,7 @@
               </a14:hiddenLine>
             </a:ext>
             <a:ext uri="{AF507438-7753-43e0-B8FC-AC1667EBCBE1}">
-              <a14:hiddenEffects xmlns:a14="http://schemas.microsoft.com/office/drawing/2010/main" xmlns="">
+              <a14:hiddenEffects xmlns="" xmlns:a14="http://schemas.microsoft.com/office/drawing/2010/main">
                 <a:effectLst>
                   <a:outerShdw blurRad="63500" dist="38099" dir="2700000" algn="ctr" rotWithShape="0">
                     <a:schemeClr val="bg2">
@@ -9607,14 +9607,14 @@
           <a:effectLst/>
           <a:extLst>
             <a:ext uri="{909E8E84-426E-40dd-AFC4-6F175D3DCCD1}">
-              <a14:hiddenFill xmlns:a14="http://schemas.microsoft.com/office/drawing/2010/main" xmlns="">
+              <a14:hiddenFill xmlns="" xmlns:a14="http://schemas.microsoft.com/office/drawing/2010/main">
                 <a:solidFill>
                   <a:schemeClr val="accent1"/>
                 </a:solidFill>
               </a14:hiddenFill>
             </a:ext>
             <a:ext uri="{91240B29-F687-4f45-9708-019B960494DF}">
-              <a14:hiddenLine xmlns:a14="http://schemas.microsoft.com/office/drawing/2010/main" xmlns="" w="9525">
+              <a14:hiddenLine xmlns="" xmlns:a14="http://schemas.microsoft.com/office/drawing/2010/main" w="9525">
                 <a:solidFill>
                   <a:schemeClr val="tx1"/>
                 </a:solidFill>
@@ -9624,7 +9624,7 @@
               </a14:hiddenLine>
             </a:ext>
             <a:ext uri="{AF507438-7753-43e0-B8FC-AC1667EBCBE1}">
-              <a14:hiddenEffects xmlns:a14="http://schemas.microsoft.com/office/drawing/2010/main" xmlns="">
+              <a14:hiddenEffects xmlns="" xmlns:a14="http://schemas.microsoft.com/office/drawing/2010/main">
                 <a:effectLst>
                   <a:outerShdw blurRad="63500" dist="38099" dir="2700000" algn="ctr" rotWithShape="0">
                     <a:schemeClr val="bg2">
@@ -9679,12 +9679,12 @@
           <a:effectLst/>
           <a:extLst>
             <a:ext uri="{909E8E84-426E-40dd-AFC4-6F175D3DCCD1}">
-              <a14:hiddenFill xmlns:a14="http://schemas.microsoft.com/office/drawing/2010/main" xmlns="">
+              <a14:hiddenFill xmlns="" xmlns:a14="http://schemas.microsoft.com/office/drawing/2010/main">
                 <a:noFill/>
               </a14:hiddenFill>
             </a:ext>
             <a:ext uri="{AF507438-7753-43e0-B8FC-AC1667EBCBE1}">
-              <a14:hiddenEffects xmlns:a14="http://schemas.microsoft.com/office/drawing/2010/main" xmlns="">
+              <a14:hiddenEffects xmlns="" xmlns:a14="http://schemas.microsoft.com/office/drawing/2010/main">
                 <a:effectLst>
                   <a:outerShdw blurRad="63500" dist="38099" dir="2700000" algn="ctr" rotWithShape="0">
                     <a:schemeClr val="bg2">
@@ -9727,14 +9727,14 @@
           <a:effectLst/>
           <a:extLst>
             <a:ext uri="{909E8E84-426E-40dd-AFC4-6F175D3DCCD1}">
-              <a14:hiddenFill xmlns:a14="http://schemas.microsoft.com/office/drawing/2010/main" xmlns="">
+              <a14:hiddenFill xmlns="" xmlns:a14="http://schemas.microsoft.com/office/drawing/2010/main">
                 <a:solidFill>
                   <a:schemeClr val="accent1"/>
                 </a:solidFill>
               </a14:hiddenFill>
             </a:ext>
             <a:ext uri="{91240B29-F687-4f45-9708-019B960494DF}">
-              <a14:hiddenLine xmlns:a14="http://schemas.microsoft.com/office/drawing/2010/main" xmlns="" w="9525">
+              <a14:hiddenLine xmlns="" xmlns:a14="http://schemas.microsoft.com/office/drawing/2010/main" w="9525">
                 <a:solidFill>
                   <a:schemeClr val="tx1"/>
                 </a:solidFill>
@@ -9744,7 +9744,7 @@
               </a14:hiddenLine>
             </a:ext>
             <a:ext uri="{AF507438-7753-43e0-B8FC-AC1667EBCBE1}">
-              <a14:hiddenEffects xmlns:a14="http://schemas.microsoft.com/office/drawing/2010/main" xmlns="">
+              <a14:hiddenEffects xmlns="" xmlns:a14="http://schemas.microsoft.com/office/drawing/2010/main">
                 <a:effectLst>
                   <a:outerShdw blurRad="63500" dist="38099" dir="2700000" algn="ctr" rotWithShape="0">
                     <a:schemeClr val="bg2">
@@ -9807,14 +9807,14 @@
           <a:effectLst/>
           <a:extLst>
             <a:ext uri="{909E8E84-426E-40dd-AFC4-6F175D3DCCD1}">
-              <a14:hiddenFill xmlns:a14="http://schemas.microsoft.com/office/drawing/2010/main" xmlns="">
+              <a14:hiddenFill xmlns="" xmlns:a14="http://schemas.microsoft.com/office/drawing/2010/main">
                 <a:solidFill>
                   <a:schemeClr val="accent1"/>
                 </a:solidFill>
               </a14:hiddenFill>
             </a:ext>
             <a:ext uri="{91240B29-F687-4f45-9708-019B960494DF}">
-              <a14:hiddenLine xmlns:a14="http://schemas.microsoft.com/office/drawing/2010/main" xmlns="" w="9525">
+              <a14:hiddenLine xmlns="" xmlns:a14="http://schemas.microsoft.com/office/drawing/2010/main" w="9525">
                 <a:solidFill>
                   <a:schemeClr val="tx1"/>
                 </a:solidFill>
@@ -9824,7 +9824,7 @@
               </a14:hiddenLine>
             </a:ext>
             <a:ext uri="{AF507438-7753-43e0-B8FC-AC1667EBCBE1}">
-              <a14:hiddenEffects xmlns:a14="http://schemas.microsoft.com/office/drawing/2010/main" xmlns="">
+              <a14:hiddenEffects xmlns="" xmlns:a14="http://schemas.microsoft.com/office/drawing/2010/main">
                 <a:effectLst>
                   <a:outerShdw blurRad="63500" dist="38099" dir="2700000" algn="ctr" rotWithShape="0">
                     <a:schemeClr val="bg2">
@@ -10025,12 +10025,12 @@
           <a:effectLst/>
           <a:extLst>
             <a:ext uri="{909E8E84-426E-40dd-AFC4-6F175D3DCCD1}">
-              <a14:hiddenFill xmlns:a14="http://schemas.microsoft.com/office/drawing/2010/main" xmlns="">
+              <a14:hiddenFill xmlns="" xmlns:a14="http://schemas.microsoft.com/office/drawing/2010/main">
                 <a:noFill/>
               </a14:hiddenFill>
             </a:ext>
             <a:ext uri="{AF507438-7753-43e0-B8FC-AC1667EBCBE1}">
-              <a14:hiddenEffects xmlns:a14="http://schemas.microsoft.com/office/drawing/2010/main" xmlns="">
+              <a14:hiddenEffects xmlns="" xmlns:a14="http://schemas.microsoft.com/office/drawing/2010/main">
                 <a:effectLst>
                   <a:outerShdw blurRad="63500" dist="38099" dir="2700000" algn="ctr" rotWithShape="0">
                     <a:schemeClr val="bg2">
@@ -10079,12 +10079,12 @@
           <a:effectLst/>
           <a:extLst>
             <a:ext uri="{909E8E84-426E-40dd-AFC4-6F175D3DCCD1}">
-              <a14:hiddenFill xmlns:a14="http://schemas.microsoft.com/office/drawing/2010/main" xmlns="">
+              <a14:hiddenFill xmlns="" xmlns:a14="http://schemas.microsoft.com/office/drawing/2010/main">
                 <a:noFill/>
               </a14:hiddenFill>
             </a:ext>
             <a:ext uri="{AF507438-7753-43e0-B8FC-AC1667EBCBE1}">
-              <a14:hiddenEffects xmlns:a14="http://schemas.microsoft.com/office/drawing/2010/main" xmlns="">
+              <a14:hiddenEffects xmlns="" xmlns:a14="http://schemas.microsoft.com/office/drawing/2010/main">
                 <a:effectLst>
                   <a:outerShdw blurRad="63500" dist="38099" dir="2700000" algn="ctr" rotWithShape="0">
                     <a:schemeClr val="bg2">
@@ -10186,7 +10186,7 @@
           <a:effectLst/>
           <a:extLst>
             <a:ext uri="{AF507438-7753-43e0-B8FC-AC1667EBCBE1}">
-              <a14:hiddenEffects xmlns:a14="http://schemas.microsoft.com/office/drawing/2010/main" xmlns="">
+              <a14:hiddenEffects xmlns="" xmlns:a14="http://schemas.microsoft.com/office/drawing/2010/main">
                 <a:effectLst>
                   <a:outerShdw blurRad="63500" dist="38099" dir="2700000" algn="ctr" rotWithShape="0">
                     <a:schemeClr val="bg2">
@@ -10240,12 +10240,12 @@
           <a:effectLst/>
           <a:extLst>
             <a:ext uri="{909E8E84-426E-40dd-AFC4-6F175D3DCCD1}">
-              <a14:hiddenFill xmlns:a14="http://schemas.microsoft.com/office/drawing/2010/main" xmlns="">
+              <a14:hiddenFill xmlns="" xmlns:a14="http://schemas.microsoft.com/office/drawing/2010/main">
                 <a:noFill/>
               </a14:hiddenFill>
             </a:ext>
             <a:ext uri="{AF507438-7753-43e0-B8FC-AC1667EBCBE1}">
-              <a14:hiddenEffects xmlns:a14="http://schemas.microsoft.com/office/drawing/2010/main" xmlns="">
+              <a14:hiddenEffects xmlns="" xmlns:a14="http://schemas.microsoft.com/office/drawing/2010/main">
                 <a:effectLst>
                   <a:outerShdw blurRad="63500" dist="38099" dir="2700000" algn="ctr" rotWithShape="0">
                     <a:schemeClr val="bg2">
@@ -10288,14 +10288,14 @@
           <a:effectLst/>
           <a:extLst>
             <a:ext uri="{909E8E84-426E-40dd-AFC4-6F175D3DCCD1}">
-              <a14:hiddenFill xmlns:a14="http://schemas.microsoft.com/office/drawing/2010/main" xmlns="">
+              <a14:hiddenFill xmlns="" xmlns:a14="http://schemas.microsoft.com/office/drawing/2010/main">
                 <a:solidFill>
                   <a:schemeClr val="accent1"/>
                 </a:solidFill>
               </a14:hiddenFill>
             </a:ext>
             <a:ext uri="{91240B29-F687-4f45-9708-019B960494DF}">
-              <a14:hiddenLine xmlns:a14="http://schemas.microsoft.com/office/drawing/2010/main" xmlns="" w="9525">
+              <a14:hiddenLine xmlns="" xmlns:a14="http://schemas.microsoft.com/office/drawing/2010/main" w="9525">
                 <a:solidFill>
                   <a:schemeClr val="tx1"/>
                 </a:solidFill>
@@ -10305,7 +10305,7 @@
               </a14:hiddenLine>
             </a:ext>
             <a:ext uri="{AF507438-7753-43e0-B8FC-AC1667EBCBE1}">
-              <a14:hiddenEffects xmlns:a14="http://schemas.microsoft.com/office/drawing/2010/main" xmlns="">
+              <a14:hiddenEffects xmlns="" xmlns:a14="http://schemas.microsoft.com/office/drawing/2010/main">
                 <a:effectLst>
                   <a:outerShdw blurRad="63500" dist="38099" dir="2700000" algn="ctr" rotWithShape="0">
                     <a:schemeClr val="bg2">
@@ -10355,14 +10355,14 @@
           <a:effectLst/>
           <a:extLst>
             <a:ext uri="{909E8E84-426E-40dd-AFC4-6F175D3DCCD1}">
-              <a14:hiddenFill xmlns:a14="http://schemas.microsoft.com/office/drawing/2010/main" xmlns="">
+              <a14:hiddenFill xmlns="" xmlns:a14="http://schemas.microsoft.com/office/drawing/2010/main">
                 <a:solidFill>
                   <a:schemeClr val="accent1"/>
                 </a:solidFill>
               </a14:hiddenFill>
             </a:ext>
             <a:ext uri="{91240B29-F687-4f45-9708-019B960494DF}">
-              <a14:hiddenLine xmlns:a14="http://schemas.microsoft.com/office/drawing/2010/main" xmlns="" w="9525">
+              <a14:hiddenLine xmlns="" xmlns:a14="http://schemas.microsoft.com/office/drawing/2010/main" w="9525">
                 <a:solidFill>
                   <a:schemeClr val="tx1"/>
                 </a:solidFill>
@@ -10372,7 +10372,7 @@
               </a14:hiddenLine>
             </a:ext>
             <a:ext uri="{AF507438-7753-43e0-B8FC-AC1667EBCBE1}">
-              <a14:hiddenEffects xmlns:a14="http://schemas.microsoft.com/office/drawing/2010/main" xmlns="">
+              <a14:hiddenEffects xmlns="" xmlns:a14="http://schemas.microsoft.com/office/drawing/2010/main">
                 <a:effectLst>
                   <a:outerShdw blurRad="63500" dist="38099" dir="2700000" algn="ctr" rotWithShape="0">
                     <a:schemeClr val="bg2">
@@ -10427,12 +10427,12 @@
           <a:effectLst/>
           <a:extLst>
             <a:ext uri="{909E8E84-426E-40dd-AFC4-6F175D3DCCD1}">
-              <a14:hiddenFill xmlns:a14="http://schemas.microsoft.com/office/drawing/2010/main" xmlns="">
+              <a14:hiddenFill xmlns="" xmlns:a14="http://schemas.microsoft.com/office/drawing/2010/main">
                 <a:noFill/>
               </a14:hiddenFill>
             </a:ext>
             <a:ext uri="{AF507438-7753-43e0-B8FC-AC1667EBCBE1}">
-              <a14:hiddenEffects xmlns:a14="http://schemas.microsoft.com/office/drawing/2010/main" xmlns="">
+              <a14:hiddenEffects xmlns="" xmlns:a14="http://schemas.microsoft.com/office/drawing/2010/main">
                 <a:effectLst>
                   <a:outerShdw blurRad="63500" dist="38099" dir="2700000" algn="ctr" rotWithShape="0">
                     <a:schemeClr val="bg2">
@@ -10475,14 +10475,14 @@
           <a:effectLst/>
           <a:extLst>
             <a:ext uri="{909E8E84-426E-40dd-AFC4-6F175D3DCCD1}">
-              <a14:hiddenFill xmlns:a14="http://schemas.microsoft.com/office/drawing/2010/main" xmlns="">
+              <a14:hiddenFill xmlns="" xmlns:a14="http://schemas.microsoft.com/office/drawing/2010/main">
                 <a:solidFill>
                   <a:schemeClr val="accent1"/>
                 </a:solidFill>
               </a14:hiddenFill>
             </a:ext>
             <a:ext uri="{91240B29-F687-4f45-9708-019B960494DF}">
-              <a14:hiddenLine xmlns:a14="http://schemas.microsoft.com/office/drawing/2010/main" xmlns="" w="9525">
+              <a14:hiddenLine xmlns="" xmlns:a14="http://schemas.microsoft.com/office/drawing/2010/main" w="9525">
                 <a:solidFill>
                   <a:schemeClr val="tx1"/>
                 </a:solidFill>
@@ -10492,7 +10492,7 @@
               </a14:hiddenLine>
             </a:ext>
             <a:ext uri="{AF507438-7753-43e0-B8FC-AC1667EBCBE1}">
-              <a14:hiddenEffects xmlns:a14="http://schemas.microsoft.com/office/drawing/2010/main" xmlns="">
+              <a14:hiddenEffects xmlns="" xmlns:a14="http://schemas.microsoft.com/office/drawing/2010/main">
                 <a:effectLst>
                   <a:outerShdw blurRad="63500" dist="38099" dir="2700000" algn="ctr" rotWithShape="0">
                     <a:schemeClr val="bg2">
@@ -10552,14 +10552,14 @@
           <a:effectLst/>
           <a:extLst>
             <a:ext uri="{909E8E84-426E-40dd-AFC4-6F175D3DCCD1}">
-              <a14:hiddenFill xmlns:a14="http://schemas.microsoft.com/office/drawing/2010/main" xmlns="">
+              <a14:hiddenFill xmlns="" xmlns:a14="http://schemas.microsoft.com/office/drawing/2010/main">
                 <a:solidFill>
                   <a:schemeClr val="accent1"/>
                 </a:solidFill>
               </a14:hiddenFill>
             </a:ext>
             <a:ext uri="{91240B29-F687-4f45-9708-019B960494DF}">
-              <a14:hiddenLine xmlns:a14="http://schemas.microsoft.com/office/drawing/2010/main" xmlns="" w="9525">
+              <a14:hiddenLine xmlns="" xmlns:a14="http://schemas.microsoft.com/office/drawing/2010/main" w="9525">
                 <a:solidFill>
                   <a:schemeClr val="tx1"/>
                 </a:solidFill>
@@ -10569,7 +10569,7 @@
               </a14:hiddenLine>
             </a:ext>
             <a:ext uri="{AF507438-7753-43e0-B8FC-AC1667EBCBE1}">
-              <a14:hiddenEffects xmlns:a14="http://schemas.microsoft.com/office/drawing/2010/main" xmlns="">
+              <a14:hiddenEffects xmlns="" xmlns:a14="http://schemas.microsoft.com/office/drawing/2010/main">
                 <a:effectLst>
                   <a:outerShdw blurRad="63500" dist="38099" dir="2700000" algn="ctr" rotWithShape="0">
                     <a:schemeClr val="bg2">
@@ -11950,12 +11950,12 @@
           <a:effectLst/>
           <a:extLst>
             <a:ext uri="{909E8E84-426E-40dd-AFC4-6F175D3DCCD1}">
-              <a14:hiddenFill xmlns:a14="http://schemas.microsoft.com/office/drawing/2010/main" xmlns="">
+              <a14:hiddenFill xmlns="" xmlns:a14="http://schemas.microsoft.com/office/drawing/2010/main">
                 <a:noFill/>
               </a14:hiddenFill>
             </a:ext>
             <a:ext uri="{AF507438-7753-43e0-B8FC-AC1667EBCBE1}">
-              <a14:hiddenEffects xmlns:a14="http://schemas.microsoft.com/office/drawing/2010/main" xmlns="">
+              <a14:hiddenEffects xmlns="" xmlns:a14="http://schemas.microsoft.com/office/drawing/2010/main">
                 <a:effectLst>
                   <a:outerShdw blurRad="63500" dist="38099" dir="2700000" algn="ctr" rotWithShape="0">
                     <a:schemeClr val="bg2">
@@ -12088,12 +12088,12 @@
           <a:effectLst/>
           <a:extLst>
             <a:ext uri="{909E8E84-426E-40dd-AFC4-6F175D3DCCD1}">
-              <a14:hiddenFill xmlns:a14="http://schemas.microsoft.com/office/drawing/2010/main" xmlns="">
+              <a14:hiddenFill xmlns="" xmlns:a14="http://schemas.microsoft.com/office/drawing/2010/main">
                 <a:noFill/>
               </a14:hiddenFill>
             </a:ext>
             <a:ext uri="{AF507438-7753-43e0-B8FC-AC1667EBCBE1}">
-              <a14:hiddenEffects xmlns:a14="http://schemas.microsoft.com/office/drawing/2010/main" xmlns="">
+              <a14:hiddenEffects xmlns="" xmlns:a14="http://schemas.microsoft.com/office/drawing/2010/main">
                 <a:effectLst>
                   <a:outerShdw blurRad="63500" dist="38099" dir="2700000" algn="ctr" rotWithShape="0">
                     <a:schemeClr val="bg2">
@@ -13679,14 +13679,14 @@
           <a:effectLst/>
           <a:extLst>
             <a:ext uri="{909E8E84-426E-40dd-AFC4-6F175D3DCCD1}">
-              <a14:hiddenFill xmlns:a14="http://schemas.microsoft.com/office/drawing/2010/main" xmlns="">
+              <a14:hiddenFill xmlns="" xmlns:a14="http://schemas.microsoft.com/office/drawing/2010/main">
                 <a:solidFill>
                   <a:schemeClr val="accent1"/>
                 </a:solidFill>
               </a14:hiddenFill>
             </a:ext>
             <a:ext uri="{91240B29-F687-4f45-9708-019B960494DF}">
-              <a14:hiddenLine xmlns:a14="http://schemas.microsoft.com/office/drawing/2010/main" xmlns="" w="9525">
+              <a14:hiddenLine xmlns="" xmlns:a14="http://schemas.microsoft.com/office/drawing/2010/main" w="9525">
                 <a:solidFill>
                   <a:schemeClr val="tx1"/>
                 </a:solidFill>
@@ -13696,7 +13696,7 @@
               </a14:hiddenLine>
             </a:ext>
             <a:ext uri="{AF507438-7753-43e0-B8FC-AC1667EBCBE1}">
-              <a14:hiddenEffects xmlns:a14="http://schemas.microsoft.com/office/drawing/2010/main" xmlns="">
+              <a14:hiddenEffects xmlns="" xmlns:a14="http://schemas.microsoft.com/office/drawing/2010/main">
                 <a:effectLst>
                   <a:outerShdw blurRad="63500" dist="38099" dir="2700000" algn="ctr" rotWithShape="0">
                     <a:schemeClr val="bg2">
@@ -14924,14 +14924,14 @@
           <a:effectLst/>
           <a:extLst>
             <a:ext uri="{909E8E84-426E-40dd-AFC4-6F175D3DCCD1}">
-              <a14:hiddenFill xmlns:a14="http://schemas.microsoft.com/office/drawing/2010/main" xmlns="">
+              <a14:hiddenFill xmlns="" xmlns:a14="http://schemas.microsoft.com/office/drawing/2010/main">
                 <a:solidFill>
                   <a:schemeClr val="accent1"/>
                 </a:solidFill>
               </a14:hiddenFill>
             </a:ext>
             <a:ext uri="{91240B29-F687-4f45-9708-019B960494DF}">
-              <a14:hiddenLine xmlns:a14="http://schemas.microsoft.com/office/drawing/2010/main" xmlns="" w="9525">
+              <a14:hiddenLine xmlns="" xmlns:a14="http://schemas.microsoft.com/office/drawing/2010/main" w="9525">
                 <a:solidFill>
                   <a:schemeClr val="tx1"/>
                 </a:solidFill>
@@ -14941,7 +14941,7 @@
               </a14:hiddenLine>
             </a:ext>
             <a:ext uri="{AF507438-7753-43e0-B8FC-AC1667EBCBE1}">
-              <a14:hiddenEffects xmlns:a14="http://schemas.microsoft.com/office/drawing/2010/main" xmlns="">
+              <a14:hiddenEffects xmlns="" xmlns:a14="http://schemas.microsoft.com/office/drawing/2010/main">
                 <a:effectLst>
                   <a:outerShdw blurRad="63500" dist="38099" dir="2700000" algn="ctr" rotWithShape="0">
                     <a:schemeClr val="bg2">
@@ -16328,12 +16328,12 @@
           <a:effectLst/>
           <a:extLst>
             <a:ext uri="{909E8E84-426E-40dd-AFC4-6F175D3DCCD1}">
-              <a14:hiddenFill xmlns:a14="http://schemas.microsoft.com/office/drawing/2010/main" xmlns="">
+              <a14:hiddenFill xmlns="" xmlns:a14="http://schemas.microsoft.com/office/drawing/2010/main">
                 <a:noFill/>
               </a14:hiddenFill>
             </a:ext>
             <a:ext uri="{AF507438-7753-43e0-B8FC-AC1667EBCBE1}">
-              <a14:hiddenEffects xmlns:a14="http://schemas.microsoft.com/office/drawing/2010/main" xmlns="">
+              <a14:hiddenEffects xmlns="" xmlns:a14="http://schemas.microsoft.com/office/drawing/2010/main">
                 <a:effectLst>
                   <a:outerShdw blurRad="63500" dist="38099" dir="2700000" algn="ctr" rotWithShape="0">
                     <a:schemeClr val="bg2">
@@ -16466,12 +16466,12 @@
           <a:effectLst/>
           <a:extLst>
             <a:ext uri="{909E8E84-426E-40dd-AFC4-6F175D3DCCD1}">
-              <a14:hiddenFill xmlns:a14="http://schemas.microsoft.com/office/drawing/2010/main" xmlns="">
+              <a14:hiddenFill xmlns="" xmlns:a14="http://schemas.microsoft.com/office/drawing/2010/main">
                 <a:noFill/>
               </a14:hiddenFill>
             </a:ext>
             <a:ext uri="{AF507438-7753-43e0-B8FC-AC1667EBCBE1}">
-              <a14:hiddenEffects xmlns:a14="http://schemas.microsoft.com/office/drawing/2010/main" xmlns="">
+              <a14:hiddenEffects xmlns="" xmlns:a14="http://schemas.microsoft.com/office/drawing/2010/main">
                 <a:effectLst>
                   <a:outerShdw blurRad="63500" dist="38099" dir="2700000" algn="ctr" rotWithShape="0">
                     <a:schemeClr val="bg2">
@@ -17029,14 +17029,14 @@
           <a:effectLst/>
           <a:extLst>
             <a:ext uri="{909E8E84-426E-40dd-AFC4-6F175D3DCCD1}">
-              <a14:hiddenFill xmlns:a14="http://schemas.microsoft.com/office/drawing/2010/main" xmlns="">
+              <a14:hiddenFill xmlns="" xmlns:a14="http://schemas.microsoft.com/office/drawing/2010/main">
                 <a:solidFill>
                   <a:schemeClr val="accent1"/>
                 </a:solidFill>
               </a14:hiddenFill>
             </a:ext>
             <a:ext uri="{91240B29-F687-4f45-9708-019B960494DF}">
-              <a14:hiddenLine xmlns:a14="http://schemas.microsoft.com/office/drawing/2010/main" xmlns="" w="9525">
+              <a14:hiddenLine xmlns="" xmlns:a14="http://schemas.microsoft.com/office/drawing/2010/main" w="9525">
                 <a:solidFill>
                   <a:schemeClr val="tx1"/>
                 </a:solidFill>
@@ -17046,7 +17046,7 @@
               </a14:hiddenLine>
             </a:ext>
             <a:ext uri="{AF507438-7753-43e0-B8FC-AC1667EBCBE1}">
-              <a14:hiddenEffects xmlns:a14="http://schemas.microsoft.com/office/drawing/2010/main" xmlns="">
+              <a14:hiddenEffects xmlns="" xmlns:a14="http://schemas.microsoft.com/office/drawing/2010/main">
                 <a:effectLst>
                   <a:outerShdw blurRad="63500" dist="38099" dir="2700000" algn="ctr" rotWithShape="0">
                     <a:schemeClr val="bg2">
@@ -17435,14 +17435,14 @@
           <a:effectLst/>
           <a:extLst>
             <a:ext uri="{909E8E84-426E-40dd-AFC4-6F175D3DCCD1}">
-              <a14:hiddenFill xmlns:a14="http://schemas.microsoft.com/office/drawing/2010/main" xmlns="">
+              <a14:hiddenFill xmlns="" xmlns:a14="http://schemas.microsoft.com/office/drawing/2010/main">
                 <a:solidFill>
                   <a:schemeClr val="accent1"/>
                 </a:solidFill>
               </a14:hiddenFill>
             </a:ext>
             <a:ext uri="{91240B29-F687-4f45-9708-019B960494DF}">
-              <a14:hiddenLine xmlns:a14="http://schemas.microsoft.com/office/drawing/2010/main" xmlns="" w="9525">
+              <a14:hiddenLine xmlns="" xmlns:a14="http://schemas.microsoft.com/office/drawing/2010/main" w="9525">
                 <a:solidFill>
                   <a:schemeClr val="tx1"/>
                 </a:solidFill>
@@ -17452,7 +17452,7 @@
               </a14:hiddenLine>
             </a:ext>
             <a:ext uri="{AF507438-7753-43e0-B8FC-AC1667EBCBE1}">
-              <a14:hiddenEffects xmlns:a14="http://schemas.microsoft.com/office/drawing/2010/main" xmlns="">
+              <a14:hiddenEffects xmlns="" xmlns:a14="http://schemas.microsoft.com/office/drawing/2010/main">
                 <a:effectLst>
                   <a:outerShdw blurRad="63500" dist="38099" dir="2700000" algn="ctr" rotWithShape="0">
                     <a:schemeClr val="bg2">
@@ -18225,7 +18225,7 @@
             <a:effectLst/>
             <a:extLst>
               <a:ext uri="{AF507438-7753-43e0-B8FC-AC1667EBCBE1}">
-                <a14:hiddenEffects xmlns:a14="http://schemas.microsoft.com/office/drawing/2010/main" xmlns="">
+                <a14:hiddenEffects xmlns="" xmlns:a14="http://schemas.microsoft.com/office/drawing/2010/main">
                   <a:effectLst>
                     <a:outerShdw blurRad="63500" dist="38099" dir="2700000" algn="ctr" rotWithShape="0">
                       <a:schemeClr val="bg2">
@@ -18271,14 +18271,14 @@
             <a:effectLst/>
             <a:extLst>
               <a:ext uri="{909E8E84-426E-40dd-AFC4-6F175D3DCCD1}">
-                <a14:hiddenFill xmlns:a14="http://schemas.microsoft.com/office/drawing/2010/main" xmlns="">
+                <a14:hiddenFill xmlns="" xmlns:a14="http://schemas.microsoft.com/office/drawing/2010/main">
                   <a:solidFill>
                     <a:schemeClr val="accent1"/>
                   </a:solidFill>
                 </a14:hiddenFill>
               </a:ext>
               <a:ext uri="{91240B29-F687-4f45-9708-019B960494DF}">
-                <a14:hiddenLine xmlns:a14="http://schemas.microsoft.com/office/drawing/2010/main" xmlns="" w="9525">
+                <a14:hiddenLine xmlns="" xmlns:a14="http://schemas.microsoft.com/office/drawing/2010/main" w="9525">
                   <a:solidFill>
                     <a:schemeClr val="tx1"/>
                   </a:solidFill>
@@ -18288,7 +18288,7 @@
                 </a14:hiddenLine>
               </a:ext>
               <a:ext uri="{AF507438-7753-43e0-B8FC-AC1667EBCBE1}">
-                <a14:hiddenEffects xmlns:a14="http://schemas.microsoft.com/office/drawing/2010/main" xmlns="">
+                <a14:hiddenEffects xmlns="" xmlns:a14="http://schemas.microsoft.com/office/drawing/2010/main">
                   <a:effectLst>
                     <a:outerShdw blurRad="63500" dist="38099" dir="2700000" algn="ctr" rotWithShape="0">
                       <a:schemeClr val="bg2">
@@ -18366,7 +18366,7 @@
             <a:effectLst/>
             <a:extLst>
               <a:ext uri="{AF507438-7753-43e0-B8FC-AC1667EBCBE1}">
-                <a14:hiddenEffects xmlns:a14="http://schemas.microsoft.com/office/drawing/2010/main" xmlns="">
+                <a14:hiddenEffects xmlns="" xmlns:a14="http://schemas.microsoft.com/office/drawing/2010/main">
                   <a:effectLst>
                     <a:outerShdw blurRad="63500" dist="38099" dir="2700000" algn="ctr" rotWithShape="0">
                       <a:schemeClr val="bg2">
@@ -18412,14 +18412,14 @@
             <a:effectLst/>
             <a:extLst>
               <a:ext uri="{909E8E84-426E-40dd-AFC4-6F175D3DCCD1}">
-                <a14:hiddenFill xmlns:a14="http://schemas.microsoft.com/office/drawing/2010/main" xmlns="">
+                <a14:hiddenFill xmlns="" xmlns:a14="http://schemas.microsoft.com/office/drawing/2010/main">
                   <a:solidFill>
                     <a:schemeClr val="accent1"/>
                   </a:solidFill>
                 </a14:hiddenFill>
               </a:ext>
               <a:ext uri="{91240B29-F687-4f45-9708-019B960494DF}">
-                <a14:hiddenLine xmlns:a14="http://schemas.microsoft.com/office/drawing/2010/main" xmlns="" w="9525">
+                <a14:hiddenLine xmlns="" xmlns:a14="http://schemas.microsoft.com/office/drawing/2010/main" w="9525">
                   <a:solidFill>
                     <a:schemeClr val="tx1"/>
                   </a:solidFill>
@@ -18429,7 +18429,7 @@
                 </a14:hiddenLine>
               </a:ext>
               <a:ext uri="{AF507438-7753-43e0-B8FC-AC1667EBCBE1}">
-                <a14:hiddenEffects xmlns:a14="http://schemas.microsoft.com/office/drawing/2010/main" xmlns="">
+                <a14:hiddenEffects xmlns="" xmlns:a14="http://schemas.microsoft.com/office/drawing/2010/main">
                   <a:effectLst>
                     <a:outerShdw blurRad="63500" dist="38099" dir="2700000" algn="ctr" rotWithShape="0">
                       <a:schemeClr val="bg2">
@@ -18507,7 +18507,7 @@
             <a:effectLst/>
             <a:extLst>
               <a:ext uri="{AF507438-7753-43e0-B8FC-AC1667EBCBE1}">
-                <a14:hiddenEffects xmlns:a14="http://schemas.microsoft.com/office/drawing/2010/main" xmlns="">
+                <a14:hiddenEffects xmlns="" xmlns:a14="http://schemas.microsoft.com/office/drawing/2010/main">
                   <a:effectLst>
                     <a:outerShdw blurRad="63500" dist="38099" dir="2700000" algn="ctr" rotWithShape="0">
                       <a:schemeClr val="bg2">
@@ -18553,14 +18553,14 @@
             <a:effectLst/>
             <a:extLst>
               <a:ext uri="{909E8E84-426E-40dd-AFC4-6F175D3DCCD1}">
-                <a14:hiddenFill xmlns:a14="http://schemas.microsoft.com/office/drawing/2010/main" xmlns="">
+                <a14:hiddenFill xmlns="" xmlns:a14="http://schemas.microsoft.com/office/drawing/2010/main">
                   <a:solidFill>
                     <a:schemeClr val="accent1"/>
                   </a:solidFill>
                 </a14:hiddenFill>
               </a:ext>
               <a:ext uri="{91240B29-F687-4f45-9708-019B960494DF}">
-                <a14:hiddenLine xmlns:a14="http://schemas.microsoft.com/office/drawing/2010/main" xmlns="" w="9525">
+                <a14:hiddenLine xmlns="" xmlns:a14="http://schemas.microsoft.com/office/drawing/2010/main" w="9525">
                   <a:solidFill>
                     <a:schemeClr val="tx1"/>
                   </a:solidFill>
@@ -18570,7 +18570,7 @@
                 </a14:hiddenLine>
               </a:ext>
               <a:ext uri="{AF507438-7753-43e0-B8FC-AC1667EBCBE1}">
-                <a14:hiddenEffects xmlns:a14="http://schemas.microsoft.com/office/drawing/2010/main" xmlns="">
+                <a14:hiddenEffects xmlns="" xmlns:a14="http://schemas.microsoft.com/office/drawing/2010/main">
                   <a:effectLst>
                     <a:outerShdw blurRad="63500" dist="38099" dir="2700000" algn="ctr" rotWithShape="0">
                       <a:schemeClr val="bg2">
@@ -18934,7 +18934,7 @@
             <a:effectLst/>
             <a:extLst>
               <a:ext uri="{AF507438-7753-43e0-B8FC-AC1667EBCBE1}">
-                <a14:hiddenEffects xmlns:a14="http://schemas.microsoft.com/office/drawing/2010/main" xmlns="">
+                <a14:hiddenEffects xmlns="" xmlns:a14="http://schemas.microsoft.com/office/drawing/2010/main">
                   <a:effectLst>
                     <a:outerShdw blurRad="63500" dist="38099" dir="2700000" algn="ctr" rotWithShape="0">
                       <a:schemeClr val="bg2">
@@ -18980,14 +18980,14 @@
             <a:effectLst/>
             <a:extLst>
               <a:ext uri="{909E8E84-426E-40dd-AFC4-6F175D3DCCD1}">
-                <a14:hiddenFill xmlns:a14="http://schemas.microsoft.com/office/drawing/2010/main" xmlns="">
+                <a14:hiddenFill xmlns="" xmlns:a14="http://schemas.microsoft.com/office/drawing/2010/main">
                   <a:solidFill>
                     <a:schemeClr val="accent1"/>
                   </a:solidFill>
                 </a14:hiddenFill>
               </a:ext>
               <a:ext uri="{91240B29-F687-4f45-9708-019B960494DF}">
-                <a14:hiddenLine xmlns:a14="http://schemas.microsoft.com/office/drawing/2010/main" xmlns="" w="9525">
+                <a14:hiddenLine xmlns="" xmlns:a14="http://schemas.microsoft.com/office/drawing/2010/main" w="9525">
                   <a:solidFill>
                     <a:schemeClr val="tx1"/>
                   </a:solidFill>
@@ -18997,7 +18997,7 @@
                 </a14:hiddenLine>
               </a:ext>
               <a:ext uri="{AF507438-7753-43e0-B8FC-AC1667EBCBE1}">
-                <a14:hiddenEffects xmlns:a14="http://schemas.microsoft.com/office/drawing/2010/main" xmlns="">
+                <a14:hiddenEffects xmlns="" xmlns:a14="http://schemas.microsoft.com/office/drawing/2010/main">
                   <a:effectLst>
                     <a:outerShdw blurRad="63500" dist="38099" dir="2700000" algn="ctr" rotWithShape="0">
                       <a:schemeClr val="bg2">
@@ -19075,7 +19075,7 @@
             <a:effectLst/>
             <a:extLst>
               <a:ext uri="{AF507438-7753-43e0-B8FC-AC1667EBCBE1}">
-                <a14:hiddenEffects xmlns:a14="http://schemas.microsoft.com/office/drawing/2010/main" xmlns="">
+                <a14:hiddenEffects xmlns="" xmlns:a14="http://schemas.microsoft.com/office/drawing/2010/main">
                   <a:effectLst>
                     <a:outerShdw blurRad="63500" dist="38099" dir="2700000" algn="ctr" rotWithShape="0">
                       <a:schemeClr val="bg2">
@@ -19121,14 +19121,14 @@
             <a:effectLst/>
             <a:extLst>
               <a:ext uri="{909E8E84-426E-40dd-AFC4-6F175D3DCCD1}">
-                <a14:hiddenFill xmlns:a14="http://schemas.microsoft.com/office/drawing/2010/main" xmlns="">
+                <a14:hiddenFill xmlns="" xmlns:a14="http://schemas.microsoft.com/office/drawing/2010/main">
                   <a:solidFill>
                     <a:schemeClr val="accent1"/>
                   </a:solidFill>
                 </a14:hiddenFill>
               </a:ext>
               <a:ext uri="{91240B29-F687-4f45-9708-019B960494DF}">
-                <a14:hiddenLine xmlns:a14="http://schemas.microsoft.com/office/drawing/2010/main" xmlns="" w="9525">
+                <a14:hiddenLine xmlns="" xmlns:a14="http://schemas.microsoft.com/office/drawing/2010/main" w="9525">
                   <a:solidFill>
                     <a:schemeClr val="tx1"/>
                   </a:solidFill>
@@ -19138,7 +19138,7 @@
                 </a14:hiddenLine>
               </a:ext>
               <a:ext uri="{AF507438-7753-43e0-B8FC-AC1667EBCBE1}">
-                <a14:hiddenEffects xmlns:a14="http://schemas.microsoft.com/office/drawing/2010/main" xmlns="">
+                <a14:hiddenEffects xmlns="" xmlns:a14="http://schemas.microsoft.com/office/drawing/2010/main">
                   <a:effectLst>
                     <a:outerShdw blurRad="63500" dist="38099" dir="2700000" algn="ctr" rotWithShape="0">
                       <a:schemeClr val="bg2">
@@ -19216,7 +19216,7 @@
             <a:effectLst/>
             <a:extLst>
               <a:ext uri="{AF507438-7753-43e0-B8FC-AC1667EBCBE1}">
-                <a14:hiddenEffects xmlns:a14="http://schemas.microsoft.com/office/drawing/2010/main" xmlns="">
+                <a14:hiddenEffects xmlns="" xmlns:a14="http://schemas.microsoft.com/office/drawing/2010/main">
                   <a:effectLst>
                     <a:outerShdw blurRad="63500" dist="38099" dir="2700000" algn="ctr" rotWithShape="0">
                       <a:schemeClr val="bg2">
@@ -19262,14 +19262,14 @@
             <a:effectLst/>
             <a:extLst>
               <a:ext uri="{909E8E84-426E-40dd-AFC4-6F175D3DCCD1}">
-                <a14:hiddenFill xmlns:a14="http://schemas.microsoft.com/office/drawing/2010/main" xmlns="">
+                <a14:hiddenFill xmlns="" xmlns:a14="http://schemas.microsoft.com/office/drawing/2010/main">
                   <a:solidFill>
                     <a:schemeClr val="accent1"/>
                   </a:solidFill>
                 </a14:hiddenFill>
               </a:ext>
               <a:ext uri="{91240B29-F687-4f45-9708-019B960494DF}">
-                <a14:hiddenLine xmlns:a14="http://schemas.microsoft.com/office/drawing/2010/main" xmlns="" w="9525">
+                <a14:hiddenLine xmlns="" xmlns:a14="http://schemas.microsoft.com/office/drawing/2010/main" w="9525">
                   <a:solidFill>
                     <a:schemeClr val="tx1"/>
                   </a:solidFill>
@@ -19279,7 +19279,7 @@
                 </a14:hiddenLine>
               </a:ext>
               <a:ext uri="{AF507438-7753-43e0-B8FC-AC1667EBCBE1}">
-                <a14:hiddenEffects xmlns:a14="http://schemas.microsoft.com/office/drawing/2010/main" xmlns="">
+                <a14:hiddenEffects xmlns="" xmlns:a14="http://schemas.microsoft.com/office/drawing/2010/main">
                   <a:effectLst>
                     <a:outerShdw blurRad="63500" dist="38099" dir="2700000" algn="ctr" rotWithShape="0">
                       <a:schemeClr val="bg2">
@@ -19478,7 +19478,7 @@
             <a:effectLst/>
             <a:extLst>
               <a:ext uri="{AF507438-7753-43e0-B8FC-AC1667EBCBE1}">
-                <a14:hiddenEffects xmlns:a14="http://schemas.microsoft.com/office/drawing/2010/main" xmlns="">
+                <a14:hiddenEffects xmlns="" xmlns:a14="http://schemas.microsoft.com/office/drawing/2010/main">
                   <a:effectLst>
                     <a:outerShdw blurRad="63500" dist="38099" dir="2700000" algn="ctr" rotWithShape="0">
                       <a:schemeClr val="bg2">
@@ -19524,14 +19524,14 @@
             <a:effectLst/>
             <a:extLst>
               <a:ext uri="{909E8E84-426E-40dd-AFC4-6F175D3DCCD1}">
-                <a14:hiddenFill xmlns:a14="http://schemas.microsoft.com/office/drawing/2010/main" xmlns="">
+                <a14:hiddenFill xmlns="" xmlns:a14="http://schemas.microsoft.com/office/drawing/2010/main">
                   <a:solidFill>
                     <a:schemeClr val="accent1"/>
                   </a:solidFill>
                 </a14:hiddenFill>
               </a:ext>
               <a:ext uri="{91240B29-F687-4f45-9708-019B960494DF}">
-                <a14:hiddenLine xmlns:a14="http://schemas.microsoft.com/office/drawing/2010/main" xmlns="" w="9525">
+                <a14:hiddenLine xmlns="" xmlns:a14="http://schemas.microsoft.com/office/drawing/2010/main" w="9525">
                   <a:solidFill>
                     <a:schemeClr val="tx1"/>
                   </a:solidFill>
@@ -19541,7 +19541,7 @@
                 </a14:hiddenLine>
               </a:ext>
               <a:ext uri="{AF507438-7753-43e0-B8FC-AC1667EBCBE1}">
-                <a14:hiddenEffects xmlns:a14="http://schemas.microsoft.com/office/drawing/2010/main" xmlns="">
+                <a14:hiddenEffects xmlns="" xmlns:a14="http://schemas.microsoft.com/office/drawing/2010/main">
                   <a:effectLst>
                     <a:outerShdw blurRad="63500" dist="38099" dir="2700000" algn="ctr" rotWithShape="0">
                       <a:schemeClr val="bg2">
@@ -19619,7 +19619,7 @@
             <a:effectLst/>
             <a:extLst>
               <a:ext uri="{AF507438-7753-43e0-B8FC-AC1667EBCBE1}">
-                <a14:hiddenEffects xmlns:a14="http://schemas.microsoft.com/office/drawing/2010/main" xmlns="">
+                <a14:hiddenEffects xmlns="" xmlns:a14="http://schemas.microsoft.com/office/drawing/2010/main">
                   <a:effectLst>
                     <a:outerShdw blurRad="63500" dist="38099" dir="2700000" algn="ctr" rotWithShape="0">
                       <a:schemeClr val="bg2">
@@ -19665,14 +19665,14 @@
             <a:effectLst/>
             <a:extLst>
               <a:ext uri="{909E8E84-426E-40dd-AFC4-6F175D3DCCD1}">
-                <a14:hiddenFill xmlns:a14="http://schemas.microsoft.com/office/drawing/2010/main" xmlns="">
+                <a14:hiddenFill xmlns="" xmlns:a14="http://schemas.microsoft.com/office/drawing/2010/main">
                   <a:solidFill>
                     <a:schemeClr val="accent1"/>
                   </a:solidFill>
                 </a14:hiddenFill>
               </a:ext>
               <a:ext uri="{91240B29-F687-4f45-9708-019B960494DF}">
-                <a14:hiddenLine xmlns:a14="http://schemas.microsoft.com/office/drawing/2010/main" xmlns="" w="9525">
+                <a14:hiddenLine xmlns="" xmlns:a14="http://schemas.microsoft.com/office/drawing/2010/main" w="9525">
                   <a:solidFill>
                     <a:schemeClr val="tx1"/>
                   </a:solidFill>
@@ -19682,7 +19682,7 @@
                 </a14:hiddenLine>
               </a:ext>
               <a:ext uri="{AF507438-7753-43e0-B8FC-AC1667EBCBE1}">
-                <a14:hiddenEffects xmlns:a14="http://schemas.microsoft.com/office/drawing/2010/main" xmlns="">
+                <a14:hiddenEffects xmlns="" xmlns:a14="http://schemas.microsoft.com/office/drawing/2010/main">
                   <a:effectLst>
                     <a:outerShdw blurRad="63500" dist="38099" dir="2700000" algn="ctr" rotWithShape="0">
                       <a:schemeClr val="bg2">
@@ -19760,7 +19760,7 @@
             <a:effectLst/>
             <a:extLst>
               <a:ext uri="{AF507438-7753-43e0-B8FC-AC1667EBCBE1}">
-                <a14:hiddenEffects xmlns:a14="http://schemas.microsoft.com/office/drawing/2010/main" xmlns="">
+                <a14:hiddenEffects xmlns="" xmlns:a14="http://schemas.microsoft.com/office/drawing/2010/main">
                   <a:effectLst>
                     <a:outerShdw blurRad="63500" dist="38099" dir="2700000" algn="ctr" rotWithShape="0">
                       <a:schemeClr val="bg2">
@@ -19806,14 +19806,14 @@
             <a:effectLst/>
             <a:extLst>
               <a:ext uri="{909E8E84-426E-40dd-AFC4-6F175D3DCCD1}">
-                <a14:hiddenFill xmlns:a14="http://schemas.microsoft.com/office/drawing/2010/main" xmlns="">
+                <a14:hiddenFill xmlns="" xmlns:a14="http://schemas.microsoft.com/office/drawing/2010/main">
                   <a:solidFill>
                     <a:schemeClr val="accent1"/>
                   </a:solidFill>
                 </a14:hiddenFill>
               </a:ext>
               <a:ext uri="{91240B29-F687-4f45-9708-019B960494DF}">
-                <a14:hiddenLine xmlns:a14="http://schemas.microsoft.com/office/drawing/2010/main" xmlns="" w="9525">
+                <a14:hiddenLine xmlns="" xmlns:a14="http://schemas.microsoft.com/office/drawing/2010/main" w="9525">
                   <a:solidFill>
                     <a:schemeClr val="tx1"/>
                   </a:solidFill>
@@ -19823,7 +19823,7 @@
                 </a14:hiddenLine>
               </a:ext>
               <a:ext uri="{AF507438-7753-43e0-B8FC-AC1667EBCBE1}">
-                <a14:hiddenEffects xmlns:a14="http://schemas.microsoft.com/office/drawing/2010/main" xmlns="">
+                <a14:hiddenEffects xmlns="" xmlns:a14="http://schemas.microsoft.com/office/drawing/2010/main">
                   <a:effectLst>
                     <a:outerShdw blurRad="63500" dist="38099" dir="2700000" algn="ctr" rotWithShape="0">
                       <a:schemeClr val="bg2">
@@ -20173,7 +20173,7 @@
             <a:effectLst/>
             <a:extLst>
               <a:ext uri="{AF507438-7753-43e0-B8FC-AC1667EBCBE1}">
-                <a14:hiddenEffects xmlns:a14="http://schemas.microsoft.com/office/drawing/2010/main" xmlns="">
+                <a14:hiddenEffects xmlns="" xmlns:a14="http://schemas.microsoft.com/office/drawing/2010/main">
                   <a:effectLst>
                     <a:outerShdw blurRad="63500" dist="38099" dir="2700000" algn="ctr" rotWithShape="0">
                       <a:schemeClr val="bg2">
@@ -20225,14 +20225,14 @@
             <a:effectLst/>
             <a:extLst>
               <a:ext uri="{909E8E84-426E-40dd-AFC4-6F175D3DCCD1}">
-                <a14:hiddenFill xmlns:a14="http://schemas.microsoft.com/office/drawing/2010/main" xmlns="">
+                <a14:hiddenFill xmlns="" xmlns:a14="http://schemas.microsoft.com/office/drawing/2010/main">
                   <a:solidFill>
                     <a:schemeClr val="accent1"/>
                   </a:solidFill>
                 </a14:hiddenFill>
               </a:ext>
               <a:ext uri="{91240B29-F687-4f45-9708-019B960494DF}">
-                <a14:hiddenLine xmlns:a14="http://schemas.microsoft.com/office/drawing/2010/main" xmlns="" w="9525">
+                <a14:hiddenLine xmlns="" xmlns:a14="http://schemas.microsoft.com/office/drawing/2010/main" w="9525">
                   <a:solidFill>
                     <a:schemeClr val="tx1"/>
                   </a:solidFill>
@@ -20242,7 +20242,7 @@
                 </a14:hiddenLine>
               </a:ext>
               <a:ext uri="{AF507438-7753-43e0-B8FC-AC1667EBCBE1}">
-                <a14:hiddenEffects xmlns:a14="http://schemas.microsoft.com/office/drawing/2010/main" xmlns="">
+                <a14:hiddenEffects xmlns="" xmlns:a14="http://schemas.microsoft.com/office/drawing/2010/main">
                   <a:effectLst>
                     <a:outerShdw blurRad="63500" dist="38099" dir="2700000" algn="ctr" rotWithShape="0">
                       <a:schemeClr val="bg2">
@@ -20332,7 +20332,7 @@
             <a:effectLst/>
             <a:extLst>
               <a:ext uri="{AF507438-7753-43e0-B8FC-AC1667EBCBE1}">
-                <a14:hiddenEffects xmlns:a14="http://schemas.microsoft.com/office/drawing/2010/main" xmlns="">
+                <a14:hiddenEffects xmlns="" xmlns:a14="http://schemas.microsoft.com/office/drawing/2010/main">
                   <a:effectLst>
                     <a:outerShdw blurRad="63500" dist="38099" dir="2700000" algn="ctr" rotWithShape="0">
                       <a:schemeClr val="bg2">
@@ -20384,14 +20384,14 @@
             <a:effectLst/>
             <a:extLst>
               <a:ext uri="{909E8E84-426E-40dd-AFC4-6F175D3DCCD1}">
-                <a14:hiddenFill xmlns:a14="http://schemas.microsoft.com/office/drawing/2010/main" xmlns="">
+                <a14:hiddenFill xmlns="" xmlns:a14="http://schemas.microsoft.com/office/drawing/2010/main">
                   <a:solidFill>
                     <a:schemeClr val="accent1"/>
                   </a:solidFill>
                 </a14:hiddenFill>
               </a:ext>
               <a:ext uri="{91240B29-F687-4f45-9708-019B960494DF}">
-                <a14:hiddenLine xmlns:a14="http://schemas.microsoft.com/office/drawing/2010/main" xmlns="" w="9525">
+                <a14:hiddenLine xmlns="" xmlns:a14="http://schemas.microsoft.com/office/drawing/2010/main" w="9525">
                   <a:solidFill>
                     <a:schemeClr val="tx1"/>
                   </a:solidFill>
@@ -20401,7 +20401,7 @@
                 </a14:hiddenLine>
               </a:ext>
               <a:ext uri="{AF507438-7753-43e0-B8FC-AC1667EBCBE1}">
-                <a14:hiddenEffects xmlns:a14="http://schemas.microsoft.com/office/drawing/2010/main" xmlns="">
+                <a14:hiddenEffects xmlns="" xmlns:a14="http://schemas.microsoft.com/office/drawing/2010/main">
                   <a:effectLst>
                     <a:outerShdw blurRad="63500" dist="38099" dir="2700000" algn="ctr" rotWithShape="0">
                       <a:schemeClr val="bg2">
@@ -20491,7 +20491,7 @@
             <a:effectLst/>
             <a:extLst>
               <a:ext uri="{AF507438-7753-43e0-B8FC-AC1667EBCBE1}">
-                <a14:hiddenEffects xmlns:a14="http://schemas.microsoft.com/office/drawing/2010/main" xmlns="">
+                <a14:hiddenEffects xmlns="" xmlns:a14="http://schemas.microsoft.com/office/drawing/2010/main">
                   <a:effectLst>
                     <a:outerShdw blurRad="63500" dist="38099" dir="2700000" algn="ctr" rotWithShape="0">
                       <a:schemeClr val="bg2">
@@ -20543,14 +20543,14 @@
             <a:effectLst/>
             <a:extLst>
               <a:ext uri="{909E8E84-426E-40dd-AFC4-6F175D3DCCD1}">
-                <a14:hiddenFill xmlns:a14="http://schemas.microsoft.com/office/drawing/2010/main" xmlns="">
+                <a14:hiddenFill xmlns="" xmlns:a14="http://schemas.microsoft.com/office/drawing/2010/main">
                   <a:solidFill>
                     <a:schemeClr val="accent1"/>
                   </a:solidFill>
                 </a14:hiddenFill>
               </a:ext>
               <a:ext uri="{91240B29-F687-4f45-9708-019B960494DF}">
-                <a14:hiddenLine xmlns:a14="http://schemas.microsoft.com/office/drawing/2010/main" xmlns="" w="9525">
+                <a14:hiddenLine xmlns="" xmlns:a14="http://schemas.microsoft.com/office/drawing/2010/main" w="9525">
                   <a:solidFill>
                     <a:schemeClr val="tx1"/>
                   </a:solidFill>
@@ -20560,7 +20560,7 @@
                 </a14:hiddenLine>
               </a:ext>
               <a:ext uri="{AF507438-7753-43e0-B8FC-AC1667EBCBE1}">
-                <a14:hiddenEffects xmlns:a14="http://schemas.microsoft.com/office/drawing/2010/main" xmlns="">
+                <a14:hiddenEffects xmlns="" xmlns:a14="http://schemas.microsoft.com/office/drawing/2010/main">
                   <a:effectLst>
                     <a:outerShdw blurRad="63500" dist="38099" dir="2700000" algn="ctr" rotWithShape="0">
                       <a:schemeClr val="bg2">
@@ -20789,7 +20789,7 @@
             <a:effectLst/>
             <a:extLst>
               <a:ext uri="{AF507438-7753-43e0-B8FC-AC1667EBCBE1}">
-                <a14:hiddenEffects xmlns:a14="http://schemas.microsoft.com/office/drawing/2010/main" xmlns="">
+                <a14:hiddenEffects xmlns="" xmlns:a14="http://schemas.microsoft.com/office/drawing/2010/main">
                   <a:effectLst>
                     <a:outerShdw blurRad="63500" dist="38099" dir="2700000" algn="ctr" rotWithShape="0">
                       <a:schemeClr val="bg2">
@@ -20841,14 +20841,14 @@
             <a:effectLst/>
             <a:extLst>
               <a:ext uri="{909E8E84-426E-40dd-AFC4-6F175D3DCCD1}">
-                <a14:hiddenFill xmlns:a14="http://schemas.microsoft.com/office/drawing/2010/main" xmlns="">
+                <a14:hiddenFill xmlns="" xmlns:a14="http://schemas.microsoft.com/office/drawing/2010/main">
                   <a:solidFill>
                     <a:schemeClr val="accent1"/>
                   </a:solidFill>
                 </a14:hiddenFill>
               </a:ext>
               <a:ext uri="{91240B29-F687-4f45-9708-019B960494DF}">
-                <a14:hiddenLine xmlns:a14="http://schemas.microsoft.com/office/drawing/2010/main" xmlns="" w="9525">
+                <a14:hiddenLine xmlns="" xmlns:a14="http://schemas.microsoft.com/office/drawing/2010/main" w="9525">
                   <a:solidFill>
                     <a:schemeClr val="tx1"/>
                   </a:solidFill>
@@ -20858,7 +20858,7 @@
                 </a14:hiddenLine>
               </a:ext>
               <a:ext uri="{AF507438-7753-43e0-B8FC-AC1667EBCBE1}">
-                <a14:hiddenEffects xmlns:a14="http://schemas.microsoft.com/office/drawing/2010/main" xmlns="">
+                <a14:hiddenEffects xmlns="" xmlns:a14="http://schemas.microsoft.com/office/drawing/2010/main">
                   <a:effectLst>
                     <a:outerShdw blurRad="63500" dist="38099" dir="2700000" algn="ctr" rotWithShape="0">
                       <a:schemeClr val="bg2">
@@ -20948,7 +20948,7 @@
             <a:effectLst/>
             <a:extLst>
               <a:ext uri="{AF507438-7753-43e0-B8FC-AC1667EBCBE1}">
-                <a14:hiddenEffects xmlns:a14="http://schemas.microsoft.com/office/drawing/2010/main" xmlns="">
+                <a14:hiddenEffects xmlns="" xmlns:a14="http://schemas.microsoft.com/office/drawing/2010/main">
                   <a:effectLst>
                     <a:outerShdw blurRad="63500" dist="38099" dir="2700000" algn="ctr" rotWithShape="0">
                       <a:schemeClr val="bg2">
@@ -21000,14 +21000,14 @@
             <a:effectLst/>
             <a:extLst>
               <a:ext uri="{909E8E84-426E-40dd-AFC4-6F175D3DCCD1}">
-                <a14:hiddenFill xmlns:a14="http://schemas.microsoft.com/office/drawing/2010/main" xmlns="">
+                <a14:hiddenFill xmlns="" xmlns:a14="http://schemas.microsoft.com/office/drawing/2010/main">
                   <a:solidFill>
                     <a:schemeClr val="accent1"/>
                   </a:solidFill>
                 </a14:hiddenFill>
               </a:ext>
               <a:ext uri="{91240B29-F687-4f45-9708-019B960494DF}">
-                <a14:hiddenLine xmlns:a14="http://schemas.microsoft.com/office/drawing/2010/main" xmlns="" w="9525">
+                <a14:hiddenLine xmlns="" xmlns:a14="http://schemas.microsoft.com/office/drawing/2010/main" w="9525">
                   <a:solidFill>
                     <a:schemeClr val="tx1"/>
                   </a:solidFill>
@@ -21017,7 +21017,7 @@
                 </a14:hiddenLine>
               </a:ext>
               <a:ext uri="{AF507438-7753-43e0-B8FC-AC1667EBCBE1}">
-                <a14:hiddenEffects xmlns:a14="http://schemas.microsoft.com/office/drawing/2010/main" xmlns="">
+                <a14:hiddenEffects xmlns="" xmlns:a14="http://schemas.microsoft.com/office/drawing/2010/main">
                   <a:effectLst>
                     <a:outerShdw blurRad="63500" dist="38099" dir="2700000" algn="ctr" rotWithShape="0">
                       <a:schemeClr val="bg2">
@@ -21107,7 +21107,7 @@
             <a:effectLst/>
             <a:extLst>
               <a:ext uri="{AF507438-7753-43e0-B8FC-AC1667EBCBE1}">
-                <a14:hiddenEffects xmlns:a14="http://schemas.microsoft.com/office/drawing/2010/main" xmlns="">
+                <a14:hiddenEffects xmlns="" xmlns:a14="http://schemas.microsoft.com/office/drawing/2010/main">
                   <a:effectLst>
                     <a:outerShdw blurRad="63500" dist="38099" dir="2700000" algn="ctr" rotWithShape="0">
                       <a:schemeClr val="bg2">
@@ -21159,14 +21159,14 @@
             <a:effectLst/>
             <a:extLst>
               <a:ext uri="{909E8E84-426E-40dd-AFC4-6F175D3DCCD1}">
-                <a14:hiddenFill xmlns:a14="http://schemas.microsoft.com/office/drawing/2010/main" xmlns="">
+                <a14:hiddenFill xmlns="" xmlns:a14="http://schemas.microsoft.com/office/drawing/2010/main">
                   <a:solidFill>
                     <a:schemeClr val="accent1"/>
                   </a:solidFill>
                 </a14:hiddenFill>
               </a:ext>
               <a:ext uri="{91240B29-F687-4f45-9708-019B960494DF}">
-                <a14:hiddenLine xmlns:a14="http://schemas.microsoft.com/office/drawing/2010/main" xmlns="" w="9525">
+                <a14:hiddenLine xmlns="" xmlns:a14="http://schemas.microsoft.com/office/drawing/2010/main" w="9525">
                   <a:solidFill>
                     <a:schemeClr val="tx1"/>
                   </a:solidFill>
@@ -21176,7 +21176,7 @@
                 </a14:hiddenLine>
               </a:ext>
               <a:ext uri="{AF507438-7753-43e0-B8FC-AC1667EBCBE1}">
-                <a14:hiddenEffects xmlns:a14="http://schemas.microsoft.com/office/drawing/2010/main" xmlns="">
+                <a14:hiddenEffects xmlns="" xmlns:a14="http://schemas.microsoft.com/office/drawing/2010/main">
                   <a:effectLst>
                     <a:outerShdw blurRad="63500" dist="38099" dir="2700000" algn="ctr" rotWithShape="0">
                       <a:schemeClr val="bg2">
@@ -21451,7 +21451,7 @@
             <a:effectLst/>
             <a:extLst>
               <a:ext uri="{AF507438-7753-43e0-B8FC-AC1667EBCBE1}">
-                <a14:hiddenEffects xmlns:a14="http://schemas.microsoft.com/office/drawing/2010/main" xmlns="">
+                <a14:hiddenEffects xmlns="" xmlns:a14="http://schemas.microsoft.com/office/drawing/2010/main">
                   <a:effectLst>
                     <a:outerShdw blurRad="63500" dist="38099" dir="2700000" algn="ctr" rotWithShape="0">
                       <a:schemeClr val="bg2">
@@ -21503,14 +21503,14 @@
             <a:effectLst/>
             <a:extLst>
               <a:ext uri="{909E8E84-426E-40dd-AFC4-6F175D3DCCD1}">
-                <a14:hiddenFill xmlns:a14="http://schemas.microsoft.com/office/drawing/2010/main" xmlns="">
+                <a14:hiddenFill xmlns="" xmlns:a14="http://schemas.microsoft.com/office/drawing/2010/main">
                   <a:solidFill>
                     <a:schemeClr val="accent1"/>
                   </a:solidFill>
                 </a14:hiddenFill>
               </a:ext>
               <a:ext uri="{91240B29-F687-4f45-9708-019B960494DF}">
-                <a14:hiddenLine xmlns:a14="http://schemas.microsoft.com/office/drawing/2010/main" xmlns="" w="9525">
+                <a14:hiddenLine xmlns="" xmlns:a14="http://schemas.microsoft.com/office/drawing/2010/main" w="9525">
                   <a:solidFill>
                     <a:schemeClr val="tx1"/>
                   </a:solidFill>
@@ -21520,7 +21520,7 @@
                 </a14:hiddenLine>
               </a:ext>
               <a:ext uri="{AF507438-7753-43e0-B8FC-AC1667EBCBE1}">
-                <a14:hiddenEffects xmlns:a14="http://schemas.microsoft.com/office/drawing/2010/main" xmlns="">
+                <a14:hiddenEffects xmlns="" xmlns:a14="http://schemas.microsoft.com/office/drawing/2010/main">
                   <a:effectLst>
                     <a:outerShdw blurRad="63500" dist="38099" dir="2700000" algn="ctr" rotWithShape="0">
                       <a:schemeClr val="bg2">
@@ -21610,7 +21610,7 @@
             <a:effectLst/>
             <a:extLst>
               <a:ext uri="{AF507438-7753-43e0-B8FC-AC1667EBCBE1}">
-                <a14:hiddenEffects xmlns:a14="http://schemas.microsoft.com/office/drawing/2010/main" xmlns="">
+                <a14:hiddenEffects xmlns="" xmlns:a14="http://schemas.microsoft.com/office/drawing/2010/main">
                   <a:effectLst>
                     <a:outerShdw blurRad="63500" dist="38099" dir="2700000" algn="ctr" rotWithShape="0">
                       <a:schemeClr val="bg2">
@@ -21662,14 +21662,14 @@
             <a:effectLst/>
             <a:extLst>
               <a:ext uri="{909E8E84-426E-40dd-AFC4-6F175D3DCCD1}">
-                <a14:hiddenFill xmlns:a14="http://schemas.microsoft.com/office/drawing/2010/main" xmlns="">
+                <a14:hiddenFill xmlns="" xmlns:a14="http://schemas.microsoft.com/office/drawing/2010/main">
                   <a:solidFill>
                     <a:schemeClr val="accent1"/>
                   </a:solidFill>
                 </a14:hiddenFill>
               </a:ext>
               <a:ext uri="{91240B29-F687-4f45-9708-019B960494DF}">
-                <a14:hiddenLine xmlns:a14="http://schemas.microsoft.com/office/drawing/2010/main" xmlns="" w="9525">
+                <a14:hiddenLine xmlns="" xmlns:a14="http://schemas.microsoft.com/office/drawing/2010/main" w="9525">
                   <a:solidFill>
                     <a:schemeClr val="tx1"/>
                   </a:solidFill>
@@ -21679,7 +21679,7 @@
                 </a14:hiddenLine>
               </a:ext>
               <a:ext uri="{AF507438-7753-43e0-B8FC-AC1667EBCBE1}">
-                <a14:hiddenEffects xmlns:a14="http://schemas.microsoft.com/office/drawing/2010/main" xmlns="">
+                <a14:hiddenEffects xmlns="" xmlns:a14="http://schemas.microsoft.com/office/drawing/2010/main">
                   <a:effectLst>
                     <a:outerShdw blurRad="63500" dist="38099" dir="2700000" algn="ctr" rotWithShape="0">
                       <a:schemeClr val="bg2">
@@ -21769,7 +21769,7 @@
             <a:effectLst/>
             <a:extLst>
               <a:ext uri="{AF507438-7753-43e0-B8FC-AC1667EBCBE1}">
-                <a14:hiddenEffects xmlns:a14="http://schemas.microsoft.com/office/drawing/2010/main" xmlns="">
+                <a14:hiddenEffects xmlns="" xmlns:a14="http://schemas.microsoft.com/office/drawing/2010/main">
                   <a:effectLst>
                     <a:outerShdw blurRad="63500" dist="38099" dir="2700000" algn="ctr" rotWithShape="0">
                       <a:schemeClr val="bg2">
@@ -21821,14 +21821,14 @@
             <a:effectLst/>
             <a:extLst>
               <a:ext uri="{909E8E84-426E-40dd-AFC4-6F175D3DCCD1}">
-                <a14:hiddenFill xmlns:a14="http://schemas.microsoft.com/office/drawing/2010/main" xmlns="">
+                <a14:hiddenFill xmlns="" xmlns:a14="http://schemas.microsoft.com/office/drawing/2010/main">
                   <a:solidFill>
                     <a:schemeClr val="accent1"/>
                   </a:solidFill>
                 </a14:hiddenFill>
               </a:ext>
               <a:ext uri="{91240B29-F687-4f45-9708-019B960494DF}">
-                <a14:hiddenLine xmlns:a14="http://schemas.microsoft.com/office/drawing/2010/main" xmlns="" w="9525">
+                <a14:hiddenLine xmlns="" xmlns:a14="http://schemas.microsoft.com/office/drawing/2010/main" w="9525">
                   <a:solidFill>
                     <a:schemeClr val="tx1"/>
                   </a:solidFill>
@@ -21838,7 +21838,7 @@
                 </a14:hiddenLine>
               </a:ext>
               <a:ext uri="{AF507438-7753-43e0-B8FC-AC1667EBCBE1}">
-                <a14:hiddenEffects xmlns:a14="http://schemas.microsoft.com/office/drawing/2010/main" xmlns="">
+                <a14:hiddenEffects xmlns="" xmlns:a14="http://schemas.microsoft.com/office/drawing/2010/main">
                   <a:effectLst>
                     <a:outerShdw blurRad="63500" dist="38099" dir="2700000" algn="ctr" rotWithShape="0">
                       <a:schemeClr val="bg2">
@@ -22850,7 +22850,7 @@
             <a:effectLst/>
             <a:extLst>
               <a:ext uri="{AF507438-7753-43e0-B8FC-AC1667EBCBE1}">
-                <a14:hiddenEffects xmlns:a14="http://schemas.microsoft.com/office/drawing/2010/main" xmlns="">
+                <a14:hiddenEffects xmlns="" xmlns:a14="http://schemas.microsoft.com/office/drawing/2010/main">
                   <a:effectLst>
                     <a:outerShdw blurRad="63500" dist="38099" dir="2700000" algn="ctr" rotWithShape="0">
                       <a:schemeClr val="bg2">
@@ -22902,14 +22902,14 @@
             <a:effectLst/>
             <a:extLst>
               <a:ext uri="{909E8E84-426E-40dd-AFC4-6F175D3DCCD1}">
-                <a14:hiddenFill xmlns:a14="http://schemas.microsoft.com/office/drawing/2010/main" xmlns="">
+                <a14:hiddenFill xmlns="" xmlns:a14="http://schemas.microsoft.com/office/drawing/2010/main">
                   <a:solidFill>
                     <a:schemeClr val="accent1"/>
                   </a:solidFill>
                 </a14:hiddenFill>
               </a:ext>
               <a:ext uri="{91240B29-F687-4f45-9708-019B960494DF}">
-                <a14:hiddenLine xmlns:a14="http://schemas.microsoft.com/office/drawing/2010/main" xmlns="" w="9525">
+                <a14:hiddenLine xmlns="" xmlns:a14="http://schemas.microsoft.com/office/drawing/2010/main" w="9525">
                   <a:solidFill>
                     <a:schemeClr val="tx1"/>
                   </a:solidFill>
@@ -22919,7 +22919,7 @@
                 </a14:hiddenLine>
               </a:ext>
               <a:ext uri="{AF507438-7753-43e0-B8FC-AC1667EBCBE1}">
-                <a14:hiddenEffects xmlns:a14="http://schemas.microsoft.com/office/drawing/2010/main" xmlns="">
+                <a14:hiddenEffects xmlns="" xmlns:a14="http://schemas.microsoft.com/office/drawing/2010/main">
                   <a:effectLst>
                     <a:outerShdw blurRad="63500" dist="38099" dir="2700000" algn="ctr" rotWithShape="0">
                       <a:schemeClr val="bg2">
@@ -23009,7 +23009,7 @@
             <a:effectLst/>
             <a:extLst>
               <a:ext uri="{AF507438-7753-43e0-B8FC-AC1667EBCBE1}">
-                <a14:hiddenEffects xmlns:a14="http://schemas.microsoft.com/office/drawing/2010/main" xmlns="">
+                <a14:hiddenEffects xmlns="" xmlns:a14="http://schemas.microsoft.com/office/drawing/2010/main">
                   <a:effectLst>
                     <a:outerShdw blurRad="63500" dist="38099" dir="2700000" algn="ctr" rotWithShape="0">
                       <a:schemeClr val="bg2">
@@ -23061,14 +23061,14 @@
             <a:effectLst/>
             <a:extLst>
               <a:ext uri="{909E8E84-426E-40dd-AFC4-6F175D3DCCD1}">
-                <a14:hiddenFill xmlns:a14="http://schemas.microsoft.com/office/drawing/2010/main" xmlns="">
+                <a14:hiddenFill xmlns="" xmlns:a14="http://schemas.microsoft.com/office/drawing/2010/main">
                   <a:solidFill>
                     <a:schemeClr val="accent1"/>
                   </a:solidFill>
                 </a14:hiddenFill>
               </a:ext>
               <a:ext uri="{91240B29-F687-4f45-9708-019B960494DF}">
-                <a14:hiddenLine xmlns:a14="http://schemas.microsoft.com/office/drawing/2010/main" xmlns="" w="9525">
+                <a14:hiddenLine xmlns="" xmlns:a14="http://schemas.microsoft.com/office/drawing/2010/main" w="9525">
                   <a:solidFill>
                     <a:schemeClr val="tx1"/>
                   </a:solidFill>
@@ -23078,7 +23078,7 @@
                 </a14:hiddenLine>
               </a:ext>
               <a:ext uri="{AF507438-7753-43e0-B8FC-AC1667EBCBE1}">
-                <a14:hiddenEffects xmlns:a14="http://schemas.microsoft.com/office/drawing/2010/main" xmlns="">
+                <a14:hiddenEffects xmlns="" xmlns:a14="http://schemas.microsoft.com/office/drawing/2010/main">
                   <a:effectLst>
                     <a:outerShdw blurRad="63500" dist="38099" dir="2700000" algn="ctr" rotWithShape="0">
                       <a:schemeClr val="bg2">
@@ -23168,7 +23168,7 @@
             <a:effectLst/>
             <a:extLst>
               <a:ext uri="{AF507438-7753-43e0-B8FC-AC1667EBCBE1}">
-                <a14:hiddenEffects xmlns:a14="http://schemas.microsoft.com/office/drawing/2010/main" xmlns="">
+                <a14:hiddenEffects xmlns="" xmlns:a14="http://schemas.microsoft.com/office/drawing/2010/main">
                   <a:effectLst>
                     <a:outerShdw blurRad="63500" dist="38099" dir="2700000" algn="ctr" rotWithShape="0">
                       <a:schemeClr val="bg2">
@@ -23220,14 +23220,14 @@
             <a:effectLst/>
             <a:extLst>
               <a:ext uri="{909E8E84-426E-40dd-AFC4-6F175D3DCCD1}">
-                <a14:hiddenFill xmlns:a14="http://schemas.microsoft.com/office/drawing/2010/main" xmlns="">
+                <a14:hiddenFill xmlns="" xmlns:a14="http://schemas.microsoft.com/office/drawing/2010/main">
                   <a:solidFill>
                     <a:schemeClr val="accent1"/>
                   </a:solidFill>
                 </a14:hiddenFill>
               </a:ext>
               <a:ext uri="{91240B29-F687-4f45-9708-019B960494DF}">
-                <a14:hiddenLine xmlns:a14="http://schemas.microsoft.com/office/drawing/2010/main" xmlns="" w="9525">
+                <a14:hiddenLine xmlns="" xmlns:a14="http://schemas.microsoft.com/office/drawing/2010/main" w="9525">
                   <a:solidFill>
                     <a:schemeClr val="tx1"/>
                   </a:solidFill>
@@ -23237,7 +23237,7 @@
                 </a14:hiddenLine>
               </a:ext>
               <a:ext uri="{AF507438-7753-43e0-B8FC-AC1667EBCBE1}">
-                <a14:hiddenEffects xmlns:a14="http://schemas.microsoft.com/office/drawing/2010/main" xmlns="">
+                <a14:hiddenEffects xmlns="" xmlns:a14="http://schemas.microsoft.com/office/drawing/2010/main">
                   <a:effectLst>
                     <a:outerShdw blurRad="63500" dist="38099" dir="2700000" algn="ctr" rotWithShape="0">
                       <a:schemeClr val="bg2">
@@ -23466,7 +23466,7 @@
             <a:effectLst/>
             <a:extLst>
               <a:ext uri="{AF507438-7753-43e0-B8FC-AC1667EBCBE1}">
-                <a14:hiddenEffects xmlns:a14="http://schemas.microsoft.com/office/drawing/2010/main" xmlns="">
+                <a14:hiddenEffects xmlns="" xmlns:a14="http://schemas.microsoft.com/office/drawing/2010/main">
                   <a:effectLst>
                     <a:outerShdw blurRad="63500" dist="38099" dir="2700000" algn="ctr" rotWithShape="0">
                       <a:schemeClr val="bg2">
@@ -23518,14 +23518,14 @@
             <a:effectLst/>
             <a:extLst>
               <a:ext uri="{909E8E84-426E-40dd-AFC4-6F175D3DCCD1}">
-                <a14:hiddenFill xmlns:a14="http://schemas.microsoft.com/office/drawing/2010/main" xmlns="">
+                <a14:hiddenFill xmlns="" xmlns:a14="http://schemas.microsoft.com/office/drawing/2010/main">
                   <a:solidFill>
                     <a:schemeClr val="accent1"/>
                   </a:solidFill>
                 </a14:hiddenFill>
               </a:ext>
               <a:ext uri="{91240B29-F687-4f45-9708-019B960494DF}">
-                <a14:hiddenLine xmlns:a14="http://schemas.microsoft.com/office/drawing/2010/main" xmlns="" w="9525">
+                <a14:hiddenLine xmlns="" xmlns:a14="http://schemas.microsoft.com/office/drawing/2010/main" w="9525">
                   <a:solidFill>
                     <a:schemeClr val="tx1"/>
                   </a:solidFill>
@@ -23535,7 +23535,7 @@
                 </a14:hiddenLine>
               </a:ext>
               <a:ext uri="{AF507438-7753-43e0-B8FC-AC1667EBCBE1}">
-                <a14:hiddenEffects xmlns:a14="http://schemas.microsoft.com/office/drawing/2010/main" xmlns="">
+                <a14:hiddenEffects xmlns="" xmlns:a14="http://schemas.microsoft.com/office/drawing/2010/main">
                   <a:effectLst>
                     <a:outerShdw blurRad="63500" dist="38099" dir="2700000" algn="ctr" rotWithShape="0">
                       <a:schemeClr val="bg2">
@@ -23625,7 +23625,7 @@
             <a:effectLst/>
             <a:extLst>
               <a:ext uri="{AF507438-7753-43e0-B8FC-AC1667EBCBE1}">
-                <a14:hiddenEffects xmlns:a14="http://schemas.microsoft.com/office/drawing/2010/main" xmlns="">
+                <a14:hiddenEffects xmlns="" xmlns:a14="http://schemas.microsoft.com/office/drawing/2010/main">
                   <a:effectLst>
                     <a:outerShdw blurRad="63500" dist="38099" dir="2700000" algn="ctr" rotWithShape="0">
                       <a:schemeClr val="bg2">
@@ -23677,14 +23677,14 @@
             <a:effectLst/>
             <a:extLst>
               <a:ext uri="{909E8E84-426E-40dd-AFC4-6F175D3DCCD1}">
-                <a14:hiddenFill xmlns:a14="http://schemas.microsoft.com/office/drawing/2010/main" xmlns="">
+                <a14:hiddenFill xmlns="" xmlns:a14="http://schemas.microsoft.com/office/drawing/2010/main">
                   <a:solidFill>
                     <a:schemeClr val="accent1"/>
                   </a:solidFill>
                 </a14:hiddenFill>
               </a:ext>
               <a:ext uri="{91240B29-F687-4f45-9708-019B960494DF}">
-                <a14:hiddenLine xmlns:a14="http://schemas.microsoft.com/office/drawing/2010/main" xmlns="" w="9525">
+                <a14:hiddenLine xmlns="" xmlns:a14="http://schemas.microsoft.com/office/drawing/2010/main" w="9525">
                   <a:solidFill>
                     <a:schemeClr val="tx1"/>
                   </a:solidFill>
@@ -23694,7 +23694,7 @@
                 </a14:hiddenLine>
               </a:ext>
               <a:ext uri="{AF507438-7753-43e0-B8FC-AC1667EBCBE1}">
-                <a14:hiddenEffects xmlns:a14="http://schemas.microsoft.com/office/drawing/2010/main" xmlns="">
+                <a14:hiddenEffects xmlns="" xmlns:a14="http://schemas.microsoft.com/office/drawing/2010/main">
                   <a:effectLst>
                     <a:outerShdw blurRad="63500" dist="38099" dir="2700000" algn="ctr" rotWithShape="0">
                       <a:schemeClr val="bg2">
@@ -23784,7 +23784,7 @@
             <a:effectLst/>
             <a:extLst>
               <a:ext uri="{AF507438-7753-43e0-B8FC-AC1667EBCBE1}">
-                <a14:hiddenEffects xmlns:a14="http://schemas.microsoft.com/office/drawing/2010/main" xmlns="">
+                <a14:hiddenEffects xmlns="" xmlns:a14="http://schemas.microsoft.com/office/drawing/2010/main">
                   <a:effectLst>
                     <a:outerShdw blurRad="63500" dist="38099" dir="2700000" algn="ctr" rotWithShape="0">
                       <a:schemeClr val="bg2">
@@ -23836,14 +23836,14 @@
             <a:effectLst/>
             <a:extLst>
               <a:ext uri="{909E8E84-426E-40dd-AFC4-6F175D3DCCD1}">
-                <a14:hiddenFill xmlns:a14="http://schemas.microsoft.com/office/drawing/2010/main" xmlns="">
+                <a14:hiddenFill xmlns="" xmlns:a14="http://schemas.microsoft.com/office/drawing/2010/main">
                   <a:solidFill>
                     <a:schemeClr val="accent1"/>
                   </a:solidFill>
                 </a14:hiddenFill>
               </a:ext>
               <a:ext uri="{91240B29-F687-4f45-9708-019B960494DF}">
-                <a14:hiddenLine xmlns:a14="http://schemas.microsoft.com/office/drawing/2010/main" xmlns="" w="9525">
+                <a14:hiddenLine xmlns="" xmlns:a14="http://schemas.microsoft.com/office/drawing/2010/main" w="9525">
                   <a:solidFill>
                     <a:schemeClr val="tx1"/>
                   </a:solidFill>
@@ -23853,7 +23853,7 @@
                 </a14:hiddenLine>
               </a:ext>
               <a:ext uri="{AF507438-7753-43e0-B8FC-AC1667EBCBE1}">
-                <a14:hiddenEffects xmlns:a14="http://schemas.microsoft.com/office/drawing/2010/main" xmlns="">
+                <a14:hiddenEffects xmlns="" xmlns:a14="http://schemas.microsoft.com/office/drawing/2010/main">
                   <a:effectLst>
                     <a:outerShdw blurRad="63500" dist="38099" dir="2700000" algn="ctr" rotWithShape="0">
                       <a:schemeClr val="bg2">
@@ -24128,7 +24128,7 @@
             <a:effectLst/>
             <a:extLst>
               <a:ext uri="{AF507438-7753-43e0-B8FC-AC1667EBCBE1}">
-                <a14:hiddenEffects xmlns:a14="http://schemas.microsoft.com/office/drawing/2010/main" xmlns="">
+                <a14:hiddenEffects xmlns="" xmlns:a14="http://schemas.microsoft.com/office/drawing/2010/main">
                   <a:effectLst>
                     <a:outerShdw blurRad="63500" dist="38099" dir="2700000" algn="ctr" rotWithShape="0">
                       <a:schemeClr val="bg2">
@@ -24180,14 +24180,14 @@
             <a:effectLst/>
             <a:extLst>
               <a:ext uri="{909E8E84-426E-40dd-AFC4-6F175D3DCCD1}">
-                <a14:hiddenFill xmlns:a14="http://schemas.microsoft.com/office/drawing/2010/main" xmlns="">
+                <a14:hiddenFill xmlns="" xmlns:a14="http://schemas.microsoft.com/office/drawing/2010/main">
                   <a:solidFill>
                     <a:schemeClr val="accent1"/>
                   </a:solidFill>
                 </a14:hiddenFill>
               </a:ext>
               <a:ext uri="{91240B29-F687-4f45-9708-019B960494DF}">
-                <a14:hiddenLine xmlns:a14="http://schemas.microsoft.com/office/drawing/2010/main" xmlns="" w="9525">
+                <a14:hiddenLine xmlns="" xmlns:a14="http://schemas.microsoft.com/office/drawing/2010/main" w="9525">
                   <a:solidFill>
                     <a:schemeClr val="tx1"/>
                   </a:solidFill>
@@ -24197,7 +24197,7 @@
                 </a14:hiddenLine>
               </a:ext>
               <a:ext uri="{AF507438-7753-43e0-B8FC-AC1667EBCBE1}">
-                <a14:hiddenEffects xmlns:a14="http://schemas.microsoft.com/office/drawing/2010/main" xmlns="">
+                <a14:hiddenEffects xmlns="" xmlns:a14="http://schemas.microsoft.com/office/drawing/2010/main">
                   <a:effectLst>
                     <a:outerShdw blurRad="63500" dist="38099" dir="2700000" algn="ctr" rotWithShape="0">
                       <a:schemeClr val="bg2">
@@ -24287,7 +24287,7 @@
             <a:effectLst/>
             <a:extLst>
               <a:ext uri="{AF507438-7753-43e0-B8FC-AC1667EBCBE1}">
-                <a14:hiddenEffects xmlns:a14="http://schemas.microsoft.com/office/drawing/2010/main" xmlns="">
+                <a14:hiddenEffects xmlns="" xmlns:a14="http://schemas.microsoft.com/office/drawing/2010/main">
                   <a:effectLst>
                     <a:outerShdw blurRad="63500" dist="38099" dir="2700000" algn="ctr" rotWithShape="0">
                       <a:schemeClr val="bg2">
@@ -24339,14 +24339,14 @@
             <a:effectLst/>
             <a:extLst>
               <a:ext uri="{909E8E84-426E-40dd-AFC4-6F175D3DCCD1}">
-                <a14:hiddenFill xmlns:a14="http://schemas.microsoft.com/office/drawing/2010/main" xmlns="">
+                <a14:hiddenFill xmlns="" xmlns:a14="http://schemas.microsoft.com/office/drawing/2010/main">
                   <a:solidFill>
                     <a:schemeClr val="accent1"/>
                   </a:solidFill>
                 </a14:hiddenFill>
               </a:ext>
               <a:ext uri="{91240B29-F687-4f45-9708-019B960494DF}">
-                <a14:hiddenLine xmlns:a14="http://schemas.microsoft.com/office/drawing/2010/main" xmlns="" w="9525">
+                <a14:hiddenLine xmlns="" xmlns:a14="http://schemas.microsoft.com/office/drawing/2010/main" w="9525">
                   <a:solidFill>
                     <a:schemeClr val="tx1"/>
                   </a:solidFill>
@@ -24356,7 +24356,7 @@
                 </a14:hiddenLine>
               </a:ext>
               <a:ext uri="{AF507438-7753-43e0-B8FC-AC1667EBCBE1}">
-                <a14:hiddenEffects xmlns:a14="http://schemas.microsoft.com/office/drawing/2010/main" xmlns="">
+                <a14:hiddenEffects xmlns="" xmlns:a14="http://schemas.microsoft.com/office/drawing/2010/main">
                   <a:effectLst>
                     <a:outerShdw blurRad="63500" dist="38099" dir="2700000" algn="ctr" rotWithShape="0">
                       <a:schemeClr val="bg2">
@@ -24446,7 +24446,7 @@
             <a:effectLst/>
             <a:extLst>
               <a:ext uri="{AF507438-7753-43e0-B8FC-AC1667EBCBE1}">
-                <a14:hiddenEffects xmlns:a14="http://schemas.microsoft.com/office/drawing/2010/main" xmlns="">
+                <a14:hiddenEffects xmlns="" xmlns:a14="http://schemas.microsoft.com/office/drawing/2010/main">
                   <a:effectLst>
                     <a:outerShdw blurRad="63500" dist="38099" dir="2700000" algn="ctr" rotWithShape="0">
                       <a:schemeClr val="bg2">
@@ -24498,14 +24498,14 @@
             <a:effectLst/>
             <a:extLst>
               <a:ext uri="{909E8E84-426E-40dd-AFC4-6F175D3DCCD1}">
-                <a14:hiddenFill xmlns:a14="http://schemas.microsoft.com/office/drawing/2010/main" xmlns="">
+                <a14:hiddenFill xmlns="" xmlns:a14="http://schemas.microsoft.com/office/drawing/2010/main">
                   <a:solidFill>
                     <a:schemeClr val="accent1"/>
                   </a:solidFill>
                 </a14:hiddenFill>
               </a:ext>
               <a:ext uri="{91240B29-F687-4f45-9708-019B960494DF}">
-                <a14:hiddenLine xmlns:a14="http://schemas.microsoft.com/office/drawing/2010/main" xmlns="" w="9525">
+                <a14:hiddenLine xmlns="" xmlns:a14="http://schemas.microsoft.com/office/drawing/2010/main" w="9525">
                   <a:solidFill>
                     <a:schemeClr val="tx1"/>
                   </a:solidFill>
@@ -24515,7 +24515,7 @@
                 </a14:hiddenLine>
               </a:ext>
               <a:ext uri="{AF507438-7753-43e0-B8FC-AC1667EBCBE1}">
-                <a14:hiddenEffects xmlns:a14="http://schemas.microsoft.com/office/drawing/2010/main" xmlns="">
+                <a14:hiddenEffects xmlns="" xmlns:a14="http://schemas.microsoft.com/office/drawing/2010/main">
                   <a:effectLst>
                     <a:outerShdw blurRad="63500" dist="38099" dir="2700000" algn="ctr" rotWithShape="0">
                       <a:schemeClr val="bg2">
@@ -25143,7 +25143,7 @@
             <a:effectLst/>
             <a:extLst>
               <a:ext uri="{AF507438-7753-43e0-B8FC-AC1667EBCBE1}">
-                <a14:hiddenEffects xmlns:a14="http://schemas.microsoft.com/office/drawing/2010/main" xmlns="">
+                <a14:hiddenEffects xmlns="" xmlns:a14="http://schemas.microsoft.com/office/drawing/2010/main">
                   <a:effectLst>
                     <a:outerShdw blurRad="63500" dist="38099" dir="2700000" algn="ctr" rotWithShape="0">
                       <a:schemeClr val="bg2">
@@ -25195,14 +25195,14 @@
             <a:effectLst/>
             <a:extLst>
               <a:ext uri="{909E8E84-426E-40dd-AFC4-6F175D3DCCD1}">
-                <a14:hiddenFill xmlns:a14="http://schemas.microsoft.com/office/drawing/2010/main" xmlns="">
+                <a14:hiddenFill xmlns="" xmlns:a14="http://schemas.microsoft.com/office/drawing/2010/main">
                   <a:solidFill>
                     <a:schemeClr val="accent1"/>
                   </a:solidFill>
                 </a14:hiddenFill>
               </a:ext>
               <a:ext uri="{91240B29-F687-4f45-9708-019B960494DF}">
-                <a14:hiddenLine xmlns:a14="http://schemas.microsoft.com/office/drawing/2010/main" xmlns="" w="9525">
+                <a14:hiddenLine xmlns="" xmlns:a14="http://schemas.microsoft.com/office/drawing/2010/main" w="9525">
                   <a:solidFill>
                     <a:schemeClr val="tx1"/>
                   </a:solidFill>
@@ -25212,7 +25212,7 @@
                 </a14:hiddenLine>
               </a:ext>
               <a:ext uri="{AF507438-7753-43e0-B8FC-AC1667EBCBE1}">
-                <a14:hiddenEffects xmlns:a14="http://schemas.microsoft.com/office/drawing/2010/main" xmlns="">
+                <a14:hiddenEffects xmlns="" xmlns:a14="http://schemas.microsoft.com/office/drawing/2010/main">
                   <a:effectLst>
                     <a:outerShdw blurRad="63500" dist="38099" dir="2700000" algn="ctr" rotWithShape="0">
                       <a:schemeClr val="bg2">
@@ -25302,7 +25302,7 @@
             <a:effectLst/>
             <a:extLst>
               <a:ext uri="{AF507438-7753-43e0-B8FC-AC1667EBCBE1}">
-                <a14:hiddenEffects xmlns:a14="http://schemas.microsoft.com/office/drawing/2010/main" xmlns="">
+                <a14:hiddenEffects xmlns="" xmlns:a14="http://schemas.microsoft.com/office/drawing/2010/main">
                   <a:effectLst>
                     <a:outerShdw blurRad="63500" dist="38099" dir="2700000" algn="ctr" rotWithShape="0">
                       <a:schemeClr val="bg2">
@@ -25354,14 +25354,14 @@
             <a:effectLst/>
             <a:extLst>
               <a:ext uri="{909E8E84-426E-40dd-AFC4-6F175D3DCCD1}">
-                <a14:hiddenFill xmlns:a14="http://schemas.microsoft.com/office/drawing/2010/main" xmlns="">
+                <a14:hiddenFill xmlns="" xmlns:a14="http://schemas.microsoft.com/office/drawing/2010/main">
                   <a:solidFill>
                     <a:schemeClr val="accent1"/>
                   </a:solidFill>
                 </a14:hiddenFill>
               </a:ext>
               <a:ext uri="{91240B29-F687-4f45-9708-019B960494DF}">
-                <a14:hiddenLine xmlns:a14="http://schemas.microsoft.com/office/drawing/2010/main" xmlns="" w="9525">
+                <a14:hiddenLine xmlns="" xmlns:a14="http://schemas.microsoft.com/office/drawing/2010/main" w="9525">
                   <a:solidFill>
                     <a:schemeClr val="tx1"/>
                   </a:solidFill>
@@ -25371,7 +25371,7 @@
                 </a14:hiddenLine>
               </a:ext>
               <a:ext uri="{AF507438-7753-43e0-B8FC-AC1667EBCBE1}">
-                <a14:hiddenEffects xmlns:a14="http://schemas.microsoft.com/office/drawing/2010/main" xmlns="">
+                <a14:hiddenEffects xmlns="" xmlns:a14="http://schemas.microsoft.com/office/drawing/2010/main">
                   <a:effectLst>
                     <a:outerShdw blurRad="63500" dist="38099" dir="2700000" algn="ctr" rotWithShape="0">
                       <a:schemeClr val="bg2">
@@ -25461,7 +25461,7 @@
             <a:effectLst/>
             <a:extLst>
               <a:ext uri="{AF507438-7753-43e0-B8FC-AC1667EBCBE1}">
-                <a14:hiddenEffects xmlns:a14="http://schemas.microsoft.com/office/drawing/2010/main" xmlns="">
+                <a14:hiddenEffects xmlns="" xmlns:a14="http://schemas.microsoft.com/office/drawing/2010/main">
                   <a:effectLst>
                     <a:outerShdw blurRad="63500" dist="38099" dir="2700000" algn="ctr" rotWithShape="0">
                       <a:schemeClr val="bg2">
@@ -25513,14 +25513,14 @@
             <a:effectLst/>
             <a:extLst>
               <a:ext uri="{909E8E84-426E-40dd-AFC4-6F175D3DCCD1}">
-                <a14:hiddenFill xmlns:a14="http://schemas.microsoft.com/office/drawing/2010/main" xmlns="">
+                <a14:hiddenFill xmlns="" xmlns:a14="http://schemas.microsoft.com/office/drawing/2010/main">
                   <a:solidFill>
                     <a:schemeClr val="accent1"/>
                   </a:solidFill>
                 </a14:hiddenFill>
               </a:ext>
               <a:ext uri="{91240B29-F687-4f45-9708-019B960494DF}">
-                <a14:hiddenLine xmlns:a14="http://schemas.microsoft.com/office/drawing/2010/main" xmlns="" w="9525">
+                <a14:hiddenLine xmlns="" xmlns:a14="http://schemas.microsoft.com/office/drawing/2010/main" w="9525">
                   <a:solidFill>
                     <a:schemeClr val="tx1"/>
                   </a:solidFill>
@@ -25530,7 +25530,7 @@
                 </a14:hiddenLine>
               </a:ext>
               <a:ext uri="{AF507438-7753-43e0-B8FC-AC1667EBCBE1}">
-                <a14:hiddenEffects xmlns:a14="http://schemas.microsoft.com/office/drawing/2010/main" xmlns="">
+                <a14:hiddenEffects xmlns="" xmlns:a14="http://schemas.microsoft.com/office/drawing/2010/main">
                   <a:effectLst>
                     <a:outerShdw blurRad="63500" dist="38099" dir="2700000" algn="ctr" rotWithShape="0">
                       <a:schemeClr val="bg2">
@@ -25759,7 +25759,7 @@
             <a:effectLst/>
             <a:extLst>
               <a:ext uri="{AF507438-7753-43e0-B8FC-AC1667EBCBE1}">
-                <a14:hiddenEffects xmlns:a14="http://schemas.microsoft.com/office/drawing/2010/main" xmlns="">
+                <a14:hiddenEffects xmlns="" xmlns:a14="http://schemas.microsoft.com/office/drawing/2010/main">
                   <a:effectLst>
                     <a:outerShdw blurRad="63500" dist="38099" dir="2700000" algn="ctr" rotWithShape="0">
                       <a:schemeClr val="bg2">
@@ -25811,14 +25811,14 @@
             <a:effectLst/>
             <a:extLst>
               <a:ext uri="{909E8E84-426E-40dd-AFC4-6F175D3DCCD1}">
-                <a14:hiddenFill xmlns:a14="http://schemas.microsoft.com/office/drawing/2010/main" xmlns="">
+                <a14:hiddenFill xmlns="" xmlns:a14="http://schemas.microsoft.com/office/drawing/2010/main">
                   <a:solidFill>
                     <a:schemeClr val="accent1"/>
                   </a:solidFill>
                 </a14:hiddenFill>
               </a:ext>
               <a:ext uri="{91240B29-F687-4f45-9708-019B960494DF}">
-                <a14:hiddenLine xmlns:a14="http://schemas.microsoft.com/office/drawing/2010/main" xmlns="" w="9525">
+                <a14:hiddenLine xmlns="" xmlns:a14="http://schemas.microsoft.com/office/drawing/2010/main" w="9525">
                   <a:solidFill>
                     <a:schemeClr val="tx1"/>
                   </a:solidFill>
@@ -25828,7 +25828,7 @@
                 </a14:hiddenLine>
               </a:ext>
               <a:ext uri="{AF507438-7753-43e0-B8FC-AC1667EBCBE1}">
-                <a14:hiddenEffects xmlns:a14="http://schemas.microsoft.com/office/drawing/2010/main" xmlns="">
+                <a14:hiddenEffects xmlns="" xmlns:a14="http://schemas.microsoft.com/office/drawing/2010/main">
                   <a:effectLst>
                     <a:outerShdw blurRad="63500" dist="38099" dir="2700000" algn="ctr" rotWithShape="0">
                       <a:schemeClr val="bg2">
@@ -25918,7 +25918,7 @@
             <a:effectLst/>
             <a:extLst>
               <a:ext uri="{AF507438-7753-43e0-B8FC-AC1667EBCBE1}">
-                <a14:hiddenEffects xmlns:a14="http://schemas.microsoft.com/office/drawing/2010/main" xmlns="">
+                <a14:hiddenEffects xmlns="" xmlns:a14="http://schemas.microsoft.com/office/drawing/2010/main">
                   <a:effectLst>
                     <a:outerShdw blurRad="63500" dist="38099" dir="2700000" algn="ctr" rotWithShape="0">
                       <a:schemeClr val="bg2">
@@ -25970,14 +25970,14 @@
             <a:effectLst/>
             <a:extLst>
               <a:ext uri="{909E8E84-426E-40dd-AFC4-6F175D3DCCD1}">
-                <a14:hiddenFill xmlns:a14="http://schemas.microsoft.com/office/drawing/2010/main" xmlns="">
+                <a14:hiddenFill xmlns="" xmlns:a14="http://schemas.microsoft.com/office/drawing/2010/main">
                   <a:solidFill>
                     <a:schemeClr val="accent1"/>
                   </a:solidFill>
                 </a14:hiddenFill>
               </a:ext>
               <a:ext uri="{91240B29-F687-4f45-9708-019B960494DF}">
-                <a14:hiddenLine xmlns:a14="http://schemas.microsoft.com/office/drawing/2010/main" xmlns="" w="9525">
+                <a14:hiddenLine xmlns="" xmlns:a14="http://schemas.microsoft.com/office/drawing/2010/main" w="9525">
                   <a:solidFill>
                     <a:schemeClr val="tx1"/>
                   </a:solidFill>
@@ -25987,7 +25987,7 @@
                 </a14:hiddenLine>
               </a:ext>
               <a:ext uri="{AF507438-7753-43e0-B8FC-AC1667EBCBE1}">
-                <a14:hiddenEffects xmlns:a14="http://schemas.microsoft.com/office/drawing/2010/main" xmlns="">
+                <a14:hiddenEffects xmlns="" xmlns:a14="http://schemas.microsoft.com/office/drawing/2010/main">
                   <a:effectLst>
                     <a:outerShdw blurRad="63500" dist="38099" dir="2700000" algn="ctr" rotWithShape="0">
                       <a:schemeClr val="bg2">
@@ -26077,7 +26077,7 @@
             <a:effectLst/>
             <a:extLst>
               <a:ext uri="{AF507438-7753-43e0-B8FC-AC1667EBCBE1}">
-                <a14:hiddenEffects xmlns:a14="http://schemas.microsoft.com/office/drawing/2010/main" xmlns="">
+                <a14:hiddenEffects xmlns="" xmlns:a14="http://schemas.microsoft.com/office/drawing/2010/main">
                   <a:effectLst>
                     <a:outerShdw blurRad="63500" dist="38099" dir="2700000" algn="ctr" rotWithShape="0">
                       <a:schemeClr val="bg2">
@@ -26129,14 +26129,14 @@
             <a:effectLst/>
             <a:extLst>
               <a:ext uri="{909E8E84-426E-40dd-AFC4-6F175D3DCCD1}">
-                <a14:hiddenFill xmlns:a14="http://schemas.microsoft.com/office/drawing/2010/main" xmlns="">
+                <a14:hiddenFill xmlns="" xmlns:a14="http://schemas.microsoft.com/office/drawing/2010/main">
                   <a:solidFill>
                     <a:schemeClr val="accent1"/>
                   </a:solidFill>
                 </a14:hiddenFill>
               </a:ext>
               <a:ext uri="{91240B29-F687-4f45-9708-019B960494DF}">
-                <a14:hiddenLine xmlns:a14="http://schemas.microsoft.com/office/drawing/2010/main" xmlns="" w="9525">
+                <a14:hiddenLine xmlns="" xmlns:a14="http://schemas.microsoft.com/office/drawing/2010/main" w="9525">
                   <a:solidFill>
                     <a:schemeClr val="tx1"/>
                   </a:solidFill>
@@ -26146,7 +26146,7 @@
                 </a14:hiddenLine>
               </a:ext>
               <a:ext uri="{AF507438-7753-43e0-B8FC-AC1667EBCBE1}">
-                <a14:hiddenEffects xmlns:a14="http://schemas.microsoft.com/office/drawing/2010/main" xmlns="">
+                <a14:hiddenEffects xmlns="" xmlns:a14="http://schemas.microsoft.com/office/drawing/2010/main">
                   <a:effectLst>
                     <a:outerShdw blurRad="63500" dist="38099" dir="2700000" algn="ctr" rotWithShape="0">
                       <a:schemeClr val="bg2">
@@ -26421,7 +26421,7 @@
             <a:effectLst/>
             <a:extLst>
               <a:ext uri="{AF507438-7753-43e0-B8FC-AC1667EBCBE1}">
-                <a14:hiddenEffects xmlns:a14="http://schemas.microsoft.com/office/drawing/2010/main" xmlns="">
+                <a14:hiddenEffects xmlns="" xmlns:a14="http://schemas.microsoft.com/office/drawing/2010/main">
                   <a:effectLst>
                     <a:outerShdw blurRad="63500" dist="38099" dir="2700000" algn="ctr" rotWithShape="0">
                       <a:schemeClr val="bg2">
@@ -26473,14 +26473,14 @@
             <a:effectLst/>
             <a:extLst>
               <a:ext uri="{909E8E84-426E-40dd-AFC4-6F175D3DCCD1}">
-                <a14:hiddenFill xmlns:a14="http://schemas.microsoft.com/office/drawing/2010/main" xmlns="">
+                <a14:hiddenFill xmlns="" xmlns:a14="http://schemas.microsoft.com/office/drawing/2010/main">
                   <a:solidFill>
                     <a:schemeClr val="accent1"/>
                   </a:solidFill>
                 </a14:hiddenFill>
               </a:ext>
               <a:ext uri="{91240B29-F687-4f45-9708-019B960494DF}">
-                <a14:hiddenLine xmlns:a14="http://schemas.microsoft.com/office/drawing/2010/main" xmlns="" w="9525">
+                <a14:hiddenLine xmlns="" xmlns:a14="http://schemas.microsoft.com/office/drawing/2010/main" w="9525">
                   <a:solidFill>
                     <a:schemeClr val="tx1"/>
                   </a:solidFill>
@@ -26490,7 +26490,7 @@
                 </a14:hiddenLine>
               </a:ext>
               <a:ext uri="{AF507438-7753-43e0-B8FC-AC1667EBCBE1}">
-                <a14:hiddenEffects xmlns:a14="http://schemas.microsoft.com/office/drawing/2010/main" xmlns="">
+                <a14:hiddenEffects xmlns="" xmlns:a14="http://schemas.microsoft.com/office/drawing/2010/main">
                   <a:effectLst>
                     <a:outerShdw blurRad="63500" dist="38099" dir="2700000" algn="ctr" rotWithShape="0">
                       <a:schemeClr val="bg2">
@@ -26580,7 +26580,7 @@
             <a:effectLst/>
             <a:extLst>
               <a:ext uri="{AF507438-7753-43e0-B8FC-AC1667EBCBE1}">
-                <a14:hiddenEffects xmlns:a14="http://schemas.microsoft.com/office/drawing/2010/main" xmlns="">
+                <a14:hiddenEffects xmlns="" xmlns:a14="http://schemas.microsoft.com/office/drawing/2010/main">
                   <a:effectLst>
                     <a:outerShdw blurRad="63500" dist="38099" dir="2700000" algn="ctr" rotWithShape="0">
                       <a:schemeClr val="bg2">
@@ -26632,14 +26632,14 @@
             <a:effectLst/>
             <a:extLst>
               <a:ext uri="{909E8E84-426E-40dd-AFC4-6F175D3DCCD1}">
-                <a14:hiddenFill xmlns:a14="http://schemas.microsoft.com/office/drawing/2010/main" xmlns="">
+                <a14:hiddenFill xmlns="" xmlns:a14="http://schemas.microsoft.com/office/drawing/2010/main">
                   <a:solidFill>
                     <a:schemeClr val="accent1"/>
                   </a:solidFill>
                 </a14:hiddenFill>
               </a:ext>
               <a:ext uri="{91240B29-F687-4f45-9708-019B960494DF}">
-                <a14:hiddenLine xmlns:a14="http://schemas.microsoft.com/office/drawing/2010/main" xmlns="" w="9525">
+                <a14:hiddenLine xmlns="" xmlns:a14="http://schemas.microsoft.com/office/drawing/2010/main" w="9525">
                   <a:solidFill>
                     <a:schemeClr val="tx1"/>
                   </a:solidFill>
@@ -26649,7 +26649,7 @@
                 </a14:hiddenLine>
               </a:ext>
               <a:ext uri="{AF507438-7753-43e0-B8FC-AC1667EBCBE1}">
-                <a14:hiddenEffects xmlns:a14="http://schemas.microsoft.com/office/drawing/2010/main" xmlns="">
+                <a14:hiddenEffects xmlns="" xmlns:a14="http://schemas.microsoft.com/office/drawing/2010/main">
                   <a:effectLst>
                     <a:outerShdw blurRad="63500" dist="38099" dir="2700000" algn="ctr" rotWithShape="0">
                       <a:schemeClr val="bg2">
@@ -26739,7 +26739,7 @@
             <a:effectLst/>
             <a:extLst>
               <a:ext uri="{AF507438-7753-43e0-B8FC-AC1667EBCBE1}">
-                <a14:hiddenEffects xmlns:a14="http://schemas.microsoft.com/office/drawing/2010/main" xmlns="">
+                <a14:hiddenEffects xmlns="" xmlns:a14="http://schemas.microsoft.com/office/drawing/2010/main">
                   <a:effectLst>
                     <a:outerShdw blurRad="63500" dist="38099" dir="2700000" algn="ctr" rotWithShape="0">
                       <a:schemeClr val="bg2">
@@ -26791,14 +26791,14 @@
             <a:effectLst/>
             <a:extLst>
               <a:ext uri="{909E8E84-426E-40dd-AFC4-6F175D3DCCD1}">
-                <a14:hiddenFill xmlns:a14="http://schemas.microsoft.com/office/drawing/2010/main" xmlns="">
+                <a14:hiddenFill xmlns="" xmlns:a14="http://schemas.microsoft.com/office/drawing/2010/main">
                   <a:solidFill>
                     <a:schemeClr val="accent1"/>
                   </a:solidFill>
                 </a14:hiddenFill>
               </a:ext>
               <a:ext uri="{91240B29-F687-4f45-9708-019B960494DF}">
-                <a14:hiddenLine xmlns:a14="http://schemas.microsoft.com/office/drawing/2010/main" xmlns="" w="9525">
+                <a14:hiddenLine xmlns="" xmlns:a14="http://schemas.microsoft.com/office/drawing/2010/main" w="9525">
                   <a:solidFill>
                     <a:schemeClr val="tx1"/>
                   </a:solidFill>
@@ -26808,7 +26808,7 @@
                 </a14:hiddenLine>
               </a:ext>
               <a:ext uri="{AF507438-7753-43e0-B8FC-AC1667EBCBE1}">
-                <a14:hiddenEffects xmlns:a14="http://schemas.microsoft.com/office/drawing/2010/main" xmlns="">
+                <a14:hiddenEffects xmlns="" xmlns:a14="http://schemas.microsoft.com/office/drawing/2010/main">
                   <a:effectLst>
                     <a:outerShdw blurRad="63500" dist="38099" dir="2700000" algn="ctr" rotWithShape="0">
                       <a:schemeClr val="bg2">
@@ -27589,7 +27589,7 @@
             <a:effectLst/>
             <a:extLst>
               <a:ext uri="{AF507438-7753-43e0-B8FC-AC1667EBCBE1}">
-                <a14:hiddenEffects xmlns:a14="http://schemas.microsoft.com/office/drawing/2010/main" xmlns="">
+                <a14:hiddenEffects xmlns="" xmlns:a14="http://schemas.microsoft.com/office/drawing/2010/main">
                   <a:effectLst>
                     <a:outerShdw blurRad="63500" dist="38099" dir="2700000" algn="ctr" rotWithShape="0">
                       <a:schemeClr val="bg2">
@@ -27641,14 +27641,14 @@
             <a:effectLst/>
             <a:extLst>
               <a:ext uri="{909E8E84-426E-40dd-AFC4-6F175D3DCCD1}">
-                <a14:hiddenFill xmlns:a14="http://schemas.microsoft.com/office/drawing/2010/main" xmlns="">
+                <a14:hiddenFill xmlns="" xmlns:a14="http://schemas.microsoft.com/office/drawing/2010/main">
                   <a:solidFill>
                     <a:schemeClr val="accent1"/>
                   </a:solidFill>
                 </a14:hiddenFill>
               </a:ext>
               <a:ext uri="{91240B29-F687-4f45-9708-019B960494DF}">
-                <a14:hiddenLine xmlns:a14="http://schemas.microsoft.com/office/drawing/2010/main" xmlns="" w="9525">
+                <a14:hiddenLine xmlns="" xmlns:a14="http://schemas.microsoft.com/office/drawing/2010/main" w="9525">
                   <a:solidFill>
                     <a:schemeClr val="tx1"/>
                   </a:solidFill>
@@ -27658,7 +27658,7 @@
                 </a14:hiddenLine>
               </a:ext>
               <a:ext uri="{AF507438-7753-43e0-B8FC-AC1667EBCBE1}">
-                <a14:hiddenEffects xmlns:a14="http://schemas.microsoft.com/office/drawing/2010/main" xmlns="">
+                <a14:hiddenEffects xmlns="" xmlns:a14="http://schemas.microsoft.com/office/drawing/2010/main">
                   <a:effectLst>
                     <a:outerShdw blurRad="63500" dist="38099" dir="2700000" algn="ctr" rotWithShape="0">
                       <a:schemeClr val="bg2">
@@ -27748,7 +27748,7 @@
             <a:effectLst/>
             <a:extLst>
               <a:ext uri="{AF507438-7753-43e0-B8FC-AC1667EBCBE1}">
-                <a14:hiddenEffects xmlns:a14="http://schemas.microsoft.com/office/drawing/2010/main" xmlns="">
+                <a14:hiddenEffects xmlns="" xmlns:a14="http://schemas.microsoft.com/office/drawing/2010/main">
                   <a:effectLst>
                     <a:outerShdw blurRad="63500" dist="38099" dir="2700000" algn="ctr" rotWithShape="0">
                       <a:schemeClr val="bg2">
@@ -27800,14 +27800,14 @@
             <a:effectLst/>
             <a:extLst>
               <a:ext uri="{909E8E84-426E-40dd-AFC4-6F175D3DCCD1}">
-                <a14:hiddenFill xmlns:a14="http://schemas.microsoft.com/office/drawing/2010/main" xmlns="">
+                <a14:hiddenFill xmlns="" xmlns:a14="http://schemas.microsoft.com/office/drawing/2010/main">
                   <a:solidFill>
                     <a:schemeClr val="accent1"/>
                   </a:solidFill>
                 </a14:hiddenFill>
               </a:ext>
               <a:ext uri="{91240B29-F687-4f45-9708-019B960494DF}">
-                <a14:hiddenLine xmlns:a14="http://schemas.microsoft.com/office/drawing/2010/main" xmlns="" w="9525">
+                <a14:hiddenLine xmlns="" xmlns:a14="http://schemas.microsoft.com/office/drawing/2010/main" w="9525">
                   <a:solidFill>
                     <a:schemeClr val="tx1"/>
                   </a:solidFill>
@@ -27817,7 +27817,7 @@
                 </a14:hiddenLine>
               </a:ext>
               <a:ext uri="{AF507438-7753-43e0-B8FC-AC1667EBCBE1}">
-                <a14:hiddenEffects xmlns:a14="http://schemas.microsoft.com/office/drawing/2010/main" xmlns="">
+                <a14:hiddenEffects xmlns="" xmlns:a14="http://schemas.microsoft.com/office/drawing/2010/main">
                   <a:effectLst>
                     <a:outerShdw blurRad="63500" dist="38099" dir="2700000" algn="ctr" rotWithShape="0">
                       <a:schemeClr val="bg2">
@@ -27907,7 +27907,7 @@
             <a:effectLst/>
             <a:extLst>
               <a:ext uri="{AF507438-7753-43e0-B8FC-AC1667EBCBE1}">
-                <a14:hiddenEffects xmlns:a14="http://schemas.microsoft.com/office/drawing/2010/main" xmlns="">
+                <a14:hiddenEffects xmlns="" xmlns:a14="http://schemas.microsoft.com/office/drawing/2010/main">
                   <a:effectLst>
                     <a:outerShdw blurRad="63500" dist="38099" dir="2700000" algn="ctr" rotWithShape="0">
                       <a:schemeClr val="bg2">
@@ -27959,14 +27959,14 @@
             <a:effectLst/>
             <a:extLst>
               <a:ext uri="{909E8E84-426E-40dd-AFC4-6F175D3DCCD1}">
-                <a14:hiddenFill xmlns:a14="http://schemas.microsoft.com/office/drawing/2010/main" xmlns="">
+                <a14:hiddenFill xmlns="" xmlns:a14="http://schemas.microsoft.com/office/drawing/2010/main">
                   <a:solidFill>
                     <a:schemeClr val="accent1"/>
                   </a:solidFill>
                 </a14:hiddenFill>
               </a:ext>
               <a:ext uri="{91240B29-F687-4f45-9708-019B960494DF}">
-                <a14:hiddenLine xmlns:a14="http://schemas.microsoft.com/office/drawing/2010/main" xmlns="" w="9525">
+                <a14:hiddenLine xmlns="" xmlns:a14="http://schemas.microsoft.com/office/drawing/2010/main" w="9525">
                   <a:solidFill>
                     <a:schemeClr val="tx1"/>
                   </a:solidFill>
@@ -27976,7 +27976,7 @@
                 </a14:hiddenLine>
               </a:ext>
               <a:ext uri="{AF507438-7753-43e0-B8FC-AC1667EBCBE1}">
-                <a14:hiddenEffects xmlns:a14="http://schemas.microsoft.com/office/drawing/2010/main" xmlns="">
+                <a14:hiddenEffects xmlns="" xmlns:a14="http://schemas.microsoft.com/office/drawing/2010/main">
                   <a:effectLst>
                     <a:outerShdw blurRad="63500" dist="38099" dir="2700000" algn="ctr" rotWithShape="0">
                       <a:schemeClr val="bg2">
@@ -28205,7 +28205,7 @@
             <a:effectLst/>
             <a:extLst>
               <a:ext uri="{AF507438-7753-43e0-B8FC-AC1667EBCBE1}">
-                <a14:hiddenEffects xmlns:a14="http://schemas.microsoft.com/office/drawing/2010/main" xmlns="">
+                <a14:hiddenEffects xmlns="" xmlns:a14="http://schemas.microsoft.com/office/drawing/2010/main">
                   <a:effectLst>
                     <a:outerShdw blurRad="63500" dist="38099" dir="2700000" algn="ctr" rotWithShape="0">
                       <a:schemeClr val="bg2">
@@ -28257,14 +28257,14 @@
             <a:effectLst/>
             <a:extLst>
               <a:ext uri="{909E8E84-426E-40dd-AFC4-6F175D3DCCD1}">
-                <a14:hiddenFill xmlns:a14="http://schemas.microsoft.com/office/drawing/2010/main" xmlns="">
+                <a14:hiddenFill xmlns="" xmlns:a14="http://schemas.microsoft.com/office/drawing/2010/main">
                   <a:solidFill>
                     <a:schemeClr val="accent1"/>
                   </a:solidFill>
                 </a14:hiddenFill>
               </a:ext>
               <a:ext uri="{91240B29-F687-4f45-9708-019B960494DF}">
-                <a14:hiddenLine xmlns:a14="http://schemas.microsoft.com/office/drawing/2010/main" xmlns="" w="9525">
+                <a14:hiddenLine xmlns="" xmlns:a14="http://schemas.microsoft.com/office/drawing/2010/main" w="9525">
                   <a:solidFill>
                     <a:schemeClr val="tx1"/>
                   </a:solidFill>
@@ -28274,7 +28274,7 @@
                 </a14:hiddenLine>
               </a:ext>
               <a:ext uri="{AF507438-7753-43e0-B8FC-AC1667EBCBE1}">
-                <a14:hiddenEffects xmlns:a14="http://schemas.microsoft.com/office/drawing/2010/main" xmlns="">
+                <a14:hiddenEffects xmlns="" xmlns:a14="http://schemas.microsoft.com/office/drawing/2010/main">
                   <a:effectLst>
                     <a:outerShdw blurRad="63500" dist="38099" dir="2700000" algn="ctr" rotWithShape="0">
                       <a:schemeClr val="bg2">
@@ -28364,7 +28364,7 @@
             <a:effectLst/>
             <a:extLst>
               <a:ext uri="{AF507438-7753-43e0-B8FC-AC1667EBCBE1}">
-                <a14:hiddenEffects xmlns:a14="http://schemas.microsoft.com/office/drawing/2010/main" xmlns="">
+                <a14:hiddenEffects xmlns="" xmlns:a14="http://schemas.microsoft.com/office/drawing/2010/main">
                   <a:effectLst>
                     <a:outerShdw blurRad="63500" dist="38099" dir="2700000" algn="ctr" rotWithShape="0">
                       <a:schemeClr val="bg2">
@@ -28416,14 +28416,14 @@
             <a:effectLst/>
             <a:extLst>
               <a:ext uri="{909E8E84-426E-40dd-AFC4-6F175D3DCCD1}">
-                <a14:hiddenFill xmlns:a14="http://schemas.microsoft.com/office/drawing/2010/main" xmlns="">
+                <a14:hiddenFill xmlns="" xmlns:a14="http://schemas.microsoft.com/office/drawing/2010/main">
                   <a:solidFill>
                     <a:schemeClr val="accent1"/>
                   </a:solidFill>
                 </a14:hiddenFill>
               </a:ext>
               <a:ext uri="{91240B29-F687-4f45-9708-019B960494DF}">
-                <a14:hiddenLine xmlns:a14="http://schemas.microsoft.com/office/drawing/2010/main" xmlns="" w="9525">
+                <a14:hiddenLine xmlns="" xmlns:a14="http://schemas.microsoft.com/office/drawing/2010/main" w="9525">
                   <a:solidFill>
                     <a:schemeClr val="tx1"/>
                   </a:solidFill>
@@ -28433,7 +28433,7 @@
                 </a14:hiddenLine>
               </a:ext>
               <a:ext uri="{AF507438-7753-43e0-B8FC-AC1667EBCBE1}">
-                <a14:hiddenEffects xmlns:a14="http://schemas.microsoft.com/office/drawing/2010/main" xmlns="">
+                <a14:hiddenEffects xmlns="" xmlns:a14="http://schemas.microsoft.com/office/drawing/2010/main">
                   <a:effectLst>
                     <a:outerShdw blurRad="63500" dist="38099" dir="2700000" algn="ctr" rotWithShape="0">
                       <a:schemeClr val="bg2">
@@ -28523,7 +28523,7 @@
             <a:effectLst/>
             <a:extLst>
               <a:ext uri="{AF507438-7753-43e0-B8FC-AC1667EBCBE1}">
-                <a14:hiddenEffects xmlns:a14="http://schemas.microsoft.com/office/drawing/2010/main" xmlns="">
+                <a14:hiddenEffects xmlns="" xmlns:a14="http://schemas.microsoft.com/office/drawing/2010/main">
                   <a:effectLst>
                     <a:outerShdw blurRad="63500" dist="38099" dir="2700000" algn="ctr" rotWithShape="0">
                       <a:schemeClr val="bg2">
@@ -28575,14 +28575,14 @@
             <a:effectLst/>
             <a:extLst>
               <a:ext uri="{909E8E84-426E-40dd-AFC4-6F175D3DCCD1}">
-                <a14:hiddenFill xmlns:a14="http://schemas.microsoft.com/office/drawing/2010/main" xmlns="">
+                <a14:hiddenFill xmlns="" xmlns:a14="http://schemas.microsoft.com/office/drawing/2010/main">
                   <a:solidFill>
                     <a:schemeClr val="accent1"/>
                   </a:solidFill>
                 </a14:hiddenFill>
               </a:ext>
               <a:ext uri="{91240B29-F687-4f45-9708-019B960494DF}">
-                <a14:hiddenLine xmlns:a14="http://schemas.microsoft.com/office/drawing/2010/main" xmlns="" w="9525">
+                <a14:hiddenLine xmlns="" xmlns:a14="http://schemas.microsoft.com/office/drawing/2010/main" w="9525">
                   <a:solidFill>
                     <a:schemeClr val="tx1"/>
                   </a:solidFill>
@@ -28592,7 +28592,7 @@
                 </a14:hiddenLine>
               </a:ext>
               <a:ext uri="{AF507438-7753-43e0-B8FC-AC1667EBCBE1}">
-                <a14:hiddenEffects xmlns:a14="http://schemas.microsoft.com/office/drawing/2010/main" xmlns="">
+                <a14:hiddenEffects xmlns="" xmlns:a14="http://schemas.microsoft.com/office/drawing/2010/main">
                   <a:effectLst>
                     <a:outerShdw blurRad="63500" dist="38099" dir="2700000" algn="ctr" rotWithShape="0">
                       <a:schemeClr val="bg2">
@@ -28867,7 +28867,7 @@
             <a:effectLst/>
             <a:extLst>
               <a:ext uri="{AF507438-7753-43e0-B8FC-AC1667EBCBE1}">
-                <a14:hiddenEffects xmlns:a14="http://schemas.microsoft.com/office/drawing/2010/main" xmlns="">
+                <a14:hiddenEffects xmlns="" xmlns:a14="http://schemas.microsoft.com/office/drawing/2010/main">
                   <a:effectLst>
                     <a:outerShdw blurRad="63500" dist="38099" dir="2700000" algn="ctr" rotWithShape="0">
                       <a:schemeClr val="bg2">
@@ -28919,14 +28919,14 @@
             <a:effectLst/>
             <a:extLst>
               <a:ext uri="{909E8E84-426E-40dd-AFC4-6F175D3DCCD1}">
-                <a14:hiddenFill xmlns:a14="http://schemas.microsoft.com/office/drawing/2010/main" xmlns="">
+                <a14:hiddenFill xmlns="" xmlns:a14="http://schemas.microsoft.com/office/drawing/2010/main">
                   <a:solidFill>
                     <a:schemeClr val="accent1"/>
                   </a:solidFill>
                 </a14:hiddenFill>
               </a:ext>
               <a:ext uri="{91240B29-F687-4f45-9708-019B960494DF}">
-                <a14:hiddenLine xmlns:a14="http://schemas.microsoft.com/office/drawing/2010/main" xmlns="" w="9525">
+                <a14:hiddenLine xmlns="" xmlns:a14="http://schemas.microsoft.com/office/drawing/2010/main" w="9525">
                   <a:solidFill>
                     <a:schemeClr val="tx1"/>
                   </a:solidFill>
@@ -28936,7 +28936,7 @@
                 </a14:hiddenLine>
               </a:ext>
               <a:ext uri="{AF507438-7753-43e0-B8FC-AC1667EBCBE1}">
-                <a14:hiddenEffects xmlns:a14="http://schemas.microsoft.com/office/drawing/2010/main" xmlns="">
+                <a14:hiddenEffects xmlns="" xmlns:a14="http://schemas.microsoft.com/office/drawing/2010/main">
                   <a:effectLst>
                     <a:outerShdw blurRad="63500" dist="38099" dir="2700000" algn="ctr" rotWithShape="0">
                       <a:schemeClr val="bg2">
@@ -29026,7 +29026,7 @@
             <a:effectLst/>
             <a:extLst>
               <a:ext uri="{AF507438-7753-43e0-B8FC-AC1667EBCBE1}">
-                <a14:hiddenEffects xmlns:a14="http://schemas.microsoft.com/office/drawing/2010/main" xmlns="">
+                <a14:hiddenEffects xmlns="" xmlns:a14="http://schemas.microsoft.com/office/drawing/2010/main">
                   <a:effectLst>
                     <a:outerShdw blurRad="63500" dist="38099" dir="2700000" algn="ctr" rotWithShape="0">
                       <a:schemeClr val="bg2">
@@ -29078,14 +29078,14 @@
             <a:effectLst/>
             <a:extLst>
               <a:ext uri="{909E8E84-426E-40dd-AFC4-6F175D3DCCD1}">
-                <a14:hiddenFill xmlns:a14="http://schemas.microsoft.com/office/drawing/2010/main" xmlns="">
+                <a14:hiddenFill xmlns="" xmlns:a14="http://schemas.microsoft.com/office/drawing/2010/main">
                   <a:solidFill>
                     <a:schemeClr val="accent1"/>
                   </a:solidFill>
                 </a14:hiddenFill>
               </a:ext>
               <a:ext uri="{91240B29-F687-4f45-9708-019B960494DF}">
-                <a14:hiddenLine xmlns:a14="http://schemas.microsoft.com/office/drawing/2010/main" xmlns="" w="9525">
+                <a14:hiddenLine xmlns="" xmlns:a14="http://schemas.microsoft.com/office/drawing/2010/main" w="9525">
                   <a:solidFill>
                     <a:schemeClr val="tx1"/>
                   </a:solidFill>
@@ -29095,7 +29095,7 @@
                 </a14:hiddenLine>
               </a:ext>
               <a:ext uri="{AF507438-7753-43e0-B8FC-AC1667EBCBE1}">
-                <a14:hiddenEffects xmlns:a14="http://schemas.microsoft.com/office/drawing/2010/main" xmlns="">
+                <a14:hiddenEffects xmlns="" xmlns:a14="http://schemas.microsoft.com/office/drawing/2010/main">
                   <a:effectLst>
                     <a:outerShdw blurRad="63500" dist="38099" dir="2700000" algn="ctr" rotWithShape="0">
                       <a:schemeClr val="bg2">
@@ -29185,7 +29185,7 @@
             <a:effectLst/>
             <a:extLst>
               <a:ext uri="{AF507438-7753-43e0-B8FC-AC1667EBCBE1}">
-                <a14:hiddenEffects xmlns:a14="http://schemas.microsoft.com/office/drawing/2010/main" xmlns="">
+                <a14:hiddenEffects xmlns="" xmlns:a14="http://schemas.microsoft.com/office/drawing/2010/main">
                   <a:effectLst>
                     <a:outerShdw blurRad="63500" dist="38099" dir="2700000" algn="ctr" rotWithShape="0">
                       <a:schemeClr val="bg2">
@@ -29237,14 +29237,14 @@
             <a:effectLst/>
             <a:extLst>
               <a:ext uri="{909E8E84-426E-40dd-AFC4-6F175D3DCCD1}">
-                <a14:hiddenFill xmlns:a14="http://schemas.microsoft.com/office/drawing/2010/main" xmlns="">
+                <a14:hiddenFill xmlns="" xmlns:a14="http://schemas.microsoft.com/office/drawing/2010/main">
                   <a:solidFill>
                     <a:schemeClr val="accent1"/>
                   </a:solidFill>
                 </a14:hiddenFill>
               </a:ext>
               <a:ext uri="{91240B29-F687-4f45-9708-019B960494DF}">
-                <a14:hiddenLine xmlns:a14="http://schemas.microsoft.com/office/drawing/2010/main" xmlns="" w="9525">
+                <a14:hiddenLine xmlns="" xmlns:a14="http://schemas.microsoft.com/office/drawing/2010/main" w="9525">
                   <a:solidFill>
                     <a:schemeClr val="tx1"/>
                   </a:solidFill>
@@ -29254,7 +29254,7 @@
                 </a14:hiddenLine>
               </a:ext>
               <a:ext uri="{AF507438-7753-43e0-B8FC-AC1667EBCBE1}">
-                <a14:hiddenEffects xmlns:a14="http://schemas.microsoft.com/office/drawing/2010/main" xmlns="">
+                <a14:hiddenEffects xmlns="" xmlns:a14="http://schemas.microsoft.com/office/drawing/2010/main">
                   <a:effectLst>
                     <a:outerShdw blurRad="63500" dist="38099" dir="2700000" algn="ctr" rotWithShape="0">
                       <a:schemeClr val="bg2">
@@ -30265,7 +30265,7 @@
             <a:effectLst/>
             <a:extLst>
               <a:ext uri="{AF507438-7753-43e0-B8FC-AC1667EBCBE1}">
-                <a14:hiddenEffects xmlns:a14="http://schemas.microsoft.com/office/drawing/2010/main" xmlns="">
+                <a14:hiddenEffects xmlns="" xmlns:a14="http://schemas.microsoft.com/office/drawing/2010/main">
                   <a:effectLst>
                     <a:outerShdw blurRad="63500" dist="38099" dir="2700000" algn="ctr" rotWithShape="0">
                       <a:schemeClr val="bg2">
@@ -30317,14 +30317,14 @@
             <a:effectLst/>
             <a:extLst>
               <a:ext uri="{909E8E84-426E-40dd-AFC4-6F175D3DCCD1}">
-                <a14:hiddenFill xmlns:a14="http://schemas.microsoft.com/office/drawing/2010/main" xmlns="">
+                <a14:hiddenFill xmlns="" xmlns:a14="http://schemas.microsoft.com/office/drawing/2010/main">
                   <a:solidFill>
                     <a:schemeClr val="accent1"/>
                   </a:solidFill>
                 </a14:hiddenFill>
               </a:ext>
               <a:ext uri="{91240B29-F687-4f45-9708-019B960494DF}">
-                <a14:hiddenLine xmlns:a14="http://schemas.microsoft.com/office/drawing/2010/main" xmlns="" w="9525">
+                <a14:hiddenLine xmlns="" xmlns:a14="http://schemas.microsoft.com/office/drawing/2010/main" w="9525">
                   <a:solidFill>
                     <a:schemeClr val="tx1"/>
                   </a:solidFill>
@@ -30334,7 +30334,7 @@
                 </a14:hiddenLine>
               </a:ext>
               <a:ext uri="{AF507438-7753-43e0-B8FC-AC1667EBCBE1}">
-                <a14:hiddenEffects xmlns:a14="http://schemas.microsoft.com/office/drawing/2010/main" xmlns="">
+                <a14:hiddenEffects xmlns="" xmlns:a14="http://schemas.microsoft.com/office/drawing/2010/main">
                   <a:effectLst>
                     <a:outerShdw blurRad="63500" dist="38099" dir="2700000" algn="ctr" rotWithShape="0">
                       <a:schemeClr val="bg2">
@@ -30424,7 +30424,7 @@
             <a:effectLst/>
             <a:extLst>
               <a:ext uri="{AF507438-7753-43e0-B8FC-AC1667EBCBE1}">
-                <a14:hiddenEffects xmlns:a14="http://schemas.microsoft.com/office/drawing/2010/main" xmlns="">
+                <a14:hiddenEffects xmlns="" xmlns:a14="http://schemas.microsoft.com/office/drawing/2010/main">
                   <a:effectLst>
                     <a:outerShdw blurRad="63500" dist="38099" dir="2700000" algn="ctr" rotWithShape="0">
                       <a:schemeClr val="bg2">
@@ -30476,14 +30476,14 @@
             <a:effectLst/>
             <a:extLst>
               <a:ext uri="{909E8E84-426E-40dd-AFC4-6F175D3DCCD1}">
-                <a14:hiddenFill xmlns:a14="http://schemas.microsoft.com/office/drawing/2010/main" xmlns="">
+                <a14:hiddenFill xmlns="" xmlns:a14="http://schemas.microsoft.com/office/drawing/2010/main">
                   <a:solidFill>
                     <a:schemeClr val="accent1"/>
                   </a:solidFill>
                 </a14:hiddenFill>
               </a:ext>
               <a:ext uri="{91240B29-F687-4f45-9708-019B960494DF}">
-                <a14:hiddenLine xmlns:a14="http://schemas.microsoft.com/office/drawing/2010/main" xmlns="" w="9525">
+                <a14:hiddenLine xmlns="" xmlns:a14="http://schemas.microsoft.com/office/drawing/2010/main" w="9525">
                   <a:solidFill>
                     <a:schemeClr val="tx1"/>
                   </a:solidFill>
@@ -30493,7 +30493,7 @@
                 </a14:hiddenLine>
               </a:ext>
               <a:ext uri="{AF507438-7753-43e0-B8FC-AC1667EBCBE1}">
-                <a14:hiddenEffects xmlns:a14="http://schemas.microsoft.com/office/drawing/2010/main" xmlns="">
+                <a14:hiddenEffects xmlns="" xmlns:a14="http://schemas.microsoft.com/office/drawing/2010/main">
                   <a:effectLst>
                     <a:outerShdw blurRad="63500" dist="38099" dir="2700000" algn="ctr" rotWithShape="0">
                       <a:schemeClr val="bg2">
@@ -30583,7 +30583,7 @@
             <a:effectLst/>
             <a:extLst>
               <a:ext uri="{AF507438-7753-43e0-B8FC-AC1667EBCBE1}">
-                <a14:hiddenEffects xmlns:a14="http://schemas.microsoft.com/office/drawing/2010/main" xmlns="">
+                <a14:hiddenEffects xmlns="" xmlns:a14="http://schemas.microsoft.com/office/drawing/2010/main">
                   <a:effectLst>
                     <a:outerShdw blurRad="63500" dist="38099" dir="2700000" algn="ctr" rotWithShape="0">
                       <a:schemeClr val="bg2">
@@ -30635,14 +30635,14 @@
             <a:effectLst/>
             <a:extLst>
               <a:ext uri="{909E8E84-426E-40dd-AFC4-6F175D3DCCD1}">
-                <a14:hiddenFill xmlns:a14="http://schemas.microsoft.com/office/drawing/2010/main" xmlns="">
+                <a14:hiddenFill xmlns="" xmlns:a14="http://schemas.microsoft.com/office/drawing/2010/main">
                   <a:solidFill>
                     <a:schemeClr val="accent1"/>
                   </a:solidFill>
                 </a14:hiddenFill>
               </a:ext>
               <a:ext uri="{91240B29-F687-4f45-9708-019B960494DF}">
-                <a14:hiddenLine xmlns:a14="http://schemas.microsoft.com/office/drawing/2010/main" xmlns="" w="9525">
+                <a14:hiddenLine xmlns="" xmlns:a14="http://schemas.microsoft.com/office/drawing/2010/main" w="9525">
                   <a:solidFill>
                     <a:schemeClr val="tx1"/>
                   </a:solidFill>
@@ -30652,7 +30652,7 @@
                 </a14:hiddenLine>
               </a:ext>
               <a:ext uri="{AF507438-7753-43e0-B8FC-AC1667EBCBE1}">
-                <a14:hiddenEffects xmlns:a14="http://schemas.microsoft.com/office/drawing/2010/main" xmlns="">
+                <a14:hiddenEffects xmlns="" xmlns:a14="http://schemas.microsoft.com/office/drawing/2010/main">
                   <a:effectLst>
                     <a:outerShdw blurRad="63500" dist="38099" dir="2700000" algn="ctr" rotWithShape="0">
                       <a:schemeClr val="bg2">
@@ -30881,7 +30881,7 @@
             <a:effectLst/>
             <a:extLst>
               <a:ext uri="{AF507438-7753-43e0-B8FC-AC1667EBCBE1}">
-                <a14:hiddenEffects xmlns:a14="http://schemas.microsoft.com/office/drawing/2010/main" xmlns="">
+                <a14:hiddenEffects xmlns="" xmlns:a14="http://schemas.microsoft.com/office/drawing/2010/main">
                   <a:effectLst>
                     <a:outerShdw blurRad="63500" dist="38099" dir="2700000" algn="ctr" rotWithShape="0">
                       <a:schemeClr val="bg2">
@@ -30933,14 +30933,14 @@
             <a:effectLst/>
             <a:extLst>
               <a:ext uri="{909E8E84-426E-40dd-AFC4-6F175D3DCCD1}">
-                <a14:hiddenFill xmlns:a14="http://schemas.microsoft.com/office/drawing/2010/main" xmlns="">
+                <a14:hiddenFill xmlns="" xmlns:a14="http://schemas.microsoft.com/office/drawing/2010/main">
                   <a:solidFill>
                     <a:schemeClr val="accent1"/>
                   </a:solidFill>
                 </a14:hiddenFill>
               </a:ext>
               <a:ext uri="{91240B29-F687-4f45-9708-019B960494DF}">
-                <a14:hiddenLine xmlns:a14="http://schemas.microsoft.com/office/drawing/2010/main" xmlns="" w="9525">
+                <a14:hiddenLine xmlns="" xmlns:a14="http://schemas.microsoft.com/office/drawing/2010/main" w="9525">
                   <a:solidFill>
                     <a:schemeClr val="tx1"/>
                   </a:solidFill>
@@ -30950,7 +30950,7 @@
                 </a14:hiddenLine>
               </a:ext>
               <a:ext uri="{AF507438-7753-43e0-B8FC-AC1667EBCBE1}">
-                <a14:hiddenEffects xmlns:a14="http://schemas.microsoft.com/office/drawing/2010/main" xmlns="">
+                <a14:hiddenEffects xmlns="" xmlns:a14="http://schemas.microsoft.com/office/drawing/2010/main">
                   <a:effectLst>
                     <a:outerShdw blurRad="63500" dist="38099" dir="2700000" algn="ctr" rotWithShape="0">
                       <a:schemeClr val="bg2">
@@ -31040,7 +31040,7 @@
             <a:effectLst/>
             <a:extLst>
               <a:ext uri="{AF507438-7753-43e0-B8FC-AC1667EBCBE1}">
-                <a14:hiddenEffects xmlns:a14="http://schemas.microsoft.com/office/drawing/2010/main" xmlns="">
+                <a14:hiddenEffects xmlns="" xmlns:a14="http://schemas.microsoft.com/office/drawing/2010/main">
                   <a:effectLst>
                     <a:outerShdw blurRad="63500" dist="38099" dir="2700000" algn="ctr" rotWithShape="0">
                       <a:schemeClr val="bg2">
@@ -31092,14 +31092,14 @@
             <a:effectLst/>
             <a:extLst>
               <a:ext uri="{909E8E84-426E-40dd-AFC4-6F175D3DCCD1}">
-                <a14:hiddenFill xmlns:a14="http://schemas.microsoft.com/office/drawing/2010/main" xmlns="">
+                <a14:hiddenFill xmlns="" xmlns:a14="http://schemas.microsoft.com/office/drawing/2010/main">
                   <a:solidFill>
                     <a:schemeClr val="accent1"/>
                   </a:solidFill>
                 </a14:hiddenFill>
               </a:ext>
               <a:ext uri="{91240B29-F687-4f45-9708-019B960494DF}">
-                <a14:hiddenLine xmlns:a14="http://schemas.microsoft.com/office/drawing/2010/main" xmlns="" w="9525">
+                <a14:hiddenLine xmlns="" xmlns:a14="http://schemas.microsoft.com/office/drawing/2010/main" w="9525">
                   <a:solidFill>
                     <a:schemeClr val="tx1"/>
                   </a:solidFill>
@@ -31109,7 +31109,7 @@
                 </a14:hiddenLine>
               </a:ext>
               <a:ext uri="{AF507438-7753-43e0-B8FC-AC1667EBCBE1}">
-                <a14:hiddenEffects xmlns:a14="http://schemas.microsoft.com/office/drawing/2010/main" xmlns="">
+                <a14:hiddenEffects xmlns="" xmlns:a14="http://schemas.microsoft.com/office/drawing/2010/main">
                   <a:effectLst>
                     <a:outerShdw blurRad="63500" dist="38099" dir="2700000" algn="ctr" rotWithShape="0">
                       <a:schemeClr val="bg2">
@@ -31199,7 +31199,7 @@
             <a:effectLst/>
             <a:extLst>
               <a:ext uri="{AF507438-7753-43e0-B8FC-AC1667EBCBE1}">
-                <a14:hiddenEffects xmlns:a14="http://schemas.microsoft.com/office/drawing/2010/main" xmlns="">
+                <a14:hiddenEffects xmlns="" xmlns:a14="http://schemas.microsoft.com/office/drawing/2010/main">
                   <a:effectLst>
                     <a:outerShdw blurRad="63500" dist="38099" dir="2700000" algn="ctr" rotWithShape="0">
                       <a:schemeClr val="bg2">
@@ -31251,14 +31251,14 @@
             <a:effectLst/>
             <a:extLst>
               <a:ext uri="{909E8E84-426E-40dd-AFC4-6F175D3DCCD1}">
-                <a14:hiddenFill xmlns:a14="http://schemas.microsoft.com/office/drawing/2010/main" xmlns="">
+                <a14:hiddenFill xmlns="" xmlns:a14="http://schemas.microsoft.com/office/drawing/2010/main">
                   <a:solidFill>
                     <a:schemeClr val="accent1"/>
                   </a:solidFill>
                 </a14:hiddenFill>
               </a:ext>
               <a:ext uri="{91240B29-F687-4f45-9708-019B960494DF}">
-                <a14:hiddenLine xmlns:a14="http://schemas.microsoft.com/office/drawing/2010/main" xmlns="" w="9525">
+                <a14:hiddenLine xmlns="" xmlns:a14="http://schemas.microsoft.com/office/drawing/2010/main" w="9525">
                   <a:solidFill>
                     <a:schemeClr val="tx1"/>
                   </a:solidFill>
@@ -31268,7 +31268,7 @@
                 </a14:hiddenLine>
               </a:ext>
               <a:ext uri="{AF507438-7753-43e0-B8FC-AC1667EBCBE1}">
-                <a14:hiddenEffects xmlns:a14="http://schemas.microsoft.com/office/drawing/2010/main" xmlns="">
+                <a14:hiddenEffects xmlns="" xmlns:a14="http://schemas.microsoft.com/office/drawing/2010/main">
                   <a:effectLst>
                     <a:outerShdw blurRad="63500" dist="38099" dir="2700000" algn="ctr" rotWithShape="0">
                       <a:schemeClr val="bg2">
@@ -31543,7 +31543,7 @@
             <a:effectLst/>
             <a:extLst>
               <a:ext uri="{AF507438-7753-43e0-B8FC-AC1667EBCBE1}">
-                <a14:hiddenEffects xmlns:a14="http://schemas.microsoft.com/office/drawing/2010/main" xmlns="">
+                <a14:hiddenEffects xmlns="" xmlns:a14="http://schemas.microsoft.com/office/drawing/2010/main">
                   <a:effectLst>
                     <a:outerShdw blurRad="63500" dist="38099" dir="2700000" algn="ctr" rotWithShape="0">
                       <a:schemeClr val="bg2">
@@ -31595,14 +31595,14 @@
             <a:effectLst/>
             <a:extLst>
               <a:ext uri="{909E8E84-426E-40dd-AFC4-6F175D3DCCD1}">
-                <a14:hiddenFill xmlns:a14="http://schemas.microsoft.com/office/drawing/2010/main" xmlns="">
+                <a14:hiddenFill xmlns="" xmlns:a14="http://schemas.microsoft.com/office/drawing/2010/main">
                   <a:solidFill>
                     <a:schemeClr val="accent1"/>
                   </a:solidFill>
                 </a14:hiddenFill>
               </a:ext>
               <a:ext uri="{91240B29-F687-4f45-9708-019B960494DF}">
-                <a14:hiddenLine xmlns:a14="http://schemas.microsoft.com/office/drawing/2010/main" xmlns="" w="9525">
+                <a14:hiddenLine xmlns="" xmlns:a14="http://schemas.microsoft.com/office/drawing/2010/main" w="9525">
                   <a:solidFill>
                     <a:schemeClr val="tx1"/>
                   </a:solidFill>
@@ -31612,7 +31612,7 @@
                 </a14:hiddenLine>
               </a:ext>
               <a:ext uri="{AF507438-7753-43e0-B8FC-AC1667EBCBE1}">
-                <a14:hiddenEffects xmlns:a14="http://schemas.microsoft.com/office/drawing/2010/main" xmlns="">
+                <a14:hiddenEffects xmlns="" xmlns:a14="http://schemas.microsoft.com/office/drawing/2010/main">
                   <a:effectLst>
                     <a:outerShdw blurRad="63500" dist="38099" dir="2700000" algn="ctr" rotWithShape="0">
                       <a:schemeClr val="bg2">
@@ -31702,7 +31702,7 @@
             <a:effectLst/>
             <a:extLst>
               <a:ext uri="{AF507438-7753-43e0-B8FC-AC1667EBCBE1}">
-                <a14:hiddenEffects xmlns:a14="http://schemas.microsoft.com/office/drawing/2010/main" xmlns="">
+                <a14:hiddenEffects xmlns="" xmlns:a14="http://schemas.microsoft.com/office/drawing/2010/main">
                   <a:effectLst>
                     <a:outerShdw blurRad="63500" dist="38099" dir="2700000" algn="ctr" rotWithShape="0">
                       <a:schemeClr val="bg2">
@@ -31754,14 +31754,14 @@
             <a:effectLst/>
             <a:extLst>
               <a:ext uri="{909E8E84-426E-40dd-AFC4-6F175D3DCCD1}">
-                <a14:hiddenFill xmlns:a14="http://schemas.microsoft.com/office/drawing/2010/main" xmlns="">
+                <a14:hiddenFill xmlns="" xmlns:a14="http://schemas.microsoft.com/office/drawing/2010/main">
                   <a:solidFill>
                     <a:schemeClr val="accent1"/>
                   </a:solidFill>
                 </a14:hiddenFill>
               </a:ext>
               <a:ext uri="{91240B29-F687-4f45-9708-019B960494DF}">
-                <a14:hiddenLine xmlns:a14="http://schemas.microsoft.com/office/drawing/2010/main" xmlns="" w="9525">
+                <a14:hiddenLine xmlns="" xmlns:a14="http://schemas.microsoft.com/office/drawing/2010/main" w="9525">
                   <a:solidFill>
                     <a:schemeClr val="tx1"/>
                   </a:solidFill>
@@ -31771,7 +31771,7 @@
                 </a14:hiddenLine>
               </a:ext>
               <a:ext uri="{AF507438-7753-43e0-B8FC-AC1667EBCBE1}">
-                <a14:hiddenEffects xmlns:a14="http://schemas.microsoft.com/office/drawing/2010/main" xmlns="">
+                <a14:hiddenEffects xmlns="" xmlns:a14="http://schemas.microsoft.com/office/drawing/2010/main">
                   <a:effectLst>
                     <a:outerShdw blurRad="63500" dist="38099" dir="2700000" algn="ctr" rotWithShape="0">
                       <a:schemeClr val="bg2">
@@ -31861,7 +31861,7 @@
             <a:effectLst/>
             <a:extLst>
               <a:ext uri="{AF507438-7753-43e0-B8FC-AC1667EBCBE1}">
-                <a14:hiddenEffects xmlns:a14="http://schemas.microsoft.com/office/drawing/2010/main" xmlns="">
+                <a14:hiddenEffects xmlns="" xmlns:a14="http://schemas.microsoft.com/office/drawing/2010/main">
                   <a:effectLst>
                     <a:outerShdw blurRad="63500" dist="38099" dir="2700000" algn="ctr" rotWithShape="0">
                       <a:schemeClr val="bg2">
@@ -31913,14 +31913,14 @@
             <a:effectLst/>
             <a:extLst>
               <a:ext uri="{909E8E84-426E-40dd-AFC4-6F175D3DCCD1}">
-                <a14:hiddenFill xmlns:a14="http://schemas.microsoft.com/office/drawing/2010/main" xmlns="">
+                <a14:hiddenFill xmlns="" xmlns:a14="http://schemas.microsoft.com/office/drawing/2010/main">
                   <a:solidFill>
                     <a:schemeClr val="accent1"/>
                   </a:solidFill>
                 </a14:hiddenFill>
               </a:ext>
               <a:ext uri="{91240B29-F687-4f45-9708-019B960494DF}">
-                <a14:hiddenLine xmlns:a14="http://schemas.microsoft.com/office/drawing/2010/main" xmlns="" w="9525">
+                <a14:hiddenLine xmlns="" xmlns:a14="http://schemas.microsoft.com/office/drawing/2010/main" w="9525">
                   <a:solidFill>
                     <a:schemeClr val="tx1"/>
                   </a:solidFill>
@@ -31930,7 +31930,7 @@
                 </a14:hiddenLine>
               </a:ext>
               <a:ext uri="{AF507438-7753-43e0-B8FC-AC1667EBCBE1}">
-                <a14:hiddenEffects xmlns:a14="http://schemas.microsoft.com/office/drawing/2010/main" xmlns="">
+                <a14:hiddenEffects xmlns="" xmlns:a14="http://schemas.microsoft.com/office/drawing/2010/main">
                   <a:effectLst>
                     <a:outerShdw blurRad="63500" dist="38099" dir="2700000" algn="ctr" rotWithShape="0">
                       <a:schemeClr val="bg2">
@@ -32437,7 +32437,7 @@
             <a:effectLst/>
             <a:extLst>
               <a:ext uri="{AF507438-7753-43e0-B8FC-AC1667EBCBE1}">
-                <a14:hiddenEffects xmlns:a14="http://schemas.microsoft.com/office/drawing/2010/main" xmlns="">
+                <a14:hiddenEffects xmlns="" xmlns:a14="http://schemas.microsoft.com/office/drawing/2010/main">
                   <a:effectLst>
                     <a:outerShdw blurRad="63500" dist="38099" dir="2700000" algn="ctr" rotWithShape="0">
                       <a:schemeClr val="bg2">
@@ -32489,14 +32489,14 @@
             <a:effectLst/>
             <a:extLst>
               <a:ext uri="{909E8E84-426E-40dd-AFC4-6F175D3DCCD1}">
-                <a14:hiddenFill xmlns:a14="http://schemas.microsoft.com/office/drawing/2010/main" xmlns="">
+                <a14:hiddenFill xmlns="" xmlns:a14="http://schemas.microsoft.com/office/drawing/2010/main">
                   <a:solidFill>
                     <a:schemeClr val="accent1"/>
                   </a:solidFill>
                 </a14:hiddenFill>
               </a:ext>
               <a:ext uri="{91240B29-F687-4f45-9708-019B960494DF}">
-                <a14:hiddenLine xmlns:a14="http://schemas.microsoft.com/office/drawing/2010/main" xmlns="" w="9525">
+                <a14:hiddenLine xmlns="" xmlns:a14="http://schemas.microsoft.com/office/drawing/2010/main" w="9525">
                   <a:solidFill>
                     <a:schemeClr val="tx1"/>
                   </a:solidFill>
@@ -32506,7 +32506,7 @@
                 </a14:hiddenLine>
               </a:ext>
               <a:ext uri="{AF507438-7753-43e0-B8FC-AC1667EBCBE1}">
-                <a14:hiddenEffects xmlns:a14="http://schemas.microsoft.com/office/drawing/2010/main" xmlns="">
+                <a14:hiddenEffects xmlns="" xmlns:a14="http://schemas.microsoft.com/office/drawing/2010/main">
                   <a:effectLst>
                     <a:outerShdw blurRad="63500" dist="38099" dir="2700000" algn="ctr" rotWithShape="0">
                       <a:schemeClr val="bg2">
@@ -32755,8 +32755,8 @@
         </p:nvSpPr>
         <p:spPr>
           <a:xfrm>
-            <a:off x="612648" y="1600200"/>
-            <a:ext cx="8153400" cy="4382589"/>
+            <a:off x="420130" y="1600200"/>
+            <a:ext cx="8345918" cy="4565822"/>
           </a:xfrm>
         </p:spPr>
         <p:txBody>
@@ -32818,7 +32818,7 @@
             <a:pPr lvl="1"/>
             <a:r>
               <a:rPr lang="en-US" sz="2000" dirty="0"/>
-              <a:t>Given a graph G = (V, E), is there a subset V’⊆V such that if (u , v)∈E then u ∈ V’ or v ∈ V’?</a:t>
+              <a:t>Given a graph G = (V, E), is there a subset V’ ⊆ V such that if (u , v) ∈ E then u ∈ V’ or v ∈ V’?</a:t>
             </a:r>
           </a:p>
         </p:txBody>
@@ -33786,7 +33786,7 @@
           <a:effectLst/>
           <a:extLst>
             <a:ext uri="{AF507438-7753-43e0-B8FC-AC1667EBCBE1}">
-              <a14:hiddenEffects xmlns:a14="http://schemas.microsoft.com/office/drawing/2010/main" xmlns="">
+              <a14:hiddenEffects xmlns="" xmlns:a14="http://schemas.microsoft.com/office/drawing/2010/main">
                 <a:effectLst>
                   <a:outerShdw blurRad="63500" dist="38099" dir="2700000" algn="ctr" rotWithShape="0">
                     <a:schemeClr val="bg2">
@@ -33840,12 +33840,12 @@
           <a:effectLst/>
           <a:extLst>
             <a:ext uri="{909E8E84-426E-40dd-AFC4-6F175D3DCCD1}">
-              <a14:hiddenFill xmlns:a14="http://schemas.microsoft.com/office/drawing/2010/main" xmlns="">
+              <a14:hiddenFill xmlns="" xmlns:a14="http://schemas.microsoft.com/office/drawing/2010/main">
                 <a:noFill/>
               </a14:hiddenFill>
             </a:ext>
             <a:ext uri="{AF507438-7753-43e0-B8FC-AC1667EBCBE1}">
-              <a14:hiddenEffects xmlns:a14="http://schemas.microsoft.com/office/drawing/2010/main" xmlns="">
+              <a14:hiddenEffects xmlns="" xmlns:a14="http://schemas.microsoft.com/office/drawing/2010/main">
                 <a:effectLst>
                   <a:outerShdw blurRad="63500" dist="38099" dir="2700000" algn="ctr" rotWithShape="0">
                     <a:schemeClr val="bg2">
@@ -33888,14 +33888,14 @@
           <a:effectLst/>
           <a:extLst>
             <a:ext uri="{909E8E84-426E-40dd-AFC4-6F175D3DCCD1}">
-              <a14:hiddenFill xmlns:a14="http://schemas.microsoft.com/office/drawing/2010/main" xmlns="">
+              <a14:hiddenFill xmlns="" xmlns:a14="http://schemas.microsoft.com/office/drawing/2010/main">
                 <a:solidFill>
                   <a:schemeClr val="accent1"/>
                 </a:solidFill>
               </a14:hiddenFill>
             </a:ext>
             <a:ext uri="{91240B29-F687-4f45-9708-019B960494DF}">
-              <a14:hiddenLine xmlns:a14="http://schemas.microsoft.com/office/drawing/2010/main" xmlns="" w="9525">
+              <a14:hiddenLine xmlns="" xmlns:a14="http://schemas.microsoft.com/office/drawing/2010/main" w="9525">
                 <a:solidFill>
                   <a:schemeClr val="tx1"/>
                 </a:solidFill>
@@ -33905,7 +33905,7 @@
               </a14:hiddenLine>
             </a:ext>
             <a:ext uri="{AF507438-7753-43e0-B8FC-AC1667EBCBE1}">
-              <a14:hiddenEffects xmlns:a14="http://schemas.microsoft.com/office/drawing/2010/main" xmlns="">
+              <a14:hiddenEffects xmlns="" xmlns:a14="http://schemas.microsoft.com/office/drawing/2010/main">
                 <a:effectLst>
                   <a:outerShdw blurRad="63500" dist="38099" dir="2700000" algn="ctr" rotWithShape="0">
                     <a:schemeClr val="bg2">
@@ -33955,14 +33955,14 @@
           <a:effectLst/>
           <a:extLst>
             <a:ext uri="{909E8E84-426E-40dd-AFC4-6F175D3DCCD1}">
-              <a14:hiddenFill xmlns:a14="http://schemas.microsoft.com/office/drawing/2010/main" xmlns="">
+              <a14:hiddenFill xmlns="" xmlns:a14="http://schemas.microsoft.com/office/drawing/2010/main">
                 <a:solidFill>
                   <a:schemeClr val="accent1"/>
                 </a:solidFill>
               </a14:hiddenFill>
             </a:ext>
             <a:ext uri="{91240B29-F687-4f45-9708-019B960494DF}">
-              <a14:hiddenLine xmlns:a14="http://schemas.microsoft.com/office/drawing/2010/main" xmlns="" w="9525">
+              <a14:hiddenLine xmlns="" xmlns:a14="http://schemas.microsoft.com/office/drawing/2010/main" w="9525">
                 <a:solidFill>
                   <a:schemeClr val="tx1"/>
                 </a:solidFill>
@@ -33972,7 +33972,7 @@
               </a14:hiddenLine>
             </a:ext>
             <a:ext uri="{AF507438-7753-43e0-B8FC-AC1667EBCBE1}">
-              <a14:hiddenEffects xmlns:a14="http://schemas.microsoft.com/office/drawing/2010/main" xmlns="">
+              <a14:hiddenEffects xmlns="" xmlns:a14="http://schemas.microsoft.com/office/drawing/2010/main">
                 <a:effectLst>
                   <a:outerShdw blurRad="63500" dist="38099" dir="2700000" algn="ctr" rotWithShape="0">
                     <a:schemeClr val="bg2">
@@ -34027,12 +34027,12 @@
           <a:effectLst/>
           <a:extLst>
             <a:ext uri="{909E8E84-426E-40dd-AFC4-6F175D3DCCD1}">
-              <a14:hiddenFill xmlns:a14="http://schemas.microsoft.com/office/drawing/2010/main" xmlns="">
+              <a14:hiddenFill xmlns="" xmlns:a14="http://schemas.microsoft.com/office/drawing/2010/main">
                 <a:noFill/>
               </a14:hiddenFill>
             </a:ext>
             <a:ext uri="{AF507438-7753-43e0-B8FC-AC1667EBCBE1}">
-              <a14:hiddenEffects xmlns:a14="http://schemas.microsoft.com/office/drawing/2010/main" xmlns="">
+              <a14:hiddenEffects xmlns="" xmlns:a14="http://schemas.microsoft.com/office/drawing/2010/main">
                 <a:effectLst>
                   <a:outerShdw blurRad="63500" dist="38099" dir="2700000" algn="ctr" rotWithShape="0">
                     <a:schemeClr val="bg2">
@@ -34075,14 +34075,14 @@
           <a:effectLst/>
           <a:extLst>
             <a:ext uri="{909E8E84-426E-40dd-AFC4-6F175D3DCCD1}">
-              <a14:hiddenFill xmlns:a14="http://schemas.microsoft.com/office/drawing/2010/main" xmlns="">
+              <a14:hiddenFill xmlns="" xmlns:a14="http://schemas.microsoft.com/office/drawing/2010/main">
                 <a:solidFill>
                   <a:schemeClr val="accent1"/>
                 </a:solidFill>
               </a14:hiddenFill>
             </a:ext>
             <a:ext uri="{91240B29-F687-4f45-9708-019B960494DF}">
-              <a14:hiddenLine xmlns:a14="http://schemas.microsoft.com/office/drawing/2010/main" xmlns="" w="9525">
+              <a14:hiddenLine xmlns="" xmlns:a14="http://schemas.microsoft.com/office/drawing/2010/main" w="9525">
                 <a:solidFill>
                   <a:schemeClr val="tx1"/>
                 </a:solidFill>
@@ -34092,7 +34092,7 @@
               </a14:hiddenLine>
             </a:ext>
             <a:ext uri="{AF507438-7753-43e0-B8FC-AC1667EBCBE1}">
-              <a14:hiddenEffects xmlns:a14="http://schemas.microsoft.com/office/drawing/2010/main" xmlns="">
+              <a14:hiddenEffects xmlns="" xmlns:a14="http://schemas.microsoft.com/office/drawing/2010/main">
                 <a:effectLst>
                   <a:outerShdw blurRad="63500" dist="38099" dir="2700000" algn="ctr" rotWithShape="0">
                     <a:schemeClr val="bg2">
@@ -34149,14 +34149,14 @@
           <a:effectLst/>
           <a:extLst>
             <a:ext uri="{909E8E84-426E-40dd-AFC4-6F175D3DCCD1}">
-              <a14:hiddenFill xmlns:a14="http://schemas.microsoft.com/office/drawing/2010/main" xmlns="">
+              <a14:hiddenFill xmlns="" xmlns:a14="http://schemas.microsoft.com/office/drawing/2010/main">
                 <a:solidFill>
                   <a:schemeClr val="accent1"/>
                 </a:solidFill>
               </a14:hiddenFill>
             </a:ext>
             <a:ext uri="{91240B29-F687-4f45-9708-019B960494DF}">
-              <a14:hiddenLine xmlns:a14="http://schemas.microsoft.com/office/drawing/2010/main" xmlns="" w="9525">
+              <a14:hiddenLine xmlns="" xmlns:a14="http://schemas.microsoft.com/office/drawing/2010/main" w="9525">
                 <a:solidFill>
                   <a:schemeClr val="tx1"/>
                 </a:solidFill>
@@ -34166,7 +34166,7 @@
               </a14:hiddenLine>
             </a:ext>
             <a:ext uri="{AF507438-7753-43e0-B8FC-AC1667EBCBE1}">
-              <a14:hiddenEffects xmlns:a14="http://schemas.microsoft.com/office/drawing/2010/main" xmlns="">
+              <a14:hiddenEffects xmlns="" xmlns:a14="http://schemas.microsoft.com/office/drawing/2010/main">
                 <a:effectLst>
                   <a:outerShdw blurRad="63500" dist="38099" dir="2700000" algn="ctr" rotWithShape="0">
                     <a:schemeClr val="bg2">
@@ -34933,7 +34933,7 @@
             <a:effectLst/>
             <a:extLst>
               <a:ext uri="{AF507438-7753-43e0-B8FC-AC1667EBCBE1}">
-                <a14:hiddenEffects xmlns:a14="http://schemas.microsoft.com/office/drawing/2010/main" xmlns="">
+                <a14:hiddenEffects xmlns="" xmlns:a14="http://schemas.microsoft.com/office/drawing/2010/main">
                   <a:effectLst>
                     <a:outerShdw blurRad="63500" dist="38099" dir="2700000" algn="ctr" rotWithShape="0">
                       <a:schemeClr val="bg2">
@@ -34992,7 +34992,7 @@
             <a:effectLst/>
             <a:extLst>
               <a:ext uri="{AF507438-7753-43e0-B8FC-AC1667EBCBE1}">
-                <a14:hiddenEffects xmlns:a14="http://schemas.microsoft.com/office/drawing/2010/main" xmlns="">
+                <a14:hiddenEffects xmlns="" xmlns:a14="http://schemas.microsoft.com/office/drawing/2010/main">
                   <a:effectLst>
                     <a:outerShdw blurRad="63500" dist="38099" dir="2700000" algn="ctr" rotWithShape="0">
                       <a:schemeClr val="bg2">
@@ -35048,7 +35048,7 @@
             <a:effectLst/>
             <a:extLst>
               <a:ext uri="{AF507438-7753-43e0-B8FC-AC1667EBCBE1}">
-                <a14:hiddenEffects xmlns:a14="http://schemas.microsoft.com/office/drawing/2010/main" xmlns="">
+                <a14:hiddenEffects xmlns="" xmlns:a14="http://schemas.microsoft.com/office/drawing/2010/main">
                   <a:effectLst>
                     <a:outerShdw blurRad="63500" dist="38099" dir="2700000" algn="ctr" rotWithShape="0">
                       <a:schemeClr val="bg2">
@@ -35104,12 +35104,12 @@
             <a:effectLst/>
             <a:extLst>
               <a:ext uri="{909E8E84-426E-40dd-AFC4-6F175D3DCCD1}">
-                <a14:hiddenFill xmlns:a14="http://schemas.microsoft.com/office/drawing/2010/main" xmlns="">
+                <a14:hiddenFill xmlns="" xmlns:a14="http://schemas.microsoft.com/office/drawing/2010/main">
                   <a:noFill/>
                 </a14:hiddenFill>
               </a:ext>
               <a:ext uri="{AF507438-7753-43e0-B8FC-AC1667EBCBE1}">
-                <a14:hiddenEffects xmlns:a14="http://schemas.microsoft.com/office/drawing/2010/main" xmlns="">
+                <a14:hiddenEffects xmlns="" xmlns:a14="http://schemas.microsoft.com/office/drawing/2010/main">
                   <a:effectLst>
                     <a:outerShdw blurRad="63500" dist="38099" dir="2700000" algn="ctr" rotWithShape="0">
                       <a:schemeClr val="bg2">
@@ -35152,14 +35152,14 @@
             <a:effectLst/>
             <a:extLst>
               <a:ext uri="{909E8E84-426E-40dd-AFC4-6F175D3DCCD1}">
-                <a14:hiddenFill xmlns:a14="http://schemas.microsoft.com/office/drawing/2010/main" xmlns="">
+                <a14:hiddenFill xmlns="" xmlns:a14="http://schemas.microsoft.com/office/drawing/2010/main">
                   <a:solidFill>
                     <a:schemeClr val="accent1"/>
                   </a:solidFill>
                 </a14:hiddenFill>
               </a:ext>
               <a:ext uri="{91240B29-F687-4f45-9708-019B960494DF}">
-                <a14:hiddenLine xmlns:a14="http://schemas.microsoft.com/office/drawing/2010/main" xmlns="" w="9525">
+                <a14:hiddenLine xmlns="" xmlns:a14="http://schemas.microsoft.com/office/drawing/2010/main" w="9525">
                   <a:solidFill>
                     <a:schemeClr val="tx1"/>
                   </a:solidFill>
@@ -35169,7 +35169,7 @@
                 </a14:hiddenLine>
               </a:ext>
               <a:ext uri="{AF507438-7753-43e0-B8FC-AC1667EBCBE1}">
-                <a14:hiddenEffects xmlns:a14="http://schemas.microsoft.com/office/drawing/2010/main" xmlns="">
+                <a14:hiddenEffects xmlns="" xmlns:a14="http://schemas.microsoft.com/office/drawing/2010/main">
                   <a:effectLst>
                     <a:outerShdw blurRad="63500" dist="38099" dir="2700000" algn="ctr" rotWithShape="0">
                       <a:schemeClr val="bg2">
@@ -35219,14 +35219,14 @@
             <a:effectLst/>
             <a:extLst>
               <a:ext uri="{909E8E84-426E-40dd-AFC4-6F175D3DCCD1}">
-                <a14:hiddenFill xmlns:a14="http://schemas.microsoft.com/office/drawing/2010/main" xmlns="">
+                <a14:hiddenFill xmlns="" xmlns:a14="http://schemas.microsoft.com/office/drawing/2010/main">
                   <a:solidFill>
                     <a:schemeClr val="accent1"/>
                   </a:solidFill>
                 </a14:hiddenFill>
               </a:ext>
               <a:ext uri="{91240B29-F687-4f45-9708-019B960494DF}">
-                <a14:hiddenLine xmlns:a14="http://schemas.microsoft.com/office/drawing/2010/main" xmlns="" w="9525">
+                <a14:hiddenLine xmlns="" xmlns:a14="http://schemas.microsoft.com/office/drawing/2010/main" w="9525">
                   <a:solidFill>
                     <a:schemeClr val="tx1"/>
                   </a:solidFill>
@@ -35236,7 +35236,7 @@
                 </a14:hiddenLine>
               </a:ext>
               <a:ext uri="{AF507438-7753-43e0-B8FC-AC1667EBCBE1}">
-                <a14:hiddenEffects xmlns:a14="http://schemas.microsoft.com/office/drawing/2010/main" xmlns="">
+                <a14:hiddenEffects xmlns="" xmlns:a14="http://schemas.microsoft.com/office/drawing/2010/main">
                   <a:effectLst>
                     <a:outerShdw blurRad="63500" dist="38099" dir="2700000" algn="ctr" rotWithShape="0">
                       <a:schemeClr val="bg2">
@@ -35291,12 +35291,12 @@
             <a:effectLst/>
             <a:extLst>
               <a:ext uri="{909E8E84-426E-40dd-AFC4-6F175D3DCCD1}">
-                <a14:hiddenFill xmlns:a14="http://schemas.microsoft.com/office/drawing/2010/main" xmlns="">
+                <a14:hiddenFill xmlns="" xmlns:a14="http://schemas.microsoft.com/office/drawing/2010/main">
                   <a:noFill/>
                 </a14:hiddenFill>
               </a:ext>
               <a:ext uri="{AF507438-7753-43e0-B8FC-AC1667EBCBE1}">
-                <a14:hiddenEffects xmlns:a14="http://schemas.microsoft.com/office/drawing/2010/main" xmlns="">
+                <a14:hiddenEffects xmlns="" xmlns:a14="http://schemas.microsoft.com/office/drawing/2010/main">
                   <a:effectLst>
                     <a:outerShdw blurRad="63500" dist="38099" dir="2700000" algn="ctr" rotWithShape="0">
                       <a:schemeClr val="bg2">
@@ -35344,12 +35344,12 @@
             <a:effectLst/>
             <a:extLst>
               <a:ext uri="{909E8E84-426E-40dd-AFC4-6F175D3DCCD1}">
-                <a14:hiddenFill xmlns:a14="http://schemas.microsoft.com/office/drawing/2010/main" xmlns="">
+                <a14:hiddenFill xmlns="" xmlns:a14="http://schemas.microsoft.com/office/drawing/2010/main">
                   <a:noFill/>
                 </a14:hiddenFill>
               </a:ext>
               <a:ext uri="{AF507438-7753-43e0-B8FC-AC1667EBCBE1}">
-                <a14:hiddenEffects xmlns:a14="http://schemas.microsoft.com/office/drawing/2010/main" xmlns="">
+                <a14:hiddenEffects xmlns="" xmlns:a14="http://schemas.microsoft.com/office/drawing/2010/main">
                   <a:effectLst>
                     <a:outerShdw blurRad="63500" dist="38099" dir="2700000" algn="ctr" rotWithShape="0">
                       <a:schemeClr val="bg2">
@@ -35397,12 +35397,12 @@
             <a:effectLst/>
             <a:extLst>
               <a:ext uri="{909E8E84-426E-40dd-AFC4-6F175D3DCCD1}">
-                <a14:hiddenFill xmlns:a14="http://schemas.microsoft.com/office/drawing/2010/main" xmlns="">
+                <a14:hiddenFill xmlns="" xmlns:a14="http://schemas.microsoft.com/office/drawing/2010/main">
                   <a:noFill/>
                 </a14:hiddenFill>
               </a:ext>
               <a:ext uri="{AF507438-7753-43e0-B8FC-AC1667EBCBE1}">
-                <a14:hiddenEffects xmlns:a14="http://schemas.microsoft.com/office/drawing/2010/main" xmlns="">
+                <a14:hiddenEffects xmlns="" xmlns:a14="http://schemas.microsoft.com/office/drawing/2010/main">
                   <a:effectLst>
                     <a:outerShdw blurRad="63500" dist="38099" dir="2700000" algn="ctr" rotWithShape="0">
                       <a:schemeClr val="bg2">
@@ -35450,12 +35450,12 @@
             <a:effectLst/>
             <a:extLst>
               <a:ext uri="{909E8E84-426E-40dd-AFC4-6F175D3DCCD1}">
-                <a14:hiddenFill xmlns:a14="http://schemas.microsoft.com/office/drawing/2010/main" xmlns="">
+                <a14:hiddenFill xmlns="" xmlns:a14="http://schemas.microsoft.com/office/drawing/2010/main">
                   <a:noFill/>
                 </a14:hiddenFill>
               </a:ext>
               <a:ext uri="{AF507438-7753-43e0-B8FC-AC1667EBCBE1}">
-                <a14:hiddenEffects xmlns:a14="http://schemas.microsoft.com/office/drawing/2010/main" xmlns="">
+                <a14:hiddenEffects xmlns="" xmlns:a14="http://schemas.microsoft.com/office/drawing/2010/main">
                   <a:effectLst>
                     <a:outerShdw blurRad="63500" dist="38099" dir="2700000" algn="ctr" rotWithShape="0">
                       <a:schemeClr val="bg2">
@@ -35503,12 +35503,12 @@
             <a:effectLst/>
             <a:extLst>
               <a:ext uri="{909E8E84-426E-40dd-AFC4-6F175D3DCCD1}">
-                <a14:hiddenFill xmlns:a14="http://schemas.microsoft.com/office/drawing/2010/main" xmlns="">
+                <a14:hiddenFill xmlns="" xmlns:a14="http://schemas.microsoft.com/office/drawing/2010/main">
                   <a:noFill/>
                 </a14:hiddenFill>
               </a:ext>
               <a:ext uri="{AF507438-7753-43e0-B8FC-AC1667EBCBE1}">
-                <a14:hiddenEffects xmlns:a14="http://schemas.microsoft.com/office/drawing/2010/main" xmlns="">
+                <a14:hiddenEffects xmlns="" xmlns:a14="http://schemas.microsoft.com/office/drawing/2010/main">
                   <a:effectLst>
                     <a:outerShdw blurRad="63500" dist="38099" dir="2700000" algn="ctr" rotWithShape="0">
                       <a:schemeClr val="bg2">
@@ -35551,14 +35551,14 @@
             <a:effectLst/>
             <a:extLst>
               <a:ext uri="{909E8E84-426E-40dd-AFC4-6F175D3DCCD1}">
-                <a14:hiddenFill xmlns:a14="http://schemas.microsoft.com/office/drawing/2010/main" xmlns="">
+                <a14:hiddenFill xmlns="" xmlns:a14="http://schemas.microsoft.com/office/drawing/2010/main">
                   <a:solidFill>
                     <a:schemeClr val="accent1"/>
                   </a:solidFill>
                 </a14:hiddenFill>
               </a:ext>
               <a:ext uri="{91240B29-F687-4f45-9708-019B960494DF}">
-                <a14:hiddenLine xmlns:a14="http://schemas.microsoft.com/office/drawing/2010/main" xmlns="" w="9525">
+                <a14:hiddenLine xmlns="" xmlns:a14="http://schemas.microsoft.com/office/drawing/2010/main" w="9525">
                   <a:solidFill>
                     <a:schemeClr val="tx1"/>
                   </a:solidFill>
@@ -35568,7 +35568,7 @@
                 </a14:hiddenLine>
               </a:ext>
               <a:ext uri="{AF507438-7753-43e0-B8FC-AC1667EBCBE1}">
-                <a14:hiddenEffects xmlns:a14="http://schemas.microsoft.com/office/drawing/2010/main" xmlns="">
+                <a14:hiddenEffects xmlns="" xmlns:a14="http://schemas.microsoft.com/office/drawing/2010/main">
                   <a:effectLst>
                     <a:outerShdw blurRad="63500" dist="38099" dir="2700000" algn="ctr" rotWithShape="0">
                       <a:schemeClr val="bg2">
@@ -35616,14 +35616,14 @@
             <a:effectLst/>
             <a:extLst>
               <a:ext uri="{909E8E84-426E-40dd-AFC4-6F175D3DCCD1}">
-                <a14:hiddenFill xmlns:a14="http://schemas.microsoft.com/office/drawing/2010/main" xmlns="">
+                <a14:hiddenFill xmlns="" xmlns:a14="http://schemas.microsoft.com/office/drawing/2010/main">
                   <a:solidFill>
                     <a:schemeClr val="accent1"/>
                   </a:solidFill>
                 </a14:hiddenFill>
               </a:ext>
               <a:ext uri="{91240B29-F687-4f45-9708-019B960494DF}">
-                <a14:hiddenLine xmlns:a14="http://schemas.microsoft.com/office/drawing/2010/main" xmlns="" w="9525">
+                <a14:hiddenLine xmlns="" xmlns:a14="http://schemas.microsoft.com/office/drawing/2010/main" w="9525">
                   <a:solidFill>
                     <a:schemeClr val="tx1"/>
                   </a:solidFill>
@@ -35633,7 +35633,7 @@
                 </a14:hiddenLine>
               </a:ext>
               <a:ext uri="{AF507438-7753-43e0-B8FC-AC1667EBCBE1}">
-                <a14:hiddenEffects xmlns:a14="http://schemas.microsoft.com/office/drawing/2010/main" xmlns="">
+                <a14:hiddenEffects xmlns="" xmlns:a14="http://schemas.microsoft.com/office/drawing/2010/main">
                   <a:effectLst>
                     <a:outerShdw blurRad="63500" dist="38099" dir="2700000" algn="ctr" rotWithShape="0">
                       <a:schemeClr val="bg2">
@@ -35681,14 +35681,14 @@
             <a:effectLst/>
             <a:extLst>
               <a:ext uri="{909E8E84-426E-40dd-AFC4-6F175D3DCCD1}">
-                <a14:hiddenFill xmlns:a14="http://schemas.microsoft.com/office/drawing/2010/main" xmlns="">
+                <a14:hiddenFill xmlns="" xmlns:a14="http://schemas.microsoft.com/office/drawing/2010/main">
                   <a:solidFill>
                     <a:schemeClr val="accent1"/>
                   </a:solidFill>
                 </a14:hiddenFill>
               </a:ext>
               <a:ext uri="{91240B29-F687-4f45-9708-019B960494DF}">
-                <a14:hiddenLine xmlns:a14="http://schemas.microsoft.com/office/drawing/2010/main" xmlns="" w="9525">
+                <a14:hiddenLine xmlns="" xmlns:a14="http://schemas.microsoft.com/office/drawing/2010/main" w="9525">
                   <a:solidFill>
                     <a:schemeClr val="tx1"/>
                   </a:solidFill>
@@ -35698,7 +35698,7 @@
                 </a14:hiddenLine>
               </a:ext>
               <a:ext uri="{AF507438-7753-43e0-B8FC-AC1667EBCBE1}">
-                <a14:hiddenEffects xmlns:a14="http://schemas.microsoft.com/office/drawing/2010/main" xmlns="">
+                <a14:hiddenEffects xmlns="" xmlns:a14="http://schemas.microsoft.com/office/drawing/2010/main">
                   <a:effectLst>
                     <a:outerShdw blurRad="63500" dist="38099" dir="2700000" algn="ctr" rotWithShape="0">
                       <a:schemeClr val="bg2">
@@ -35746,14 +35746,14 @@
             <a:effectLst/>
             <a:extLst>
               <a:ext uri="{909E8E84-426E-40dd-AFC4-6F175D3DCCD1}">
-                <a14:hiddenFill xmlns:a14="http://schemas.microsoft.com/office/drawing/2010/main" xmlns="">
+                <a14:hiddenFill xmlns="" xmlns:a14="http://schemas.microsoft.com/office/drawing/2010/main">
                   <a:solidFill>
                     <a:schemeClr val="accent1"/>
                   </a:solidFill>
                 </a14:hiddenFill>
               </a:ext>
               <a:ext uri="{91240B29-F687-4f45-9708-019B960494DF}">
-                <a14:hiddenLine xmlns:a14="http://schemas.microsoft.com/office/drawing/2010/main" xmlns="" w="9525">
+                <a14:hiddenLine xmlns="" xmlns:a14="http://schemas.microsoft.com/office/drawing/2010/main" w="9525">
                   <a:solidFill>
                     <a:schemeClr val="tx1"/>
                   </a:solidFill>
@@ -35763,7 +35763,7 @@
                 </a14:hiddenLine>
               </a:ext>
               <a:ext uri="{AF507438-7753-43e0-B8FC-AC1667EBCBE1}">
-                <a14:hiddenEffects xmlns:a14="http://schemas.microsoft.com/office/drawing/2010/main" xmlns="">
+                <a14:hiddenEffects xmlns="" xmlns:a14="http://schemas.microsoft.com/office/drawing/2010/main">
                   <a:effectLst>
                     <a:outerShdw blurRad="63500" dist="38099" dir="2700000" algn="ctr" rotWithShape="0">
                       <a:schemeClr val="bg2">
@@ -35811,14 +35811,14 @@
             <a:effectLst/>
             <a:extLst>
               <a:ext uri="{909E8E84-426E-40dd-AFC4-6F175D3DCCD1}">
-                <a14:hiddenFill xmlns:a14="http://schemas.microsoft.com/office/drawing/2010/main" xmlns="">
+                <a14:hiddenFill xmlns="" xmlns:a14="http://schemas.microsoft.com/office/drawing/2010/main">
                   <a:solidFill>
                     <a:schemeClr val="accent1"/>
                   </a:solidFill>
                 </a14:hiddenFill>
               </a:ext>
               <a:ext uri="{91240B29-F687-4f45-9708-019B960494DF}">
-                <a14:hiddenLine xmlns:a14="http://schemas.microsoft.com/office/drawing/2010/main" xmlns="" w="9525">
+                <a14:hiddenLine xmlns="" xmlns:a14="http://schemas.microsoft.com/office/drawing/2010/main" w="9525">
                   <a:solidFill>
                     <a:schemeClr val="tx1"/>
                   </a:solidFill>
@@ -35828,7 +35828,7 @@
                 </a14:hiddenLine>
               </a:ext>
               <a:ext uri="{AF507438-7753-43e0-B8FC-AC1667EBCBE1}">
-                <a14:hiddenEffects xmlns:a14="http://schemas.microsoft.com/office/drawing/2010/main" xmlns="">
+                <a14:hiddenEffects xmlns="" xmlns:a14="http://schemas.microsoft.com/office/drawing/2010/main">
                   <a:effectLst>
                     <a:outerShdw blurRad="63500" dist="38099" dir="2700000" algn="ctr" rotWithShape="0">
                       <a:schemeClr val="bg2">
@@ -35953,7 +35953,7 @@
           <a:effectLst/>
           <a:extLst>
             <a:ext uri="{AF507438-7753-43e0-B8FC-AC1667EBCBE1}">
-              <a14:hiddenEffects xmlns:a14="http://schemas.microsoft.com/office/drawing/2010/main" xmlns="">
+              <a14:hiddenEffects xmlns="" xmlns:a14="http://schemas.microsoft.com/office/drawing/2010/main">
                 <a:effectLst>
                   <a:outerShdw blurRad="63500" dist="38099" dir="2700000" algn="ctr" rotWithShape="0">
                     <a:schemeClr val="bg2">
@@ -36007,12 +36007,12 @@
           <a:effectLst/>
           <a:extLst>
             <a:ext uri="{909E8E84-426E-40dd-AFC4-6F175D3DCCD1}">
-              <a14:hiddenFill xmlns:a14="http://schemas.microsoft.com/office/drawing/2010/main" xmlns="">
+              <a14:hiddenFill xmlns="" xmlns:a14="http://schemas.microsoft.com/office/drawing/2010/main">
                 <a:noFill/>
               </a14:hiddenFill>
             </a:ext>
             <a:ext uri="{AF507438-7753-43e0-B8FC-AC1667EBCBE1}">
-              <a14:hiddenEffects xmlns:a14="http://schemas.microsoft.com/office/drawing/2010/main" xmlns="">
+              <a14:hiddenEffects xmlns="" xmlns:a14="http://schemas.microsoft.com/office/drawing/2010/main">
                 <a:effectLst>
                   <a:outerShdw blurRad="63500" dist="38099" dir="2700000" algn="ctr" rotWithShape="0">
                     <a:schemeClr val="bg2">
@@ -36055,14 +36055,14 @@
           <a:effectLst/>
           <a:extLst>
             <a:ext uri="{909E8E84-426E-40dd-AFC4-6F175D3DCCD1}">
-              <a14:hiddenFill xmlns:a14="http://schemas.microsoft.com/office/drawing/2010/main" xmlns="">
+              <a14:hiddenFill xmlns="" xmlns:a14="http://schemas.microsoft.com/office/drawing/2010/main">
                 <a:solidFill>
                   <a:schemeClr val="accent1"/>
                 </a:solidFill>
               </a14:hiddenFill>
             </a:ext>
             <a:ext uri="{91240B29-F687-4f45-9708-019B960494DF}">
-              <a14:hiddenLine xmlns:a14="http://schemas.microsoft.com/office/drawing/2010/main" xmlns="" w="9525">
+              <a14:hiddenLine xmlns="" xmlns:a14="http://schemas.microsoft.com/office/drawing/2010/main" w="9525">
                 <a:solidFill>
                   <a:schemeClr val="tx1"/>
                 </a:solidFill>
@@ -36072,7 +36072,7 @@
               </a14:hiddenLine>
             </a:ext>
             <a:ext uri="{AF507438-7753-43e0-B8FC-AC1667EBCBE1}">
-              <a14:hiddenEffects xmlns:a14="http://schemas.microsoft.com/office/drawing/2010/main" xmlns="">
+              <a14:hiddenEffects xmlns="" xmlns:a14="http://schemas.microsoft.com/office/drawing/2010/main">
                 <a:effectLst>
                   <a:outerShdw blurRad="63500" dist="38099" dir="2700000" algn="ctr" rotWithShape="0">
                     <a:schemeClr val="bg2">
@@ -36122,14 +36122,14 @@
           <a:effectLst/>
           <a:extLst>
             <a:ext uri="{909E8E84-426E-40dd-AFC4-6F175D3DCCD1}">
-              <a14:hiddenFill xmlns:a14="http://schemas.microsoft.com/office/drawing/2010/main" xmlns="">
+              <a14:hiddenFill xmlns="" xmlns:a14="http://schemas.microsoft.com/office/drawing/2010/main">
                 <a:solidFill>
                   <a:schemeClr val="accent1"/>
                 </a:solidFill>
               </a14:hiddenFill>
             </a:ext>
             <a:ext uri="{91240B29-F687-4f45-9708-019B960494DF}">
-              <a14:hiddenLine xmlns:a14="http://schemas.microsoft.com/office/drawing/2010/main" xmlns="" w="9525">
+              <a14:hiddenLine xmlns="" xmlns:a14="http://schemas.microsoft.com/office/drawing/2010/main" w="9525">
                 <a:solidFill>
                   <a:schemeClr val="tx1"/>
                 </a:solidFill>
@@ -36139,7 +36139,7 @@
               </a14:hiddenLine>
             </a:ext>
             <a:ext uri="{AF507438-7753-43e0-B8FC-AC1667EBCBE1}">
-              <a14:hiddenEffects xmlns:a14="http://schemas.microsoft.com/office/drawing/2010/main" xmlns="">
+              <a14:hiddenEffects xmlns="" xmlns:a14="http://schemas.microsoft.com/office/drawing/2010/main">
                 <a:effectLst>
                   <a:outerShdw blurRad="63500" dist="38099" dir="2700000" algn="ctr" rotWithShape="0">
                     <a:schemeClr val="bg2">
@@ -36194,12 +36194,12 @@
           <a:effectLst/>
           <a:extLst>
             <a:ext uri="{909E8E84-426E-40dd-AFC4-6F175D3DCCD1}">
-              <a14:hiddenFill xmlns:a14="http://schemas.microsoft.com/office/drawing/2010/main" xmlns="">
+              <a14:hiddenFill xmlns="" xmlns:a14="http://schemas.microsoft.com/office/drawing/2010/main">
                 <a:noFill/>
               </a14:hiddenFill>
             </a:ext>
             <a:ext uri="{AF507438-7753-43e0-B8FC-AC1667EBCBE1}">
-              <a14:hiddenEffects xmlns:a14="http://schemas.microsoft.com/office/drawing/2010/main" xmlns="">
+              <a14:hiddenEffects xmlns="" xmlns:a14="http://schemas.microsoft.com/office/drawing/2010/main">
                 <a:effectLst>
                   <a:outerShdw blurRad="63500" dist="38099" dir="2700000" algn="ctr" rotWithShape="0">
                     <a:schemeClr val="bg2">
@@ -36242,14 +36242,14 @@
           <a:effectLst/>
           <a:extLst>
             <a:ext uri="{909E8E84-426E-40dd-AFC4-6F175D3DCCD1}">
-              <a14:hiddenFill xmlns:a14="http://schemas.microsoft.com/office/drawing/2010/main" xmlns="">
+              <a14:hiddenFill xmlns="" xmlns:a14="http://schemas.microsoft.com/office/drawing/2010/main">
                 <a:solidFill>
                   <a:schemeClr val="accent1"/>
                 </a:solidFill>
               </a14:hiddenFill>
             </a:ext>
             <a:ext uri="{91240B29-F687-4f45-9708-019B960494DF}">
-              <a14:hiddenLine xmlns:a14="http://schemas.microsoft.com/office/drawing/2010/main" xmlns="" w="9525">
+              <a14:hiddenLine xmlns="" xmlns:a14="http://schemas.microsoft.com/office/drawing/2010/main" w="9525">
                 <a:solidFill>
                   <a:schemeClr val="tx1"/>
                 </a:solidFill>
@@ -36259,7 +36259,7 @@
               </a14:hiddenLine>
             </a:ext>
             <a:ext uri="{AF507438-7753-43e0-B8FC-AC1667EBCBE1}">
-              <a14:hiddenEffects xmlns:a14="http://schemas.microsoft.com/office/drawing/2010/main" xmlns="">
+              <a14:hiddenEffects xmlns="" xmlns:a14="http://schemas.microsoft.com/office/drawing/2010/main">
                 <a:effectLst>
                   <a:outerShdw blurRad="63500" dist="38099" dir="2700000" algn="ctr" rotWithShape="0">
                     <a:schemeClr val="bg2">
@@ -36316,14 +36316,14 @@
           <a:effectLst/>
           <a:extLst>
             <a:ext uri="{909E8E84-426E-40dd-AFC4-6F175D3DCCD1}">
-              <a14:hiddenFill xmlns:a14="http://schemas.microsoft.com/office/drawing/2010/main" xmlns="">
+              <a14:hiddenFill xmlns="" xmlns:a14="http://schemas.microsoft.com/office/drawing/2010/main">
                 <a:solidFill>
                   <a:schemeClr val="accent1"/>
                 </a:solidFill>
               </a14:hiddenFill>
             </a:ext>
             <a:ext uri="{91240B29-F687-4f45-9708-019B960494DF}">
-              <a14:hiddenLine xmlns:a14="http://schemas.microsoft.com/office/drawing/2010/main" xmlns="" w="9525">
+              <a14:hiddenLine xmlns="" xmlns:a14="http://schemas.microsoft.com/office/drawing/2010/main" w="9525">
                 <a:solidFill>
                   <a:schemeClr val="tx1"/>
                 </a:solidFill>
@@ -36333,7 +36333,7 @@
               </a14:hiddenLine>
             </a:ext>
             <a:ext uri="{AF507438-7753-43e0-B8FC-AC1667EBCBE1}">
-              <a14:hiddenEffects xmlns:a14="http://schemas.microsoft.com/office/drawing/2010/main" xmlns="">
+              <a14:hiddenEffects xmlns="" xmlns:a14="http://schemas.microsoft.com/office/drawing/2010/main">
                 <a:effectLst>
                   <a:outerShdw blurRad="63500" dist="38099" dir="2700000" algn="ctr" rotWithShape="0">
                     <a:schemeClr val="bg2">
@@ -36872,12 +36872,12 @@
           <a:effectLst/>
           <a:extLst>
             <a:ext uri="{909E8E84-426E-40dd-AFC4-6F175D3DCCD1}">
-              <a14:hiddenFill xmlns:a14="http://schemas.microsoft.com/office/drawing/2010/main" xmlns="">
+              <a14:hiddenFill xmlns="" xmlns:a14="http://schemas.microsoft.com/office/drawing/2010/main">
                 <a:noFill/>
               </a14:hiddenFill>
             </a:ext>
             <a:ext uri="{AF507438-7753-43e0-B8FC-AC1667EBCBE1}">
-              <a14:hiddenEffects xmlns:a14="http://schemas.microsoft.com/office/drawing/2010/main" xmlns="">
+              <a14:hiddenEffects xmlns="" xmlns:a14="http://schemas.microsoft.com/office/drawing/2010/main">
                 <a:effectLst>
                   <a:outerShdw blurRad="63500" dist="38099" dir="2700000" algn="ctr" rotWithShape="0">
                     <a:schemeClr val="bg2">
@@ -37010,12 +37010,12 @@
           <a:effectLst/>
           <a:extLst>
             <a:ext uri="{909E8E84-426E-40dd-AFC4-6F175D3DCCD1}">
-              <a14:hiddenFill xmlns:a14="http://schemas.microsoft.com/office/drawing/2010/main" xmlns="">
+              <a14:hiddenFill xmlns="" xmlns:a14="http://schemas.microsoft.com/office/drawing/2010/main">
                 <a:noFill/>
               </a14:hiddenFill>
             </a:ext>
             <a:ext uri="{AF507438-7753-43e0-B8FC-AC1667EBCBE1}">
-              <a14:hiddenEffects xmlns:a14="http://schemas.microsoft.com/office/drawing/2010/main" xmlns="">
+              <a14:hiddenEffects xmlns="" xmlns:a14="http://schemas.microsoft.com/office/drawing/2010/main">
                 <a:effectLst>
                   <a:outerShdw blurRad="63500" dist="38099" dir="2700000" algn="ctr" rotWithShape="0">
                     <a:schemeClr val="bg2">

</xml_diff>

<commit_message>
Review max flow topics (studying for final)
</commit_message>
<xml_diff>
--- a/Lectures/Lecture 24_NP-Complete Reductions.pptx
+++ b/Lectures/Lecture 24_NP-Complete Reductions.pptx
@@ -273,7 +273,7 @@
           <a:p>
             <a:fld id="{40A064AD-7059-6948-BAB0-E62C6B3257D3}" type="datetimeFigureOut">
               <a:rPr lang="en-US" smtClean="0"/>
-              <a:t>4/28/24</a:t>
+              <a:t>5/1/24</a:t>
             </a:fld>
             <a:endParaRPr lang="en-US"/>
           </a:p>
@@ -438,7 +438,7 @@
           <a:p>
             <a:fld id="{07F74A3F-3C2C-9340-BD65-4AF8BE3CE1AC}" type="datetimeFigureOut">
               <a:rPr lang="en-US" smtClean="0"/>
-              <a:t>4/28/24</a:t>
+              <a:t>5/1/24</a:t>
             </a:fld>
             <a:endParaRPr lang="en-US"/>
           </a:p>
@@ -1078,7 +1078,7 @@
           <a:p>
             <a:fld id="{D728701E-CAF4-4159-9B3E-41C86DFFA30D}" type="datetimeFigureOut">
               <a:rPr lang="en-US" smtClean="0"/>
-              <a:t>4/28/24</a:t>
+              <a:t>5/1/24</a:t>
             </a:fld>
             <a:endParaRPr lang="en-US"/>
           </a:p>
@@ -1273,7 +1273,7 @@
           <a:p>
             <a:fld id="{D728701E-CAF4-4159-9B3E-41C86DFFA30D}" type="datetimeFigureOut">
               <a:rPr lang="en-US" smtClean="0"/>
-              <a:t>4/28/24</a:t>
+              <a:t>5/1/24</a:t>
             </a:fld>
             <a:endParaRPr lang="en-US"/>
           </a:p>
@@ -1457,7 +1457,7 @@
           <a:p>
             <a:fld id="{D728701E-CAF4-4159-9B3E-41C86DFFA30D}" type="datetimeFigureOut">
               <a:rPr lang="en-US" smtClean="0"/>
-              <a:t>4/28/24</a:t>
+              <a:t>5/1/24</a:t>
             </a:fld>
             <a:endParaRPr lang="en-US"/>
           </a:p>
@@ -1719,7 +1719,7 @@
           <a:p>
             <a:fld id="{D728701E-CAF4-4159-9B3E-41C86DFFA30D}" type="datetimeFigureOut">
               <a:rPr lang="en-US" smtClean="0"/>
-              <a:t>4/28/24</a:t>
+              <a:t>5/1/24</a:t>
             </a:fld>
             <a:endParaRPr lang="en-US"/>
           </a:p>
@@ -2134,7 +2134,7 @@
           <a:p>
             <a:fld id="{D728701E-CAF4-4159-9B3E-41C86DFFA30D}" type="datetimeFigureOut">
               <a:rPr lang="en-US" smtClean="0"/>
-              <a:t>4/28/24</a:t>
+              <a:t>5/1/24</a:t>
             </a:fld>
             <a:endParaRPr lang="en-US"/>
           </a:p>
@@ -2375,7 +2375,7 @@
           <a:p>
             <a:fld id="{D728701E-CAF4-4159-9B3E-41C86DFFA30D}" type="datetimeFigureOut">
               <a:rPr lang="en-US" smtClean="0"/>
-              <a:t>4/28/24</a:t>
+              <a:t>5/1/24</a:t>
             </a:fld>
             <a:endParaRPr lang="en-US"/>
           </a:p>
@@ -2610,7 +2610,7 @@
           <a:p>
             <a:fld id="{D728701E-CAF4-4159-9B3E-41C86DFFA30D}" type="datetimeFigureOut">
               <a:rPr lang="en-US" smtClean="0"/>
-              <a:t>4/28/24</a:t>
+              <a:t>5/1/24</a:t>
             </a:fld>
             <a:endParaRPr lang="en-US"/>
           </a:p>
@@ -2804,7 +2804,7 @@
           <a:p>
             <a:fld id="{D728701E-CAF4-4159-9B3E-41C86DFFA30D}" type="datetimeFigureOut">
               <a:rPr lang="en-US" smtClean="0"/>
-              <a:t>4/28/24</a:t>
+              <a:t>5/1/24</a:t>
             </a:fld>
             <a:endParaRPr lang="en-US"/>
           </a:p>
@@ -2902,7 +2902,7 @@
           <a:p>
             <a:fld id="{D728701E-CAF4-4159-9B3E-41C86DFFA30D}" type="datetimeFigureOut">
               <a:rPr lang="en-US" smtClean="0"/>
-              <a:t>4/28/24</a:t>
+              <a:t>5/1/24</a:t>
             </a:fld>
             <a:endParaRPr lang="en-US"/>
           </a:p>
@@ -3037,7 +3037,7 @@
           <a:p>
             <a:fld id="{D728701E-CAF4-4159-9B3E-41C86DFFA30D}" type="datetimeFigureOut">
               <a:rPr lang="en-US" smtClean="0"/>
-              <a:t>4/28/24</a:t>
+              <a:t>5/1/24</a:t>
             </a:fld>
             <a:endParaRPr lang="en-US"/>
           </a:p>
@@ -3559,7 +3559,7 @@
           <a:p>
             <a:fld id="{D728701E-CAF4-4159-9B3E-41C86DFFA30D}" type="datetimeFigureOut">
               <a:rPr lang="en-US" smtClean="0"/>
-              <a:t>4/28/24</a:t>
+              <a:t>5/1/24</a:t>
             </a:fld>
             <a:endParaRPr lang="en-US"/>
           </a:p>
@@ -3818,7 +3818,7 @@
           <a:p>
             <a:fld id="{D728701E-CAF4-4159-9B3E-41C86DFFA30D}" type="datetimeFigureOut">
               <a:rPr lang="en-US" smtClean="0"/>
-              <a:t>4/28/24</a:t>
+              <a:t>5/1/24</a:t>
             </a:fld>
             <a:endParaRPr lang="en-US"/>
           </a:p>
@@ -9438,7 +9438,7 @@
           <a:effectLst/>
           <a:extLst>
             <a:ext uri="{AF507438-7753-43e0-B8FC-AC1667EBCBE1}">
-              <a14:hiddenEffects xmlns="" xmlns:a14="http://schemas.microsoft.com/office/drawing/2010/main">
+              <a14:hiddenEffects xmlns:a14="http://schemas.microsoft.com/office/drawing/2010/main" xmlns="">
                 <a:effectLst>
                   <a:outerShdw blurRad="63500" dist="38099" dir="2700000" algn="ctr" rotWithShape="0">
                     <a:schemeClr val="bg2">
@@ -9492,12 +9492,12 @@
           <a:effectLst/>
           <a:extLst>
             <a:ext uri="{909E8E84-426E-40dd-AFC4-6F175D3DCCD1}">
-              <a14:hiddenFill xmlns="" xmlns:a14="http://schemas.microsoft.com/office/drawing/2010/main">
+              <a14:hiddenFill xmlns:a14="http://schemas.microsoft.com/office/drawing/2010/main" xmlns="">
                 <a:noFill/>
               </a14:hiddenFill>
             </a:ext>
             <a:ext uri="{AF507438-7753-43e0-B8FC-AC1667EBCBE1}">
-              <a14:hiddenEffects xmlns="" xmlns:a14="http://schemas.microsoft.com/office/drawing/2010/main">
+              <a14:hiddenEffects xmlns:a14="http://schemas.microsoft.com/office/drawing/2010/main" xmlns="">
                 <a:effectLst>
                   <a:outerShdw blurRad="63500" dist="38099" dir="2700000" algn="ctr" rotWithShape="0">
                     <a:schemeClr val="bg2">
@@ -9540,14 +9540,14 @@
           <a:effectLst/>
           <a:extLst>
             <a:ext uri="{909E8E84-426E-40dd-AFC4-6F175D3DCCD1}">
-              <a14:hiddenFill xmlns="" xmlns:a14="http://schemas.microsoft.com/office/drawing/2010/main">
+              <a14:hiddenFill xmlns:a14="http://schemas.microsoft.com/office/drawing/2010/main" xmlns="">
                 <a:solidFill>
                   <a:schemeClr val="accent1"/>
                 </a:solidFill>
               </a14:hiddenFill>
             </a:ext>
             <a:ext uri="{91240B29-F687-4f45-9708-019B960494DF}">
-              <a14:hiddenLine xmlns="" xmlns:a14="http://schemas.microsoft.com/office/drawing/2010/main" w="9525">
+              <a14:hiddenLine xmlns:a14="http://schemas.microsoft.com/office/drawing/2010/main" xmlns="" w="9525">
                 <a:solidFill>
                   <a:schemeClr val="tx1"/>
                 </a:solidFill>
@@ -9557,7 +9557,7 @@
               </a14:hiddenLine>
             </a:ext>
             <a:ext uri="{AF507438-7753-43e0-B8FC-AC1667EBCBE1}">
-              <a14:hiddenEffects xmlns="" xmlns:a14="http://schemas.microsoft.com/office/drawing/2010/main">
+              <a14:hiddenEffects xmlns:a14="http://schemas.microsoft.com/office/drawing/2010/main" xmlns="">
                 <a:effectLst>
                   <a:outerShdw blurRad="63500" dist="38099" dir="2700000" algn="ctr" rotWithShape="0">
                     <a:schemeClr val="bg2">
@@ -9607,14 +9607,14 @@
           <a:effectLst/>
           <a:extLst>
             <a:ext uri="{909E8E84-426E-40dd-AFC4-6F175D3DCCD1}">
-              <a14:hiddenFill xmlns="" xmlns:a14="http://schemas.microsoft.com/office/drawing/2010/main">
+              <a14:hiddenFill xmlns:a14="http://schemas.microsoft.com/office/drawing/2010/main" xmlns="">
                 <a:solidFill>
                   <a:schemeClr val="accent1"/>
                 </a:solidFill>
               </a14:hiddenFill>
             </a:ext>
             <a:ext uri="{91240B29-F687-4f45-9708-019B960494DF}">
-              <a14:hiddenLine xmlns="" xmlns:a14="http://schemas.microsoft.com/office/drawing/2010/main" w="9525">
+              <a14:hiddenLine xmlns:a14="http://schemas.microsoft.com/office/drawing/2010/main" xmlns="" w="9525">
                 <a:solidFill>
                   <a:schemeClr val="tx1"/>
                 </a:solidFill>
@@ -9624,7 +9624,7 @@
               </a14:hiddenLine>
             </a:ext>
             <a:ext uri="{AF507438-7753-43e0-B8FC-AC1667EBCBE1}">
-              <a14:hiddenEffects xmlns="" xmlns:a14="http://schemas.microsoft.com/office/drawing/2010/main">
+              <a14:hiddenEffects xmlns:a14="http://schemas.microsoft.com/office/drawing/2010/main" xmlns="">
                 <a:effectLst>
                   <a:outerShdw blurRad="63500" dist="38099" dir="2700000" algn="ctr" rotWithShape="0">
                     <a:schemeClr val="bg2">
@@ -9679,12 +9679,12 @@
           <a:effectLst/>
           <a:extLst>
             <a:ext uri="{909E8E84-426E-40dd-AFC4-6F175D3DCCD1}">
-              <a14:hiddenFill xmlns="" xmlns:a14="http://schemas.microsoft.com/office/drawing/2010/main">
+              <a14:hiddenFill xmlns:a14="http://schemas.microsoft.com/office/drawing/2010/main" xmlns="">
                 <a:noFill/>
               </a14:hiddenFill>
             </a:ext>
             <a:ext uri="{AF507438-7753-43e0-B8FC-AC1667EBCBE1}">
-              <a14:hiddenEffects xmlns="" xmlns:a14="http://schemas.microsoft.com/office/drawing/2010/main">
+              <a14:hiddenEffects xmlns:a14="http://schemas.microsoft.com/office/drawing/2010/main" xmlns="">
                 <a:effectLst>
                   <a:outerShdw blurRad="63500" dist="38099" dir="2700000" algn="ctr" rotWithShape="0">
                     <a:schemeClr val="bg2">
@@ -9727,14 +9727,14 @@
           <a:effectLst/>
           <a:extLst>
             <a:ext uri="{909E8E84-426E-40dd-AFC4-6F175D3DCCD1}">
-              <a14:hiddenFill xmlns="" xmlns:a14="http://schemas.microsoft.com/office/drawing/2010/main">
+              <a14:hiddenFill xmlns:a14="http://schemas.microsoft.com/office/drawing/2010/main" xmlns="">
                 <a:solidFill>
                   <a:schemeClr val="accent1"/>
                 </a:solidFill>
               </a14:hiddenFill>
             </a:ext>
             <a:ext uri="{91240B29-F687-4f45-9708-019B960494DF}">
-              <a14:hiddenLine xmlns="" xmlns:a14="http://schemas.microsoft.com/office/drawing/2010/main" w="9525">
+              <a14:hiddenLine xmlns:a14="http://schemas.microsoft.com/office/drawing/2010/main" xmlns="" w="9525">
                 <a:solidFill>
                   <a:schemeClr val="tx1"/>
                 </a:solidFill>
@@ -9744,7 +9744,7 @@
               </a14:hiddenLine>
             </a:ext>
             <a:ext uri="{AF507438-7753-43e0-B8FC-AC1667EBCBE1}">
-              <a14:hiddenEffects xmlns="" xmlns:a14="http://schemas.microsoft.com/office/drawing/2010/main">
+              <a14:hiddenEffects xmlns:a14="http://schemas.microsoft.com/office/drawing/2010/main" xmlns="">
                 <a:effectLst>
                   <a:outerShdw blurRad="63500" dist="38099" dir="2700000" algn="ctr" rotWithShape="0">
                     <a:schemeClr val="bg2">
@@ -9807,14 +9807,14 @@
           <a:effectLst/>
           <a:extLst>
             <a:ext uri="{909E8E84-426E-40dd-AFC4-6F175D3DCCD1}">
-              <a14:hiddenFill xmlns="" xmlns:a14="http://schemas.microsoft.com/office/drawing/2010/main">
+              <a14:hiddenFill xmlns:a14="http://schemas.microsoft.com/office/drawing/2010/main" xmlns="">
                 <a:solidFill>
                   <a:schemeClr val="accent1"/>
                 </a:solidFill>
               </a14:hiddenFill>
             </a:ext>
             <a:ext uri="{91240B29-F687-4f45-9708-019B960494DF}">
-              <a14:hiddenLine xmlns="" xmlns:a14="http://schemas.microsoft.com/office/drawing/2010/main" w="9525">
+              <a14:hiddenLine xmlns:a14="http://schemas.microsoft.com/office/drawing/2010/main" xmlns="" w="9525">
                 <a:solidFill>
                   <a:schemeClr val="tx1"/>
                 </a:solidFill>
@@ -9824,7 +9824,7 @@
               </a14:hiddenLine>
             </a:ext>
             <a:ext uri="{AF507438-7753-43e0-B8FC-AC1667EBCBE1}">
-              <a14:hiddenEffects xmlns="" xmlns:a14="http://schemas.microsoft.com/office/drawing/2010/main">
+              <a14:hiddenEffects xmlns:a14="http://schemas.microsoft.com/office/drawing/2010/main" xmlns="">
                 <a:effectLst>
                   <a:outerShdw blurRad="63500" dist="38099" dir="2700000" algn="ctr" rotWithShape="0">
                     <a:schemeClr val="bg2">
@@ -10025,12 +10025,12 @@
           <a:effectLst/>
           <a:extLst>
             <a:ext uri="{909E8E84-426E-40dd-AFC4-6F175D3DCCD1}">
-              <a14:hiddenFill xmlns="" xmlns:a14="http://schemas.microsoft.com/office/drawing/2010/main">
+              <a14:hiddenFill xmlns:a14="http://schemas.microsoft.com/office/drawing/2010/main" xmlns="">
                 <a:noFill/>
               </a14:hiddenFill>
             </a:ext>
             <a:ext uri="{AF507438-7753-43e0-B8FC-AC1667EBCBE1}">
-              <a14:hiddenEffects xmlns="" xmlns:a14="http://schemas.microsoft.com/office/drawing/2010/main">
+              <a14:hiddenEffects xmlns:a14="http://schemas.microsoft.com/office/drawing/2010/main" xmlns="">
                 <a:effectLst>
                   <a:outerShdw blurRad="63500" dist="38099" dir="2700000" algn="ctr" rotWithShape="0">
                     <a:schemeClr val="bg2">
@@ -10079,12 +10079,12 @@
           <a:effectLst/>
           <a:extLst>
             <a:ext uri="{909E8E84-426E-40dd-AFC4-6F175D3DCCD1}">
-              <a14:hiddenFill xmlns="" xmlns:a14="http://schemas.microsoft.com/office/drawing/2010/main">
+              <a14:hiddenFill xmlns:a14="http://schemas.microsoft.com/office/drawing/2010/main" xmlns="">
                 <a:noFill/>
               </a14:hiddenFill>
             </a:ext>
             <a:ext uri="{AF507438-7753-43e0-B8FC-AC1667EBCBE1}">
-              <a14:hiddenEffects xmlns="" xmlns:a14="http://schemas.microsoft.com/office/drawing/2010/main">
+              <a14:hiddenEffects xmlns:a14="http://schemas.microsoft.com/office/drawing/2010/main" xmlns="">
                 <a:effectLst>
                   <a:outerShdw blurRad="63500" dist="38099" dir="2700000" algn="ctr" rotWithShape="0">
                     <a:schemeClr val="bg2">
@@ -10186,7 +10186,7 @@
           <a:effectLst/>
           <a:extLst>
             <a:ext uri="{AF507438-7753-43e0-B8FC-AC1667EBCBE1}">
-              <a14:hiddenEffects xmlns="" xmlns:a14="http://schemas.microsoft.com/office/drawing/2010/main">
+              <a14:hiddenEffects xmlns:a14="http://schemas.microsoft.com/office/drawing/2010/main" xmlns="">
                 <a:effectLst>
                   <a:outerShdw blurRad="63500" dist="38099" dir="2700000" algn="ctr" rotWithShape="0">
                     <a:schemeClr val="bg2">
@@ -10240,12 +10240,12 @@
           <a:effectLst/>
           <a:extLst>
             <a:ext uri="{909E8E84-426E-40dd-AFC4-6F175D3DCCD1}">
-              <a14:hiddenFill xmlns="" xmlns:a14="http://schemas.microsoft.com/office/drawing/2010/main">
+              <a14:hiddenFill xmlns:a14="http://schemas.microsoft.com/office/drawing/2010/main" xmlns="">
                 <a:noFill/>
               </a14:hiddenFill>
             </a:ext>
             <a:ext uri="{AF507438-7753-43e0-B8FC-AC1667EBCBE1}">
-              <a14:hiddenEffects xmlns="" xmlns:a14="http://schemas.microsoft.com/office/drawing/2010/main">
+              <a14:hiddenEffects xmlns:a14="http://schemas.microsoft.com/office/drawing/2010/main" xmlns="">
                 <a:effectLst>
                   <a:outerShdw blurRad="63500" dist="38099" dir="2700000" algn="ctr" rotWithShape="0">
                     <a:schemeClr val="bg2">
@@ -10288,14 +10288,14 @@
           <a:effectLst/>
           <a:extLst>
             <a:ext uri="{909E8E84-426E-40dd-AFC4-6F175D3DCCD1}">
-              <a14:hiddenFill xmlns="" xmlns:a14="http://schemas.microsoft.com/office/drawing/2010/main">
+              <a14:hiddenFill xmlns:a14="http://schemas.microsoft.com/office/drawing/2010/main" xmlns="">
                 <a:solidFill>
                   <a:schemeClr val="accent1"/>
                 </a:solidFill>
               </a14:hiddenFill>
             </a:ext>
             <a:ext uri="{91240B29-F687-4f45-9708-019B960494DF}">
-              <a14:hiddenLine xmlns="" xmlns:a14="http://schemas.microsoft.com/office/drawing/2010/main" w="9525">
+              <a14:hiddenLine xmlns:a14="http://schemas.microsoft.com/office/drawing/2010/main" xmlns="" w="9525">
                 <a:solidFill>
                   <a:schemeClr val="tx1"/>
                 </a:solidFill>
@@ -10305,7 +10305,7 @@
               </a14:hiddenLine>
             </a:ext>
             <a:ext uri="{AF507438-7753-43e0-B8FC-AC1667EBCBE1}">
-              <a14:hiddenEffects xmlns="" xmlns:a14="http://schemas.microsoft.com/office/drawing/2010/main">
+              <a14:hiddenEffects xmlns:a14="http://schemas.microsoft.com/office/drawing/2010/main" xmlns="">
                 <a:effectLst>
                   <a:outerShdw blurRad="63500" dist="38099" dir="2700000" algn="ctr" rotWithShape="0">
                     <a:schemeClr val="bg2">
@@ -10355,14 +10355,14 @@
           <a:effectLst/>
           <a:extLst>
             <a:ext uri="{909E8E84-426E-40dd-AFC4-6F175D3DCCD1}">
-              <a14:hiddenFill xmlns="" xmlns:a14="http://schemas.microsoft.com/office/drawing/2010/main">
+              <a14:hiddenFill xmlns:a14="http://schemas.microsoft.com/office/drawing/2010/main" xmlns="">
                 <a:solidFill>
                   <a:schemeClr val="accent1"/>
                 </a:solidFill>
               </a14:hiddenFill>
             </a:ext>
             <a:ext uri="{91240B29-F687-4f45-9708-019B960494DF}">
-              <a14:hiddenLine xmlns="" xmlns:a14="http://schemas.microsoft.com/office/drawing/2010/main" w="9525">
+              <a14:hiddenLine xmlns:a14="http://schemas.microsoft.com/office/drawing/2010/main" xmlns="" w="9525">
                 <a:solidFill>
                   <a:schemeClr val="tx1"/>
                 </a:solidFill>
@@ -10372,7 +10372,7 @@
               </a14:hiddenLine>
             </a:ext>
             <a:ext uri="{AF507438-7753-43e0-B8FC-AC1667EBCBE1}">
-              <a14:hiddenEffects xmlns="" xmlns:a14="http://schemas.microsoft.com/office/drawing/2010/main">
+              <a14:hiddenEffects xmlns:a14="http://schemas.microsoft.com/office/drawing/2010/main" xmlns="">
                 <a:effectLst>
                   <a:outerShdw blurRad="63500" dist="38099" dir="2700000" algn="ctr" rotWithShape="0">
                     <a:schemeClr val="bg2">
@@ -10427,12 +10427,12 @@
           <a:effectLst/>
           <a:extLst>
             <a:ext uri="{909E8E84-426E-40dd-AFC4-6F175D3DCCD1}">
-              <a14:hiddenFill xmlns="" xmlns:a14="http://schemas.microsoft.com/office/drawing/2010/main">
+              <a14:hiddenFill xmlns:a14="http://schemas.microsoft.com/office/drawing/2010/main" xmlns="">
                 <a:noFill/>
               </a14:hiddenFill>
             </a:ext>
             <a:ext uri="{AF507438-7753-43e0-B8FC-AC1667EBCBE1}">
-              <a14:hiddenEffects xmlns="" xmlns:a14="http://schemas.microsoft.com/office/drawing/2010/main">
+              <a14:hiddenEffects xmlns:a14="http://schemas.microsoft.com/office/drawing/2010/main" xmlns="">
                 <a:effectLst>
                   <a:outerShdw blurRad="63500" dist="38099" dir="2700000" algn="ctr" rotWithShape="0">
                     <a:schemeClr val="bg2">
@@ -10475,14 +10475,14 @@
           <a:effectLst/>
           <a:extLst>
             <a:ext uri="{909E8E84-426E-40dd-AFC4-6F175D3DCCD1}">
-              <a14:hiddenFill xmlns="" xmlns:a14="http://schemas.microsoft.com/office/drawing/2010/main">
+              <a14:hiddenFill xmlns:a14="http://schemas.microsoft.com/office/drawing/2010/main" xmlns="">
                 <a:solidFill>
                   <a:schemeClr val="accent1"/>
                 </a:solidFill>
               </a14:hiddenFill>
             </a:ext>
             <a:ext uri="{91240B29-F687-4f45-9708-019B960494DF}">
-              <a14:hiddenLine xmlns="" xmlns:a14="http://schemas.microsoft.com/office/drawing/2010/main" w="9525">
+              <a14:hiddenLine xmlns:a14="http://schemas.microsoft.com/office/drawing/2010/main" xmlns="" w="9525">
                 <a:solidFill>
                   <a:schemeClr val="tx1"/>
                 </a:solidFill>
@@ -10492,7 +10492,7 @@
               </a14:hiddenLine>
             </a:ext>
             <a:ext uri="{AF507438-7753-43e0-B8FC-AC1667EBCBE1}">
-              <a14:hiddenEffects xmlns="" xmlns:a14="http://schemas.microsoft.com/office/drawing/2010/main">
+              <a14:hiddenEffects xmlns:a14="http://schemas.microsoft.com/office/drawing/2010/main" xmlns="">
                 <a:effectLst>
                   <a:outerShdw blurRad="63500" dist="38099" dir="2700000" algn="ctr" rotWithShape="0">
                     <a:schemeClr val="bg2">
@@ -10552,14 +10552,14 @@
           <a:effectLst/>
           <a:extLst>
             <a:ext uri="{909E8E84-426E-40dd-AFC4-6F175D3DCCD1}">
-              <a14:hiddenFill xmlns="" xmlns:a14="http://schemas.microsoft.com/office/drawing/2010/main">
+              <a14:hiddenFill xmlns:a14="http://schemas.microsoft.com/office/drawing/2010/main" xmlns="">
                 <a:solidFill>
                   <a:schemeClr val="accent1"/>
                 </a:solidFill>
               </a14:hiddenFill>
             </a:ext>
             <a:ext uri="{91240B29-F687-4f45-9708-019B960494DF}">
-              <a14:hiddenLine xmlns="" xmlns:a14="http://schemas.microsoft.com/office/drawing/2010/main" w="9525">
+              <a14:hiddenLine xmlns:a14="http://schemas.microsoft.com/office/drawing/2010/main" xmlns="" w="9525">
                 <a:solidFill>
                   <a:schemeClr val="tx1"/>
                 </a:solidFill>
@@ -10569,7 +10569,7 @@
               </a14:hiddenLine>
             </a:ext>
             <a:ext uri="{AF507438-7753-43e0-B8FC-AC1667EBCBE1}">
-              <a14:hiddenEffects xmlns="" xmlns:a14="http://schemas.microsoft.com/office/drawing/2010/main">
+              <a14:hiddenEffects xmlns:a14="http://schemas.microsoft.com/office/drawing/2010/main" xmlns="">
                 <a:effectLst>
                   <a:outerShdw blurRad="63500" dist="38099" dir="2700000" algn="ctr" rotWithShape="0">
                     <a:schemeClr val="bg2">
@@ -11950,12 +11950,12 @@
           <a:effectLst/>
           <a:extLst>
             <a:ext uri="{909E8E84-426E-40dd-AFC4-6F175D3DCCD1}">
-              <a14:hiddenFill xmlns="" xmlns:a14="http://schemas.microsoft.com/office/drawing/2010/main">
+              <a14:hiddenFill xmlns:a14="http://schemas.microsoft.com/office/drawing/2010/main" xmlns="">
                 <a:noFill/>
               </a14:hiddenFill>
             </a:ext>
             <a:ext uri="{AF507438-7753-43e0-B8FC-AC1667EBCBE1}">
-              <a14:hiddenEffects xmlns="" xmlns:a14="http://schemas.microsoft.com/office/drawing/2010/main">
+              <a14:hiddenEffects xmlns:a14="http://schemas.microsoft.com/office/drawing/2010/main" xmlns="">
                 <a:effectLst>
                   <a:outerShdw blurRad="63500" dist="38099" dir="2700000" algn="ctr" rotWithShape="0">
                     <a:schemeClr val="bg2">
@@ -12088,12 +12088,12 @@
           <a:effectLst/>
           <a:extLst>
             <a:ext uri="{909E8E84-426E-40dd-AFC4-6F175D3DCCD1}">
-              <a14:hiddenFill xmlns="" xmlns:a14="http://schemas.microsoft.com/office/drawing/2010/main">
+              <a14:hiddenFill xmlns:a14="http://schemas.microsoft.com/office/drawing/2010/main" xmlns="">
                 <a:noFill/>
               </a14:hiddenFill>
             </a:ext>
             <a:ext uri="{AF507438-7753-43e0-B8FC-AC1667EBCBE1}">
-              <a14:hiddenEffects xmlns="" xmlns:a14="http://schemas.microsoft.com/office/drawing/2010/main">
+              <a14:hiddenEffects xmlns:a14="http://schemas.microsoft.com/office/drawing/2010/main" xmlns="">
                 <a:effectLst>
                   <a:outerShdw blurRad="63500" dist="38099" dir="2700000" algn="ctr" rotWithShape="0">
                     <a:schemeClr val="bg2">
@@ -13679,14 +13679,14 @@
           <a:effectLst/>
           <a:extLst>
             <a:ext uri="{909E8E84-426E-40dd-AFC4-6F175D3DCCD1}">
-              <a14:hiddenFill xmlns="" xmlns:a14="http://schemas.microsoft.com/office/drawing/2010/main">
+              <a14:hiddenFill xmlns:a14="http://schemas.microsoft.com/office/drawing/2010/main" xmlns="">
                 <a:solidFill>
                   <a:schemeClr val="accent1"/>
                 </a:solidFill>
               </a14:hiddenFill>
             </a:ext>
             <a:ext uri="{91240B29-F687-4f45-9708-019B960494DF}">
-              <a14:hiddenLine xmlns="" xmlns:a14="http://schemas.microsoft.com/office/drawing/2010/main" w="9525">
+              <a14:hiddenLine xmlns:a14="http://schemas.microsoft.com/office/drawing/2010/main" xmlns="" w="9525">
                 <a:solidFill>
                   <a:schemeClr val="tx1"/>
                 </a:solidFill>
@@ -13696,7 +13696,7 @@
               </a14:hiddenLine>
             </a:ext>
             <a:ext uri="{AF507438-7753-43e0-B8FC-AC1667EBCBE1}">
-              <a14:hiddenEffects xmlns="" xmlns:a14="http://schemas.microsoft.com/office/drawing/2010/main">
+              <a14:hiddenEffects xmlns:a14="http://schemas.microsoft.com/office/drawing/2010/main" xmlns="">
                 <a:effectLst>
                   <a:outerShdw blurRad="63500" dist="38099" dir="2700000" algn="ctr" rotWithShape="0">
                     <a:schemeClr val="bg2">
@@ -14924,14 +14924,14 @@
           <a:effectLst/>
           <a:extLst>
             <a:ext uri="{909E8E84-426E-40dd-AFC4-6F175D3DCCD1}">
-              <a14:hiddenFill xmlns="" xmlns:a14="http://schemas.microsoft.com/office/drawing/2010/main">
+              <a14:hiddenFill xmlns:a14="http://schemas.microsoft.com/office/drawing/2010/main" xmlns="">
                 <a:solidFill>
                   <a:schemeClr val="accent1"/>
                 </a:solidFill>
               </a14:hiddenFill>
             </a:ext>
             <a:ext uri="{91240B29-F687-4f45-9708-019B960494DF}">
-              <a14:hiddenLine xmlns="" xmlns:a14="http://schemas.microsoft.com/office/drawing/2010/main" w="9525">
+              <a14:hiddenLine xmlns:a14="http://schemas.microsoft.com/office/drawing/2010/main" xmlns="" w="9525">
                 <a:solidFill>
                   <a:schemeClr val="tx1"/>
                 </a:solidFill>
@@ -14941,7 +14941,7 @@
               </a14:hiddenLine>
             </a:ext>
             <a:ext uri="{AF507438-7753-43e0-B8FC-AC1667EBCBE1}">
-              <a14:hiddenEffects xmlns="" xmlns:a14="http://schemas.microsoft.com/office/drawing/2010/main">
+              <a14:hiddenEffects xmlns:a14="http://schemas.microsoft.com/office/drawing/2010/main" xmlns="">
                 <a:effectLst>
                   <a:outerShdw blurRad="63500" dist="38099" dir="2700000" algn="ctr" rotWithShape="0">
                     <a:schemeClr val="bg2">
@@ -16328,12 +16328,12 @@
           <a:effectLst/>
           <a:extLst>
             <a:ext uri="{909E8E84-426E-40dd-AFC4-6F175D3DCCD1}">
-              <a14:hiddenFill xmlns="" xmlns:a14="http://schemas.microsoft.com/office/drawing/2010/main">
+              <a14:hiddenFill xmlns:a14="http://schemas.microsoft.com/office/drawing/2010/main" xmlns="">
                 <a:noFill/>
               </a14:hiddenFill>
             </a:ext>
             <a:ext uri="{AF507438-7753-43e0-B8FC-AC1667EBCBE1}">
-              <a14:hiddenEffects xmlns="" xmlns:a14="http://schemas.microsoft.com/office/drawing/2010/main">
+              <a14:hiddenEffects xmlns:a14="http://schemas.microsoft.com/office/drawing/2010/main" xmlns="">
                 <a:effectLst>
                   <a:outerShdw blurRad="63500" dist="38099" dir="2700000" algn="ctr" rotWithShape="0">
                     <a:schemeClr val="bg2">
@@ -16466,12 +16466,12 @@
           <a:effectLst/>
           <a:extLst>
             <a:ext uri="{909E8E84-426E-40dd-AFC4-6F175D3DCCD1}">
-              <a14:hiddenFill xmlns="" xmlns:a14="http://schemas.microsoft.com/office/drawing/2010/main">
+              <a14:hiddenFill xmlns:a14="http://schemas.microsoft.com/office/drawing/2010/main" xmlns="">
                 <a:noFill/>
               </a14:hiddenFill>
             </a:ext>
             <a:ext uri="{AF507438-7753-43e0-B8FC-AC1667EBCBE1}">
-              <a14:hiddenEffects xmlns="" xmlns:a14="http://schemas.microsoft.com/office/drawing/2010/main">
+              <a14:hiddenEffects xmlns:a14="http://schemas.microsoft.com/office/drawing/2010/main" xmlns="">
                 <a:effectLst>
                   <a:outerShdw blurRad="63500" dist="38099" dir="2700000" algn="ctr" rotWithShape="0">
                     <a:schemeClr val="bg2">
@@ -17029,14 +17029,14 @@
           <a:effectLst/>
           <a:extLst>
             <a:ext uri="{909E8E84-426E-40dd-AFC4-6F175D3DCCD1}">
-              <a14:hiddenFill xmlns="" xmlns:a14="http://schemas.microsoft.com/office/drawing/2010/main">
+              <a14:hiddenFill xmlns:a14="http://schemas.microsoft.com/office/drawing/2010/main" xmlns="">
                 <a:solidFill>
                   <a:schemeClr val="accent1"/>
                 </a:solidFill>
               </a14:hiddenFill>
             </a:ext>
             <a:ext uri="{91240B29-F687-4f45-9708-019B960494DF}">
-              <a14:hiddenLine xmlns="" xmlns:a14="http://schemas.microsoft.com/office/drawing/2010/main" w="9525">
+              <a14:hiddenLine xmlns:a14="http://schemas.microsoft.com/office/drawing/2010/main" xmlns="" w="9525">
                 <a:solidFill>
                   <a:schemeClr val="tx1"/>
                 </a:solidFill>
@@ -17046,7 +17046,7 @@
               </a14:hiddenLine>
             </a:ext>
             <a:ext uri="{AF507438-7753-43e0-B8FC-AC1667EBCBE1}">
-              <a14:hiddenEffects xmlns="" xmlns:a14="http://schemas.microsoft.com/office/drawing/2010/main">
+              <a14:hiddenEffects xmlns:a14="http://schemas.microsoft.com/office/drawing/2010/main" xmlns="">
                 <a:effectLst>
                   <a:outerShdw blurRad="63500" dist="38099" dir="2700000" algn="ctr" rotWithShape="0">
                     <a:schemeClr val="bg2">
@@ -17435,14 +17435,14 @@
           <a:effectLst/>
           <a:extLst>
             <a:ext uri="{909E8E84-426E-40dd-AFC4-6F175D3DCCD1}">
-              <a14:hiddenFill xmlns="" xmlns:a14="http://schemas.microsoft.com/office/drawing/2010/main">
+              <a14:hiddenFill xmlns:a14="http://schemas.microsoft.com/office/drawing/2010/main" xmlns="">
                 <a:solidFill>
                   <a:schemeClr val="accent1"/>
                 </a:solidFill>
               </a14:hiddenFill>
             </a:ext>
             <a:ext uri="{91240B29-F687-4f45-9708-019B960494DF}">
-              <a14:hiddenLine xmlns="" xmlns:a14="http://schemas.microsoft.com/office/drawing/2010/main" w="9525">
+              <a14:hiddenLine xmlns:a14="http://schemas.microsoft.com/office/drawing/2010/main" xmlns="" w="9525">
                 <a:solidFill>
                   <a:schemeClr val="tx1"/>
                 </a:solidFill>
@@ -17452,7 +17452,7 @@
               </a14:hiddenLine>
             </a:ext>
             <a:ext uri="{AF507438-7753-43e0-B8FC-AC1667EBCBE1}">
-              <a14:hiddenEffects xmlns="" xmlns:a14="http://schemas.microsoft.com/office/drawing/2010/main">
+              <a14:hiddenEffects xmlns:a14="http://schemas.microsoft.com/office/drawing/2010/main" xmlns="">
                 <a:effectLst>
                   <a:outerShdw blurRad="63500" dist="38099" dir="2700000" algn="ctr" rotWithShape="0">
                     <a:schemeClr val="bg2">
@@ -18225,7 +18225,7 @@
             <a:effectLst/>
             <a:extLst>
               <a:ext uri="{AF507438-7753-43e0-B8FC-AC1667EBCBE1}">
-                <a14:hiddenEffects xmlns="" xmlns:a14="http://schemas.microsoft.com/office/drawing/2010/main">
+                <a14:hiddenEffects xmlns:a14="http://schemas.microsoft.com/office/drawing/2010/main" xmlns="">
                   <a:effectLst>
                     <a:outerShdw blurRad="63500" dist="38099" dir="2700000" algn="ctr" rotWithShape="0">
                       <a:schemeClr val="bg2">
@@ -18271,14 +18271,14 @@
             <a:effectLst/>
             <a:extLst>
               <a:ext uri="{909E8E84-426E-40dd-AFC4-6F175D3DCCD1}">
-                <a14:hiddenFill xmlns="" xmlns:a14="http://schemas.microsoft.com/office/drawing/2010/main">
+                <a14:hiddenFill xmlns:a14="http://schemas.microsoft.com/office/drawing/2010/main" xmlns="">
                   <a:solidFill>
                     <a:schemeClr val="accent1"/>
                   </a:solidFill>
                 </a14:hiddenFill>
               </a:ext>
               <a:ext uri="{91240B29-F687-4f45-9708-019B960494DF}">
-                <a14:hiddenLine xmlns="" xmlns:a14="http://schemas.microsoft.com/office/drawing/2010/main" w="9525">
+                <a14:hiddenLine xmlns:a14="http://schemas.microsoft.com/office/drawing/2010/main" xmlns="" w="9525">
                   <a:solidFill>
                     <a:schemeClr val="tx1"/>
                   </a:solidFill>
@@ -18288,7 +18288,7 @@
                 </a14:hiddenLine>
               </a:ext>
               <a:ext uri="{AF507438-7753-43e0-B8FC-AC1667EBCBE1}">
-                <a14:hiddenEffects xmlns="" xmlns:a14="http://schemas.microsoft.com/office/drawing/2010/main">
+                <a14:hiddenEffects xmlns:a14="http://schemas.microsoft.com/office/drawing/2010/main" xmlns="">
                   <a:effectLst>
                     <a:outerShdw blurRad="63500" dist="38099" dir="2700000" algn="ctr" rotWithShape="0">
                       <a:schemeClr val="bg2">
@@ -18366,7 +18366,7 @@
             <a:effectLst/>
             <a:extLst>
               <a:ext uri="{AF507438-7753-43e0-B8FC-AC1667EBCBE1}">
-                <a14:hiddenEffects xmlns="" xmlns:a14="http://schemas.microsoft.com/office/drawing/2010/main">
+                <a14:hiddenEffects xmlns:a14="http://schemas.microsoft.com/office/drawing/2010/main" xmlns="">
                   <a:effectLst>
                     <a:outerShdw blurRad="63500" dist="38099" dir="2700000" algn="ctr" rotWithShape="0">
                       <a:schemeClr val="bg2">
@@ -18412,14 +18412,14 @@
             <a:effectLst/>
             <a:extLst>
               <a:ext uri="{909E8E84-426E-40dd-AFC4-6F175D3DCCD1}">
-                <a14:hiddenFill xmlns="" xmlns:a14="http://schemas.microsoft.com/office/drawing/2010/main">
+                <a14:hiddenFill xmlns:a14="http://schemas.microsoft.com/office/drawing/2010/main" xmlns="">
                   <a:solidFill>
                     <a:schemeClr val="accent1"/>
                   </a:solidFill>
                 </a14:hiddenFill>
               </a:ext>
               <a:ext uri="{91240B29-F687-4f45-9708-019B960494DF}">
-                <a14:hiddenLine xmlns="" xmlns:a14="http://schemas.microsoft.com/office/drawing/2010/main" w="9525">
+                <a14:hiddenLine xmlns:a14="http://schemas.microsoft.com/office/drawing/2010/main" xmlns="" w="9525">
                   <a:solidFill>
                     <a:schemeClr val="tx1"/>
                   </a:solidFill>
@@ -18429,7 +18429,7 @@
                 </a14:hiddenLine>
               </a:ext>
               <a:ext uri="{AF507438-7753-43e0-B8FC-AC1667EBCBE1}">
-                <a14:hiddenEffects xmlns="" xmlns:a14="http://schemas.microsoft.com/office/drawing/2010/main">
+                <a14:hiddenEffects xmlns:a14="http://schemas.microsoft.com/office/drawing/2010/main" xmlns="">
                   <a:effectLst>
                     <a:outerShdw blurRad="63500" dist="38099" dir="2700000" algn="ctr" rotWithShape="0">
                       <a:schemeClr val="bg2">
@@ -18507,7 +18507,7 @@
             <a:effectLst/>
             <a:extLst>
               <a:ext uri="{AF507438-7753-43e0-B8FC-AC1667EBCBE1}">
-                <a14:hiddenEffects xmlns="" xmlns:a14="http://schemas.microsoft.com/office/drawing/2010/main">
+                <a14:hiddenEffects xmlns:a14="http://schemas.microsoft.com/office/drawing/2010/main" xmlns="">
                   <a:effectLst>
                     <a:outerShdw blurRad="63500" dist="38099" dir="2700000" algn="ctr" rotWithShape="0">
                       <a:schemeClr val="bg2">
@@ -18553,14 +18553,14 @@
             <a:effectLst/>
             <a:extLst>
               <a:ext uri="{909E8E84-426E-40dd-AFC4-6F175D3DCCD1}">
-                <a14:hiddenFill xmlns="" xmlns:a14="http://schemas.microsoft.com/office/drawing/2010/main">
+                <a14:hiddenFill xmlns:a14="http://schemas.microsoft.com/office/drawing/2010/main" xmlns="">
                   <a:solidFill>
                     <a:schemeClr val="accent1"/>
                   </a:solidFill>
                 </a14:hiddenFill>
               </a:ext>
               <a:ext uri="{91240B29-F687-4f45-9708-019B960494DF}">
-                <a14:hiddenLine xmlns="" xmlns:a14="http://schemas.microsoft.com/office/drawing/2010/main" w="9525">
+                <a14:hiddenLine xmlns:a14="http://schemas.microsoft.com/office/drawing/2010/main" xmlns="" w="9525">
                   <a:solidFill>
                     <a:schemeClr val="tx1"/>
                   </a:solidFill>
@@ -18570,7 +18570,7 @@
                 </a14:hiddenLine>
               </a:ext>
               <a:ext uri="{AF507438-7753-43e0-B8FC-AC1667EBCBE1}">
-                <a14:hiddenEffects xmlns="" xmlns:a14="http://schemas.microsoft.com/office/drawing/2010/main">
+                <a14:hiddenEffects xmlns:a14="http://schemas.microsoft.com/office/drawing/2010/main" xmlns="">
                   <a:effectLst>
                     <a:outerShdw blurRad="63500" dist="38099" dir="2700000" algn="ctr" rotWithShape="0">
                       <a:schemeClr val="bg2">
@@ -18934,7 +18934,7 @@
             <a:effectLst/>
             <a:extLst>
               <a:ext uri="{AF507438-7753-43e0-B8FC-AC1667EBCBE1}">
-                <a14:hiddenEffects xmlns="" xmlns:a14="http://schemas.microsoft.com/office/drawing/2010/main">
+                <a14:hiddenEffects xmlns:a14="http://schemas.microsoft.com/office/drawing/2010/main" xmlns="">
                   <a:effectLst>
                     <a:outerShdw blurRad="63500" dist="38099" dir="2700000" algn="ctr" rotWithShape="0">
                       <a:schemeClr val="bg2">
@@ -18980,14 +18980,14 @@
             <a:effectLst/>
             <a:extLst>
               <a:ext uri="{909E8E84-426E-40dd-AFC4-6F175D3DCCD1}">
-                <a14:hiddenFill xmlns="" xmlns:a14="http://schemas.microsoft.com/office/drawing/2010/main">
+                <a14:hiddenFill xmlns:a14="http://schemas.microsoft.com/office/drawing/2010/main" xmlns="">
                   <a:solidFill>
                     <a:schemeClr val="accent1"/>
                   </a:solidFill>
                 </a14:hiddenFill>
               </a:ext>
               <a:ext uri="{91240B29-F687-4f45-9708-019B960494DF}">
-                <a14:hiddenLine xmlns="" xmlns:a14="http://schemas.microsoft.com/office/drawing/2010/main" w="9525">
+                <a14:hiddenLine xmlns:a14="http://schemas.microsoft.com/office/drawing/2010/main" xmlns="" w="9525">
                   <a:solidFill>
                     <a:schemeClr val="tx1"/>
                   </a:solidFill>
@@ -18997,7 +18997,7 @@
                 </a14:hiddenLine>
               </a:ext>
               <a:ext uri="{AF507438-7753-43e0-B8FC-AC1667EBCBE1}">
-                <a14:hiddenEffects xmlns="" xmlns:a14="http://schemas.microsoft.com/office/drawing/2010/main">
+                <a14:hiddenEffects xmlns:a14="http://schemas.microsoft.com/office/drawing/2010/main" xmlns="">
                   <a:effectLst>
                     <a:outerShdw blurRad="63500" dist="38099" dir="2700000" algn="ctr" rotWithShape="0">
                       <a:schemeClr val="bg2">
@@ -19075,7 +19075,7 @@
             <a:effectLst/>
             <a:extLst>
               <a:ext uri="{AF507438-7753-43e0-B8FC-AC1667EBCBE1}">
-                <a14:hiddenEffects xmlns="" xmlns:a14="http://schemas.microsoft.com/office/drawing/2010/main">
+                <a14:hiddenEffects xmlns:a14="http://schemas.microsoft.com/office/drawing/2010/main" xmlns="">
                   <a:effectLst>
                     <a:outerShdw blurRad="63500" dist="38099" dir="2700000" algn="ctr" rotWithShape="0">
                       <a:schemeClr val="bg2">
@@ -19121,14 +19121,14 @@
             <a:effectLst/>
             <a:extLst>
               <a:ext uri="{909E8E84-426E-40dd-AFC4-6F175D3DCCD1}">
-                <a14:hiddenFill xmlns="" xmlns:a14="http://schemas.microsoft.com/office/drawing/2010/main">
+                <a14:hiddenFill xmlns:a14="http://schemas.microsoft.com/office/drawing/2010/main" xmlns="">
                   <a:solidFill>
                     <a:schemeClr val="accent1"/>
                   </a:solidFill>
                 </a14:hiddenFill>
               </a:ext>
               <a:ext uri="{91240B29-F687-4f45-9708-019B960494DF}">
-                <a14:hiddenLine xmlns="" xmlns:a14="http://schemas.microsoft.com/office/drawing/2010/main" w="9525">
+                <a14:hiddenLine xmlns:a14="http://schemas.microsoft.com/office/drawing/2010/main" xmlns="" w="9525">
                   <a:solidFill>
                     <a:schemeClr val="tx1"/>
                   </a:solidFill>
@@ -19138,7 +19138,7 @@
                 </a14:hiddenLine>
               </a:ext>
               <a:ext uri="{AF507438-7753-43e0-B8FC-AC1667EBCBE1}">
-                <a14:hiddenEffects xmlns="" xmlns:a14="http://schemas.microsoft.com/office/drawing/2010/main">
+                <a14:hiddenEffects xmlns:a14="http://schemas.microsoft.com/office/drawing/2010/main" xmlns="">
                   <a:effectLst>
                     <a:outerShdw blurRad="63500" dist="38099" dir="2700000" algn="ctr" rotWithShape="0">
                       <a:schemeClr val="bg2">
@@ -19216,7 +19216,7 @@
             <a:effectLst/>
             <a:extLst>
               <a:ext uri="{AF507438-7753-43e0-B8FC-AC1667EBCBE1}">
-                <a14:hiddenEffects xmlns="" xmlns:a14="http://schemas.microsoft.com/office/drawing/2010/main">
+                <a14:hiddenEffects xmlns:a14="http://schemas.microsoft.com/office/drawing/2010/main" xmlns="">
                   <a:effectLst>
                     <a:outerShdw blurRad="63500" dist="38099" dir="2700000" algn="ctr" rotWithShape="0">
                       <a:schemeClr val="bg2">
@@ -19262,14 +19262,14 @@
             <a:effectLst/>
             <a:extLst>
               <a:ext uri="{909E8E84-426E-40dd-AFC4-6F175D3DCCD1}">
-                <a14:hiddenFill xmlns="" xmlns:a14="http://schemas.microsoft.com/office/drawing/2010/main">
+                <a14:hiddenFill xmlns:a14="http://schemas.microsoft.com/office/drawing/2010/main" xmlns="">
                   <a:solidFill>
                     <a:schemeClr val="accent1"/>
                   </a:solidFill>
                 </a14:hiddenFill>
               </a:ext>
               <a:ext uri="{91240B29-F687-4f45-9708-019B960494DF}">
-                <a14:hiddenLine xmlns="" xmlns:a14="http://schemas.microsoft.com/office/drawing/2010/main" w="9525">
+                <a14:hiddenLine xmlns:a14="http://schemas.microsoft.com/office/drawing/2010/main" xmlns="" w="9525">
                   <a:solidFill>
                     <a:schemeClr val="tx1"/>
                   </a:solidFill>
@@ -19279,7 +19279,7 @@
                 </a14:hiddenLine>
               </a:ext>
               <a:ext uri="{AF507438-7753-43e0-B8FC-AC1667EBCBE1}">
-                <a14:hiddenEffects xmlns="" xmlns:a14="http://schemas.microsoft.com/office/drawing/2010/main">
+                <a14:hiddenEffects xmlns:a14="http://schemas.microsoft.com/office/drawing/2010/main" xmlns="">
                   <a:effectLst>
                     <a:outerShdw blurRad="63500" dist="38099" dir="2700000" algn="ctr" rotWithShape="0">
                       <a:schemeClr val="bg2">
@@ -19478,7 +19478,7 @@
             <a:effectLst/>
             <a:extLst>
               <a:ext uri="{AF507438-7753-43e0-B8FC-AC1667EBCBE1}">
-                <a14:hiddenEffects xmlns="" xmlns:a14="http://schemas.microsoft.com/office/drawing/2010/main">
+                <a14:hiddenEffects xmlns:a14="http://schemas.microsoft.com/office/drawing/2010/main" xmlns="">
                   <a:effectLst>
                     <a:outerShdw blurRad="63500" dist="38099" dir="2700000" algn="ctr" rotWithShape="0">
                       <a:schemeClr val="bg2">
@@ -19524,14 +19524,14 @@
             <a:effectLst/>
             <a:extLst>
               <a:ext uri="{909E8E84-426E-40dd-AFC4-6F175D3DCCD1}">
-                <a14:hiddenFill xmlns="" xmlns:a14="http://schemas.microsoft.com/office/drawing/2010/main">
+                <a14:hiddenFill xmlns:a14="http://schemas.microsoft.com/office/drawing/2010/main" xmlns="">
                   <a:solidFill>
                     <a:schemeClr val="accent1"/>
                   </a:solidFill>
                 </a14:hiddenFill>
               </a:ext>
               <a:ext uri="{91240B29-F687-4f45-9708-019B960494DF}">
-                <a14:hiddenLine xmlns="" xmlns:a14="http://schemas.microsoft.com/office/drawing/2010/main" w="9525">
+                <a14:hiddenLine xmlns:a14="http://schemas.microsoft.com/office/drawing/2010/main" xmlns="" w="9525">
                   <a:solidFill>
                     <a:schemeClr val="tx1"/>
                   </a:solidFill>
@@ -19541,7 +19541,7 @@
                 </a14:hiddenLine>
               </a:ext>
               <a:ext uri="{AF507438-7753-43e0-B8FC-AC1667EBCBE1}">
-                <a14:hiddenEffects xmlns="" xmlns:a14="http://schemas.microsoft.com/office/drawing/2010/main">
+                <a14:hiddenEffects xmlns:a14="http://schemas.microsoft.com/office/drawing/2010/main" xmlns="">
                   <a:effectLst>
                     <a:outerShdw blurRad="63500" dist="38099" dir="2700000" algn="ctr" rotWithShape="0">
                       <a:schemeClr val="bg2">
@@ -19619,7 +19619,7 @@
             <a:effectLst/>
             <a:extLst>
               <a:ext uri="{AF507438-7753-43e0-B8FC-AC1667EBCBE1}">
-                <a14:hiddenEffects xmlns="" xmlns:a14="http://schemas.microsoft.com/office/drawing/2010/main">
+                <a14:hiddenEffects xmlns:a14="http://schemas.microsoft.com/office/drawing/2010/main" xmlns="">
                   <a:effectLst>
                     <a:outerShdw blurRad="63500" dist="38099" dir="2700000" algn="ctr" rotWithShape="0">
                       <a:schemeClr val="bg2">
@@ -19665,14 +19665,14 @@
             <a:effectLst/>
             <a:extLst>
               <a:ext uri="{909E8E84-426E-40dd-AFC4-6F175D3DCCD1}">
-                <a14:hiddenFill xmlns="" xmlns:a14="http://schemas.microsoft.com/office/drawing/2010/main">
+                <a14:hiddenFill xmlns:a14="http://schemas.microsoft.com/office/drawing/2010/main" xmlns="">
                   <a:solidFill>
                     <a:schemeClr val="accent1"/>
                   </a:solidFill>
                 </a14:hiddenFill>
               </a:ext>
               <a:ext uri="{91240B29-F687-4f45-9708-019B960494DF}">
-                <a14:hiddenLine xmlns="" xmlns:a14="http://schemas.microsoft.com/office/drawing/2010/main" w="9525">
+                <a14:hiddenLine xmlns:a14="http://schemas.microsoft.com/office/drawing/2010/main" xmlns="" w="9525">
                   <a:solidFill>
                     <a:schemeClr val="tx1"/>
                   </a:solidFill>
@@ -19682,7 +19682,7 @@
                 </a14:hiddenLine>
               </a:ext>
               <a:ext uri="{AF507438-7753-43e0-B8FC-AC1667EBCBE1}">
-                <a14:hiddenEffects xmlns="" xmlns:a14="http://schemas.microsoft.com/office/drawing/2010/main">
+                <a14:hiddenEffects xmlns:a14="http://schemas.microsoft.com/office/drawing/2010/main" xmlns="">
                   <a:effectLst>
                     <a:outerShdw blurRad="63500" dist="38099" dir="2700000" algn="ctr" rotWithShape="0">
                       <a:schemeClr val="bg2">
@@ -19760,7 +19760,7 @@
             <a:effectLst/>
             <a:extLst>
               <a:ext uri="{AF507438-7753-43e0-B8FC-AC1667EBCBE1}">
-                <a14:hiddenEffects xmlns="" xmlns:a14="http://schemas.microsoft.com/office/drawing/2010/main">
+                <a14:hiddenEffects xmlns:a14="http://schemas.microsoft.com/office/drawing/2010/main" xmlns="">
                   <a:effectLst>
                     <a:outerShdw blurRad="63500" dist="38099" dir="2700000" algn="ctr" rotWithShape="0">
                       <a:schemeClr val="bg2">
@@ -19806,14 +19806,14 @@
             <a:effectLst/>
             <a:extLst>
               <a:ext uri="{909E8E84-426E-40dd-AFC4-6F175D3DCCD1}">
-                <a14:hiddenFill xmlns="" xmlns:a14="http://schemas.microsoft.com/office/drawing/2010/main">
+                <a14:hiddenFill xmlns:a14="http://schemas.microsoft.com/office/drawing/2010/main" xmlns="">
                   <a:solidFill>
                     <a:schemeClr val="accent1"/>
                   </a:solidFill>
                 </a14:hiddenFill>
               </a:ext>
               <a:ext uri="{91240B29-F687-4f45-9708-019B960494DF}">
-                <a14:hiddenLine xmlns="" xmlns:a14="http://schemas.microsoft.com/office/drawing/2010/main" w="9525">
+                <a14:hiddenLine xmlns:a14="http://schemas.microsoft.com/office/drawing/2010/main" xmlns="" w="9525">
                   <a:solidFill>
                     <a:schemeClr val="tx1"/>
                   </a:solidFill>
@@ -19823,7 +19823,7 @@
                 </a14:hiddenLine>
               </a:ext>
               <a:ext uri="{AF507438-7753-43e0-B8FC-AC1667EBCBE1}">
-                <a14:hiddenEffects xmlns="" xmlns:a14="http://schemas.microsoft.com/office/drawing/2010/main">
+                <a14:hiddenEffects xmlns:a14="http://schemas.microsoft.com/office/drawing/2010/main" xmlns="">
                   <a:effectLst>
                     <a:outerShdw blurRad="63500" dist="38099" dir="2700000" algn="ctr" rotWithShape="0">
                       <a:schemeClr val="bg2">
@@ -20173,7 +20173,7 @@
             <a:effectLst/>
             <a:extLst>
               <a:ext uri="{AF507438-7753-43e0-B8FC-AC1667EBCBE1}">
-                <a14:hiddenEffects xmlns="" xmlns:a14="http://schemas.microsoft.com/office/drawing/2010/main">
+                <a14:hiddenEffects xmlns:a14="http://schemas.microsoft.com/office/drawing/2010/main" xmlns="">
                   <a:effectLst>
                     <a:outerShdw blurRad="63500" dist="38099" dir="2700000" algn="ctr" rotWithShape="0">
                       <a:schemeClr val="bg2">
@@ -20225,14 +20225,14 @@
             <a:effectLst/>
             <a:extLst>
               <a:ext uri="{909E8E84-426E-40dd-AFC4-6F175D3DCCD1}">
-                <a14:hiddenFill xmlns="" xmlns:a14="http://schemas.microsoft.com/office/drawing/2010/main">
+                <a14:hiddenFill xmlns:a14="http://schemas.microsoft.com/office/drawing/2010/main" xmlns="">
                   <a:solidFill>
                     <a:schemeClr val="accent1"/>
                   </a:solidFill>
                 </a14:hiddenFill>
               </a:ext>
               <a:ext uri="{91240B29-F687-4f45-9708-019B960494DF}">
-                <a14:hiddenLine xmlns="" xmlns:a14="http://schemas.microsoft.com/office/drawing/2010/main" w="9525">
+                <a14:hiddenLine xmlns:a14="http://schemas.microsoft.com/office/drawing/2010/main" xmlns="" w="9525">
                   <a:solidFill>
                     <a:schemeClr val="tx1"/>
                   </a:solidFill>
@@ -20242,7 +20242,7 @@
                 </a14:hiddenLine>
               </a:ext>
               <a:ext uri="{AF507438-7753-43e0-B8FC-AC1667EBCBE1}">
-                <a14:hiddenEffects xmlns="" xmlns:a14="http://schemas.microsoft.com/office/drawing/2010/main">
+                <a14:hiddenEffects xmlns:a14="http://schemas.microsoft.com/office/drawing/2010/main" xmlns="">
                   <a:effectLst>
                     <a:outerShdw blurRad="63500" dist="38099" dir="2700000" algn="ctr" rotWithShape="0">
                       <a:schemeClr val="bg2">
@@ -20332,7 +20332,7 @@
             <a:effectLst/>
             <a:extLst>
               <a:ext uri="{AF507438-7753-43e0-B8FC-AC1667EBCBE1}">
-                <a14:hiddenEffects xmlns="" xmlns:a14="http://schemas.microsoft.com/office/drawing/2010/main">
+                <a14:hiddenEffects xmlns:a14="http://schemas.microsoft.com/office/drawing/2010/main" xmlns="">
                   <a:effectLst>
                     <a:outerShdw blurRad="63500" dist="38099" dir="2700000" algn="ctr" rotWithShape="0">
                       <a:schemeClr val="bg2">
@@ -20384,14 +20384,14 @@
             <a:effectLst/>
             <a:extLst>
               <a:ext uri="{909E8E84-426E-40dd-AFC4-6F175D3DCCD1}">
-                <a14:hiddenFill xmlns="" xmlns:a14="http://schemas.microsoft.com/office/drawing/2010/main">
+                <a14:hiddenFill xmlns:a14="http://schemas.microsoft.com/office/drawing/2010/main" xmlns="">
                   <a:solidFill>
                     <a:schemeClr val="accent1"/>
                   </a:solidFill>
                 </a14:hiddenFill>
               </a:ext>
               <a:ext uri="{91240B29-F687-4f45-9708-019B960494DF}">
-                <a14:hiddenLine xmlns="" xmlns:a14="http://schemas.microsoft.com/office/drawing/2010/main" w="9525">
+                <a14:hiddenLine xmlns:a14="http://schemas.microsoft.com/office/drawing/2010/main" xmlns="" w="9525">
                   <a:solidFill>
                     <a:schemeClr val="tx1"/>
                   </a:solidFill>
@@ -20401,7 +20401,7 @@
                 </a14:hiddenLine>
               </a:ext>
               <a:ext uri="{AF507438-7753-43e0-B8FC-AC1667EBCBE1}">
-                <a14:hiddenEffects xmlns="" xmlns:a14="http://schemas.microsoft.com/office/drawing/2010/main">
+                <a14:hiddenEffects xmlns:a14="http://schemas.microsoft.com/office/drawing/2010/main" xmlns="">
                   <a:effectLst>
                     <a:outerShdw blurRad="63500" dist="38099" dir="2700000" algn="ctr" rotWithShape="0">
                       <a:schemeClr val="bg2">
@@ -20491,7 +20491,7 @@
             <a:effectLst/>
             <a:extLst>
               <a:ext uri="{AF507438-7753-43e0-B8FC-AC1667EBCBE1}">
-                <a14:hiddenEffects xmlns="" xmlns:a14="http://schemas.microsoft.com/office/drawing/2010/main">
+                <a14:hiddenEffects xmlns:a14="http://schemas.microsoft.com/office/drawing/2010/main" xmlns="">
                   <a:effectLst>
                     <a:outerShdw blurRad="63500" dist="38099" dir="2700000" algn="ctr" rotWithShape="0">
                       <a:schemeClr val="bg2">
@@ -20543,14 +20543,14 @@
             <a:effectLst/>
             <a:extLst>
               <a:ext uri="{909E8E84-426E-40dd-AFC4-6F175D3DCCD1}">
-                <a14:hiddenFill xmlns="" xmlns:a14="http://schemas.microsoft.com/office/drawing/2010/main">
+                <a14:hiddenFill xmlns:a14="http://schemas.microsoft.com/office/drawing/2010/main" xmlns="">
                   <a:solidFill>
                     <a:schemeClr val="accent1"/>
                   </a:solidFill>
                 </a14:hiddenFill>
               </a:ext>
               <a:ext uri="{91240B29-F687-4f45-9708-019B960494DF}">
-                <a14:hiddenLine xmlns="" xmlns:a14="http://schemas.microsoft.com/office/drawing/2010/main" w="9525">
+                <a14:hiddenLine xmlns:a14="http://schemas.microsoft.com/office/drawing/2010/main" xmlns="" w="9525">
                   <a:solidFill>
                     <a:schemeClr val="tx1"/>
                   </a:solidFill>
@@ -20560,7 +20560,7 @@
                 </a14:hiddenLine>
               </a:ext>
               <a:ext uri="{AF507438-7753-43e0-B8FC-AC1667EBCBE1}">
-                <a14:hiddenEffects xmlns="" xmlns:a14="http://schemas.microsoft.com/office/drawing/2010/main">
+                <a14:hiddenEffects xmlns:a14="http://schemas.microsoft.com/office/drawing/2010/main" xmlns="">
                   <a:effectLst>
                     <a:outerShdw blurRad="63500" dist="38099" dir="2700000" algn="ctr" rotWithShape="0">
                       <a:schemeClr val="bg2">
@@ -20789,7 +20789,7 @@
             <a:effectLst/>
             <a:extLst>
               <a:ext uri="{AF507438-7753-43e0-B8FC-AC1667EBCBE1}">
-                <a14:hiddenEffects xmlns="" xmlns:a14="http://schemas.microsoft.com/office/drawing/2010/main">
+                <a14:hiddenEffects xmlns:a14="http://schemas.microsoft.com/office/drawing/2010/main" xmlns="">
                   <a:effectLst>
                     <a:outerShdw blurRad="63500" dist="38099" dir="2700000" algn="ctr" rotWithShape="0">
                       <a:schemeClr val="bg2">
@@ -20841,14 +20841,14 @@
             <a:effectLst/>
             <a:extLst>
               <a:ext uri="{909E8E84-426E-40dd-AFC4-6F175D3DCCD1}">
-                <a14:hiddenFill xmlns="" xmlns:a14="http://schemas.microsoft.com/office/drawing/2010/main">
+                <a14:hiddenFill xmlns:a14="http://schemas.microsoft.com/office/drawing/2010/main" xmlns="">
                   <a:solidFill>
                     <a:schemeClr val="accent1"/>
                   </a:solidFill>
                 </a14:hiddenFill>
               </a:ext>
               <a:ext uri="{91240B29-F687-4f45-9708-019B960494DF}">
-                <a14:hiddenLine xmlns="" xmlns:a14="http://schemas.microsoft.com/office/drawing/2010/main" w="9525">
+                <a14:hiddenLine xmlns:a14="http://schemas.microsoft.com/office/drawing/2010/main" xmlns="" w="9525">
                   <a:solidFill>
                     <a:schemeClr val="tx1"/>
                   </a:solidFill>
@@ -20858,7 +20858,7 @@
                 </a14:hiddenLine>
               </a:ext>
               <a:ext uri="{AF507438-7753-43e0-B8FC-AC1667EBCBE1}">
-                <a14:hiddenEffects xmlns="" xmlns:a14="http://schemas.microsoft.com/office/drawing/2010/main">
+                <a14:hiddenEffects xmlns:a14="http://schemas.microsoft.com/office/drawing/2010/main" xmlns="">
                   <a:effectLst>
                     <a:outerShdw blurRad="63500" dist="38099" dir="2700000" algn="ctr" rotWithShape="0">
                       <a:schemeClr val="bg2">
@@ -20948,7 +20948,7 @@
             <a:effectLst/>
             <a:extLst>
               <a:ext uri="{AF507438-7753-43e0-B8FC-AC1667EBCBE1}">
-                <a14:hiddenEffects xmlns="" xmlns:a14="http://schemas.microsoft.com/office/drawing/2010/main">
+                <a14:hiddenEffects xmlns:a14="http://schemas.microsoft.com/office/drawing/2010/main" xmlns="">
                   <a:effectLst>
                     <a:outerShdw blurRad="63500" dist="38099" dir="2700000" algn="ctr" rotWithShape="0">
                       <a:schemeClr val="bg2">
@@ -21000,14 +21000,14 @@
             <a:effectLst/>
             <a:extLst>
               <a:ext uri="{909E8E84-426E-40dd-AFC4-6F175D3DCCD1}">
-                <a14:hiddenFill xmlns="" xmlns:a14="http://schemas.microsoft.com/office/drawing/2010/main">
+                <a14:hiddenFill xmlns:a14="http://schemas.microsoft.com/office/drawing/2010/main" xmlns="">
                   <a:solidFill>
                     <a:schemeClr val="accent1"/>
                   </a:solidFill>
                 </a14:hiddenFill>
               </a:ext>
               <a:ext uri="{91240B29-F687-4f45-9708-019B960494DF}">
-                <a14:hiddenLine xmlns="" xmlns:a14="http://schemas.microsoft.com/office/drawing/2010/main" w="9525">
+                <a14:hiddenLine xmlns:a14="http://schemas.microsoft.com/office/drawing/2010/main" xmlns="" w="9525">
                   <a:solidFill>
                     <a:schemeClr val="tx1"/>
                   </a:solidFill>
@@ -21017,7 +21017,7 @@
                 </a14:hiddenLine>
               </a:ext>
               <a:ext uri="{AF507438-7753-43e0-B8FC-AC1667EBCBE1}">
-                <a14:hiddenEffects xmlns="" xmlns:a14="http://schemas.microsoft.com/office/drawing/2010/main">
+                <a14:hiddenEffects xmlns:a14="http://schemas.microsoft.com/office/drawing/2010/main" xmlns="">
                   <a:effectLst>
                     <a:outerShdw blurRad="63500" dist="38099" dir="2700000" algn="ctr" rotWithShape="0">
                       <a:schemeClr val="bg2">
@@ -21107,7 +21107,7 @@
             <a:effectLst/>
             <a:extLst>
               <a:ext uri="{AF507438-7753-43e0-B8FC-AC1667EBCBE1}">
-                <a14:hiddenEffects xmlns="" xmlns:a14="http://schemas.microsoft.com/office/drawing/2010/main">
+                <a14:hiddenEffects xmlns:a14="http://schemas.microsoft.com/office/drawing/2010/main" xmlns="">
                   <a:effectLst>
                     <a:outerShdw blurRad="63500" dist="38099" dir="2700000" algn="ctr" rotWithShape="0">
                       <a:schemeClr val="bg2">
@@ -21159,14 +21159,14 @@
             <a:effectLst/>
             <a:extLst>
               <a:ext uri="{909E8E84-426E-40dd-AFC4-6F175D3DCCD1}">
-                <a14:hiddenFill xmlns="" xmlns:a14="http://schemas.microsoft.com/office/drawing/2010/main">
+                <a14:hiddenFill xmlns:a14="http://schemas.microsoft.com/office/drawing/2010/main" xmlns="">
                   <a:solidFill>
                     <a:schemeClr val="accent1"/>
                   </a:solidFill>
                 </a14:hiddenFill>
               </a:ext>
               <a:ext uri="{91240B29-F687-4f45-9708-019B960494DF}">
-                <a14:hiddenLine xmlns="" xmlns:a14="http://schemas.microsoft.com/office/drawing/2010/main" w="9525">
+                <a14:hiddenLine xmlns:a14="http://schemas.microsoft.com/office/drawing/2010/main" xmlns="" w="9525">
                   <a:solidFill>
                     <a:schemeClr val="tx1"/>
                   </a:solidFill>
@@ -21176,7 +21176,7 @@
                 </a14:hiddenLine>
               </a:ext>
               <a:ext uri="{AF507438-7753-43e0-B8FC-AC1667EBCBE1}">
-                <a14:hiddenEffects xmlns="" xmlns:a14="http://schemas.microsoft.com/office/drawing/2010/main">
+                <a14:hiddenEffects xmlns:a14="http://schemas.microsoft.com/office/drawing/2010/main" xmlns="">
                   <a:effectLst>
                     <a:outerShdw blurRad="63500" dist="38099" dir="2700000" algn="ctr" rotWithShape="0">
                       <a:schemeClr val="bg2">
@@ -21451,7 +21451,7 @@
             <a:effectLst/>
             <a:extLst>
               <a:ext uri="{AF507438-7753-43e0-B8FC-AC1667EBCBE1}">
-                <a14:hiddenEffects xmlns="" xmlns:a14="http://schemas.microsoft.com/office/drawing/2010/main">
+                <a14:hiddenEffects xmlns:a14="http://schemas.microsoft.com/office/drawing/2010/main" xmlns="">
                   <a:effectLst>
                     <a:outerShdw blurRad="63500" dist="38099" dir="2700000" algn="ctr" rotWithShape="0">
                       <a:schemeClr val="bg2">
@@ -21503,14 +21503,14 @@
             <a:effectLst/>
             <a:extLst>
               <a:ext uri="{909E8E84-426E-40dd-AFC4-6F175D3DCCD1}">
-                <a14:hiddenFill xmlns="" xmlns:a14="http://schemas.microsoft.com/office/drawing/2010/main">
+                <a14:hiddenFill xmlns:a14="http://schemas.microsoft.com/office/drawing/2010/main" xmlns="">
                   <a:solidFill>
                     <a:schemeClr val="accent1"/>
                   </a:solidFill>
                 </a14:hiddenFill>
               </a:ext>
               <a:ext uri="{91240B29-F687-4f45-9708-019B960494DF}">
-                <a14:hiddenLine xmlns="" xmlns:a14="http://schemas.microsoft.com/office/drawing/2010/main" w="9525">
+                <a14:hiddenLine xmlns:a14="http://schemas.microsoft.com/office/drawing/2010/main" xmlns="" w="9525">
                   <a:solidFill>
                     <a:schemeClr val="tx1"/>
                   </a:solidFill>
@@ -21520,7 +21520,7 @@
                 </a14:hiddenLine>
               </a:ext>
               <a:ext uri="{AF507438-7753-43e0-B8FC-AC1667EBCBE1}">
-                <a14:hiddenEffects xmlns="" xmlns:a14="http://schemas.microsoft.com/office/drawing/2010/main">
+                <a14:hiddenEffects xmlns:a14="http://schemas.microsoft.com/office/drawing/2010/main" xmlns="">
                   <a:effectLst>
                     <a:outerShdw blurRad="63500" dist="38099" dir="2700000" algn="ctr" rotWithShape="0">
                       <a:schemeClr val="bg2">
@@ -21610,7 +21610,7 @@
             <a:effectLst/>
             <a:extLst>
               <a:ext uri="{AF507438-7753-43e0-B8FC-AC1667EBCBE1}">
-                <a14:hiddenEffects xmlns="" xmlns:a14="http://schemas.microsoft.com/office/drawing/2010/main">
+                <a14:hiddenEffects xmlns:a14="http://schemas.microsoft.com/office/drawing/2010/main" xmlns="">
                   <a:effectLst>
                     <a:outerShdw blurRad="63500" dist="38099" dir="2700000" algn="ctr" rotWithShape="0">
                       <a:schemeClr val="bg2">
@@ -21662,14 +21662,14 @@
             <a:effectLst/>
             <a:extLst>
               <a:ext uri="{909E8E84-426E-40dd-AFC4-6F175D3DCCD1}">
-                <a14:hiddenFill xmlns="" xmlns:a14="http://schemas.microsoft.com/office/drawing/2010/main">
+                <a14:hiddenFill xmlns:a14="http://schemas.microsoft.com/office/drawing/2010/main" xmlns="">
                   <a:solidFill>
                     <a:schemeClr val="accent1"/>
                   </a:solidFill>
                 </a14:hiddenFill>
               </a:ext>
               <a:ext uri="{91240B29-F687-4f45-9708-019B960494DF}">
-                <a14:hiddenLine xmlns="" xmlns:a14="http://schemas.microsoft.com/office/drawing/2010/main" w="9525">
+                <a14:hiddenLine xmlns:a14="http://schemas.microsoft.com/office/drawing/2010/main" xmlns="" w="9525">
                   <a:solidFill>
                     <a:schemeClr val="tx1"/>
                   </a:solidFill>
@@ -21679,7 +21679,7 @@
                 </a14:hiddenLine>
               </a:ext>
               <a:ext uri="{AF507438-7753-43e0-B8FC-AC1667EBCBE1}">
-                <a14:hiddenEffects xmlns="" xmlns:a14="http://schemas.microsoft.com/office/drawing/2010/main">
+                <a14:hiddenEffects xmlns:a14="http://schemas.microsoft.com/office/drawing/2010/main" xmlns="">
                   <a:effectLst>
                     <a:outerShdw blurRad="63500" dist="38099" dir="2700000" algn="ctr" rotWithShape="0">
                       <a:schemeClr val="bg2">
@@ -21769,7 +21769,7 @@
             <a:effectLst/>
             <a:extLst>
               <a:ext uri="{AF507438-7753-43e0-B8FC-AC1667EBCBE1}">
-                <a14:hiddenEffects xmlns="" xmlns:a14="http://schemas.microsoft.com/office/drawing/2010/main">
+                <a14:hiddenEffects xmlns:a14="http://schemas.microsoft.com/office/drawing/2010/main" xmlns="">
                   <a:effectLst>
                     <a:outerShdw blurRad="63500" dist="38099" dir="2700000" algn="ctr" rotWithShape="0">
                       <a:schemeClr val="bg2">
@@ -21821,14 +21821,14 @@
             <a:effectLst/>
             <a:extLst>
               <a:ext uri="{909E8E84-426E-40dd-AFC4-6F175D3DCCD1}">
-                <a14:hiddenFill xmlns="" xmlns:a14="http://schemas.microsoft.com/office/drawing/2010/main">
+                <a14:hiddenFill xmlns:a14="http://schemas.microsoft.com/office/drawing/2010/main" xmlns="">
                   <a:solidFill>
                     <a:schemeClr val="accent1"/>
                   </a:solidFill>
                 </a14:hiddenFill>
               </a:ext>
               <a:ext uri="{91240B29-F687-4f45-9708-019B960494DF}">
-                <a14:hiddenLine xmlns="" xmlns:a14="http://schemas.microsoft.com/office/drawing/2010/main" w="9525">
+                <a14:hiddenLine xmlns:a14="http://schemas.microsoft.com/office/drawing/2010/main" xmlns="" w="9525">
                   <a:solidFill>
                     <a:schemeClr val="tx1"/>
                   </a:solidFill>
@@ -21838,7 +21838,7 @@
                 </a14:hiddenLine>
               </a:ext>
               <a:ext uri="{AF507438-7753-43e0-B8FC-AC1667EBCBE1}">
-                <a14:hiddenEffects xmlns="" xmlns:a14="http://schemas.microsoft.com/office/drawing/2010/main">
+                <a14:hiddenEffects xmlns:a14="http://schemas.microsoft.com/office/drawing/2010/main" xmlns="">
                   <a:effectLst>
                     <a:outerShdw blurRad="63500" dist="38099" dir="2700000" algn="ctr" rotWithShape="0">
                       <a:schemeClr val="bg2">
@@ -22850,7 +22850,7 @@
             <a:effectLst/>
             <a:extLst>
               <a:ext uri="{AF507438-7753-43e0-B8FC-AC1667EBCBE1}">
-                <a14:hiddenEffects xmlns="" xmlns:a14="http://schemas.microsoft.com/office/drawing/2010/main">
+                <a14:hiddenEffects xmlns:a14="http://schemas.microsoft.com/office/drawing/2010/main" xmlns="">
                   <a:effectLst>
                     <a:outerShdw blurRad="63500" dist="38099" dir="2700000" algn="ctr" rotWithShape="0">
                       <a:schemeClr val="bg2">
@@ -22902,14 +22902,14 @@
             <a:effectLst/>
             <a:extLst>
               <a:ext uri="{909E8E84-426E-40dd-AFC4-6F175D3DCCD1}">
-                <a14:hiddenFill xmlns="" xmlns:a14="http://schemas.microsoft.com/office/drawing/2010/main">
+                <a14:hiddenFill xmlns:a14="http://schemas.microsoft.com/office/drawing/2010/main" xmlns="">
                   <a:solidFill>
                     <a:schemeClr val="accent1"/>
                   </a:solidFill>
                 </a14:hiddenFill>
               </a:ext>
               <a:ext uri="{91240B29-F687-4f45-9708-019B960494DF}">
-                <a14:hiddenLine xmlns="" xmlns:a14="http://schemas.microsoft.com/office/drawing/2010/main" w="9525">
+                <a14:hiddenLine xmlns:a14="http://schemas.microsoft.com/office/drawing/2010/main" xmlns="" w="9525">
                   <a:solidFill>
                     <a:schemeClr val="tx1"/>
                   </a:solidFill>
@@ -22919,7 +22919,7 @@
                 </a14:hiddenLine>
               </a:ext>
               <a:ext uri="{AF507438-7753-43e0-B8FC-AC1667EBCBE1}">
-                <a14:hiddenEffects xmlns="" xmlns:a14="http://schemas.microsoft.com/office/drawing/2010/main">
+                <a14:hiddenEffects xmlns:a14="http://schemas.microsoft.com/office/drawing/2010/main" xmlns="">
                   <a:effectLst>
                     <a:outerShdw blurRad="63500" dist="38099" dir="2700000" algn="ctr" rotWithShape="0">
                       <a:schemeClr val="bg2">
@@ -23009,7 +23009,7 @@
             <a:effectLst/>
             <a:extLst>
               <a:ext uri="{AF507438-7753-43e0-B8FC-AC1667EBCBE1}">
-                <a14:hiddenEffects xmlns="" xmlns:a14="http://schemas.microsoft.com/office/drawing/2010/main">
+                <a14:hiddenEffects xmlns:a14="http://schemas.microsoft.com/office/drawing/2010/main" xmlns="">
                   <a:effectLst>
                     <a:outerShdw blurRad="63500" dist="38099" dir="2700000" algn="ctr" rotWithShape="0">
                       <a:schemeClr val="bg2">
@@ -23061,14 +23061,14 @@
             <a:effectLst/>
             <a:extLst>
               <a:ext uri="{909E8E84-426E-40dd-AFC4-6F175D3DCCD1}">
-                <a14:hiddenFill xmlns="" xmlns:a14="http://schemas.microsoft.com/office/drawing/2010/main">
+                <a14:hiddenFill xmlns:a14="http://schemas.microsoft.com/office/drawing/2010/main" xmlns="">
                   <a:solidFill>
                     <a:schemeClr val="accent1"/>
                   </a:solidFill>
                 </a14:hiddenFill>
               </a:ext>
               <a:ext uri="{91240B29-F687-4f45-9708-019B960494DF}">
-                <a14:hiddenLine xmlns="" xmlns:a14="http://schemas.microsoft.com/office/drawing/2010/main" w="9525">
+                <a14:hiddenLine xmlns:a14="http://schemas.microsoft.com/office/drawing/2010/main" xmlns="" w="9525">
                   <a:solidFill>
                     <a:schemeClr val="tx1"/>
                   </a:solidFill>
@@ -23078,7 +23078,7 @@
                 </a14:hiddenLine>
               </a:ext>
               <a:ext uri="{AF507438-7753-43e0-B8FC-AC1667EBCBE1}">
-                <a14:hiddenEffects xmlns="" xmlns:a14="http://schemas.microsoft.com/office/drawing/2010/main">
+                <a14:hiddenEffects xmlns:a14="http://schemas.microsoft.com/office/drawing/2010/main" xmlns="">
                   <a:effectLst>
                     <a:outerShdw blurRad="63500" dist="38099" dir="2700000" algn="ctr" rotWithShape="0">
                       <a:schemeClr val="bg2">
@@ -23168,7 +23168,7 @@
             <a:effectLst/>
             <a:extLst>
               <a:ext uri="{AF507438-7753-43e0-B8FC-AC1667EBCBE1}">
-                <a14:hiddenEffects xmlns="" xmlns:a14="http://schemas.microsoft.com/office/drawing/2010/main">
+                <a14:hiddenEffects xmlns:a14="http://schemas.microsoft.com/office/drawing/2010/main" xmlns="">
                   <a:effectLst>
                     <a:outerShdw blurRad="63500" dist="38099" dir="2700000" algn="ctr" rotWithShape="0">
                       <a:schemeClr val="bg2">
@@ -23220,14 +23220,14 @@
             <a:effectLst/>
             <a:extLst>
               <a:ext uri="{909E8E84-426E-40dd-AFC4-6F175D3DCCD1}">
-                <a14:hiddenFill xmlns="" xmlns:a14="http://schemas.microsoft.com/office/drawing/2010/main">
+                <a14:hiddenFill xmlns:a14="http://schemas.microsoft.com/office/drawing/2010/main" xmlns="">
                   <a:solidFill>
                     <a:schemeClr val="accent1"/>
                   </a:solidFill>
                 </a14:hiddenFill>
               </a:ext>
               <a:ext uri="{91240B29-F687-4f45-9708-019B960494DF}">
-                <a14:hiddenLine xmlns="" xmlns:a14="http://schemas.microsoft.com/office/drawing/2010/main" w="9525">
+                <a14:hiddenLine xmlns:a14="http://schemas.microsoft.com/office/drawing/2010/main" xmlns="" w="9525">
                   <a:solidFill>
                     <a:schemeClr val="tx1"/>
                   </a:solidFill>
@@ -23237,7 +23237,7 @@
                 </a14:hiddenLine>
               </a:ext>
               <a:ext uri="{AF507438-7753-43e0-B8FC-AC1667EBCBE1}">
-                <a14:hiddenEffects xmlns="" xmlns:a14="http://schemas.microsoft.com/office/drawing/2010/main">
+                <a14:hiddenEffects xmlns:a14="http://schemas.microsoft.com/office/drawing/2010/main" xmlns="">
                   <a:effectLst>
                     <a:outerShdw blurRad="63500" dist="38099" dir="2700000" algn="ctr" rotWithShape="0">
                       <a:schemeClr val="bg2">
@@ -23466,7 +23466,7 @@
             <a:effectLst/>
             <a:extLst>
               <a:ext uri="{AF507438-7753-43e0-B8FC-AC1667EBCBE1}">
-                <a14:hiddenEffects xmlns="" xmlns:a14="http://schemas.microsoft.com/office/drawing/2010/main">
+                <a14:hiddenEffects xmlns:a14="http://schemas.microsoft.com/office/drawing/2010/main" xmlns="">
                   <a:effectLst>
                     <a:outerShdw blurRad="63500" dist="38099" dir="2700000" algn="ctr" rotWithShape="0">
                       <a:schemeClr val="bg2">
@@ -23518,14 +23518,14 @@
             <a:effectLst/>
             <a:extLst>
               <a:ext uri="{909E8E84-426E-40dd-AFC4-6F175D3DCCD1}">
-                <a14:hiddenFill xmlns="" xmlns:a14="http://schemas.microsoft.com/office/drawing/2010/main">
+                <a14:hiddenFill xmlns:a14="http://schemas.microsoft.com/office/drawing/2010/main" xmlns="">
                   <a:solidFill>
                     <a:schemeClr val="accent1"/>
                   </a:solidFill>
                 </a14:hiddenFill>
               </a:ext>
               <a:ext uri="{91240B29-F687-4f45-9708-019B960494DF}">
-                <a14:hiddenLine xmlns="" xmlns:a14="http://schemas.microsoft.com/office/drawing/2010/main" w="9525">
+                <a14:hiddenLine xmlns:a14="http://schemas.microsoft.com/office/drawing/2010/main" xmlns="" w="9525">
                   <a:solidFill>
                     <a:schemeClr val="tx1"/>
                   </a:solidFill>
@@ -23535,7 +23535,7 @@
                 </a14:hiddenLine>
               </a:ext>
               <a:ext uri="{AF507438-7753-43e0-B8FC-AC1667EBCBE1}">
-                <a14:hiddenEffects xmlns="" xmlns:a14="http://schemas.microsoft.com/office/drawing/2010/main">
+                <a14:hiddenEffects xmlns:a14="http://schemas.microsoft.com/office/drawing/2010/main" xmlns="">
                   <a:effectLst>
                     <a:outerShdw blurRad="63500" dist="38099" dir="2700000" algn="ctr" rotWithShape="0">
                       <a:schemeClr val="bg2">
@@ -23625,7 +23625,7 @@
             <a:effectLst/>
             <a:extLst>
               <a:ext uri="{AF507438-7753-43e0-B8FC-AC1667EBCBE1}">
-                <a14:hiddenEffects xmlns="" xmlns:a14="http://schemas.microsoft.com/office/drawing/2010/main">
+                <a14:hiddenEffects xmlns:a14="http://schemas.microsoft.com/office/drawing/2010/main" xmlns="">
                   <a:effectLst>
                     <a:outerShdw blurRad="63500" dist="38099" dir="2700000" algn="ctr" rotWithShape="0">
                       <a:schemeClr val="bg2">
@@ -23677,14 +23677,14 @@
             <a:effectLst/>
             <a:extLst>
               <a:ext uri="{909E8E84-426E-40dd-AFC4-6F175D3DCCD1}">
-                <a14:hiddenFill xmlns="" xmlns:a14="http://schemas.microsoft.com/office/drawing/2010/main">
+                <a14:hiddenFill xmlns:a14="http://schemas.microsoft.com/office/drawing/2010/main" xmlns="">
                   <a:solidFill>
                     <a:schemeClr val="accent1"/>
                   </a:solidFill>
                 </a14:hiddenFill>
               </a:ext>
               <a:ext uri="{91240B29-F687-4f45-9708-019B960494DF}">
-                <a14:hiddenLine xmlns="" xmlns:a14="http://schemas.microsoft.com/office/drawing/2010/main" w="9525">
+                <a14:hiddenLine xmlns:a14="http://schemas.microsoft.com/office/drawing/2010/main" xmlns="" w="9525">
                   <a:solidFill>
                     <a:schemeClr val="tx1"/>
                   </a:solidFill>
@@ -23694,7 +23694,7 @@
                 </a14:hiddenLine>
               </a:ext>
               <a:ext uri="{AF507438-7753-43e0-B8FC-AC1667EBCBE1}">
-                <a14:hiddenEffects xmlns="" xmlns:a14="http://schemas.microsoft.com/office/drawing/2010/main">
+                <a14:hiddenEffects xmlns:a14="http://schemas.microsoft.com/office/drawing/2010/main" xmlns="">
                   <a:effectLst>
                     <a:outerShdw blurRad="63500" dist="38099" dir="2700000" algn="ctr" rotWithShape="0">
                       <a:schemeClr val="bg2">
@@ -23784,7 +23784,7 @@
             <a:effectLst/>
             <a:extLst>
               <a:ext uri="{AF507438-7753-43e0-B8FC-AC1667EBCBE1}">
-                <a14:hiddenEffects xmlns="" xmlns:a14="http://schemas.microsoft.com/office/drawing/2010/main">
+                <a14:hiddenEffects xmlns:a14="http://schemas.microsoft.com/office/drawing/2010/main" xmlns="">
                   <a:effectLst>
                     <a:outerShdw blurRad="63500" dist="38099" dir="2700000" algn="ctr" rotWithShape="0">
                       <a:schemeClr val="bg2">
@@ -23836,14 +23836,14 @@
             <a:effectLst/>
             <a:extLst>
               <a:ext uri="{909E8E84-426E-40dd-AFC4-6F175D3DCCD1}">
-                <a14:hiddenFill xmlns="" xmlns:a14="http://schemas.microsoft.com/office/drawing/2010/main">
+                <a14:hiddenFill xmlns:a14="http://schemas.microsoft.com/office/drawing/2010/main" xmlns="">
                   <a:solidFill>
                     <a:schemeClr val="accent1"/>
                   </a:solidFill>
                 </a14:hiddenFill>
               </a:ext>
               <a:ext uri="{91240B29-F687-4f45-9708-019B960494DF}">
-                <a14:hiddenLine xmlns="" xmlns:a14="http://schemas.microsoft.com/office/drawing/2010/main" w="9525">
+                <a14:hiddenLine xmlns:a14="http://schemas.microsoft.com/office/drawing/2010/main" xmlns="" w="9525">
                   <a:solidFill>
                     <a:schemeClr val="tx1"/>
                   </a:solidFill>
@@ -23853,7 +23853,7 @@
                 </a14:hiddenLine>
               </a:ext>
               <a:ext uri="{AF507438-7753-43e0-B8FC-AC1667EBCBE1}">
-                <a14:hiddenEffects xmlns="" xmlns:a14="http://schemas.microsoft.com/office/drawing/2010/main">
+                <a14:hiddenEffects xmlns:a14="http://schemas.microsoft.com/office/drawing/2010/main" xmlns="">
                   <a:effectLst>
                     <a:outerShdw blurRad="63500" dist="38099" dir="2700000" algn="ctr" rotWithShape="0">
                       <a:schemeClr val="bg2">
@@ -24128,7 +24128,7 @@
             <a:effectLst/>
             <a:extLst>
               <a:ext uri="{AF507438-7753-43e0-B8FC-AC1667EBCBE1}">
-                <a14:hiddenEffects xmlns="" xmlns:a14="http://schemas.microsoft.com/office/drawing/2010/main">
+                <a14:hiddenEffects xmlns:a14="http://schemas.microsoft.com/office/drawing/2010/main" xmlns="">
                   <a:effectLst>
                     <a:outerShdw blurRad="63500" dist="38099" dir="2700000" algn="ctr" rotWithShape="0">
                       <a:schemeClr val="bg2">
@@ -24180,14 +24180,14 @@
             <a:effectLst/>
             <a:extLst>
               <a:ext uri="{909E8E84-426E-40dd-AFC4-6F175D3DCCD1}">
-                <a14:hiddenFill xmlns="" xmlns:a14="http://schemas.microsoft.com/office/drawing/2010/main">
+                <a14:hiddenFill xmlns:a14="http://schemas.microsoft.com/office/drawing/2010/main" xmlns="">
                   <a:solidFill>
                     <a:schemeClr val="accent1"/>
                   </a:solidFill>
                 </a14:hiddenFill>
               </a:ext>
               <a:ext uri="{91240B29-F687-4f45-9708-019B960494DF}">
-                <a14:hiddenLine xmlns="" xmlns:a14="http://schemas.microsoft.com/office/drawing/2010/main" w="9525">
+                <a14:hiddenLine xmlns:a14="http://schemas.microsoft.com/office/drawing/2010/main" xmlns="" w="9525">
                   <a:solidFill>
                     <a:schemeClr val="tx1"/>
                   </a:solidFill>
@@ -24197,7 +24197,7 @@
                 </a14:hiddenLine>
               </a:ext>
               <a:ext uri="{AF507438-7753-43e0-B8FC-AC1667EBCBE1}">
-                <a14:hiddenEffects xmlns="" xmlns:a14="http://schemas.microsoft.com/office/drawing/2010/main">
+                <a14:hiddenEffects xmlns:a14="http://schemas.microsoft.com/office/drawing/2010/main" xmlns="">
                   <a:effectLst>
                     <a:outerShdw blurRad="63500" dist="38099" dir="2700000" algn="ctr" rotWithShape="0">
                       <a:schemeClr val="bg2">
@@ -24287,7 +24287,7 @@
             <a:effectLst/>
             <a:extLst>
               <a:ext uri="{AF507438-7753-43e0-B8FC-AC1667EBCBE1}">
-                <a14:hiddenEffects xmlns="" xmlns:a14="http://schemas.microsoft.com/office/drawing/2010/main">
+                <a14:hiddenEffects xmlns:a14="http://schemas.microsoft.com/office/drawing/2010/main" xmlns="">
                   <a:effectLst>
                     <a:outerShdw blurRad="63500" dist="38099" dir="2700000" algn="ctr" rotWithShape="0">
                       <a:schemeClr val="bg2">
@@ -24339,14 +24339,14 @@
             <a:effectLst/>
             <a:extLst>
               <a:ext uri="{909E8E84-426E-40dd-AFC4-6F175D3DCCD1}">
-                <a14:hiddenFill xmlns="" xmlns:a14="http://schemas.microsoft.com/office/drawing/2010/main">
+                <a14:hiddenFill xmlns:a14="http://schemas.microsoft.com/office/drawing/2010/main" xmlns="">
                   <a:solidFill>
                     <a:schemeClr val="accent1"/>
                   </a:solidFill>
                 </a14:hiddenFill>
               </a:ext>
               <a:ext uri="{91240B29-F687-4f45-9708-019B960494DF}">
-                <a14:hiddenLine xmlns="" xmlns:a14="http://schemas.microsoft.com/office/drawing/2010/main" w="9525">
+                <a14:hiddenLine xmlns:a14="http://schemas.microsoft.com/office/drawing/2010/main" xmlns="" w="9525">
                   <a:solidFill>
                     <a:schemeClr val="tx1"/>
                   </a:solidFill>
@@ -24356,7 +24356,7 @@
                 </a14:hiddenLine>
               </a:ext>
               <a:ext uri="{AF507438-7753-43e0-B8FC-AC1667EBCBE1}">
-                <a14:hiddenEffects xmlns="" xmlns:a14="http://schemas.microsoft.com/office/drawing/2010/main">
+                <a14:hiddenEffects xmlns:a14="http://schemas.microsoft.com/office/drawing/2010/main" xmlns="">
                   <a:effectLst>
                     <a:outerShdw blurRad="63500" dist="38099" dir="2700000" algn="ctr" rotWithShape="0">
                       <a:schemeClr val="bg2">
@@ -24446,7 +24446,7 @@
             <a:effectLst/>
             <a:extLst>
               <a:ext uri="{AF507438-7753-43e0-B8FC-AC1667EBCBE1}">
-                <a14:hiddenEffects xmlns="" xmlns:a14="http://schemas.microsoft.com/office/drawing/2010/main">
+                <a14:hiddenEffects xmlns:a14="http://schemas.microsoft.com/office/drawing/2010/main" xmlns="">
                   <a:effectLst>
                     <a:outerShdw blurRad="63500" dist="38099" dir="2700000" algn="ctr" rotWithShape="0">
                       <a:schemeClr val="bg2">
@@ -24498,14 +24498,14 @@
             <a:effectLst/>
             <a:extLst>
               <a:ext uri="{909E8E84-426E-40dd-AFC4-6F175D3DCCD1}">
-                <a14:hiddenFill xmlns="" xmlns:a14="http://schemas.microsoft.com/office/drawing/2010/main">
+                <a14:hiddenFill xmlns:a14="http://schemas.microsoft.com/office/drawing/2010/main" xmlns="">
                   <a:solidFill>
                     <a:schemeClr val="accent1"/>
                   </a:solidFill>
                 </a14:hiddenFill>
               </a:ext>
               <a:ext uri="{91240B29-F687-4f45-9708-019B960494DF}">
-                <a14:hiddenLine xmlns="" xmlns:a14="http://schemas.microsoft.com/office/drawing/2010/main" w="9525">
+                <a14:hiddenLine xmlns:a14="http://schemas.microsoft.com/office/drawing/2010/main" xmlns="" w="9525">
                   <a:solidFill>
                     <a:schemeClr val="tx1"/>
                   </a:solidFill>
@@ -24515,7 +24515,7 @@
                 </a14:hiddenLine>
               </a:ext>
               <a:ext uri="{AF507438-7753-43e0-B8FC-AC1667EBCBE1}">
-                <a14:hiddenEffects xmlns="" xmlns:a14="http://schemas.microsoft.com/office/drawing/2010/main">
+                <a14:hiddenEffects xmlns:a14="http://schemas.microsoft.com/office/drawing/2010/main" xmlns="">
                   <a:effectLst>
                     <a:outerShdw blurRad="63500" dist="38099" dir="2700000" algn="ctr" rotWithShape="0">
                       <a:schemeClr val="bg2">
@@ -25143,7 +25143,7 @@
             <a:effectLst/>
             <a:extLst>
               <a:ext uri="{AF507438-7753-43e0-B8FC-AC1667EBCBE1}">
-                <a14:hiddenEffects xmlns="" xmlns:a14="http://schemas.microsoft.com/office/drawing/2010/main">
+                <a14:hiddenEffects xmlns:a14="http://schemas.microsoft.com/office/drawing/2010/main" xmlns="">
                   <a:effectLst>
                     <a:outerShdw blurRad="63500" dist="38099" dir="2700000" algn="ctr" rotWithShape="0">
                       <a:schemeClr val="bg2">
@@ -25195,14 +25195,14 @@
             <a:effectLst/>
             <a:extLst>
               <a:ext uri="{909E8E84-426E-40dd-AFC4-6F175D3DCCD1}">
-                <a14:hiddenFill xmlns="" xmlns:a14="http://schemas.microsoft.com/office/drawing/2010/main">
+                <a14:hiddenFill xmlns:a14="http://schemas.microsoft.com/office/drawing/2010/main" xmlns="">
                   <a:solidFill>
                     <a:schemeClr val="accent1"/>
                   </a:solidFill>
                 </a14:hiddenFill>
               </a:ext>
               <a:ext uri="{91240B29-F687-4f45-9708-019B960494DF}">
-                <a14:hiddenLine xmlns="" xmlns:a14="http://schemas.microsoft.com/office/drawing/2010/main" w="9525">
+                <a14:hiddenLine xmlns:a14="http://schemas.microsoft.com/office/drawing/2010/main" xmlns="" w="9525">
                   <a:solidFill>
                     <a:schemeClr val="tx1"/>
                   </a:solidFill>
@@ -25212,7 +25212,7 @@
                 </a14:hiddenLine>
               </a:ext>
               <a:ext uri="{AF507438-7753-43e0-B8FC-AC1667EBCBE1}">
-                <a14:hiddenEffects xmlns="" xmlns:a14="http://schemas.microsoft.com/office/drawing/2010/main">
+                <a14:hiddenEffects xmlns:a14="http://schemas.microsoft.com/office/drawing/2010/main" xmlns="">
                   <a:effectLst>
                     <a:outerShdw blurRad="63500" dist="38099" dir="2700000" algn="ctr" rotWithShape="0">
                       <a:schemeClr val="bg2">
@@ -25302,7 +25302,7 @@
             <a:effectLst/>
             <a:extLst>
               <a:ext uri="{AF507438-7753-43e0-B8FC-AC1667EBCBE1}">
-                <a14:hiddenEffects xmlns="" xmlns:a14="http://schemas.microsoft.com/office/drawing/2010/main">
+                <a14:hiddenEffects xmlns:a14="http://schemas.microsoft.com/office/drawing/2010/main" xmlns="">
                   <a:effectLst>
                     <a:outerShdw blurRad="63500" dist="38099" dir="2700000" algn="ctr" rotWithShape="0">
                       <a:schemeClr val="bg2">
@@ -25354,14 +25354,14 @@
             <a:effectLst/>
             <a:extLst>
               <a:ext uri="{909E8E84-426E-40dd-AFC4-6F175D3DCCD1}">
-                <a14:hiddenFill xmlns="" xmlns:a14="http://schemas.microsoft.com/office/drawing/2010/main">
+                <a14:hiddenFill xmlns:a14="http://schemas.microsoft.com/office/drawing/2010/main" xmlns="">
                   <a:solidFill>
                     <a:schemeClr val="accent1"/>
                   </a:solidFill>
                 </a14:hiddenFill>
               </a:ext>
               <a:ext uri="{91240B29-F687-4f45-9708-019B960494DF}">
-                <a14:hiddenLine xmlns="" xmlns:a14="http://schemas.microsoft.com/office/drawing/2010/main" w="9525">
+                <a14:hiddenLine xmlns:a14="http://schemas.microsoft.com/office/drawing/2010/main" xmlns="" w="9525">
                   <a:solidFill>
                     <a:schemeClr val="tx1"/>
                   </a:solidFill>
@@ -25371,7 +25371,7 @@
                 </a14:hiddenLine>
               </a:ext>
               <a:ext uri="{AF507438-7753-43e0-B8FC-AC1667EBCBE1}">
-                <a14:hiddenEffects xmlns="" xmlns:a14="http://schemas.microsoft.com/office/drawing/2010/main">
+                <a14:hiddenEffects xmlns:a14="http://schemas.microsoft.com/office/drawing/2010/main" xmlns="">
                   <a:effectLst>
                     <a:outerShdw blurRad="63500" dist="38099" dir="2700000" algn="ctr" rotWithShape="0">
                       <a:schemeClr val="bg2">
@@ -25461,7 +25461,7 @@
             <a:effectLst/>
             <a:extLst>
               <a:ext uri="{AF507438-7753-43e0-B8FC-AC1667EBCBE1}">
-                <a14:hiddenEffects xmlns="" xmlns:a14="http://schemas.microsoft.com/office/drawing/2010/main">
+                <a14:hiddenEffects xmlns:a14="http://schemas.microsoft.com/office/drawing/2010/main" xmlns="">
                   <a:effectLst>
                     <a:outerShdw blurRad="63500" dist="38099" dir="2700000" algn="ctr" rotWithShape="0">
                       <a:schemeClr val="bg2">
@@ -25513,14 +25513,14 @@
             <a:effectLst/>
             <a:extLst>
               <a:ext uri="{909E8E84-426E-40dd-AFC4-6F175D3DCCD1}">
-                <a14:hiddenFill xmlns="" xmlns:a14="http://schemas.microsoft.com/office/drawing/2010/main">
+                <a14:hiddenFill xmlns:a14="http://schemas.microsoft.com/office/drawing/2010/main" xmlns="">
                   <a:solidFill>
                     <a:schemeClr val="accent1"/>
                   </a:solidFill>
                 </a14:hiddenFill>
               </a:ext>
               <a:ext uri="{91240B29-F687-4f45-9708-019B960494DF}">
-                <a14:hiddenLine xmlns="" xmlns:a14="http://schemas.microsoft.com/office/drawing/2010/main" w="9525">
+                <a14:hiddenLine xmlns:a14="http://schemas.microsoft.com/office/drawing/2010/main" xmlns="" w="9525">
                   <a:solidFill>
                     <a:schemeClr val="tx1"/>
                   </a:solidFill>
@@ -25530,7 +25530,7 @@
                 </a14:hiddenLine>
               </a:ext>
               <a:ext uri="{AF507438-7753-43e0-B8FC-AC1667EBCBE1}">
-                <a14:hiddenEffects xmlns="" xmlns:a14="http://schemas.microsoft.com/office/drawing/2010/main">
+                <a14:hiddenEffects xmlns:a14="http://schemas.microsoft.com/office/drawing/2010/main" xmlns="">
                   <a:effectLst>
                     <a:outerShdw blurRad="63500" dist="38099" dir="2700000" algn="ctr" rotWithShape="0">
                       <a:schemeClr val="bg2">
@@ -25759,7 +25759,7 @@
             <a:effectLst/>
             <a:extLst>
               <a:ext uri="{AF507438-7753-43e0-B8FC-AC1667EBCBE1}">
-                <a14:hiddenEffects xmlns="" xmlns:a14="http://schemas.microsoft.com/office/drawing/2010/main">
+                <a14:hiddenEffects xmlns:a14="http://schemas.microsoft.com/office/drawing/2010/main" xmlns="">
                   <a:effectLst>
                     <a:outerShdw blurRad="63500" dist="38099" dir="2700000" algn="ctr" rotWithShape="0">
                       <a:schemeClr val="bg2">
@@ -25811,14 +25811,14 @@
             <a:effectLst/>
             <a:extLst>
               <a:ext uri="{909E8E84-426E-40dd-AFC4-6F175D3DCCD1}">
-                <a14:hiddenFill xmlns="" xmlns:a14="http://schemas.microsoft.com/office/drawing/2010/main">
+                <a14:hiddenFill xmlns:a14="http://schemas.microsoft.com/office/drawing/2010/main" xmlns="">
                   <a:solidFill>
                     <a:schemeClr val="accent1"/>
                   </a:solidFill>
                 </a14:hiddenFill>
               </a:ext>
               <a:ext uri="{91240B29-F687-4f45-9708-019B960494DF}">
-                <a14:hiddenLine xmlns="" xmlns:a14="http://schemas.microsoft.com/office/drawing/2010/main" w="9525">
+                <a14:hiddenLine xmlns:a14="http://schemas.microsoft.com/office/drawing/2010/main" xmlns="" w="9525">
                   <a:solidFill>
                     <a:schemeClr val="tx1"/>
                   </a:solidFill>
@@ -25828,7 +25828,7 @@
                 </a14:hiddenLine>
               </a:ext>
               <a:ext uri="{AF507438-7753-43e0-B8FC-AC1667EBCBE1}">
-                <a14:hiddenEffects xmlns="" xmlns:a14="http://schemas.microsoft.com/office/drawing/2010/main">
+                <a14:hiddenEffects xmlns:a14="http://schemas.microsoft.com/office/drawing/2010/main" xmlns="">
                   <a:effectLst>
                     <a:outerShdw blurRad="63500" dist="38099" dir="2700000" algn="ctr" rotWithShape="0">
                       <a:schemeClr val="bg2">
@@ -25918,7 +25918,7 @@
             <a:effectLst/>
             <a:extLst>
               <a:ext uri="{AF507438-7753-43e0-B8FC-AC1667EBCBE1}">
-                <a14:hiddenEffects xmlns="" xmlns:a14="http://schemas.microsoft.com/office/drawing/2010/main">
+                <a14:hiddenEffects xmlns:a14="http://schemas.microsoft.com/office/drawing/2010/main" xmlns="">
                   <a:effectLst>
                     <a:outerShdw blurRad="63500" dist="38099" dir="2700000" algn="ctr" rotWithShape="0">
                       <a:schemeClr val="bg2">
@@ -25970,14 +25970,14 @@
             <a:effectLst/>
             <a:extLst>
               <a:ext uri="{909E8E84-426E-40dd-AFC4-6F175D3DCCD1}">
-                <a14:hiddenFill xmlns="" xmlns:a14="http://schemas.microsoft.com/office/drawing/2010/main">
+                <a14:hiddenFill xmlns:a14="http://schemas.microsoft.com/office/drawing/2010/main" xmlns="">
                   <a:solidFill>
                     <a:schemeClr val="accent1"/>
                   </a:solidFill>
                 </a14:hiddenFill>
               </a:ext>
               <a:ext uri="{91240B29-F687-4f45-9708-019B960494DF}">
-                <a14:hiddenLine xmlns="" xmlns:a14="http://schemas.microsoft.com/office/drawing/2010/main" w="9525">
+                <a14:hiddenLine xmlns:a14="http://schemas.microsoft.com/office/drawing/2010/main" xmlns="" w="9525">
                   <a:solidFill>
                     <a:schemeClr val="tx1"/>
                   </a:solidFill>
@@ -25987,7 +25987,7 @@
                 </a14:hiddenLine>
               </a:ext>
               <a:ext uri="{AF507438-7753-43e0-B8FC-AC1667EBCBE1}">
-                <a14:hiddenEffects xmlns="" xmlns:a14="http://schemas.microsoft.com/office/drawing/2010/main">
+                <a14:hiddenEffects xmlns:a14="http://schemas.microsoft.com/office/drawing/2010/main" xmlns="">
                   <a:effectLst>
                     <a:outerShdw blurRad="63500" dist="38099" dir="2700000" algn="ctr" rotWithShape="0">
                       <a:schemeClr val="bg2">
@@ -26077,7 +26077,7 @@
             <a:effectLst/>
             <a:extLst>
               <a:ext uri="{AF507438-7753-43e0-B8FC-AC1667EBCBE1}">
-                <a14:hiddenEffects xmlns="" xmlns:a14="http://schemas.microsoft.com/office/drawing/2010/main">
+                <a14:hiddenEffects xmlns:a14="http://schemas.microsoft.com/office/drawing/2010/main" xmlns="">
                   <a:effectLst>
                     <a:outerShdw blurRad="63500" dist="38099" dir="2700000" algn="ctr" rotWithShape="0">
                       <a:schemeClr val="bg2">
@@ -26129,14 +26129,14 @@
             <a:effectLst/>
             <a:extLst>
               <a:ext uri="{909E8E84-426E-40dd-AFC4-6F175D3DCCD1}">
-                <a14:hiddenFill xmlns="" xmlns:a14="http://schemas.microsoft.com/office/drawing/2010/main">
+                <a14:hiddenFill xmlns:a14="http://schemas.microsoft.com/office/drawing/2010/main" xmlns="">
                   <a:solidFill>
                     <a:schemeClr val="accent1"/>
                   </a:solidFill>
                 </a14:hiddenFill>
               </a:ext>
               <a:ext uri="{91240B29-F687-4f45-9708-019B960494DF}">
-                <a14:hiddenLine xmlns="" xmlns:a14="http://schemas.microsoft.com/office/drawing/2010/main" w="9525">
+                <a14:hiddenLine xmlns:a14="http://schemas.microsoft.com/office/drawing/2010/main" xmlns="" w="9525">
                   <a:solidFill>
                     <a:schemeClr val="tx1"/>
                   </a:solidFill>
@@ -26146,7 +26146,7 @@
                 </a14:hiddenLine>
               </a:ext>
               <a:ext uri="{AF507438-7753-43e0-B8FC-AC1667EBCBE1}">
-                <a14:hiddenEffects xmlns="" xmlns:a14="http://schemas.microsoft.com/office/drawing/2010/main">
+                <a14:hiddenEffects xmlns:a14="http://schemas.microsoft.com/office/drawing/2010/main" xmlns="">
                   <a:effectLst>
                     <a:outerShdw blurRad="63500" dist="38099" dir="2700000" algn="ctr" rotWithShape="0">
                       <a:schemeClr val="bg2">
@@ -26421,7 +26421,7 @@
             <a:effectLst/>
             <a:extLst>
               <a:ext uri="{AF507438-7753-43e0-B8FC-AC1667EBCBE1}">
-                <a14:hiddenEffects xmlns="" xmlns:a14="http://schemas.microsoft.com/office/drawing/2010/main">
+                <a14:hiddenEffects xmlns:a14="http://schemas.microsoft.com/office/drawing/2010/main" xmlns="">
                   <a:effectLst>
                     <a:outerShdw blurRad="63500" dist="38099" dir="2700000" algn="ctr" rotWithShape="0">
                       <a:schemeClr val="bg2">
@@ -26473,14 +26473,14 @@
             <a:effectLst/>
             <a:extLst>
               <a:ext uri="{909E8E84-426E-40dd-AFC4-6F175D3DCCD1}">
-                <a14:hiddenFill xmlns="" xmlns:a14="http://schemas.microsoft.com/office/drawing/2010/main">
+                <a14:hiddenFill xmlns:a14="http://schemas.microsoft.com/office/drawing/2010/main" xmlns="">
                   <a:solidFill>
                     <a:schemeClr val="accent1"/>
                   </a:solidFill>
                 </a14:hiddenFill>
               </a:ext>
               <a:ext uri="{91240B29-F687-4f45-9708-019B960494DF}">
-                <a14:hiddenLine xmlns="" xmlns:a14="http://schemas.microsoft.com/office/drawing/2010/main" w="9525">
+                <a14:hiddenLine xmlns:a14="http://schemas.microsoft.com/office/drawing/2010/main" xmlns="" w="9525">
                   <a:solidFill>
                     <a:schemeClr val="tx1"/>
                   </a:solidFill>
@@ -26490,7 +26490,7 @@
                 </a14:hiddenLine>
               </a:ext>
               <a:ext uri="{AF507438-7753-43e0-B8FC-AC1667EBCBE1}">
-                <a14:hiddenEffects xmlns="" xmlns:a14="http://schemas.microsoft.com/office/drawing/2010/main">
+                <a14:hiddenEffects xmlns:a14="http://schemas.microsoft.com/office/drawing/2010/main" xmlns="">
                   <a:effectLst>
                     <a:outerShdw blurRad="63500" dist="38099" dir="2700000" algn="ctr" rotWithShape="0">
                       <a:schemeClr val="bg2">
@@ -26580,7 +26580,7 @@
             <a:effectLst/>
             <a:extLst>
               <a:ext uri="{AF507438-7753-43e0-B8FC-AC1667EBCBE1}">
-                <a14:hiddenEffects xmlns="" xmlns:a14="http://schemas.microsoft.com/office/drawing/2010/main">
+                <a14:hiddenEffects xmlns:a14="http://schemas.microsoft.com/office/drawing/2010/main" xmlns="">
                   <a:effectLst>
                     <a:outerShdw blurRad="63500" dist="38099" dir="2700000" algn="ctr" rotWithShape="0">
                       <a:schemeClr val="bg2">
@@ -26632,14 +26632,14 @@
             <a:effectLst/>
             <a:extLst>
               <a:ext uri="{909E8E84-426E-40dd-AFC4-6F175D3DCCD1}">
-                <a14:hiddenFill xmlns="" xmlns:a14="http://schemas.microsoft.com/office/drawing/2010/main">
+                <a14:hiddenFill xmlns:a14="http://schemas.microsoft.com/office/drawing/2010/main" xmlns="">
                   <a:solidFill>
                     <a:schemeClr val="accent1"/>
                   </a:solidFill>
                 </a14:hiddenFill>
               </a:ext>
               <a:ext uri="{91240B29-F687-4f45-9708-019B960494DF}">
-                <a14:hiddenLine xmlns="" xmlns:a14="http://schemas.microsoft.com/office/drawing/2010/main" w="9525">
+                <a14:hiddenLine xmlns:a14="http://schemas.microsoft.com/office/drawing/2010/main" xmlns="" w="9525">
                   <a:solidFill>
                     <a:schemeClr val="tx1"/>
                   </a:solidFill>
@@ -26649,7 +26649,7 @@
                 </a14:hiddenLine>
               </a:ext>
               <a:ext uri="{AF507438-7753-43e0-B8FC-AC1667EBCBE1}">
-                <a14:hiddenEffects xmlns="" xmlns:a14="http://schemas.microsoft.com/office/drawing/2010/main">
+                <a14:hiddenEffects xmlns:a14="http://schemas.microsoft.com/office/drawing/2010/main" xmlns="">
                   <a:effectLst>
                     <a:outerShdw blurRad="63500" dist="38099" dir="2700000" algn="ctr" rotWithShape="0">
                       <a:schemeClr val="bg2">
@@ -26739,7 +26739,7 @@
             <a:effectLst/>
             <a:extLst>
               <a:ext uri="{AF507438-7753-43e0-B8FC-AC1667EBCBE1}">
-                <a14:hiddenEffects xmlns="" xmlns:a14="http://schemas.microsoft.com/office/drawing/2010/main">
+                <a14:hiddenEffects xmlns:a14="http://schemas.microsoft.com/office/drawing/2010/main" xmlns="">
                   <a:effectLst>
                     <a:outerShdw blurRad="63500" dist="38099" dir="2700000" algn="ctr" rotWithShape="0">
                       <a:schemeClr val="bg2">
@@ -26791,14 +26791,14 @@
             <a:effectLst/>
             <a:extLst>
               <a:ext uri="{909E8E84-426E-40dd-AFC4-6F175D3DCCD1}">
-                <a14:hiddenFill xmlns="" xmlns:a14="http://schemas.microsoft.com/office/drawing/2010/main">
+                <a14:hiddenFill xmlns:a14="http://schemas.microsoft.com/office/drawing/2010/main" xmlns="">
                   <a:solidFill>
                     <a:schemeClr val="accent1"/>
                   </a:solidFill>
                 </a14:hiddenFill>
               </a:ext>
               <a:ext uri="{91240B29-F687-4f45-9708-019B960494DF}">
-                <a14:hiddenLine xmlns="" xmlns:a14="http://schemas.microsoft.com/office/drawing/2010/main" w="9525">
+                <a14:hiddenLine xmlns:a14="http://schemas.microsoft.com/office/drawing/2010/main" xmlns="" w="9525">
                   <a:solidFill>
                     <a:schemeClr val="tx1"/>
                   </a:solidFill>
@@ -26808,7 +26808,7 @@
                 </a14:hiddenLine>
               </a:ext>
               <a:ext uri="{AF507438-7753-43e0-B8FC-AC1667EBCBE1}">
-                <a14:hiddenEffects xmlns="" xmlns:a14="http://schemas.microsoft.com/office/drawing/2010/main">
+                <a14:hiddenEffects xmlns:a14="http://schemas.microsoft.com/office/drawing/2010/main" xmlns="">
                   <a:effectLst>
                     <a:outerShdw blurRad="63500" dist="38099" dir="2700000" algn="ctr" rotWithShape="0">
                       <a:schemeClr val="bg2">
@@ -27589,7 +27589,7 @@
             <a:effectLst/>
             <a:extLst>
               <a:ext uri="{AF507438-7753-43e0-B8FC-AC1667EBCBE1}">
-                <a14:hiddenEffects xmlns="" xmlns:a14="http://schemas.microsoft.com/office/drawing/2010/main">
+                <a14:hiddenEffects xmlns:a14="http://schemas.microsoft.com/office/drawing/2010/main" xmlns="">
                   <a:effectLst>
                     <a:outerShdw blurRad="63500" dist="38099" dir="2700000" algn="ctr" rotWithShape="0">
                       <a:schemeClr val="bg2">
@@ -27641,14 +27641,14 @@
             <a:effectLst/>
             <a:extLst>
               <a:ext uri="{909E8E84-426E-40dd-AFC4-6F175D3DCCD1}">
-                <a14:hiddenFill xmlns="" xmlns:a14="http://schemas.microsoft.com/office/drawing/2010/main">
+                <a14:hiddenFill xmlns:a14="http://schemas.microsoft.com/office/drawing/2010/main" xmlns="">
                   <a:solidFill>
                     <a:schemeClr val="accent1"/>
                   </a:solidFill>
                 </a14:hiddenFill>
               </a:ext>
               <a:ext uri="{91240B29-F687-4f45-9708-019B960494DF}">
-                <a14:hiddenLine xmlns="" xmlns:a14="http://schemas.microsoft.com/office/drawing/2010/main" w="9525">
+                <a14:hiddenLine xmlns:a14="http://schemas.microsoft.com/office/drawing/2010/main" xmlns="" w="9525">
                   <a:solidFill>
                     <a:schemeClr val="tx1"/>
                   </a:solidFill>
@@ -27658,7 +27658,7 @@
                 </a14:hiddenLine>
               </a:ext>
               <a:ext uri="{AF507438-7753-43e0-B8FC-AC1667EBCBE1}">
-                <a14:hiddenEffects xmlns="" xmlns:a14="http://schemas.microsoft.com/office/drawing/2010/main">
+                <a14:hiddenEffects xmlns:a14="http://schemas.microsoft.com/office/drawing/2010/main" xmlns="">
                   <a:effectLst>
                     <a:outerShdw blurRad="63500" dist="38099" dir="2700000" algn="ctr" rotWithShape="0">
                       <a:schemeClr val="bg2">
@@ -27748,7 +27748,7 @@
             <a:effectLst/>
             <a:extLst>
               <a:ext uri="{AF507438-7753-43e0-B8FC-AC1667EBCBE1}">
-                <a14:hiddenEffects xmlns="" xmlns:a14="http://schemas.microsoft.com/office/drawing/2010/main">
+                <a14:hiddenEffects xmlns:a14="http://schemas.microsoft.com/office/drawing/2010/main" xmlns="">
                   <a:effectLst>
                     <a:outerShdw blurRad="63500" dist="38099" dir="2700000" algn="ctr" rotWithShape="0">
                       <a:schemeClr val="bg2">
@@ -27800,14 +27800,14 @@
             <a:effectLst/>
             <a:extLst>
               <a:ext uri="{909E8E84-426E-40dd-AFC4-6F175D3DCCD1}">
-                <a14:hiddenFill xmlns="" xmlns:a14="http://schemas.microsoft.com/office/drawing/2010/main">
+                <a14:hiddenFill xmlns:a14="http://schemas.microsoft.com/office/drawing/2010/main" xmlns="">
                   <a:solidFill>
                     <a:schemeClr val="accent1"/>
                   </a:solidFill>
                 </a14:hiddenFill>
               </a:ext>
               <a:ext uri="{91240B29-F687-4f45-9708-019B960494DF}">
-                <a14:hiddenLine xmlns="" xmlns:a14="http://schemas.microsoft.com/office/drawing/2010/main" w="9525">
+                <a14:hiddenLine xmlns:a14="http://schemas.microsoft.com/office/drawing/2010/main" xmlns="" w="9525">
                   <a:solidFill>
                     <a:schemeClr val="tx1"/>
                   </a:solidFill>
@@ -27817,7 +27817,7 @@
                 </a14:hiddenLine>
               </a:ext>
               <a:ext uri="{AF507438-7753-43e0-B8FC-AC1667EBCBE1}">
-                <a14:hiddenEffects xmlns="" xmlns:a14="http://schemas.microsoft.com/office/drawing/2010/main">
+                <a14:hiddenEffects xmlns:a14="http://schemas.microsoft.com/office/drawing/2010/main" xmlns="">
                   <a:effectLst>
                     <a:outerShdw blurRad="63500" dist="38099" dir="2700000" algn="ctr" rotWithShape="0">
                       <a:schemeClr val="bg2">
@@ -27907,7 +27907,7 @@
             <a:effectLst/>
             <a:extLst>
               <a:ext uri="{AF507438-7753-43e0-B8FC-AC1667EBCBE1}">
-                <a14:hiddenEffects xmlns="" xmlns:a14="http://schemas.microsoft.com/office/drawing/2010/main">
+                <a14:hiddenEffects xmlns:a14="http://schemas.microsoft.com/office/drawing/2010/main" xmlns="">
                   <a:effectLst>
                     <a:outerShdw blurRad="63500" dist="38099" dir="2700000" algn="ctr" rotWithShape="0">
                       <a:schemeClr val="bg2">
@@ -27959,14 +27959,14 @@
             <a:effectLst/>
             <a:extLst>
               <a:ext uri="{909E8E84-426E-40dd-AFC4-6F175D3DCCD1}">
-                <a14:hiddenFill xmlns="" xmlns:a14="http://schemas.microsoft.com/office/drawing/2010/main">
+                <a14:hiddenFill xmlns:a14="http://schemas.microsoft.com/office/drawing/2010/main" xmlns="">
                   <a:solidFill>
                     <a:schemeClr val="accent1"/>
                   </a:solidFill>
                 </a14:hiddenFill>
               </a:ext>
               <a:ext uri="{91240B29-F687-4f45-9708-019B960494DF}">
-                <a14:hiddenLine xmlns="" xmlns:a14="http://schemas.microsoft.com/office/drawing/2010/main" w="9525">
+                <a14:hiddenLine xmlns:a14="http://schemas.microsoft.com/office/drawing/2010/main" xmlns="" w="9525">
                   <a:solidFill>
                     <a:schemeClr val="tx1"/>
                   </a:solidFill>
@@ -27976,7 +27976,7 @@
                 </a14:hiddenLine>
               </a:ext>
               <a:ext uri="{AF507438-7753-43e0-B8FC-AC1667EBCBE1}">
-                <a14:hiddenEffects xmlns="" xmlns:a14="http://schemas.microsoft.com/office/drawing/2010/main">
+                <a14:hiddenEffects xmlns:a14="http://schemas.microsoft.com/office/drawing/2010/main" xmlns="">
                   <a:effectLst>
                     <a:outerShdw blurRad="63500" dist="38099" dir="2700000" algn="ctr" rotWithShape="0">
                       <a:schemeClr val="bg2">
@@ -28205,7 +28205,7 @@
             <a:effectLst/>
             <a:extLst>
               <a:ext uri="{AF507438-7753-43e0-B8FC-AC1667EBCBE1}">
-                <a14:hiddenEffects xmlns="" xmlns:a14="http://schemas.microsoft.com/office/drawing/2010/main">
+                <a14:hiddenEffects xmlns:a14="http://schemas.microsoft.com/office/drawing/2010/main" xmlns="">
                   <a:effectLst>
                     <a:outerShdw blurRad="63500" dist="38099" dir="2700000" algn="ctr" rotWithShape="0">
                       <a:schemeClr val="bg2">
@@ -28257,14 +28257,14 @@
             <a:effectLst/>
             <a:extLst>
               <a:ext uri="{909E8E84-426E-40dd-AFC4-6F175D3DCCD1}">
-                <a14:hiddenFill xmlns="" xmlns:a14="http://schemas.microsoft.com/office/drawing/2010/main">
+                <a14:hiddenFill xmlns:a14="http://schemas.microsoft.com/office/drawing/2010/main" xmlns="">
                   <a:solidFill>
                     <a:schemeClr val="accent1"/>
                   </a:solidFill>
                 </a14:hiddenFill>
               </a:ext>
               <a:ext uri="{91240B29-F687-4f45-9708-019B960494DF}">
-                <a14:hiddenLine xmlns="" xmlns:a14="http://schemas.microsoft.com/office/drawing/2010/main" w="9525">
+                <a14:hiddenLine xmlns:a14="http://schemas.microsoft.com/office/drawing/2010/main" xmlns="" w="9525">
                   <a:solidFill>
                     <a:schemeClr val="tx1"/>
                   </a:solidFill>
@@ -28274,7 +28274,7 @@
                 </a14:hiddenLine>
               </a:ext>
               <a:ext uri="{AF507438-7753-43e0-B8FC-AC1667EBCBE1}">
-                <a14:hiddenEffects xmlns="" xmlns:a14="http://schemas.microsoft.com/office/drawing/2010/main">
+                <a14:hiddenEffects xmlns:a14="http://schemas.microsoft.com/office/drawing/2010/main" xmlns="">
                   <a:effectLst>
                     <a:outerShdw blurRad="63500" dist="38099" dir="2700000" algn="ctr" rotWithShape="0">
                       <a:schemeClr val="bg2">
@@ -28364,7 +28364,7 @@
             <a:effectLst/>
             <a:extLst>
               <a:ext uri="{AF507438-7753-43e0-B8FC-AC1667EBCBE1}">
-                <a14:hiddenEffects xmlns="" xmlns:a14="http://schemas.microsoft.com/office/drawing/2010/main">
+                <a14:hiddenEffects xmlns:a14="http://schemas.microsoft.com/office/drawing/2010/main" xmlns="">
                   <a:effectLst>
                     <a:outerShdw blurRad="63500" dist="38099" dir="2700000" algn="ctr" rotWithShape="0">
                       <a:schemeClr val="bg2">
@@ -28416,14 +28416,14 @@
             <a:effectLst/>
             <a:extLst>
               <a:ext uri="{909E8E84-426E-40dd-AFC4-6F175D3DCCD1}">
-                <a14:hiddenFill xmlns="" xmlns:a14="http://schemas.microsoft.com/office/drawing/2010/main">
+                <a14:hiddenFill xmlns:a14="http://schemas.microsoft.com/office/drawing/2010/main" xmlns="">
                   <a:solidFill>
                     <a:schemeClr val="accent1"/>
                   </a:solidFill>
                 </a14:hiddenFill>
               </a:ext>
               <a:ext uri="{91240B29-F687-4f45-9708-019B960494DF}">
-                <a14:hiddenLine xmlns="" xmlns:a14="http://schemas.microsoft.com/office/drawing/2010/main" w="9525">
+                <a14:hiddenLine xmlns:a14="http://schemas.microsoft.com/office/drawing/2010/main" xmlns="" w="9525">
                   <a:solidFill>
                     <a:schemeClr val="tx1"/>
                   </a:solidFill>
@@ -28433,7 +28433,7 @@
                 </a14:hiddenLine>
               </a:ext>
               <a:ext uri="{AF507438-7753-43e0-B8FC-AC1667EBCBE1}">
-                <a14:hiddenEffects xmlns="" xmlns:a14="http://schemas.microsoft.com/office/drawing/2010/main">
+                <a14:hiddenEffects xmlns:a14="http://schemas.microsoft.com/office/drawing/2010/main" xmlns="">
                   <a:effectLst>
                     <a:outerShdw blurRad="63500" dist="38099" dir="2700000" algn="ctr" rotWithShape="0">
                       <a:schemeClr val="bg2">
@@ -28523,7 +28523,7 @@
             <a:effectLst/>
             <a:extLst>
               <a:ext uri="{AF507438-7753-43e0-B8FC-AC1667EBCBE1}">
-                <a14:hiddenEffects xmlns="" xmlns:a14="http://schemas.microsoft.com/office/drawing/2010/main">
+                <a14:hiddenEffects xmlns:a14="http://schemas.microsoft.com/office/drawing/2010/main" xmlns="">
                   <a:effectLst>
                     <a:outerShdw blurRad="63500" dist="38099" dir="2700000" algn="ctr" rotWithShape="0">
                       <a:schemeClr val="bg2">
@@ -28575,14 +28575,14 @@
             <a:effectLst/>
             <a:extLst>
               <a:ext uri="{909E8E84-426E-40dd-AFC4-6F175D3DCCD1}">
-                <a14:hiddenFill xmlns="" xmlns:a14="http://schemas.microsoft.com/office/drawing/2010/main">
+                <a14:hiddenFill xmlns:a14="http://schemas.microsoft.com/office/drawing/2010/main" xmlns="">
                   <a:solidFill>
                     <a:schemeClr val="accent1"/>
                   </a:solidFill>
                 </a14:hiddenFill>
               </a:ext>
               <a:ext uri="{91240B29-F687-4f45-9708-019B960494DF}">
-                <a14:hiddenLine xmlns="" xmlns:a14="http://schemas.microsoft.com/office/drawing/2010/main" w="9525">
+                <a14:hiddenLine xmlns:a14="http://schemas.microsoft.com/office/drawing/2010/main" xmlns="" w="9525">
                   <a:solidFill>
                     <a:schemeClr val="tx1"/>
                   </a:solidFill>
@@ -28592,7 +28592,7 @@
                 </a14:hiddenLine>
               </a:ext>
               <a:ext uri="{AF507438-7753-43e0-B8FC-AC1667EBCBE1}">
-                <a14:hiddenEffects xmlns="" xmlns:a14="http://schemas.microsoft.com/office/drawing/2010/main">
+                <a14:hiddenEffects xmlns:a14="http://schemas.microsoft.com/office/drawing/2010/main" xmlns="">
                   <a:effectLst>
                     <a:outerShdw blurRad="63500" dist="38099" dir="2700000" algn="ctr" rotWithShape="0">
                       <a:schemeClr val="bg2">
@@ -28867,7 +28867,7 @@
             <a:effectLst/>
             <a:extLst>
               <a:ext uri="{AF507438-7753-43e0-B8FC-AC1667EBCBE1}">
-                <a14:hiddenEffects xmlns="" xmlns:a14="http://schemas.microsoft.com/office/drawing/2010/main">
+                <a14:hiddenEffects xmlns:a14="http://schemas.microsoft.com/office/drawing/2010/main" xmlns="">
                   <a:effectLst>
                     <a:outerShdw blurRad="63500" dist="38099" dir="2700000" algn="ctr" rotWithShape="0">
                       <a:schemeClr val="bg2">
@@ -28919,14 +28919,14 @@
             <a:effectLst/>
             <a:extLst>
               <a:ext uri="{909E8E84-426E-40dd-AFC4-6F175D3DCCD1}">
-                <a14:hiddenFill xmlns="" xmlns:a14="http://schemas.microsoft.com/office/drawing/2010/main">
+                <a14:hiddenFill xmlns:a14="http://schemas.microsoft.com/office/drawing/2010/main" xmlns="">
                   <a:solidFill>
                     <a:schemeClr val="accent1"/>
                   </a:solidFill>
                 </a14:hiddenFill>
               </a:ext>
               <a:ext uri="{91240B29-F687-4f45-9708-019B960494DF}">
-                <a14:hiddenLine xmlns="" xmlns:a14="http://schemas.microsoft.com/office/drawing/2010/main" w="9525">
+                <a14:hiddenLine xmlns:a14="http://schemas.microsoft.com/office/drawing/2010/main" xmlns="" w="9525">
                   <a:solidFill>
                     <a:schemeClr val="tx1"/>
                   </a:solidFill>
@@ -28936,7 +28936,7 @@
                 </a14:hiddenLine>
               </a:ext>
               <a:ext uri="{AF507438-7753-43e0-B8FC-AC1667EBCBE1}">
-                <a14:hiddenEffects xmlns="" xmlns:a14="http://schemas.microsoft.com/office/drawing/2010/main">
+                <a14:hiddenEffects xmlns:a14="http://schemas.microsoft.com/office/drawing/2010/main" xmlns="">
                   <a:effectLst>
                     <a:outerShdw blurRad="63500" dist="38099" dir="2700000" algn="ctr" rotWithShape="0">
                       <a:schemeClr val="bg2">
@@ -29026,7 +29026,7 @@
             <a:effectLst/>
             <a:extLst>
               <a:ext uri="{AF507438-7753-43e0-B8FC-AC1667EBCBE1}">
-                <a14:hiddenEffects xmlns="" xmlns:a14="http://schemas.microsoft.com/office/drawing/2010/main">
+                <a14:hiddenEffects xmlns:a14="http://schemas.microsoft.com/office/drawing/2010/main" xmlns="">
                   <a:effectLst>
                     <a:outerShdw blurRad="63500" dist="38099" dir="2700000" algn="ctr" rotWithShape="0">
                       <a:schemeClr val="bg2">
@@ -29078,14 +29078,14 @@
             <a:effectLst/>
             <a:extLst>
               <a:ext uri="{909E8E84-426E-40dd-AFC4-6F175D3DCCD1}">
-                <a14:hiddenFill xmlns="" xmlns:a14="http://schemas.microsoft.com/office/drawing/2010/main">
+                <a14:hiddenFill xmlns:a14="http://schemas.microsoft.com/office/drawing/2010/main" xmlns="">
                   <a:solidFill>
                     <a:schemeClr val="accent1"/>
                   </a:solidFill>
                 </a14:hiddenFill>
               </a:ext>
               <a:ext uri="{91240B29-F687-4f45-9708-019B960494DF}">
-                <a14:hiddenLine xmlns="" xmlns:a14="http://schemas.microsoft.com/office/drawing/2010/main" w="9525">
+                <a14:hiddenLine xmlns:a14="http://schemas.microsoft.com/office/drawing/2010/main" xmlns="" w="9525">
                   <a:solidFill>
                     <a:schemeClr val="tx1"/>
                   </a:solidFill>
@@ -29095,7 +29095,7 @@
                 </a14:hiddenLine>
               </a:ext>
               <a:ext uri="{AF507438-7753-43e0-B8FC-AC1667EBCBE1}">
-                <a14:hiddenEffects xmlns="" xmlns:a14="http://schemas.microsoft.com/office/drawing/2010/main">
+                <a14:hiddenEffects xmlns:a14="http://schemas.microsoft.com/office/drawing/2010/main" xmlns="">
                   <a:effectLst>
                     <a:outerShdw blurRad="63500" dist="38099" dir="2700000" algn="ctr" rotWithShape="0">
                       <a:schemeClr val="bg2">
@@ -29185,7 +29185,7 @@
             <a:effectLst/>
             <a:extLst>
               <a:ext uri="{AF507438-7753-43e0-B8FC-AC1667EBCBE1}">
-                <a14:hiddenEffects xmlns="" xmlns:a14="http://schemas.microsoft.com/office/drawing/2010/main">
+                <a14:hiddenEffects xmlns:a14="http://schemas.microsoft.com/office/drawing/2010/main" xmlns="">
                   <a:effectLst>
                     <a:outerShdw blurRad="63500" dist="38099" dir="2700000" algn="ctr" rotWithShape="0">
                       <a:schemeClr val="bg2">
@@ -29237,14 +29237,14 @@
             <a:effectLst/>
             <a:extLst>
               <a:ext uri="{909E8E84-426E-40dd-AFC4-6F175D3DCCD1}">
-                <a14:hiddenFill xmlns="" xmlns:a14="http://schemas.microsoft.com/office/drawing/2010/main">
+                <a14:hiddenFill xmlns:a14="http://schemas.microsoft.com/office/drawing/2010/main" xmlns="">
                   <a:solidFill>
                     <a:schemeClr val="accent1"/>
                   </a:solidFill>
                 </a14:hiddenFill>
               </a:ext>
               <a:ext uri="{91240B29-F687-4f45-9708-019B960494DF}">
-                <a14:hiddenLine xmlns="" xmlns:a14="http://schemas.microsoft.com/office/drawing/2010/main" w="9525">
+                <a14:hiddenLine xmlns:a14="http://schemas.microsoft.com/office/drawing/2010/main" xmlns="" w="9525">
                   <a:solidFill>
                     <a:schemeClr val="tx1"/>
                   </a:solidFill>
@@ -29254,7 +29254,7 @@
                 </a14:hiddenLine>
               </a:ext>
               <a:ext uri="{AF507438-7753-43e0-B8FC-AC1667EBCBE1}">
-                <a14:hiddenEffects xmlns="" xmlns:a14="http://schemas.microsoft.com/office/drawing/2010/main">
+                <a14:hiddenEffects xmlns:a14="http://schemas.microsoft.com/office/drawing/2010/main" xmlns="">
                   <a:effectLst>
                     <a:outerShdw blurRad="63500" dist="38099" dir="2700000" algn="ctr" rotWithShape="0">
                       <a:schemeClr val="bg2">
@@ -30265,7 +30265,7 @@
             <a:effectLst/>
             <a:extLst>
               <a:ext uri="{AF507438-7753-43e0-B8FC-AC1667EBCBE1}">
-                <a14:hiddenEffects xmlns="" xmlns:a14="http://schemas.microsoft.com/office/drawing/2010/main">
+                <a14:hiddenEffects xmlns:a14="http://schemas.microsoft.com/office/drawing/2010/main" xmlns="">
                   <a:effectLst>
                     <a:outerShdw blurRad="63500" dist="38099" dir="2700000" algn="ctr" rotWithShape="0">
                       <a:schemeClr val="bg2">
@@ -30317,14 +30317,14 @@
             <a:effectLst/>
             <a:extLst>
               <a:ext uri="{909E8E84-426E-40dd-AFC4-6F175D3DCCD1}">
-                <a14:hiddenFill xmlns="" xmlns:a14="http://schemas.microsoft.com/office/drawing/2010/main">
+                <a14:hiddenFill xmlns:a14="http://schemas.microsoft.com/office/drawing/2010/main" xmlns="">
                   <a:solidFill>
                     <a:schemeClr val="accent1"/>
                   </a:solidFill>
                 </a14:hiddenFill>
               </a:ext>
               <a:ext uri="{91240B29-F687-4f45-9708-019B960494DF}">
-                <a14:hiddenLine xmlns="" xmlns:a14="http://schemas.microsoft.com/office/drawing/2010/main" w="9525">
+                <a14:hiddenLine xmlns:a14="http://schemas.microsoft.com/office/drawing/2010/main" xmlns="" w="9525">
                   <a:solidFill>
                     <a:schemeClr val="tx1"/>
                   </a:solidFill>
@@ -30334,7 +30334,7 @@
                 </a14:hiddenLine>
               </a:ext>
               <a:ext uri="{AF507438-7753-43e0-B8FC-AC1667EBCBE1}">
-                <a14:hiddenEffects xmlns="" xmlns:a14="http://schemas.microsoft.com/office/drawing/2010/main">
+                <a14:hiddenEffects xmlns:a14="http://schemas.microsoft.com/office/drawing/2010/main" xmlns="">
                   <a:effectLst>
                     <a:outerShdw blurRad="63500" dist="38099" dir="2700000" algn="ctr" rotWithShape="0">
                       <a:schemeClr val="bg2">
@@ -30424,7 +30424,7 @@
             <a:effectLst/>
             <a:extLst>
               <a:ext uri="{AF507438-7753-43e0-B8FC-AC1667EBCBE1}">
-                <a14:hiddenEffects xmlns="" xmlns:a14="http://schemas.microsoft.com/office/drawing/2010/main">
+                <a14:hiddenEffects xmlns:a14="http://schemas.microsoft.com/office/drawing/2010/main" xmlns="">
                   <a:effectLst>
                     <a:outerShdw blurRad="63500" dist="38099" dir="2700000" algn="ctr" rotWithShape="0">
                       <a:schemeClr val="bg2">
@@ -30476,14 +30476,14 @@
             <a:effectLst/>
             <a:extLst>
               <a:ext uri="{909E8E84-426E-40dd-AFC4-6F175D3DCCD1}">
-                <a14:hiddenFill xmlns="" xmlns:a14="http://schemas.microsoft.com/office/drawing/2010/main">
+                <a14:hiddenFill xmlns:a14="http://schemas.microsoft.com/office/drawing/2010/main" xmlns="">
                   <a:solidFill>
                     <a:schemeClr val="accent1"/>
                   </a:solidFill>
                 </a14:hiddenFill>
               </a:ext>
               <a:ext uri="{91240B29-F687-4f45-9708-019B960494DF}">
-                <a14:hiddenLine xmlns="" xmlns:a14="http://schemas.microsoft.com/office/drawing/2010/main" w="9525">
+                <a14:hiddenLine xmlns:a14="http://schemas.microsoft.com/office/drawing/2010/main" xmlns="" w="9525">
                   <a:solidFill>
                     <a:schemeClr val="tx1"/>
                   </a:solidFill>
@@ -30493,7 +30493,7 @@
                 </a14:hiddenLine>
               </a:ext>
               <a:ext uri="{AF507438-7753-43e0-B8FC-AC1667EBCBE1}">
-                <a14:hiddenEffects xmlns="" xmlns:a14="http://schemas.microsoft.com/office/drawing/2010/main">
+                <a14:hiddenEffects xmlns:a14="http://schemas.microsoft.com/office/drawing/2010/main" xmlns="">
                   <a:effectLst>
                     <a:outerShdw blurRad="63500" dist="38099" dir="2700000" algn="ctr" rotWithShape="0">
                       <a:schemeClr val="bg2">
@@ -30583,7 +30583,7 @@
             <a:effectLst/>
             <a:extLst>
               <a:ext uri="{AF507438-7753-43e0-B8FC-AC1667EBCBE1}">
-                <a14:hiddenEffects xmlns="" xmlns:a14="http://schemas.microsoft.com/office/drawing/2010/main">
+                <a14:hiddenEffects xmlns:a14="http://schemas.microsoft.com/office/drawing/2010/main" xmlns="">
                   <a:effectLst>
                     <a:outerShdw blurRad="63500" dist="38099" dir="2700000" algn="ctr" rotWithShape="0">
                       <a:schemeClr val="bg2">
@@ -30635,14 +30635,14 @@
             <a:effectLst/>
             <a:extLst>
               <a:ext uri="{909E8E84-426E-40dd-AFC4-6F175D3DCCD1}">
-                <a14:hiddenFill xmlns="" xmlns:a14="http://schemas.microsoft.com/office/drawing/2010/main">
+                <a14:hiddenFill xmlns:a14="http://schemas.microsoft.com/office/drawing/2010/main" xmlns="">
                   <a:solidFill>
                     <a:schemeClr val="accent1"/>
                   </a:solidFill>
                 </a14:hiddenFill>
               </a:ext>
               <a:ext uri="{91240B29-F687-4f45-9708-019B960494DF}">
-                <a14:hiddenLine xmlns="" xmlns:a14="http://schemas.microsoft.com/office/drawing/2010/main" w="9525">
+                <a14:hiddenLine xmlns:a14="http://schemas.microsoft.com/office/drawing/2010/main" xmlns="" w="9525">
                   <a:solidFill>
                     <a:schemeClr val="tx1"/>
                   </a:solidFill>
@@ -30652,7 +30652,7 @@
                 </a14:hiddenLine>
               </a:ext>
               <a:ext uri="{AF507438-7753-43e0-B8FC-AC1667EBCBE1}">
-                <a14:hiddenEffects xmlns="" xmlns:a14="http://schemas.microsoft.com/office/drawing/2010/main">
+                <a14:hiddenEffects xmlns:a14="http://schemas.microsoft.com/office/drawing/2010/main" xmlns="">
                   <a:effectLst>
                     <a:outerShdw blurRad="63500" dist="38099" dir="2700000" algn="ctr" rotWithShape="0">
                       <a:schemeClr val="bg2">
@@ -30881,7 +30881,7 @@
             <a:effectLst/>
             <a:extLst>
               <a:ext uri="{AF507438-7753-43e0-B8FC-AC1667EBCBE1}">
-                <a14:hiddenEffects xmlns="" xmlns:a14="http://schemas.microsoft.com/office/drawing/2010/main">
+                <a14:hiddenEffects xmlns:a14="http://schemas.microsoft.com/office/drawing/2010/main" xmlns="">
                   <a:effectLst>
                     <a:outerShdw blurRad="63500" dist="38099" dir="2700000" algn="ctr" rotWithShape="0">
                       <a:schemeClr val="bg2">
@@ -30933,14 +30933,14 @@
             <a:effectLst/>
             <a:extLst>
               <a:ext uri="{909E8E84-426E-40dd-AFC4-6F175D3DCCD1}">
-                <a14:hiddenFill xmlns="" xmlns:a14="http://schemas.microsoft.com/office/drawing/2010/main">
+                <a14:hiddenFill xmlns:a14="http://schemas.microsoft.com/office/drawing/2010/main" xmlns="">
                   <a:solidFill>
                     <a:schemeClr val="accent1"/>
                   </a:solidFill>
                 </a14:hiddenFill>
               </a:ext>
               <a:ext uri="{91240B29-F687-4f45-9708-019B960494DF}">
-                <a14:hiddenLine xmlns="" xmlns:a14="http://schemas.microsoft.com/office/drawing/2010/main" w="9525">
+                <a14:hiddenLine xmlns:a14="http://schemas.microsoft.com/office/drawing/2010/main" xmlns="" w="9525">
                   <a:solidFill>
                     <a:schemeClr val="tx1"/>
                   </a:solidFill>
@@ -30950,7 +30950,7 @@
                 </a14:hiddenLine>
               </a:ext>
               <a:ext uri="{AF507438-7753-43e0-B8FC-AC1667EBCBE1}">
-                <a14:hiddenEffects xmlns="" xmlns:a14="http://schemas.microsoft.com/office/drawing/2010/main">
+                <a14:hiddenEffects xmlns:a14="http://schemas.microsoft.com/office/drawing/2010/main" xmlns="">
                   <a:effectLst>
                     <a:outerShdw blurRad="63500" dist="38099" dir="2700000" algn="ctr" rotWithShape="0">
                       <a:schemeClr val="bg2">
@@ -31040,7 +31040,7 @@
             <a:effectLst/>
             <a:extLst>
               <a:ext uri="{AF507438-7753-43e0-B8FC-AC1667EBCBE1}">
-                <a14:hiddenEffects xmlns="" xmlns:a14="http://schemas.microsoft.com/office/drawing/2010/main">
+                <a14:hiddenEffects xmlns:a14="http://schemas.microsoft.com/office/drawing/2010/main" xmlns="">
                   <a:effectLst>
                     <a:outerShdw blurRad="63500" dist="38099" dir="2700000" algn="ctr" rotWithShape="0">
                       <a:schemeClr val="bg2">
@@ -31092,14 +31092,14 @@
             <a:effectLst/>
             <a:extLst>
               <a:ext uri="{909E8E84-426E-40dd-AFC4-6F175D3DCCD1}">
-                <a14:hiddenFill xmlns="" xmlns:a14="http://schemas.microsoft.com/office/drawing/2010/main">
+                <a14:hiddenFill xmlns:a14="http://schemas.microsoft.com/office/drawing/2010/main" xmlns="">
                   <a:solidFill>
                     <a:schemeClr val="accent1"/>
                   </a:solidFill>
                 </a14:hiddenFill>
               </a:ext>
               <a:ext uri="{91240B29-F687-4f45-9708-019B960494DF}">
-                <a14:hiddenLine xmlns="" xmlns:a14="http://schemas.microsoft.com/office/drawing/2010/main" w="9525">
+                <a14:hiddenLine xmlns:a14="http://schemas.microsoft.com/office/drawing/2010/main" xmlns="" w="9525">
                   <a:solidFill>
                     <a:schemeClr val="tx1"/>
                   </a:solidFill>
@@ -31109,7 +31109,7 @@
                 </a14:hiddenLine>
               </a:ext>
               <a:ext uri="{AF507438-7753-43e0-B8FC-AC1667EBCBE1}">
-                <a14:hiddenEffects xmlns="" xmlns:a14="http://schemas.microsoft.com/office/drawing/2010/main">
+                <a14:hiddenEffects xmlns:a14="http://schemas.microsoft.com/office/drawing/2010/main" xmlns="">
                   <a:effectLst>
                     <a:outerShdw blurRad="63500" dist="38099" dir="2700000" algn="ctr" rotWithShape="0">
                       <a:schemeClr val="bg2">
@@ -31199,7 +31199,7 @@
             <a:effectLst/>
             <a:extLst>
               <a:ext uri="{AF507438-7753-43e0-B8FC-AC1667EBCBE1}">
-                <a14:hiddenEffects xmlns="" xmlns:a14="http://schemas.microsoft.com/office/drawing/2010/main">
+                <a14:hiddenEffects xmlns:a14="http://schemas.microsoft.com/office/drawing/2010/main" xmlns="">
                   <a:effectLst>
                     <a:outerShdw blurRad="63500" dist="38099" dir="2700000" algn="ctr" rotWithShape="0">
                       <a:schemeClr val="bg2">
@@ -31251,14 +31251,14 @@
             <a:effectLst/>
             <a:extLst>
               <a:ext uri="{909E8E84-426E-40dd-AFC4-6F175D3DCCD1}">
-                <a14:hiddenFill xmlns="" xmlns:a14="http://schemas.microsoft.com/office/drawing/2010/main">
+                <a14:hiddenFill xmlns:a14="http://schemas.microsoft.com/office/drawing/2010/main" xmlns="">
                   <a:solidFill>
                     <a:schemeClr val="accent1"/>
                   </a:solidFill>
                 </a14:hiddenFill>
               </a:ext>
               <a:ext uri="{91240B29-F687-4f45-9708-019B960494DF}">
-                <a14:hiddenLine xmlns="" xmlns:a14="http://schemas.microsoft.com/office/drawing/2010/main" w="9525">
+                <a14:hiddenLine xmlns:a14="http://schemas.microsoft.com/office/drawing/2010/main" xmlns="" w="9525">
                   <a:solidFill>
                     <a:schemeClr val="tx1"/>
                   </a:solidFill>
@@ -31268,7 +31268,7 @@
                 </a14:hiddenLine>
               </a:ext>
               <a:ext uri="{AF507438-7753-43e0-B8FC-AC1667EBCBE1}">
-                <a14:hiddenEffects xmlns="" xmlns:a14="http://schemas.microsoft.com/office/drawing/2010/main">
+                <a14:hiddenEffects xmlns:a14="http://schemas.microsoft.com/office/drawing/2010/main" xmlns="">
                   <a:effectLst>
                     <a:outerShdw blurRad="63500" dist="38099" dir="2700000" algn="ctr" rotWithShape="0">
                       <a:schemeClr val="bg2">
@@ -31543,7 +31543,7 @@
             <a:effectLst/>
             <a:extLst>
               <a:ext uri="{AF507438-7753-43e0-B8FC-AC1667EBCBE1}">
-                <a14:hiddenEffects xmlns="" xmlns:a14="http://schemas.microsoft.com/office/drawing/2010/main">
+                <a14:hiddenEffects xmlns:a14="http://schemas.microsoft.com/office/drawing/2010/main" xmlns="">
                   <a:effectLst>
                     <a:outerShdw blurRad="63500" dist="38099" dir="2700000" algn="ctr" rotWithShape="0">
                       <a:schemeClr val="bg2">
@@ -31595,14 +31595,14 @@
             <a:effectLst/>
             <a:extLst>
               <a:ext uri="{909E8E84-426E-40dd-AFC4-6F175D3DCCD1}">
-                <a14:hiddenFill xmlns="" xmlns:a14="http://schemas.microsoft.com/office/drawing/2010/main">
+                <a14:hiddenFill xmlns:a14="http://schemas.microsoft.com/office/drawing/2010/main" xmlns="">
                   <a:solidFill>
                     <a:schemeClr val="accent1"/>
                   </a:solidFill>
                 </a14:hiddenFill>
               </a:ext>
               <a:ext uri="{91240B29-F687-4f45-9708-019B960494DF}">
-                <a14:hiddenLine xmlns="" xmlns:a14="http://schemas.microsoft.com/office/drawing/2010/main" w="9525">
+                <a14:hiddenLine xmlns:a14="http://schemas.microsoft.com/office/drawing/2010/main" xmlns="" w="9525">
                   <a:solidFill>
                     <a:schemeClr val="tx1"/>
                   </a:solidFill>
@@ -31612,7 +31612,7 @@
                 </a14:hiddenLine>
               </a:ext>
               <a:ext uri="{AF507438-7753-43e0-B8FC-AC1667EBCBE1}">
-                <a14:hiddenEffects xmlns="" xmlns:a14="http://schemas.microsoft.com/office/drawing/2010/main">
+                <a14:hiddenEffects xmlns:a14="http://schemas.microsoft.com/office/drawing/2010/main" xmlns="">
                   <a:effectLst>
                     <a:outerShdw blurRad="63500" dist="38099" dir="2700000" algn="ctr" rotWithShape="0">
                       <a:schemeClr val="bg2">
@@ -31702,7 +31702,7 @@
             <a:effectLst/>
             <a:extLst>
               <a:ext uri="{AF507438-7753-43e0-B8FC-AC1667EBCBE1}">
-                <a14:hiddenEffects xmlns="" xmlns:a14="http://schemas.microsoft.com/office/drawing/2010/main">
+                <a14:hiddenEffects xmlns:a14="http://schemas.microsoft.com/office/drawing/2010/main" xmlns="">
                   <a:effectLst>
                     <a:outerShdw blurRad="63500" dist="38099" dir="2700000" algn="ctr" rotWithShape="0">
                       <a:schemeClr val="bg2">
@@ -31754,14 +31754,14 @@
             <a:effectLst/>
             <a:extLst>
               <a:ext uri="{909E8E84-426E-40dd-AFC4-6F175D3DCCD1}">
-                <a14:hiddenFill xmlns="" xmlns:a14="http://schemas.microsoft.com/office/drawing/2010/main">
+                <a14:hiddenFill xmlns:a14="http://schemas.microsoft.com/office/drawing/2010/main" xmlns="">
                   <a:solidFill>
                     <a:schemeClr val="accent1"/>
                   </a:solidFill>
                 </a14:hiddenFill>
               </a:ext>
               <a:ext uri="{91240B29-F687-4f45-9708-019B960494DF}">
-                <a14:hiddenLine xmlns="" xmlns:a14="http://schemas.microsoft.com/office/drawing/2010/main" w="9525">
+                <a14:hiddenLine xmlns:a14="http://schemas.microsoft.com/office/drawing/2010/main" xmlns="" w="9525">
                   <a:solidFill>
                     <a:schemeClr val="tx1"/>
                   </a:solidFill>
@@ -31771,7 +31771,7 @@
                 </a14:hiddenLine>
               </a:ext>
               <a:ext uri="{AF507438-7753-43e0-B8FC-AC1667EBCBE1}">
-                <a14:hiddenEffects xmlns="" xmlns:a14="http://schemas.microsoft.com/office/drawing/2010/main">
+                <a14:hiddenEffects xmlns:a14="http://schemas.microsoft.com/office/drawing/2010/main" xmlns="">
                   <a:effectLst>
                     <a:outerShdw blurRad="63500" dist="38099" dir="2700000" algn="ctr" rotWithShape="0">
                       <a:schemeClr val="bg2">
@@ -31861,7 +31861,7 @@
             <a:effectLst/>
             <a:extLst>
               <a:ext uri="{AF507438-7753-43e0-B8FC-AC1667EBCBE1}">
-                <a14:hiddenEffects xmlns="" xmlns:a14="http://schemas.microsoft.com/office/drawing/2010/main">
+                <a14:hiddenEffects xmlns:a14="http://schemas.microsoft.com/office/drawing/2010/main" xmlns="">
                   <a:effectLst>
                     <a:outerShdw blurRad="63500" dist="38099" dir="2700000" algn="ctr" rotWithShape="0">
                       <a:schemeClr val="bg2">
@@ -31913,14 +31913,14 @@
             <a:effectLst/>
             <a:extLst>
               <a:ext uri="{909E8E84-426E-40dd-AFC4-6F175D3DCCD1}">
-                <a14:hiddenFill xmlns="" xmlns:a14="http://schemas.microsoft.com/office/drawing/2010/main">
+                <a14:hiddenFill xmlns:a14="http://schemas.microsoft.com/office/drawing/2010/main" xmlns="">
                   <a:solidFill>
                     <a:schemeClr val="accent1"/>
                   </a:solidFill>
                 </a14:hiddenFill>
               </a:ext>
               <a:ext uri="{91240B29-F687-4f45-9708-019B960494DF}">
-                <a14:hiddenLine xmlns="" xmlns:a14="http://schemas.microsoft.com/office/drawing/2010/main" w="9525">
+                <a14:hiddenLine xmlns:a14="http://schemas.microsoft.com/office/drawing/2010/main" xmlns="" w="9525">
                   <a:solidFill>
                     <a:schemeClr val="tx1"/>
                   </a:solidFill>
@@ -31930,7 +31930,7 @@
                 </a14:hiddenLine>
               </a:ext>
               <a:ext uri="{AF507438-7753-43e0-B8FC-AC1667EBCBE1}">
-                <a14:hiddenEffects xmlns="" xmlns:a14="http://schemas.microsoft.com/office/drawing/2010/main">
+                <a14:hiddenEffects xmlns:a14="http://schemas.microsoft.com/office/drawing/2010/main" xmlns="">
                   <a:effectLst>
                     <a:outerShdw blurRad="63500" dist="38099" dir="2700000" algn="ctr" rotWithShape="0">
                       <a:schemeClr val="bg2">
@@ -32437,7 +32437,7 @@
             <a:effectLst/>
             <a:extLst>
               <a:ext uri="{AF507438-7753-43e0-B8FC-AC1667EBCBE1}">
-                <a14:hiddenEffects xmlns="" xmlns:a14="http://schemas.microsoft.com/office/drawing/2010/main">
+                <a14:hiddenEffects xmlns:a14="http://schemas.microsoft.com/office/drawing/2010/main" xmlns="">
                   <a:effectLst>
                     <a:outerShdw blurRad="63500" dist="38099" dir="2700000" algn="ctr" rotWithShape="0">
                       <a:schemeClr val="bg2">
@@ -32489,14 +32489,14 @@
             <a:effectLst/>
             <a:extLst>
               <a:ext uri="{909E8E84-426E-40dd-AFC4-6F175D3DCCD1}">
-                <a14:hiddenFill xmlns="" xmlns:a14="http://schemas.microsoft.com/office/drawing/2010/main">
+                <a14:hiddenFill xmlns:a14="http://schemas.microsoft.com/office/drawing/2010/main" xmlns="">
                   <a:solidFill>
                     <a:schemeClr val="accent1"/>
                   </a:solidFill>
                 </a14:hiddenFill>
               </a:ext>
               <a:ext uri="{91240B29-F687-4f45-9708-019B960494DF}">
-                <a14:hiddenLine xmlns="" xmlns:a14="http://schemas.microsoft.com/office/drawing/2010/main" w="9525">
+                <a14:hiddenLine xmlns:a14="http://schemas.microsoft.com/office/drawing/2010/main" xmlns="" w="9525">
                   <a:solidFill>
                     <a:schemeClr val="tx1"/>
                   </a:solidFill>
@@ -32506,7 +32506,7 @@
                 </a14:hiddenLine>
               </a:ext>
               <a:ext uri="{AF507438-7753-43e0-B8FC-AC1667EBCBE1}">
-                <a14:hiddenEffects xmlns="" xmlns:a14="http://schemas.microsoft.com/office/drawing/2010/main">
+                <a14:hiddenEffects xmlns:a14="http://schemas.microsoft.com/office/drawing/2010/main" xmlns="">
                   <a:effectLst>
                     <a:outerShdw blurRad="63500" dist="38099" dir="2700000" algn="ctr" rotWithShape="0">
                       <a:schemeClr val="bg2">
@@ -33786,7 +33786,7 @@
           <a:effectLst/>
           <a:extLst>
             <a:ext uri="{AF507438-7753-43e0-B8FC-AC1667EBCBE1}">
-              <a14:hiddenEffects xmlns="" xmlns:a14="http://schemas.microsoft.com/office/drawing/2010/main">
+              <a14:hiddenEffects xmlns:a14="http://schemas.microsoft.com/office/drawing/2010/main" xmlns="">
                 <a:effectLst>
                   <a:outerShdw blurRad="63500" dist="38099" dir="2700000" algn="ctr" rotWithShape="0">
                     <a:schemeClr val="bg2">
@@ -33840,12 +33840,12 @@
           <a:effectLst/>
           <a:extLst>
             <a:ext uri="{909E8E84-426E-40dd-AFC4-6F175D3DCCD1}">
-              <a14:hiddenFill xmlns="" xmlns:a14="http://schemas.microsoft.com/office/drawing/2010/main">
+              <a14:hiddenFill xmlns:a14="http://schemas.microsoft.com/office/drawing/2010/main" xmlns="">
                 <a:noFill/>
               </a14:hiddenFill>
             </a:ext>
             <a:ext uri="{AF507438-7753-43e0-B8FC-AC1667EBCBE1}">
-              <a14:hiddenEffects xmlns="" xmlns:a14="http://schemas.microsoft.com/office/drawing/2010/main">
+              <a14:hiddenEffects xmlns:a14="http://schemas.microsoft.com/office/drawing/2010/main" xmlns="">
                 <a:effectLst>
                   <a:outerShdw blurRad="63500" dist="38099" dir="2700000" algn="ctr" rotWithShape="0">
                     <a:schemeClr val="bg2">
@@ -33888,14 +33888,14 @@
           <a:effectLst/>
           <a:extLst>
             <a:ext uri="{909E8E84-426E-40dd-AFC4-6F175D3DCCD1}">
-              <a14:hiddenFill xmlns="" xmlns:a14="http://schemas.microsoft.com/office/drawing/2010/main">
+              <a14:hiddenFill xmlns:a14="http://schemas.microsoft.com/office/drawing/2010/main" xmlns="">
                 <a:solidFill>
                   <a:schemeClr val="accent1"/>
                 </a:solidFill>
               </a14:hiddenFill>
             </a:ext>
             <a:ext uri="{91240B29-F687-4f45-9708-019B960494DF}">
-              <a14:hiddenLine xmlns="" xmlns:a14="http://schemas.microsoft.com/office/drawing/2010/main" w="9525">
+              <a14:hiddenLine xmlns:a14="http://schemas.microsoft.com/office/drawing/2010/main" xmlns="" w="9525">
                 <a:solidFill>
                   <a:schemeClr val="tx1"/>
                 </a:solidFill>
@@ -33905,7 +33905,7 @@
               </a14:hiddenLine>
             </a:ext>
             <a:ext uri="{AF507438-7753-43e0-B8FC-AC1667EBCBE1}">
-              <a14:hiddenEffects xmlns="" xmlns:a14="http://schemas.microsoft.com/office/drawing/2010/main">
+              <a14:hiddenEffects xmlns:a14="http://schemas.microsoft.com/office/drawing/2010/main" xmlns="">
                 <a:effectLst>
                   <a:outerShdw blurRad="63500" dist="38099" dir="2700000" algn="ctr" rotWithShape="0">
                     <a:schemeClr val="bg2">
@@ -33955,14 +33955,14 @@
           <a:effectLst/>
           <a:extLst>
             <a:ext uri="{909E8E84-426E-40dd-AFC4-6F175D3DCCD1}">
-              <a14:hiddenFill xmlns="" xmlns:a14="http://schemas.microsoft.com/office/drawing/2010/main">
+              <a14:hiddenFill xmlns:a14="http://schemas.microsoft.com/office/drawing/2010/main" xmlns="">
                 <a:solidFill>
                   <a:schemeClr val="accent1"/>
                 </a:solidFill>
               </a14:hiddenFill>
             </a:ext>
             <a:ext uri="{91240B29-F687-4f45-9708-019B960494DF}">
-              <a14:hiddenLine xmlns="" xmlns:a14="http://schemas.microsoft.com/office/drawing/2010/main" w="9525">
+              <a14:hiddenLine xmlns:a14="http://schemas.microsoft.com/office/drawing/2010/main" xmlns="" w="9525">
                 <a:solidFill>
                   <a:schemeClr val="tx1"/>
                 </a:solidFill>
@@ -33972,7 +33972,7 @@
               </a14:hiddenLine>
             </a:ext>
             <a:ext uri="{AF507438-7753-43e0-B8FC-AC1667EBCBE1}">
-              <a14:hiddenEffects xmlns="" xmlns:a14="http://schemas.microsoft.com/office/drawing/2010/main">
+              <a14:hiddenEffects xmlns:a14="http://schemas.microsoft.com/office/drawing/2010/main" xmlns="">
                 <a:effectLst>
                   <a:outerShdw blurRad="63500" dist="38099" dir="2700000" algn="ctr" rotWithShape="0">
                     <a:schemeClr val="bg2">
@@ -34027,12 +34027,12 @@
           <a:effectLst/>
           <a:extLst>
             <a:ext uri="{909E8E84-426E-40dd-AFC4-6F175D3DCCD1}">
-              <a14:hiddenFill xmlns="" xmlns:a14="http://schemas.microsoft.com/office/drawing/2010/main">
+              <a14:hiddenFill xmlns:a14="http://schemas.microsoft.com/office/drawing/2010/main" xmlns="">
                 <a:noFill/>
               </a14:hiddenFill>
             </a:ext>
             <a:ext uri="{AF507438-7753-43e0-B8FC-AC1667EBCBE1}">
-              <a14:hiddenEffects xmlns="" xmlns:a14="http://schemas.microsoft.com/office/drawing/2010/main">
+              <a14:hiddenEffects xmlns:a14="http://schemas.microsoft.com/office/drawing/2010/main" xmlns="">
                 <a:effectLst>
                   <a:outerShdw blurRad="63500" dist="38099" dir="2700000" algn="ctr" rotWithShape="0">
                     <a:schemeClr val="bg2">
@@ -34075,14 +34075,14 @@
           <a:effectLst/>
           <a:extLst>
             <a:ext uri="{909E8E84-426E-40dd-AFC4-6F175D3DCCD1}">
-              <a14:hiddenFill xmlns="" xmlns:a14="http://schemas.microsoft.com/office/drawing/2010/main">
+              <a14:hiddenFill xmlns:a14="http://schemas.microsoft.com/office/drawing/2010/main" xmlns="">
                 <a:solidFill>
                   <a:schemeClr val="accent1"/>
                 </a:solidFill>
               </a14:hiddenFill>
             </a:ext>
             <a:ext uri="{91240B29-F687-4f45-9708-019B960494DF}">
-              <a14:hiddenLine xmlns="" xmlns:a14="http://schemas.microsoft.com/office/drawing/2010/main" w="9525">
+              <a14:hiddenLine xmlns:a14="http://schemas.microsoft.com/office/drawing/2010/main" xmlns="" w="9525">
                 <a:solidFill>
                   <a:schemeClr val="tx1"/>
                 </a:solidFill>
@@ -34092,7 +34092,7 @@
               </a14:hiddenLine>
             </a:ext>
             <a:ext uri="{AF507438-7753-43e0-B8FC-AC1667EBCBE1}">
-              <a14:hiddenEffects xmlns="" xmlns:a14="http://schemas.microsoft.com/office/drawing/2010/main">
+              <a14:hiddenEffects xmlns:a14="http://schemas.microsoft.com/office/drawing/2010/main" xmlns="">
                 <a:effectLst>
                   <a:outerShdw blurRad="63500" dist="38099" dir="2700000" algn="ctr" rotWithShape="0">
                     <a:schemeClr val="bg2">
@@ -34149,14 +34149,14 @@
           <a:effectLst/>
           <a:extLst>
             <a:ext uri="{909E8E84-426E-40dd-AFC4-6F175D3DCCD1}">
-              <a14:hiddenFill xmlns="" xmlns:a14="http://schemas.microsoft.com/office/drawing/2010/main">
+              <a14:hiddenFill xmlns:a14="http://schemas.microsoft.com/office/drawing/2010/main" xmlns="">
                 <a:solidFill>
                   <a:schemeClr val="accent1"/>
                 </a:solidFill>
               </a14:hiddenFill>
             </a:ext>
             <a:ext uri="{91240B29-F687-4f45-9708-019B960494DF}">
-              <a14:hiddenLine xmlns="" xmlns:a14="http://schemas.microsoft.com/office/drawing/2010/main" w="9525">
+              <a14:hiddenLine xmlns:a14="http://schemas.microsoft.com/office/drawing/2010/main" xmlns="" w="9525">
                 <a:solidFill>
                   <a:schemeClr val="tx1"/>
                 </a:solidFill>
@@ -34166,7 +34166,7 @@
               </a14:hiddenLine>
             </a:ext>
             <a:ext uri="{AF507438-7753-43e0-B8FC-AC1667EBCBE1}">
-              <a14:hiddenEffects xmlns="" xmlns:a14="http://schemas.microsoft.com/office/drawing/2010/main">
+              <a14:hiddenEffects xmlns:a14="http://schemas.microsoft.com/office/drawing/2010/main" xmlns="">
                 <a:effectLst>
                   <a:outerShdw blurRad="63500" dist="38099" dir="2700000" algn="ctr" rotWithShape="0">
                     <a:schemeClr val="bg2">
@@ -34933,7 +34933,7 @@
             <a:effectLst/>
             <a:extLst>
               <a:ext uri="{AF507438-7753-43e0-B8FC-AC1667EBCBE1}">
-                <a14:hiddenEffects xmlns="" xmlns:a14="http://schemas.microsoft.com/office/drawing/2010/main">
+                <a14:hiddenEffects xmlns:a14="http://schemas.microsoft.com/office/drawing/2010/main" xmlns="">
                   <a:effectLst>
                     <a:outerShdw blurRad="63500" dist="38099" dir="2700000" algn="ctr" rotWithShape="0">
                       <a:schemeClr val="bg2">
@@ -34992,7 +34992,7 @@
             <a:effectLst/>
             <a:extLst>
               <a:ext uri="{AF507438-7753-43e0-B8FC-AC1667EBCBE1}">
-                <a14:hiddenEffects xmlns="" xmlns:a14="http://schemas.microsoft.com/office/drawing/2010/main">
+                <a14:hiddenEffects xmlns:a14="http://schemas.microsoft.com/office/drawing/2010/main" xmlns="">
                   <a:effectLst>
                     <a:outerShdw blurRad="63500" dist="38099" dir="2700000" algn="ctr" rotWithShape="0">
                       <a:schemeClr val="bg2">
@@ -35048,7 +35048,7 @@
             <a:effectLst/>
             <a:extLst>
               <a:ext uri="{AF507438-7753-43e0-B8FC-AC1667EBCBE1}">
-                <a14:hiddenEffects xmlns="" xmlns:a14="http://schemas.microsoft.com/office/drawing/2010/main">
+                <a14:hiddenEffects xmlns:a14="http://schemas.microsoft.com/office/drawing/2010/main" xmlns="">
                   <a:effectLst>
                     <a:outerShdw blurRad="63500" dist="38099" dir="2700000" algn="ctr" rotWithShape="0">
                       <a:schemeClr val="bg2">
@@ -35104,12 +35104,12 @@
             <a:effectLst/>
             <a:extLst>
               <a:ext uri="{909E8E84-426E-40dd-AFC4-6F175D3DCCD1}">
-                <a14:hiddenFill xmlns="" xmlns:a14="http://schemas.microsoft.com/office/drawing/2010/main">
+                <a14:hiddenFill xmlns:a14="http://schemas.microsoft.com/office/drawing/2010/main" xmlns="">
                   <a:noFill/>
                 </a14:hiddenFill>
               </a:ext>
               <a:ext uri="{AF507438-7753-43e0-B8FC-AC1667EBCBE1}">
-                <a14:hiddenEffects xmlns="" xmlns:a14="http://schemas.microsoft.com/office/drawing/2010/main">
+                <a14:hiddenEffects xmlns:a14="http://schemas.microsoft.com/office/drawing/2010/main" xmlns="">
                   <a:effectLst>
                     <a:outerShdw blurRad="63500" dist="38099" dir="2700000" algn="ctr" rotWithShape="0">
                       <a:schemeClr val="bg2">
@@ -35152,14 +35152,14 @@
             <a:effectLst/>
             <a:extLst>
               <a:ext uri="{909E8E84-426E-40dd-AFC4-6F175D3DCCD1}">
-                <a14:hiddenFill xmlns="" xmlns:a14="http://schemas.microsoft.com/office/drawing/2010/main">
+                <a14:hiddenFill xmlns:a14="http://schemas.microsoft.com/office/drawing/2010/main" xmlns="">
                   <a:solidFill>
                     <a:schemeClr val="accent1"/>
                   </a:solidFill>
                 </a14:hiddenFill>
               </a:ext>
               <a:ext uri="{91240B29-F687-4f45-9708-019B960494DF}">
-                <a14:hiddenLine xmlns="" xmlns:a14="http://schemas.microsoft.com/office/drawing/2010/main" w="9525">
+                <a14:hiddenLine xmlns:a14="http://schemas.microsoft.com/office/drawing/2010/main" xmlns="" w="9525">
                   <a:solidFill>
                     <a:schemeClr val="tx1"/>
                   </a:solidFill>
@@ -35169,7 +35169,7 @@
                 </a14:hiddenLine>
               </a:ext>
               <a:ext uri="{AF507438-7753-43e0-B8FC-AC1667EBCBE1}">
-                <a14:hiddenEffects xmlns="" xmlns:a14="http://schemas.microsoft.com/office/drawing/2010/main">
+                <a14:hiddenEffects xmlns:a14="http://schemas.microsoft.com/office/drawing/2010/main" xmlns="">
                   <a:effectLst>
                     <a:outerShdw blurRad="63500" dist="38099" dir="2700000" algn="ctr" rotWithShape="0">
                       <a:schemeClr val="bg2">
@@ -35219,14 +35219,14 @@
             <a:effectLst/>
             <a:extLst>
               <a:ext uri="{909E8E84-426E-40dd-AFC4-6F175D3DCCD1}">
-                <a14:hiddenFill xmlns="" xmlns:a14="http://schemas.microsoft.com/office/drawing/2010/main">
+                <a14:hiddenFill xmlns:a14="http://schemas.microsoft.com/office/drawing/2010/main" xmlns="">
                   <a:solidFill>
                     <a:schemeClr val="accent1"/>
                   </a:solidFill>
                 </a14:hiddenFill>
               </a:ext>
               <a:ext uri="{91240B29-F687-4f45-9708-019B960494DF}">
-                <a14:hiddenLine xmlns="" xmlns:a14="http://schemas.microsoft.com/office/drawing/2010/main" w="9525">
+                <a14:hiddenLine xmlns:a14="http://schemas.microsoft.com/office/drawing/2010/main" xmlns="" w="9525">
                   <a:solidFill>
                     <a:schemeClr val="tx1"/>
                   </a:solidFill>
@@ -35236,7 +35236,7 @@
                 </a14:hiddenLine>
               </a:ext>
               <a:ext uri="{AF507438-7753-43e0-B8FC-AC1667EBCBE1}">
-                <a14:hiddenEffects xmlns="" xmlns:a14="http://schemas.microsoft.com/office/drawing/2010/main">
+                <a14:hiddenEffects xmlns:a14="http://schemas.microsoft.com/office/drawing/2010/main" xmlns="">
                   <a:effectLst>
                     <a:outerShdw blurRad="63500" dist="38099" dir="2700000" algn="ctr" rotWithShape="0">
                       <a:schemeClr val="bg2">
@@ -35291,12 +35291,12 @@
             <a:effectLst/>
             <a:extLst>
               <a:ext uri="{909E8E84-426E-40dd-AFC4-6F175D3DCCD1}">
-                <a14:hiddenFill xmlns="" xmlns:a14="http://schemas.microsoft.com/office/drawing/2010/main">
+                <a14:hiddenFill xmlns:a14="http://schemas.microsoft.com/office/drawing/2010/main" xmlns="">
                   <a:noFill/>
                 </a14:hiddenFill>
               </a:ext>
               <a:ext uri="{AF507438-7753-43e0-B8FC-AC1667EBCBE1}">
-                <a14:hiddenEffects xmlns="" xmlns:a14="http://schemas.microsoft.com/office/drawing/2010/main">
+                <a14:hiddenEffects xmlns:a14="http://schemas.microsoft.com/office/drawing/2010/main" xmlns="">
                   <a:effectLst>
                     <a:outerShdw blurRad="63500" dist="38099" dir="2700000" algn="ctr" rotWithShape="0">
                       <a:schemeClr val="bg2">
@@ -35344,12 +35344,12 @@
             <a:effectLst/>
             <a:extLst>
               <a:ext uri="{909E8E84-426E-40dd-AFC4-6F175D3DCCD1}">
-                <a14:hiddenFill xmlns="" xmlns:a14="http://schemas.microsoft.com/office/drawing/2010/main">
+                <a14:hiddenFill xmlns:a14="http://schemas.microsoft.com/office/drawing/2010/main" xmlns="">
                   <a:noFill/>
                 </a14:hiddenFill>
               </a:ext>
               <a:ext uri="{AF507438-7753-43e0-B8FC-AC1667EBCBE1}">
-                <a14:hiddenEffects xmlns="" xmlns:a14="http://schemas.microsoft.com/office/drawing/2010/main">
+                <a14:hiddenEffects xmlns:a14="http://schemas.microsoft.com/office/drawing/2010/main" xmlns="">
                   <a:effectLst>
                     <a:outerShdw blurRad="63500" dist="38099" dir="2700000" algn="ctr" rotWithShape="0">
                       <a:schemeClr val="bg2">
@@ -35397,12 +35397,12 @@
             <a:effectLst/>
             <a:extLst>
               <a:ext uri="{909E8E84-426E-40dd-AFC4-6F175D3DCCD1}">
-                <a14:hiddenFill xmlns="" xmlns:a14="http://schemas.microsoft.com/office/drawing/2010/main">
+                <a14:hiddenFill xmlns:a14="http://schemas.microsoft.com/office/drawing/2010/main" xmlns="">
                   <a:noFill/>
                 </a14:hiddenFill>
               </a:ext>
               <a:ext uri="{AF507438-7753-43e0-B8FC-AC1667EBCBE1}">
-                <a14:hiddenEffects xmlns="" xmlns:a14="http://schemas.microsoft.com/office/drawing/2010/main">
+                <a14:hiddenEffects xmlns:a14="http://schemas.microsoft.com/office/drawing/2010/main" xmlns="">
                   <a:effectLst>
                     <a:outerShdw blurRad="63500" dist="38099" dir="2700000" algn="ctr" rotWithShape="0">
                       <a:schemeClr val="bg2">
@@ -35450,12 +35450,12 @@
             <a:effectLst/>
             <a:extLst>
               <a:ext uri="{909E8E84-426E-40dd-AFC4-6F175D3DCCD1}">
-                <a14:hiddenFill xmlns="" xmlns:a14="http://schemas.microsoft.com/office/drawing/2010/main">
+                <a14:hiddenFill xmlns:a14="http://schemas.microsoft.com/office/drawing/2010/main" xmlns="">
                   <a:noFill/>
                 </a14:hiddenFill>
               </a:ext>
               <a:ext uri="{AF507438-7753-43e0-B8FC-AC1667EBCBE1}">
-                <a14:hiddenEffects xmlns="" xmlns:a14="http://schemas.microsoft.com/office/drawing/2010/main">
+                <a14:hiddenEffects xmlns:a14="http://schemas.microsoft.com/office/drawing/2010/main" xmlns="">
                   <a:effectLst>
                     <a:outerShdw blurRad="63500" dist="38099" dir="2700000" algn="ctr" rotWithShape="0">
                       <a:schemeClr val="bg2">
@@ -35503,12 +35503,12 @@
             <a:effectLst/>
             <a:extLst>
               <a:ext uri="{909E8E84-426E-40dd-AFC4-6F175D3DCCD1}">
-                <a14:hiddenFill xmlns="" xmlns:a14="http://schemas.microsoft.com/office/drawing/2010/main">
+                <a14:hiddenFill xmlns:a14="http://schemas.microsoft.com/office/drawing/2010/main" xmlns="">
                   <a:noFill/>
                 </a14:hiddenFill>
               </a:ext>
               <a:ext uri="{AF507438-7753-43e0-B8FC-AC1667EBCBE1}">
-                <a14:hiddenEffects xmlns="" xmlns:a14="http://schemas.microsoft.com/office/drawing/2010/main">
+                <a14:hiddenEffects xmlns:a14="http://schemas.microsoft.com/office/drawing/2010/main" xmlns="">
                   <a:effectLst>
                     <a:outerShdw blurRad="63500" dist="38099" dir="2700000" algn="ctr" rotWithShape="0">
                       <a:schemeClr val="bg2">
@@ -35551,14 +35551,14 @@
             <a:effectLst/>
             <a:extLst>
               <a:ext uri="{909E8E84-426E-40dd-AFC4-6F175D3DCCD1}">
-                <a14:hiddenFill xmlns="" xmlns:a14="http://schemas.microsoft.com/office/drawing/2010/main">
+                <a14:hiddenFill xmlns:a14="http://schemas.microsoft.com/office/drawing/2010/main" xmlns="">
                   <a:solidFill>
                     <a:schemeClr val="accent1"/>
                   </a:solidFill>
                 </a14:hiddenFill>
               </a:ext>
               <a:ext uri="{91240B29-F687-4f45-9708-019B960494DF}">
-                <a14:hiddenLine xmlns="" xmlns:a14="http://schemas.microsoft.com/office/drawing/2010/main" w="9525">
+                <a14:hiddenLine xmlns:a14="http://schemas.microsoft.com/office/drawing/2010/main" xmlns="" w="9525">
                   <a:solidFill>
                     <a:schemeClr val="tx1"/>
                   </a:solidFill>
@@ -35568,7 +35568,7 @@
                 </a14:hiddenLine>
               </a:ext>
               <a:ext uri="{AF507438-7753-43e0-B8FC-AC1667EBCBE1}">
-                <a14:hiddenEffects xmlns="" xmlns:a14="http://schemas.microsoft.com/office/drawing/2010/main">
+                <a14:hiddenEffects xmlns:a14="http://schemas.microsoft.com/office/drawing/2010/main" xmlns="">
                   <a:effectLst>
                     <a:outerShdw blurRad="63500" dist="38099" dir="2700000" algn="ctr" rotWithShape="0">
                       <a:schemeClr val="bg2">
@@ -35616,14 +35616,14 @@
             <a:effectLst/>
             <a:extLst>
               <a:ext uri="{909E8E84-426E-40dd-AFC4-6F175D3DCCD1}">
-                <a14:hiddenFill xmlns="" xmlns:a14="http://schemas.microsoft.com/office/drawing/2010/main">
+                <a14:hiddenFill xmlns:a14="http://schemas.microsoft.com/office/drawing/2010/main" xmlns="">
                   <a:solidFill>
                     <a:schemeClr val="accent1"/>
                   </a:solidFill>
                 </a14:hiddenFill>
               </a:ext>
               <a:ext uri="{91240B29-F687-4f45-9708-019B960494DF}">
-                <a14:hiddenLine xmlns="" xmlns:a14="http://schemas.microsoft.com/office/drawing/2010/main" w="9525">
+                <a14:hiddenLine xmlns:a14="http://schemas.microsoft.com/office/drawing/2010/main" xmlns="" w="9525">
                   <a:solidFill>
                     <a:schemeClr val="tx1"/>
                   </a:solidFill>
@@ -35633,7 +35633,7 @@
                 </a14:hiddenLine>
               </a:ext>
               <a:ext uri="{AF507438-7753-43e0-B8FC-AC1667EBCBE1}">
-                <a14:hiddenEffects xmlns="" xmlns:a14="http://schemas.microsoft.com/office/drawing/2010/main">
+                <a14:hiddenEffects xmlns:a14="http://schemas.microsoft.com/office/drawing/2010/main" xmlns="">
                   <a:effectLst>
                     <a:outerShdw blurRad="63500" dist="38099" dir="2700000" algn="ctr" rotWithShape="0">
                       <a:schemeClr val="bg2">
@@ -35681,14 +35681,14 @@
             <a:effectLst/>
             <a:extLst>
               <a:ext uri="{909E8E84-426E-40dd-AFC4-6F175D3DCCD1}">
-                <a14:hiddenFill xmlns="" xmlns:a14="http://schemas.microsoft.com/office/drawing/2010/main">
+                <a14:hiddenFill xmlns:a14="http://schemas.microsoft.com/office/drawing/2010/main" xmlns="">
                   <a:solidFill>
                     <a:schemeClr val="accent1"/>
                   </a:solidFill>
                 </a14:hiddenFill>
               </a:ext>
               <a:ext uri="{91240B29-F687-4f45-9708-019B960494DF}">
-                <a14:hiddenLine xmlns="" xmlns:a14="http://schemas.microsoft.com/office/drawing/2010/main" w="9525">
+                <a14:hiddenLine xmlns:a14="http://schemas.microsoft.com/office/drawing/2010/main" xmlns="" w="9525">
                   <a:solidFill>
                     <a:schemeClr val="tx1"/>
                   </a:solidFill>
@@ -35698,7 +35698,7 @@
                 </a14:hiddenLine>
               </a:ext>
               <a:ext uri="{AF507438-7753-43e0-B8FC-AC1667EBCBE1}">
-                <a14:hiddenEffects xmlns="" xmlns:a14="http://schemas.microsoft.com/office/drawing/2010/main">
+                <a14:hiddenEffects xmlns:a14="http://schemas.microsoft.com/office/drawing/2010/main" xmlns="">
                   <a:effectLst>
                     <a:outerShdw blurRad="63500" dist="38099" dir="2700000" algn="ctr" rotWithShape="0">
                       <a:schemeClr val="bg2">
@@ -35746,14 +35746,14 @@
             <a:effectLst/>
             <a:extLst>
               <a:ext uri="{909E8E84-426E-40dd-AFC4-6F175D3DCCD1}">
-                <a14:hiddenFill xmlns="" xmlns:a14="http://schemas.microsoft.com/office/drawing/2010/main">
+                <a14:hiddenFill xmlns:a14="http://schemas.microsoft.com/office/drawing/2010/main" xmlns="">
                   <a:solidFill>
                     <a:schemeClr val="accent1"/>
                   </a:solidFill>
                 </a14:hiddenFill>
               </a:ext>
               <a:ext uri="{91240B29-F687-4f45-9708-019B960494DF}">
-                <a14:hiddenLine xmlns="" xmlns:a14="http://schemas.microsoft.com/office/drawing/2010/main" w="9525">
+                <a14:hiddenLine xmlns:a14="http://schemas.microsoft.com/office/drawing/2010/main" xmlns="" w="9525">
                   <a:solidFill>
                     <a:schemeClr val="tx1"/>
                   </a:solidFill>
@@ -35763,7 +35763,7 @@
                 </a14:hiddenLine>
               </a:ext>
               <a:ext uri="{AF507438-7753-43e0-B8FC-AC1667EBCBE1}">
-                <a14:hiddenEffects xmlns="" xmlns:a14="http://schemas.microsoft.com/office/drawing/2010/main">
+                <a14:hiddenEffects xmlns:a14="http://schemas.microsoft.com/office/drawing/2010/main" xmlns="">
                   <a:effectLst>
                     <a:outerShdw blurRad="63500" dist="38099" dir="2700000" algn="ctr" rotWithShape="0">
                       <a:schemeClr val="bg2">
@@ -35811,14 +35811,14 @@
             <a:effectLst/>
             <a:extLst>
               <a:ext uri="{909E8E84-426E-40dd-AFC4-6F175D3DCCD1}">
-                <a14:hiddenFill xmlns="" xmlns:a14="http://schemas.microsoft.com/office/drawing/2010/main">
+                <a14:hiddenFill xmlns:a14="http://schemas.microsoft.com/office/drawing/2010/main" xmlns="">
                   <a:solidFill>
                     <a:schemeClr val="accent1"/>
                   </a:solidFill>
                 </a14:hiddenFill>
               </a:ext>
               <a:ext uri="{91240B29-F687-4f45-9708-019B960494DF}">
-                <a14:hiddenLine xmlns="" xmlns:a14="http://schemas.microsoft.com/office/drawing/2010/main" w="9525">
+                <a14:hiddenLine xmlns:a14="http://schemas.microsoft.com/office/drawing/2010/main" xmlns="" w="9525">
                   <a:solidFill>
                     <a:schemeClr val="tx1"/>
                   </a:solidFill>
@@ -35828,7 +35828,7 @@
                 </a14:hiddenLine>
               </a:ext>
               <a:ext uri="{AF507438-7753-43e0-B8FC-AC1667EBCBE1}">
-                <a14:hiddenEffects xmlns="" xmlns:a14="http://schemas.microsoft.com/office/drawing/2010/main">
+                <a14:hiddenEffects xmlns:a14="http://schemas.microsoft.com/office/drawing/2010/main" xmlns="">
                   <a:effectLst>
                     <a:outerShdw blurRad="63500" dist="38099" dir="2700000" algn="ctr" rotWithShape="0">
                       <a:schemeClr val="bg2">
@@ -35953,7 +35953,7 @@
           <a:effectLst/>
           <a:extLst>
             <a:ext uri="{AF507438-7753-43e0-B8FC-AC1667EBCBE1}">
-              <a14:hiddenEffects xmlns="" xmlns:a14="http://schemas.microsoft.com/office/drawing/2010/main">
+              <a14:hiddenEffects xmlns:a14="http://schemas.microsoft.com/office/drawing/2010/main" xmlns="">
                 <a:effectLst>
                   <a:outerShdw blurRad="63500" dist="38099" dir="2700000" algn="ctr" rotWithShape="0">
                     <a:schemeClr val="bg2">
@@ -36007,12 +36007,12 @@
           <a:effectLst/>
           <a:extLst>
             <a:ext uri="{909E8E84-426E-40dd-AFC4-6F175D3DCCD1}">
-              <a14:hiddenFill xmlns="" xmlns:a14="http://schemas.microsoft.com/office/drawing/2010/main">
+              <a14:hiddenFill xmlns:a14="http://schemas.microsoft.com/office/drawing/2010/main" xmlns="">
                 <a:noFill/>
               </a14:hiddenFill>
             </a:ext>
             <a:ext uri="{AF507438-7753-43e0-B8FC-AC1667EBCBE1}">
-              <a14:hiddenEffects xmlns="" xmlns:a14="http://schemas.microsoft.com/office/drawing/2010/main">
+              <a14:hiddenEffects xmlns:a14="http://schemas.microsoft.com/office/drawing/2010/main" xmlns="">
                 <a:effectLst>
                   <a:outerShdw blurRad="63500" dist="38099" dir="2700000" algn="ctr" rotWithShape="0">
                     <a:schemeClr val="bg2">
@@ -36055,14 +36055,14 @@
           <a:effectLst/>
           <a:extLst>
             <a:ext uri="{909E8E84-426E-40dd-AFC4-6F175D3DCCD1}">
-              <a14:hiddenFill xmlns="" xmlns:a14="http://schemas.microsoft.com/office/drawing/2010/main">
+              <a14:hiddenFill xmlns:a14="http://schemas.microsoft.com/office/drawing/2010/main" xmlns="">
                 <a:solidFill>
                   <a:schemeClr val="accent1"/>
                 </a:solidFill>
               </a14:hiddenFill>
             </a:ext>
             <a:ext uri="{91240B29-F687-4f45-9708-019B960494DF}">
-              <a14:hiddenLine xmlns="" xmlns:a14="http://schemas.microsoft.com/office/drawing/2010/main" w="9525">
+              <a14:hiddenLine xmlns:a14="http://schemas.microsoft.com/office/drawing/2010/main" xmlns="" w="9525">
                 <a:solidFill>
                   <a:schemeClr val="tx1"/>
                 </a:solidFill>
@@ -36072,7 +36072,7 @@
               </a14:hiddenLine>
             </a:ext>
             <a:ext uri="{AF507438-7753-43e0-B8FC-AC1667EBCBE1}">
-              <a14:hiddenEffects xmlns="" xmlns:a14="http://schemas.microsoft.com/office/drawing/2010/main">
+              <a14:hiddenEffects xmlns:a14="http://schemas.microsoft.com/office/drawing/2010/main" xmlns="">
                 <a:effectLst>
                   <a:outerShdw blurRad="63500" dist="38099" dir="2700000" algn="ctr" rotWithShape="0">
                     <a:schemeClr val="bg2">
@@ -36122,14 +36122,14 @@
           <a:effectLst/>
           <a:extLst>
             <a:ext uri="{909E8E84-426E-40dd-AFC4-6F175D3DCCD1}">
-              <a14:hiddenFill xmlns="" xmlns:a14="http://schemas.microsoft.com/office/drawing/2010/main">
+              <a14:hiddenFill xmlns:a14="http://schemas.microsoft.com/office/drawing/2010/main" xmlns="">
                 <a:solidFill>
                   <a:schemeClr val="accent1"/>
                 </a:solidFill>
               </a14:hiddenFill>
             </a:ext>
             <a:ext uri="{91240B29-F687-4f45-9708-019B960494DF}">
-              <a14:hiddenLine xmlns="" xmlns:a14="http://schemas.microsoft.com/office/drawing/2010/main" w="9525">
+              <a14:hiddenLine xmlns:a14="http://schemas.microsoft.com/office/drawing/2010/main" xmlns="" w="9525">
                 <a:solidFill>
                   <a:schemeClr val="tx1"/>
                 </a:solidFill>
@@ -36139,7 +36139,7 @@
               </a14:hiddenLine>
             </a:ext>
             <a:ext uri="{AF507438-7753-43e0-B8FC-AC1667EBCBE1}">
-              <a14:hiddenEffects xmlns="" xmlns:a14="http://schemas.microsoft.com/office/drawing/2010/main">
+              <a14:hiddenEffects xmlns:a14="http://schemas.microsoft.com/office/drawing/2010/main" xmlns="">
                 <a:effectLst>
                   <a:outerShdw blurRad="63500" dist="38099" dir="2700000" algn="ctr" rotWithShape="0">
                     <a:schemeClr val="bg2">
@@ -36194,12 +36194,12 @@
           <a:effectLst/>
           <a:extLst>
             <a:ext uri="{909E8E84-426E-40dd-AFC4-6F175D3DCCD1}">
-              <a14:hiddenFill xmlns="" xmlns:a14="http://schemas.microsoft.com/office/drawing/2010/main">
+              <a14:hiddenFill xmlns:a14="http://schemas.microsoft.com/office/drawing/2010/main" xmlns="">
                 <a:noFill/>
               </a14:hiddenFill>
             </a:ext>
             <a:ext uri="{AF507438-7753-43e0-B8FC-AC1667EBCBE1}">
-              <a14:hiddenEffects xmlns="" xmlns:a14="http://schemas.microsoft.com/office/drawing/2010/main">
+              <a14:hiddenEffects xmlns:a14="http://schemas.microsoft.com/office/drawing/2010/main" xmlns="">
                 <a:effectLst>
                   <a:outerShdw blurRad="63500" dist="38099" dir="2700000" algn="ctr" rotWithShape="0">
                     <a:schemeClr val="bg2">
@@ -36242,14 +36242,14 @@
           <a:effectLst/>
           <a:extLst>
             <a:ext uri="{909E8E84-426E-40dd-AFC4-6F175D3DCCD1}">
-              <a14:hiddenFill xmlns="" xmlns:a14="http://schemas.microsoft.com/office/drawing/2010/main">
+              <a14:hiddenFill xmlns:a14="http://schemas.microsoft.com/office/drawing/2010/main" xmlns="">
                 <a:solidFill>
                   <a:schemeClr val="accent1"/>
                 </a:solidFill>
               </a14:hiddenFill>
             </a:ext>
             <a:ext uri="{91240B29-F687-4f45-9708-019B960494DF}">
-              <a14:hiddenLine xmlns="" xmlns:a14="http://schemas.microsoft.com/office/drawing/2010/main" w="9525">
+              <a14:hiddenLine xmlns:a14="http://schemas.microsoft.com/office/drawing/2010/main" xmlns="" w="9525">
                 <a:solidFill>
                   <a:schemeClr val="tx1"/>
                 </a:solidFill>
@@ -36259,7 +36259,7 @@
               </a14:hiddenLine>
             </a:ext>
             <a:ext uri="{AF507438-7753-43e0-B8FC-AC1667EBCBE1}">
-              <a14:hiddenEffects xmlns="" xmlns:a14="http://schemas.microsoft.com/office/drawing/2010/main">
+              <a14:hiddenEffects xmlns:a14="http://schemas.microsoft.com/office/drawing/2010/main" xmlns="">
                 <a:effectLst>
                   <a:outerShdw blurRad="63500" dist="38099" dir="2700000" algn="ctr" rotWithShape="0">
                     <a:schemeClr val="bg2">
@@ -36316,14 +36316,14 @@
           <a:effectLst/>
           <a:extLst>
             <a:ext uri="{909E8E84-426E-40dd-AFC4-6F175D3DCCD1}">
-              <a14:hiddenFill xmlns="" xmlns:a14="http://schemas.microsoft.com/office/drawing/2010/main">
+              <a14:hiddenFill xmlns:a14="http://schemas.microsoft.com/office/drawing/2010/main" xmlns="">
                 <a:solidFill>
                   <a:schemeClr val="accent1"/>
                 </a:solidFill>
               </a14:hiddenFill>
             </a:ext>
             <a:ext uri="{91240B29-F687-4f45-9708-019B960494DF}">
-              <a14:hiddenLine xmlns="" xmlns:a14="http://schemas.microsoft.com/office/drawing/2010/main" w="9525">
+              <a14:hiddenLine xmlns:a14="http://schemas.microsoft.com/office/drawing/2010/main" xmlns="" w="9525">
                 <a:solidFill>
                   <a:schemeClr val="tx1"/>
                 </a:solidFill>
@@ -36333,7 +36333,7 @@
               </a14:hiddenLine>
             </a:ext>
             <a:ext uri="{AF507438-7753-43e0-B8FC-AC1667EBCBE1}">
-              <a14:hiddenEffects xmlns="" xmlns:a14="http://schemas.microsoft.com/office/drawing/2010/main">
+              <a14:hiddenEffects xmlns:a14="http://schemas.microsoft.com/office/drawing/2010/main" xmlns="">
                 <a:effectLst>
                   <a:outerShdw blurRad="63500" dist="38099" dir="2700000" algn="ctr" rotWithShape="0">
                     <a:schemeClr val="bg2">
@@ -36872,12 +36872,12 @@
           <a:effectLst/>
           <a:extLst>
             <a:ext uri="{909E8E84-426E-40dd-AFC4-6F175D3DCCD1}">
-              <a14:hiddenFill xmlns="" xmlns:a14="http://schemas.microsoft.com/office/drawing/2010/main">
+              <a14:hiddenFill xmlns:a14="http://schemas.microsoft.com/office/drawing/2010/main" xmlns="">
                 <a:noFill/>
               </a14:hiddenFill>
             </a:ext>
             <a:ext uri="{AF507438-7753-43e0-B8FC-AC1667EBCBE1}">
-              <a14:hiddenEffects xmlns="" xmlns:a14="http://schemas.microsoft.com/office/drawing/2010/main">
+              <a14:hiddenEffects xmlns:a14="http://schemas.microsoft.com/office/drawing/2010/main" xmlns="">
                 <a:effectLst>
                   <a:outerShdw blurRad="63500" dist="38099" dir="2700000" algn="ctr" rotWithShape="0">
                     <a:schemeClr val="bg2">
@@ -37010,12 +37010,12 @@
           <a:effectLst/>
           <a:extLst>
             <a:ext uri="{909E8E84-426E-40dd-AFC4-6F175D3DCCD1}">
-              <a14:hiddenFill xmlns="" xmlns:a14="http://schemas.microsoft.com/office/drawing/2010/main">
+              <a14:hiddenFill xmlns:a14="http://schemas.microsoft.com/office/drawing/2010/main" xmlns="">
                 <a:noFill/>
               </a14:hiddenFill>
             </a:ext>
             <a:ext uri="{AF507438-7753-43e0-B8FC-AC1667EBCBE1}">
-              <a14:hiddenEffects xmlns="" xmlns:a14="http://schemas.microsoft.com/office/drawing/2010/main">
+              <a14:hiddenEffects xmlns:a14="http://schemas.microsoft.com/office/drawing/2010/main" xmlns="">
                 <a:effectLst>
                   <a:outerShdw blurRad="63500" dist="38099" dir="2700000" algn="ctr" rotWithShape="0">
                     <a:schemeClr val="bg2">

</xml_diff>